<commit_message>
initial slide and info work completed, need code for service bus and storage, perhaps logic app walkthrough for event grid
</commit_message>
<xml_diff>
--- a/ServerlessMessagingDemystified.pptx
+++ b/ServerlessMessagingDemystified.pptx
@@ -5,7 +5,7 @@
     <p:sldMasterId id="2147483648" r:id="rId1"/>
   </p:sldMasterIdLst>
   <p:notesMasterIdLst>
-    <p:notesMasterId r:id="rId35"/>
+    <p:notesMasterId r:id="rId37"/>
   </p:notesMasterIdLst>
   <p:sldIdLst>
     <p:sldId id="256" r:id="rId2"/>
@@ -32,15 +32,17 @@
     <p:sldId id="341" r:id="rId23"/>
     <p:sldId id="338" r:id="rId24"/>
     <p:sldId id="345" r:id="rId25"/>
-    <p:sldId id="354" r:id="rId26"/>
-    <p:sldId id="339" r:id="rId27"/>
-    <p:sldId id="342" r:id="rId28"/>
-    <p:sldId id="355" r:id="rId29"/>
-    <p:sldId id="356" r:id="rId30"/>
-    <p:sldId id="343" r:id="rId31"/>
-    <p:sldId id="328" r:id="rId32"/>
-    <p:sldId id="330" r:id="rId33"/>
-    <p:sldId id="329" r:id="rId34"/>
+    <p:sldId id="357" r:id="rId26"/>
+    <p:sldId id="358" r:id="rId27"/>
+    <p:sldId id="354" r:id="rId28"/>
+    <p:sldId id="339" r:id="rId29"/>
+    <p:sldId id="342" r:id="rId30"/>
+    <p:sldId id="355" r:id="rId31"/>
+    <p:sldId id="356" r:id="rId32"/>
+    <p:sldId id="343" r:id="rId33"/>
+    <p:sldId id="328" r:id="rId34"/>
+    <p:sldId id="330" r:id="rId35"/>
+    <p:sldId id="329" r:id="rId36"/>
   </p:sldIdLst>
   <p:sldSz cx="12192000" cy="6858000"/>
   <p:notesSz cx="6858000" cy="9144000"/>
@@ -196,6 +198,8 @@
           <p14:sldIdLst>
             <p14:sldId id="338"/>
             <p14:sldId id="345"/>
+            <p14:sldId id="357"/>
+            <p14:sldId id="358"/>
             <p14:sldId id="354"/>
           </p14:sldIdLst>
         </p14:section>
@@ -314,7 +318,7 @@
           <a:p>
             <a:fld id="{EC6E915F-729B-41B5-9E60-B75A98DB1B95}" type="datetimeFigureOut">
               <a:rPr lang="en-US" smtClean="0"/>
-              <a:t>6/2/2022</a:t>
+              <a:t>6/3/2022</a:t>
             </a:fld>
             <a:endParaRPr lang="en-US"/>
           </a:p>
@@ -781,7 +785,10 @@
           <a:bodyPr/>
           <a:lstStyle/>
           <a:p>
-            <a:endParaRPr lang="en-US" dirty="0"/>
+            <a:r>
+              <a:rPr lang="en-US" dirty="0"/>
+              <a:t>https://docs.microsoft.com/en-us/azure/service-bus-messaging/service-bus-dotnet-how-to-use-topics-subscriptions</a:t>
+            </a:r>
           </a:p>
         </p:txBody>
       </p:sp>
@@ -802,7 +809,7 @@
           <a:p>
             <a:fld id="{8C2E9449-D161-4234-AF44-56BC19BD5257}" type="slidenum">
               <a:rPr lang="en-US" smtClean="0"/>
-              <a:t>29</a:t>
+              <a:t>28</a:t>
             </a:fld>
             <a:endParaRPr lang="en-US"/>
           </a:p>
@@ -811,7 +818,7 @@
     </p:spTree>
     <p:extLst>
       <p:ext uri="{BB962C8B-B14F-4D97-AF65-F5344CB8AC3E}">
-        <p14:creationId xmlns:p14="http://schemas.microsoft.com/office/powerpoint/2010/main" val="3854404646"/>
+        <p14:creationId xmlns:p14="http://schemas.microsoft.com/office/powerpoint/2010/main" val="3129252641"/>
       </p:ext>
     </p:extLst>
   </p:cSld>
@@ -865,30 +872,10 @@
           <a:bodyPr/>
           <a:lstStyle/>
           <a:p>
-            <a:pPr marL="0" marR="0" lvl="0" indent="0" algn="l" defTabSz="914400" rtl="0" eaLnBrk="1" fontAlgn="auto" latinLnBrk="0" hangingPunct="1">
-              <a:lnSpc>
-                <a:spcPct val="100000"/>
-              </a:lnSpc>
-              <a:spcBef>
-                <a:spcPts val="0"/>
-              </a:spcBef>
-              <a:spcAft>
-                <a:spcPts val="0"/>
-              </a:spcAft>
-              <a:buClrTx/>
-              <a:buSzTx/>
-              <a:buFontTx/>
-              <a:buNone/>
-              <a:tabLst/>
-              <a:defRPr/>
-            </a:pPr>
             <a:r>
               <a:rPr lang="en-US" dirty="0"/>
-              <a:t>https://docs.microsoft.com/en-us/azure/storage/queues/storage-dotnet-how-to-use-queues?tabs=dotnet</a:t>
-            </a:r>
-          </a:p>
-          <a:p>
-            <a:endParaRPr lang="en-US" dirty="0"/>
+              <a:t>https://docs.microsoft.com/en-us/azure/service-bus-messaging/service-bus-azure-and-service-bus-queues-compared-contrasted</a:t>
+            </a:r>
           </a:p>
         </p:txBody>
       </p:sp>
@@ -909,7 +896,7 @@
           <a:p>
             <a:fld id="{8C2E9449-D161-4234-AF44-56BC19BD5257}" type="slidenum">
               <a:rPr lang="en-US" smtClean="0"/>
-              <a:t>30</a:t>
+              <a:t>29</a:t>
             </a:fld>
             <a:endParaRPr lang="en-US"/>
           </a:p>
@@ -918,7 +905,7 @@
     </p:spTree>
     <p:extLst>
       <p:ext uri="{BB962C8B-B14F-4D97-AF65-F5344CB8AC3E}">
-        <p14:creationId xmlns:p14="http://schemas.microsoft.com/office/powerpoint/2010/main" val="313362551"/>
+        <p14:creationId xmlns:p14="http://schemas.microsoft.com/office/powerpoint/2010/main" val="3790585450"/>
       </p:ext>
     </p:extLst>
   </p:cSld>
@@ -993,7 +980,7 @@
           <a:p>
             <a:fld id="{8C2E9449-D161-4234-AF44-56BC19BD5257}" type="slidenum">
               <a:rPr lang="en-US" smtClean="0"/>
-              <a:t>32</a:t>
+              <a:t>31</a:t>
             </a:fld>
             <a:endParaRPr lang="en-US"/>
           </a:p>
@@ -1002,7 +989,7 @@
     </p:spTree>
     <p:extLst>
       <p:ext uri="{BB962C8B-B14F-4D97-AF65-F5344CB8AC3E}">
-        <p14:creationId xmlns:p14="http://schemas.microsoft.com/office/powerpoint/2010/main" val="1009367226"/>
+        <p14:creationId xmlns:p14="http://schemas.microsoft.com/office/powerpoint/2010/main" val="3854404646"/>
       </p:ext>
     </p:extLst>
   </p:cSld>
@@ -1056,6 +1043,197 @@
           <a:bodyPr/>
           <a:lstStyle/>
           <a:p>
+            <a:pPr marL="0" marR="0" lvl="0" indent="0" algn="l" defTabSz="914400" rtl="0" eaLnBrk="1" fontAlgn="auto" latinLnBrk="0" hangingPunct="1">
+              <a:lnSpc>
+                <a:spcPct val="100000"/>
+              </a:lnSpc>
+              <a:spcBef>
+                <a:spcPts val="0"/>
+              </a:spcBef>
+              <a:spcAft>
+                <a:spcPts val="0"/>
+              </a:spcAft>
+              <a:buClrTx/>
+              <a:buSzTx/>
+              <a:buFontTx/>
+              <a:buNone/>
+              <a:tabLst/>
+              <a:defRPr/>
+            </a:pPr>
+            <a:r>
+              <a:rPr lang="en-US" dirty="0"/>
+              <a:t>https://docs.microsoft.com/en-us/azure/storage/queues/storage-dotnet-how-to-use-queues?tabs=dotnet</a:t>
+            </a:r>
+          </a:p>
+          <a:p>
+            <a:endParaRPr lang="en-US" dirty="0"/>
+          </a:p>
+        </p:txBody>
+      </p:sp>
+      <p:sp>
+        <p:nvSpPr>
+          <p:cNvPr id="4" name="Slide Number Placeholder 3"/>
+          <p:cNvSpPr>
+            <a:spLocks noGrp="1"/>
+          </p:cNvSpPr>
+          <p:nvPr>
+            <p:ph type="sldNum" sz="quarter" idx="5"/>
+          </p:nvPr>
+        </p:nvSpPr>
+        <p:spPr/>
+        <p:txBody>
+          <a:bodyPr/>
+          <a:lstStyle/>
+          <a:p>
+            <a:fld id="{8C2E9449-D161-4234-AF44-56BC19BD5257}" type="slidenum">
+              <a:rPr lang="en-US" smtClean="0"/>
+              <a:t>32</a:t>
+            </a:fld>
+            <a:endParaRPr lang="en-US"/>
+          </a:p>
+        </p:txBody>
+      </p:sp>
+    </p:spTree>
+    <p:extLst>
+      <p:ext uri="{BB962C8B-B14F-4D97-AF65-F5344CB8AC3E}">
+        <p14:creationId xmlns:p14="http://schemas.microsoft.com/office/powerpoint/2010/main" val="313362551"/>
+      </p:ext>
+    </p:extLst>
+  </p:cSld>
+  <p:clrMapOvr>
+    <a:masterClrMapping/>
+  </p:clrMapOvr>
+</p:notes>
+</file>
+
+<file path=ppt/notesSlides/notesSlide14.xml><?xml version="1.0" encoding="utf-8"?>
+<p:notes xmlns:a="http://schemas.openxmlformats.org/drawingml/2006/main" xmlns:r="http://schemas.openxmlformats.org/officeDocument/2006/relationships" xmlns:p="http://schemas.openxmlformats.org/presentationml/2006/main">
+  <p:cSld>
+    <p:spTree>
+      <p:nvGrpSpPr>
+        <p:cNvPr id="1" name=""/>
+        <p:cNvGrpSpPr/>
+        <p:nvPr/>
+      </p:nvGrpSpPr>
+      <p:grpSpPr>
+        <a:xfrm>
+          <a:off x="0" y="0"/>
+          <a:ext cx="0" cy="0"/>
+          <a:chOff x="0" y="0"/>
+          <a:chExt cx="0" cy="0"/>
+        </a:xfrm>
+      </p:grpSpPr>
+      <p:sp>
+        <p:nvSpPr>
+          <p:cNvPr id="2" name="Slide Image Placeholder 1"/>
+          <p:cNvSpPr>
+            <a:spLocks noGrp="1" noRot="1" noChangeAspect="1"/>
+          </p:cNvSpPr>
+          <p:nvPr>
+            <p:ph type="sldImg"/>
+          </p:nvPr>
+        </p:nvSpPr>
+        <p:spPr/>
+      </p:sp>
+      <p:sp>
+        <p:nvSpPr>
+          <p:cNvPr id="3" name="Notes Placeholder 2"/>
+          <p:cNvSpPr>
+            <a:spLocks noGrp="1"/>
+          </p:cNvSpPr>
+          <p:nvPr>
+            <p:ph type="body" idx="1"/>
+          </p:nvPr>
+        </p:nvSpPr>
+        <p:spPr/>
+        <p:txBody>
+          <a:bodyPr/>
+          <a:lstStyle/>
+          <a:p>
+            <a:endParaRPr lang="en-US" dirty="0"/>
+          </a:p>
+        </p:txBody>
+      </p:sp>
+      <p:sp>
+        <p:nvSpPr>
+          <p:cNvPr id="4" name="Slide Number Placeholder 3"/>
+          <p:cNvSpPr>
+            <a:spLocks noGrp="1"/>
+          </p:cNvSpPr>
+          <p:nvPr>
+            <p:ph type="sldNum" sz="quarter" idx="5"/>
+          </p:nvPr>
+        </p:nvSpPr>
+        <p:spPr/>
+        <p:txBody>
+          <a:bodyPr/>
+          <a:lstStyle/>
+          <a:p>
+            <a:fld id="{8C2E9449-D161-4234-AF44-56BC19BD5257}" type="slidenum">
+              <a:rPr lang="en-US" smtClean="0"/>
+              <a:t>34</a:t>
+            </a:fld>
+            <a:endParaRPr lang="en-US"/>
+          </a:p>
+        </p:txBody>
+      </p:sp>
+    </p:spTree>
+    <p:extLst>
+      <p:ext uri="{BB962C8B-B14F-4D97-AF65-F5344CB8AC3E}">
+        <p14:creationId xmlns:p14="http://schemas.microsoft.com/office/powerpoint/2010/main" val="1009367226"/>
+      </p:ext>
+    </p:extLst>
+  </p:cSld>
+  <p:clrMapOvr>
+    <a:masterClrMapping/>
+  </p:clrMapOvr>
+</p:notes>
+</file>
+
+<file path=ppt/notesSlides/notesSlide15.xml><?xml version="1.0" encoding="utf-8"?>
+<p:notes xmlns:a="http://schemas.openxmlformats.org/drawingml/2006/main" xmlns:r="http://schemas.openxmlformats.org/officeDocument/2006/relationships" xmlns:p="http://schemas.openxmlformats.org/presentationml/2006/main">
+  <p:cSld>
+    <p:spTree>
+      <p:nvGrpSpPr>
+        <p:cNvPr id="1" name=""/>
+        <p:cNvGrpSpPr/>
+        <p:nvPr/>
+      </p:nvGrpSpPr>
+      <p:grpSpPr>
+        <a:xfrm>
+          <a:off x="0" y="0"/>
+          <a:ext cx="0" cy="0"/>
+          <a:chOff x="0" y="0"/>
+          <a:chExt cx="0" cy="0"/>
+        </a:xfrm>
+      </p:grpSpPr>
+      <p:sp>
+        <p:nvSpPr>
+          <p:cNvPr id="2" name="Slide Image Placeholder 1"/>
+          <p:cNvSpPr>
+            <a:spLocks noGrp="1" noRot="1" noChangeAspect="1"/>
+          </p:cNvSpPr>
+          <p:nvPr>
+            <p:ph type="sldImg"/>
+          </p:nvPr>
+        </p:nvSpPr>
+        <p:spPr/>
+      </p:sp>
+      <p:sp>
+        <p:nvSpPr>
+          <p:cNvPr id="3" name="Notes Placeholder 2"/>
+          <p:cNvSpPr>
+            <a:spLocks noGrp="1"/>
+          </p:cNvSpPr>
+          <p:nvPr>
+            <p:ph type="body" idx="1"/>
+          </p:nvPr>
+        </p:nvSpPr>
+        <p:spPr/>
+        <p:txBody>
+          <a:bodyPr/>
+          <a:lstStyle/>
+          <a:p>
             <a:r>
               <a:rPr lang="en-US" dirty="0"/>
               <a:t>Thank you for attending my talk today.  Please reach out and connect. </a:t>
@@ -1111,7 +1289,7 @@
           <a:p>
             <a:fld id="{8C2E9449-D161-4234-AF44-56BC19BD5257}" type="slidenum">
               <a:rPr lang="en-US" smtClean="0"/>
-              <a:t>33</a:t>
+              <a:t>35</a:t>
             </a:fld>
             <a:endParaRPr lang="en-US"/>
           </a:p>
@@ -1729,7 +1907,7 @@
           <a:p>
             <a:fld id="{8C2E9449-D161-4234-AF44-56BC19BD5257}" type="slidenum">
               <a:rPr lang="en-US" smtClean="0"/>
-              <a:t>25</a:t>
+              <a:t>23</a:t>
             </a:fld>
             <a:endParaRPr lang="en-US"/>
           </a:p>
@@ -1738,7 +1916,7 @@
     </p:spTree>
     <p:extLst>
       <p:ext uri="{BB962C8B-B14F-4D97-AF65-F5344CB8AC3E}">
-        <p14:creationId xmlns:p14="http://schemas.microsoft.com/office/powerpoint/2010/main" val="3266879566"/>
+        <p14:creationId xmlns:p14="http://schemas.microsoft.com/office/powerpoint/2010/main" val="927344670"/>
       </p:ext>
     </p:extLst>
   </p:cSld>
@@ -1792,10 +1970,7 @@
           <a:bodyPr/>
           <a:lstStyle/>
           <a:p>
-            <a:r>
-              <a:rPr lang="en-US" dirty="0"/>
-              <a:t>https://docs.microsoft.com/en-us/azure/service-bus-messaging/service-bus-dotnet-how-to-use-topics-subscriptions</a:t>
-            </a:r>
+            <a:endParaRPr lang="en-US" dirty="0"/>
           </a:p>
         </p:txBody>
       </p:sp>
@@ -1816,7 +1991,7 @@
           <a:p>
             <a:fld id="{8C2E9449-D161-4234-AF44-56BC19BD5257}" type="slidenum">
               <a:rPr lang="en-US" smtClean="0"/>
-              <a:t>26</a:t>
+              <a:t>25</a:t>
             </a:fld>
             <a:endParaRPr lang="en-US"/>
           </a:p>
@@ -1825,7 +2000,7 @@
     </p:spTree>
     <p:extLst>
       <p:ext uri="{BB962C8B-B14F-4D97-AF65-F5344CB8AC3E}">
-        <p14:creationId xmlns:p14="http://schemas.microsoft.com/office/powerpoint/2010/main" val="3129252641"/>
+        <p14:creationId xmlns:p14="http://schemas.microsoft.com/office/powerpoint/2010/main" val="522867708"/>
       </p:ext>
     </p:extLst>
   </p:cSld>
@@ -1879,10 +2054,7 @@
           <a:bodyPr/>
           <a:lstStyle/>
           <a:p>
-            <a:r>
-              <a:rPr lang="en-US" dirty="0"/>
-              <a:t>https://docs.microsoft.com/en-us/azure/service-bus-messaging/service-bus-azure-and-service-bus-queues-compared-contrasted</a:t>
-            </a:r>
+            <a:endParaRPr lang="en-US" dirty="0"/>
           </a:p>
         </p:txBody>
       </p:sp>
@@ -1912,7 +2084,7 @@
     </p:spTree>
     <p:extLst>
       <p:ext uri="{BB962C8B-B14F-4D97-AF65-F5344CB8AC3E}">
-        <p14:creationId xmlns:p14="http://schemas.microsoft.com/office/powerpoint/2010/main" val="3790585450"/>
+        <p14:creationId xmlns:p14="http://schemas.microsoft.com/office/powerpoint/2010/main" val="3266879566"/>
       </p:ext>
     </p:extLst>
   </p:cSld>
@@ -2111,7 +2283,7 @@
             <a:fld id="{B61BEF0D-F0BB-DE4B-95CE-6DB70DBA9567}" type="datetimeFigureOut">
               <a:rPr lang="en-US" dirty="0"/>
               <a:pPr/>
-              <a:t>6/2/2022</a:t>
+              <a:t>6/3/2022</a:t>
             </a:fld>
             <a:endParaRPr lang="en-US" dirty="0"/>
           </a:p>
@@ -2446,7 +2618,7 @@
             <a:fld id="{B61BEF0D-F0BB-DE4B-95CE-6DB70DBA9567}" type="datetimeFigureOut">
               <a:rPr lang="en-US" dirty="0"/>
               <a:pPr/>
-              <a:t>6/2/2022</a:t>
+              <a:t>6/3/2022</a:t>
             </a:fld>
             <a:endParaRPr lang="en-US" dirty="0"/>
           </a:p>
@@ -2844,7 +3016,7 @@
             <a:fld id="{B61BEF0D-F0BB-DE4B-95CE-6DB70DBA9567}" type="datetimeFigureOut">
               <a:rPr lang="en-US" dirty="0"/>
               <a:pPr/>
-              <a:t>6/2/2022</a:t>
+              <a:t>6/3/2022</a:t>
             </a:fld>
             <a:endParaRPr lang="en-US" dirty="0"/>
           </a:p>
@@ -3177,7 +3349,7 @@
             <a:fld id="{B61BEF0D-F0BB-DE4B-95CE-6DB70DBA9567}" type="datetimeFigureOut">
               <a:rPr lang="en-US" dirty="0"/>
               <a:pPr/>
-              <a:t>6/2/2022</a:t>
+              <a:t>6/3/2022</a:t>
             </a:fld>
             <a:endParaRPr lang="en-US" dirty="0"/>
           </a:p>
@@ -3494,7 +3666,7 @@
             <a:fld id="{B61BEF0D-F0BB-DE4B-95CE-6DB70DBA9567}" type="datetimeFigureOut">
               <a:rPr lang="en-US" dirty="0"/>
               <a:pPr/>
-              <a:t>6/2/2022</a:t>
+              <a:t>6/3/2022</a:t>
             </a:fld>
             <a:endParaRPr lang="en-US" dirty="0"/>
           </a:p>
@@ -3887,7 +4059,7 @@
             <a:fld id="{B61BEF0D-F0BB-DE4B-95CE-6DB70DBA9567}" type="datetimeFigureOut">
               <a:rPr lang="en-US" dirty="0"/>
               <a:pPr/>
-              <a:t>6/2/2022</a:t>
+              <a:t>6/3/2022</a:t>
             </a:fld>
             <a:endParaRPr lang="en-US" dirty="0"/>
           </a:p>
@@ -4141,7 +4313,7 @@
             <a:fld id="{B61BEF0D-F0BB-DE4B-95CE-6DB70DBA9567}" type="datetimeFigureOut">
               <a:rPr lang="en-US" dirty="0"/>
               <a:pPr/>
-              <a:t>6/2/2022</a:t>
+              <a:t>6/3/2022</a:t>
             </a:fld>
             <a:endParaRPr lang="en-US" dirty="0"/>
           </a:p>
@@ -4400,7 +4572,7 @@
             <a:fld id="{B61BEF0D-F0BB-DE4B-95CE-6DB70DBA9567}" type="datetimeFigureOut">
               <a:rPr lang="en-US" dirty="0"/>
               <a:pPr/>
-              <a:t>6/2/2022</a:t>
+              <a:t>6/3/2022</a:t>
             </a:fld>
             <a:endParaRPr lang="en-US" dirty="0"/>
           </a:p>
@@ -4659,7 +4831,7 @@
             <a:fld id="{B61BEF0D-F0BB-DE4B-95CE-6DB70DBA9567}" type="datetimeFigureOut">
               <a:rPr lang="en-US" dirty="0"/>
               <a:pPr/>
-              <a:t>6/2/2022</a:t>
+              <a:t>6/3/2022</a:t>
             </a:fld>
             <a:endParaRPr lang="en-US" dirty="0"/>
           </a:p>
@@ -4985,7 +5157,7 @@
             <a:fld id="{B61BEF0D-F0BB-DE4B-95CE-6DB70DBA9567}" type="datetimeFigureOut">
               <a:rPr lang="en-US" dirty="0"/>
               <a:pPr/>
-              <a:t>6/2/2022</a:t>
+              <a:t>6/3/2022</a:t>
             </a:fld>
             <a:endParaRPr lang="en-US" dirty="0"/>
           </a:p>
@@ -5305,7 +5477,7 @@
             <a:fld id="{B61BEF0D-F0BB-DE4B-95CE-6DB70DBA9567}" type="datetimeFigureOut">
               <a:rPr lang="en-US" dirty="0"/>
               <a:pPr/>
-              <a:t>6/2/2022</a:t>
+              <a:t>6/3/2022</a:t>
             </a:fld>
             <a:endParaRPr lang="en-US" dirty="0"/>
           </a:p>
@@ -5759,7 +5931,7 @@
             <a:fld id="{B61BEF0D-F0BB-DE4B-95CE-6DB70DBA9567}" type="datetimeFigureOut">
               <a:rPr lang="en-US" dirty="0"/>
               <a:pPr/>
-              <a:t>6/2/2022</a:t>
+              <a:t>6/3/2022</a:t>
             </a:fld>
             <a:endParaRPr lang="en-US" dirty="0"/>
           </a:p>
@@ -5961,7 +6133,7 @@
             <a:fld id="{B61BEF0D-F0BB-DE4B-95CE-6DB70DBA9567}" type="datetimeFigureOut">
               <a:rPr lang="en-US" dirty="0"/>
               <a:pPr/>
-              <a:t>6/2/2022</a:t>
+              <a:t>6/3/2022</a:t>
             </a:fld>
             <a:endParaRPr lang="en-US" dirty="0"/>
           </a:p>
@@ -6135,7 +6307,7 @@
             <a:fld id="{B61BEF0D-F0BB-DE4B-95CE-6DB70DBA9567}" type="datetimeFigureOut">
               <a:rPr lang="en-US" dirty="0"/>
               <a:pPr/>
-              <a:t>6/2/2022</a:t>
+              <a:t>6/3/2022</a:t>
             </a:fld>
             <a:endParaRPr lang="en-US" dirty="0"/>
           </a:p>
@@ -6465,7 +6637,7 @@
             <a:fld id="{B61BEF0D-F0BB-DE4B-95CE-6DB70DBA9567}" type="datetimeFigureOut">
               <a:rPr lang="en-US" dirty="0"/>
               <a:pPr/>
-              <a:t>6/2/2022</a:t>
+              <a:t>6/3/2022</a:t>
             </a:fld>
             <a:endParaRPr lang="en-US" dirty="0"/>
           </a:p>
@@ -6807,7 +6979,7 @@
             <a:fld id="{B61BEF0D-F0BB-DE4B-95CE-6DB70DBA9567}" type="datetimeFigureOut">
               <a:rPr lang="en-US" dirty="0"/>
               <a:pPr/>
-              <a:t>6/2/2022</a:t>
+              <a:t>6/3/2022</a:t>
             </a:fld>
             <a:endParaRPr lang="en-US" dirty="0"/>
           </a:p>
@@ -8921,7 +9093,7 @@
             <a:fld id="{B61BEF0D-F0BB-DE4B-95CE-6DB70DBA9567}" type="datetimeFigureOut">
               <a:rPr lang="en-US" dirty="0"/>
               <a:pPr/>
-              <a:t>6/2/2022</a:t>
+              <a:t>6/3/2022</a:t>
             </a:fld>
             <a:endParaRPr lang="en-US" dirty="0"/>
           </a:p>
@@ -10702,12 +10874,103 @@
             <p:ph idx="1"/>
           </p:nvPr>
         </p:nvSpPr>
-        <p:spPr/>
+        <p:spPr>
+          <a:xfrm>
+            <a:off x="2589212" y="1352811"/>
+            <a:ext cx="8915400" cy="4881079"/>
+          </a:xfrm>
+        </p:spPr>
         <p:txBody>
-          <a:bodyPr/>
+          <a:bodyPr>
+            <a:normAutofit fontScale="85000" lnSpcReduction="20000"/>
+          </a:bodyPr>
           <a:lstStyle/>
           <a:p>
-            <a:endParaRPr lang="en-US"/>
+            <a:r>
+              <a:rPr lang="en-US" sz="2600" dirty="0"/>
+              <a:t>Capable of true FIFO (ordered) processing to one or more competing consumers</a:t>
+            </a:r>
+          </a:p>
+          <a:p>
+            <a:r>
+              <a:rPr lang="en-US" sz="2600" dirty="0"/>
+              <a:t>256 kb max message size</a:t>
+            </a:r>
+          </a:p>
+          <a:p>
+            <a:r>
+              <a:rPr lang="en-US" sz="2600" dirty="0"/>
+              <a:t>Duplicate Detection</a:t>
+            </a:r>
+          </a:p>
+          <a:p>
+            <a:r>
+              <a:rPr lang="en-US" sz="2600" dirty="0"/>
+              <a:t>Provides decoupling of application components, thereby helping with load-levelling/load-balancing</a:t>
+            </a:r>
+          </a:p>
+          <a:p>
+            <a:r>
+              <a:rPr lang="en-US" sz="2600" dirty="0"/>
+              <a:t>Modes</a:t>
+            </a:r>
+          </a:p>
+          <a:p>
+            <a:pPr lvl="1"/>
+            <a:r>
+              <a:rPr lang="en-US" sz="2200" b="1" dirty="0"/>
+              <a:t>Receive and Delete </a:t>
+            </a:r>
+            <a:r>
+              <a:rPr lang="en-US" sz="2200" dirty="0"/>
+              <a:t>[use when app can tolerate not processing messages]</a:t>
+            </a:r>
+          </a:p>
+          <a:p>
+            <a:pPr lvl="1"/>
+            <a:r>
+              <a:rPr lang="en-US" sz="2200" b="1" dirty="0"/>
+              <a:t>Peek Lock </a:t>
+            </a:r>
+            <a:r>
+              <a:rPr lang="en-US" sz="2200" dirty="0"/>
+              <a:t>[apps cannot tolerate not processing.  Locks, then marks completed]</a:t>
+            </a:r>
+          </a:p>
+          <a:p>
+            <a:pPr lvl="2"/>
+            <a:r>
+              <a:rPr lang="en-US" sz="1900" dirty="0"/>
+              <a:t>Message is abandoned and returned or occurs after timeout expires</a:t>
+            </a:r>
+          </a:p>
+          <a:p>
+            <a:pPr lvl="2"/>
+            <a:r>
+              <a:rPr lang="en-US" sz="1900" dirty="0"/>
+              <a:t>At-least once processing</a:t>
+            </a:r>
+          </a:p>
+          <a:p>
+            <a:pPr lvl="2"/>
+            <a:r>
+              <a:rPr lang="en-US" sz="1900" dirty="0"/>
+              <a:t>At-most once processing</a:t>
+            </a:r>
+          </a:p>
+          <a:p>
+            <a:pPr lvl="1"/>
+            <a:endParaRPr lang="en-US" dirty="0"/>
+          </a:p>
+          <a:p>
+            <a:pPr lvl="1"/>
+            <a:endParaRPr lang="en-US" dirty="0"/>
+          </a:p>
+          <a:p>
+            <a:endParaRPr lang="en-US" dirty="0"/>
+          </a:p>
+          <a:p>
+            <a:endParaRPr lang="en-US" dirty="0"/>
           </a:p>
         </p:txBody>
       </p:sp>
@@ -15087,12 +15350,56 @@
             <p:ph idx="1"/>
           </p:nvPr>
         </p:nvSpPr>
-        <p:spPr/>
+        <p:spPr>
+          <a:xfrm>
+            <a:off x="2589212" y="1615858"/>
+            <a:ext cx="8915400" cy="4295364"/>
+          </a:xfrm>
+        </p:spPr>
         <p:txBody>
           <a:bodyPr/>
           <a:lstStyle/>
           <a:p>
-            <a:endParaRPr lang="en-US"/>
+            <a:r>
+              <a:rPr lang="en-US" sz="2400" dirty="0"/>
+              <a:t>Create topics with one or more subscriptions for Pub/Sub pattern</a:t>
+            </a:r>
+          </a:p>
+          <a:p>
+            <a:r>
+              <a:rPr lang="en-US" sz="2400" dirty="0"/>
+              <a:t>Can handle dead-letter messaging</a:t>
+            </a:r>
+          </a:p>
+          <a:p>
+            <a:r>
+              <a:rPr lang="en-US" sz="2400" dirty="0"/>
+              <a:t>Filter at the subscription level to only receive messages important to the subscriber</a:t>
+            </a:r>
+          </a:p>
+          <a:p>
+            <a:r>
+              <a:rPr lang="en-US" sz="2400" dirty="0"/>
+              <a:t>Subscriptions act as a virtual queue with copies of the messages</a:t>
+            </a:r>
+          </a:p>
+          <a:p>
+            <a:r>
+              <a:rPr lang="en-US" sz="2400" dirty="0"/>
+              <a:t>All the same benefits of a queue but can be leveraged through multiple filtered subscriptions</a:t>
+            </a:r>
+          </a:p>
+          <a:p>
+            <a:pPr marL="0" indent="0">
+              <a:buNone/>
+            </a:pPr>
+            <a:endParaRPr lang="en-US" dirty="0"/>
+          </a:p>
+          <a:p>
+            <a:endParaRPr lang="en-US" dirty="0"/>
+          </a:p>
+          <a:p>
+            <a:endParaRPr lang="en-US" dirty="0"/>
           </a:p>
         </p:txBody>
       </p:sp>
@@ -15110,6 +15417,391 @@
 </file>
 
 <file path=ppt/slides/slide25.xml><?xml version="1.0" encoding="utf-8"?>
+<p:sld xmlns:a="http://schemas.openxmlformats.org/drawingml/2006/main" xmlns:r="http://schemas.openxmlformats.org/officeDocument/2006/relationships" xmlns:p="http://schemas.openxmlformats.org/presentationml/2006/main">
+  <p:cSld>
+    <p:spTree>
+      <p:nvGrpSpPr>
+        <p:cNvPr id="1" name=""/>
+        <p:cNvGrpSpPr/>
+        <p:nvPr/>
+      </p:nvGrpSpPr>
+      <p:grpSpPr>
+        <a:xfrm>
+          <a:off x="0" y="0"/>
+          <a:ext cx="0" cy="0"/>
+          <a:chOff x="0" y="0"/>
+          <a:chExt cx="0" cy="0"/>
+        </a:xfrm>
+      </p:grpSpPr>
+      <p:sp>
+        <p:nvSpPr>
+          <p:cNvPr id="2" name="Title 1">
+            <a:extLst>
+              <a:ext uri="{FF2B5EF4-FFF2-40B4-BE49-F238E27FC236}">
+                <a16:creationId xmlns:a16="http://schemas.microsoft.com/office/drawing/2014/main" id="{42820365-0C4B-7C8C-79A1-1538537E5F91}"/>
+              </a:ext>
+            </a:extLst>
+          </p:cNvPr>
+          <p:cNvSpPr>
+            <a:spLocks noGrp="1"/>
+          </p:cNvSpPr>
+          <p:nvPr>
+            <p:ph type="title"/>
+          </p:nvPr>
+        </p:nvSpPr>
+        <p:spPr/>
+        <p:txBody>
+          <a:bodyPr/>
+          <a:lstStyle/>
+          <a:p>
+            <a:r>
+              <a:rPr lang="en-US" dirty="0"/>
+              <a:t>Service Bus Pub/Sub cont.</a:t>
+            </a:r>
+          </a:p>
+        </p:txBody>
+      </p:sp>
+      <p:sp>
+        <p:nvSpPr>
+          <p:cNvPr id="3" name="Content Placeholder 2">
+            <a:extLst>
+              <a:ext uri="{FF2B5EF4-FFF2-40B4-BE49-F238E27FC236}">
+                <a16:creationId xmlns:a16="http://schemas.microsoft.com/office/drawing/2014/main" id="{CF5138A8-E086-11BE-895C-926370A74C4A}"/>
+              </a:ext>
+            </a:extLst>
+          </p:cNvPr>
+          <p:cNvSpPr>
+            <a:spLocks noGrp="1"/>
+          </p:cNvSpPr>
+          <p:nvPr>
+            <p:ph idx="1"/>
+          </p:nvPr>
+        </p:nvSpPr>
+        <p:spPr>
+          <a:xfrm>
+            <a:off x="2589212" y="1441100"/>
+            <a:ext cx="8915400" cy="5107184"/>
+          </a:xfrm>
+        </p:spPr>
+        <p:txBody>
+          <a:bodyPr>
+            <a:normAutofit fontScale="92500" lnSpcReduction="20000"/>
+          </a:bodyPr>
+          <a:lstStyle/>
+          <a:p>
+            <a:r>
+              <a:rPr lang="en-US" sz="2400" dirty="0"/>
+              <a:t>Leverage both system properties and custom user-defined fields</a:t>
+            </a:r>
+          </a:p>
+          <a:p>
+            <a:r>
+              <a:rPr lang="en-US" sz="2400" dirty="0"/>
+              <a:t>Filter actions with filter expressions</a:t>
+            </a:r>
+          </a:p>
+          <a:p>
+            <a:pPr lvl="1"/>
+            <a:r>
+              <a:rPr lang="en-US" sz="2000" dirty="0"/>
+              <a:t>SQL Filter (exists, IS NULL, AND/OR/NOT)</a:t>
+            </a:r>
+          </a:p>
+          <a:p>
+            <a:pPr lvl="1"/>
+            <a:r>
+              <a:rPr lang="en-US" sz="2000" dirty="0"/>
+              <a:t>Boolean Filter (</a:t>
+            </a:r>
+            <a:r>
+              <a:rPr lang="en-US" sz="2000" dirty="0" err="1"/>
+              <a:t>TrueFilter</a:t>
+            </a:r>
+            <a:r>
+              <a:rPr lang="en-US" sz="2000" dirty="0"/>
+              <a:t> or </a:t>
+            </a:r>
+            <a:r>
+              <a:rPr lang="en-US" sz="2000" dirty="0" err="1"/>
+              <a:t>FalseFilter</a:t>
+            </a:r>
+            <a:r>
+              <a:rPr lang="en-US" sz="2000" dirty="0"/>
+              <a:t>)</a:t>
+            </a:r>
+          </a:p>
+          <a:p>
+            <a:pPr lvl="1"/>
+            <a:r>
+              <a:rPr lang="en-US" sz="2000" dirty="0"/>
+              <a:t>Correlation filter </a:t>
+            </a:r>
+          </a:p>
+          <a:p>
+            <a:pPr lvl="2"/>
+            <a:r>
+              <a:rPr lang="en-US" sz="1800" dirty="0"/>
+              <a:t>Correlation Id</a:t>
+            </a:r>
+          </a:p>
+          <a:p>
+            <a:pPr lvl="2"/>
+            <a:r>
+              <a:rPr lang="en-US" sz="1800" dirty="0" err="1"/>
+              <a:t>ContentType</a:t>
+            </a:r>
+            <a:endParaRPr lang="en-US" sz="1800" dirty="0"/>
+          </a:p>
+          <a:p>
+            <a:pPr lvl="2"/>
+            <a:r>
+              <a:rPr lang="en-US" sz="1800" dirty="0"/>
+              <a:t>Label</a:t>
+            </a:r>
+          </a:p>
+          <a:p>
+            <a:pPr lvl="2"/>
+            <a:r>
+              <a:rPr lang="en-US" sz="1800" dirty="0" err="1"/>
+              <a:t>MessageId</a:t>
+            </a:r>
+            <a:endParaRPr lang="en-US" sz="1800" dirty="0"/>
+          </a:p>
+          <a:p>
+            <a:pPr lvl="2"/>
+            <a:r>
+              <a:rPr lang="en-US" sz="1800" dirty="0" err="1"/>
+              <a:t>ReplyTo</a:t>
+            </a:r>
+            <a:r>
+              <a:rPr lang="en-US" sz="1800" dirty="0"/>
+              <a:t>/</a:t>
+            </a:r>
+            <a:r>
+              <a:rPr lang="en-US" sz="1800" dirty="0" err="1"/>
+              <a:t>ReplyToSessionId</a:t>
+            </a:r>
+            <a:endParaRPr lang="en-US" sz="1800" dirty="0"/>
+          </a:p>
+          <a:p>
+            <a:pPr lvl="2"/>
+            <a:r>
+              <a:rPr lang="en-US" sz="1800" dirty="0" err="1"/>
+              <a:t>SessionId</a:t>
+            </a:r>
+            <a:endParaRPr lang="en-US" sz="1800" dirty="0"/>
+          </a:p>
+          <a:p>
+            <a:pPr lvl="2"/>
+            <a:r>
+              <a:rPr lang="en-US" sz="1800" dirty="0"/>
+              <a:t>To</a:t>
+            </a:r>
+          </a:p>
+          <a:p>
+            <a:pPr lvl="2"/>
+            <a:r>
+              <a:rPr lang="en-US" sz="1800" dirty="0"/>
+              <a:t>Any user-defined properties</a:t>
+            </a:r>
+          </a:p>
+        </p:txBody>
+      </p:sp>
+    </p:spTree>
+    <p:extLst>
+      <p:ext uri="{BB962C8B-B14F-4D97-AF65-F5344CB8AC3E}">
+        <p14:creationId xmlns:p14="http://schemas.microsoft.com/office/powerpoint/2010/main" val="2000262289"/>
+      </p:ext>
+    </p:extLst>
+  </p:cSld>
+  <p:clrMapOvr>
+    <a:masterClrMapping/>
+  </p:clrMapOvr>
+</p:sld>
+</file>
+
+<file path=ppt/slides/slide26.xml><?xml version="1.0" encoding="utf-8"?>
+<p:sld xmlns:a="http://schemas.openxmlformats.org/drawingml/2006/main" xmlns:r="http://schemas.openxmlformats.org/officeDocument/2006/relationships" xmlns:p="http://schemas.openxmlformats.org/presentationml/2006/main">
+  <p:cSld>
+    <p:spTree>
+      <p:nvGrpSpPr>
+        <p:cNvPr id="1" name=""/>
+        <p:cNvGrpSpPr/>
+        <p:nvPr/>
+      </p:nvGrpSpPr>
+      <p:grpSpPr>
+        <a:xfrm>
+          <a:off x="0" y="0"/>
+          <a:ext cx="0" cy="0"/>
+          <a:chOff x="0" y="0"/>
+          <a:chExt cx="0" cy="0"/>
+        </a:xfrm>
+      </p:grpSpPr>
+      <p:sp>
+        <p:nvSpPr>
+          <p:cNvPr id="2" name="Title 1">
+            <a:extLst>
+              <a:ext uri="{FF2B5EF4-FFF2-40B4-BE49-F238E27FC236}">
+                <a16:creationId xmlns:a16="http://schemas.microsoft.com/office/drawing/2014/main" id="{1F38EFE1-CF31-03E7-CAB6-96DE5836DBD8}"/>
+              </a:ext>
+            </a:extLst>
+          </p:cNvPr>
+          <p:cNvSpPr>
+            <a:spLocks noGrp="1"/>
+          </p:cNvSpPr>
+          <p:nvPr>
+            <p:ph type="title"/>
+          </p:nvPr>
+        </p:nvSpPr>
+        <p:spPr/>
+        <p:txBody>
+          <a:bodyPr/>
+          <a:lstStyle/>
+          <a:p>
+            <a:r>
+              <a:rPr lang="en-US" dirty="0"/>
+              <a:t>Service Bus Pub/Sub cont.</a:t>
+            </a:r>
+          </a:p>
+        </p:txBody>
+      </p:sp>
+      <p:sp>
+        <p:nvSpPr>
+          <p:cNvPr id="3" name="Content Placeholder 2">
+            <a:extLst>
+              <a:ext uri="{FF2B5EF4-FFF2-40B4-BE49-F238E27FC236}">
+                <a16:creationId xmlns:a16="http://schemas.microsoft.com/office/drawing/2014/main" id="{6DFC81B8-4905-EC25-C4B4-20151C93F483}"/>
+              </a:ext>
+            </a:extLst>
+          </p:cNvPr>
+          <p:cNvSpPr>
+            <a:spLocks noGrp="1"/>
+          </p:cNvSpPr>
+          <p:nvPr>
+            <p:ph idx="1"/>
+          </p:nvPr>
+        </p:nvSpPr>
+        <p:spPr>
+          <a:xfrm>
+            <a:off x="2589212" y="1563329"/>
+            <a:ext cx="8915400" cy="4347893"/>
+          </a:xfrm>
+        </p:spPr>
+        <p:txBody>
+          <a:bodyPr>
+            <a:normAutofit/>
+          </a:bodyPr>
+          <a:lstStyle/>
+          <a:p>
+            <a:r>
+              <a:rPr lang="en-US" sz="2800" dirty="0"/>
+              <a:t>Service bus Filter examples</a:t>
+            </a:r>
+          </a:p>
+          <a:p>
+            <a:pPr lvl="1"/>
+            <a:r>
+              <a:rPr lang="en-US" sz="2400" dirty="0"/>
+              <a:t>Numeric Values (</a:t>
+            </a:r>
+            <a:r>
+              <a:rPr lang="en-US" sz="2400" dirty="0" err="1"/>
+              <a:t>xyzProperty</a:t>
+            </a:r>
+            <a:r>
+              <a:rPr lang="en-US" sz="2400" dirty="0"/>
+              <a:t> = 10 | </a:t>
+            </a:r>
+            <a:r>
+              <a:rPr lang="en-US" sz="2400" dirty="0" err="1"/>
+              <a:t>xyzProperty</a:t>
+            </a:r>
+            <a:r>
+              <a:rPr lang="en-US" sz="2400" dirty="0"/>
+              <a:t> &gt; 5 and </a:t>
+            </a:r>
+            <a:r>
+              <a:rPr lang="en-US" sz="2400" dirty="0" err="1"/>
+              <a:t>xyzProperty</a:t>
+            </a:r>
+            <a:r>
+              <a:rPr lang="en-US" sz="2400" dirty="0"/>
+              <a:t> &lt; 10)</a:t>
+            </a:r>
+          </a:p>
+          <a:p>
+            <a:pPr lvl="1"/>
+            <a:r>
+              <a:rPr lang="en-US" sz="2400" dirty="0"/>
+              <a:t>Parameters (@someFilterValue -&gt; </a:t>
+            </a:r>
+            <a:r>
+              <a:rPr lang="en-US" sz="2400" dirty="0" err="1"/>
+              <a:t>somefield</a:t>
+            </a:r>
+            <a:r>
+              <a:rPr lang="en-US" sz="2400" dirty="0"/>
+              <a:t> &lt; @someFilterValue)</a:t>
+            </a:r>
+          </a:p>
+          <a:p>
+            <a:pPr lvl="1"/>
+            <a:r>
+              <a:rPr lang="en-US" sz="2400" dirty="0"/>
+              <a:t>In / Not In ( </a:t>
+            </a:r>
+            <a:r>
+              <a:rPr lang="en-US" sz="2400" dirty="0" err="1"/>
+              <a:t>xyzPropertyId</a:t>
+            </a:r>
+            <a:r>
+              <a:rPr lang="en-US" sz="2400" dirty="0"/>
+              <a:t> IN (‘string1’, ‘string2’, …, ‘</a:t>
+            </a:r>
+            <a:r>
+              <a:rPr lang="en-US" sz="2400" dirty="0" err="1"/>
+              <a:t>stringN</a:t>
+            </a:r>
+            <a:r>
+              <a:rPr lang="en-US" sz="2400" dirty="0"/>
+              <a:t>’) and </a:t>
+            </a:r>
+            <a:r>
+              <a:rPr lang="en-US" sz="2400" dirty="0" err="1"/>
+              <a:t>xyzProperty</a:t>
+            </a:r>
+            <a:r>
+              <a:rPr lang="en-US" sz="2400" dirty="0"/>
+              <a:t> NOT IN (‘anotherstring1’, …)</a:t>
+            </a:r>
+          </a:p>
+          <a:p>
+            <a:pPr lvl="1"/>
+            <a:r>
+              <a:rPr lang="en-US" sz="2400" dirty="0" err="1"/>
+              <a:t>CorrelationId</a:t>
+            </a:r>
+            <a:r>
+              <a:rPr lang="en-US" sz="2400" dirty="0"/>
+              <a:t> a</a:t>
+            </a:r>
+          </a:p>
+        </p:txBody>
+      </p:sp>
+    </p:spTree>
+    <p:extLst>
+      <p:ext uri="{BB962C8B-B14F-4D97-AF65-F5344CB8AC3E}">
+        <p14:creationId xmlns:p14="http://schemas.microsoft.com/office/powerpoint/2010/main" val="4277451637"/>
+      </p:ext>
+    </p:extLst>
+  </p:cSld>
+  <p:clrMapOvr>
+    <a:masterClrMapping/>
+  </p:clrMapOvr>
+</p:sld>
+</file>
+
+<file path=ppt/slides/slide27.xml><?xml version="1.0" encoding="utf-8"?>
 <p:sld xmlns:a="http://schemas.openxmlformats.org/drawingml/2006/main" xmlns:r="http://schemas.openxmlformats.org/officeDocument/2006/relationships" xmlns:p="http://schemas.openxmlformats.org/presentationml/2006/main">
   <p:cSld>
     <p:spTree>
@@ -15232,178 +15924,6 @@
 </p:sld>
 </file>
 
-<file path=ppt/slides/slide26.xml><?xml version="1.0" encoding="utf-8"?>
-<p:sld xmlns:a="http://schemas.openxmlformats.org/drawingml/2006/main" xmlns:r="http://schemas.openxmlformats.org/officeDocument/2006/relationships" xmlns:p="http://schemas.openxmlformats.org/presentationml/2006/main">
-  <p:cSld>
-    <p:spTree>
-      <p:nvGrpSpPr>
-        <p:cNvPr id="1" name=""/>
-        <p:cNvGrpSpPr/>
-        <p:nvPr/>
-      </p:nvGrpSpPr>
-      <p:grpSpPr>
-        <a:xfrm>
-          <a:off x="0" y="0"/>
-          <a:ext cx="0" cy="0"/>
-          <a:chOff x="0" y="0"/>
-          <a:chExt cx="0" cy="0"/>
-        </a:xfrm>
-      </p:grpSpPr>
-      <p:sp>
-        <p:nvSpPr>
-          <p:cNvPr id="2" name="Title 1">
-            <a:extLst>
-              <a:ext uri="{FF2B5EF4-FFF2-40B4-BE49-F238E27FC236}">
-                <a16:creationId xmlns:a16="http://schemas.microsoft.com/office/drawing/2014/main" id="{8B10B72A-E8EE-E103-3BAB-B209FBF0E099}"/>
-              </a:ext>
-            </a:extLst>
-          </p:cNvPr>
-          <p:cNvSpPr>
-            <a:spLocks noGrp="1"/>
-          </p:cNvSpPr>
-          <p:nvPr>
-            <p:ph type="title"/>
-          </p:nvPr>
-        </p:nvSpPr>
-        <p:spPr/>
-        <p:txBody>
-          <a:bodyPr/>
-          <a:lstStyle/>
-          <a:p>
-            <a:r>
-              <a:rPr lang="en-US" dirty="0"/>
-              <a:t>Publishing and Subscribing to messages</a:t>
-            </a:r>
-          </a:p>
-        </p:txBody>
-      </p:sp>
-      <p:sp>
-        <p:nvSpPr>
-          <p:cNvPr id="3" name="Text Placeholder 2">
-            <a:extLst>
-              <a:ext uri="{FF2B5EF4-FFF2-40B4-BE49-F238E27FC236}">
-                <a16:creationId xmlns:a16="http://schemas.microsoft.com/office/drawing/2014/main" id="{862566A3-198E-5B8A-39BA-0D758BDFB39F}"/>
-              </a:ext>
-            </a:extLst>
-          </p:cNvPr>
-          <p:cNvSpPr>
-            <a:spLocks noGrp="1"/>
-          </p:cNvSpPr>
-          <p:nvPr>
-            <p:ph type="body" idx="1"/>
-          </p:nvPr>
-        </p:nvSpPr>
-        <p:spPr/>
-        <p:txBody>
-          <a:bodyPr/>
-          <a:lstStyle/>
-          <a:p>
-            <a:r>
-              <a:rPr lang="en-US" dirty="0"/>
-              <a:t>Azure Service Bus messaging</a:t>
-            </a:r>
-          </a:p>
-        </p:txBody>
-      </p:sp>
-    </p:spTree>
-    <p:extLst>
-      <p:ext uri="{BB962C8B-B14F-4D97-AF65-F5344CB8AC3E}">
-        <p14:creationId xmlns:p14="http://schemas.microsoft.com/office/powerpoint/2010/main" val="3085507398"/>
-      </p:ext>
-    </p:extLst>
-  </p:cSld>
-  <p:clrMapOvr>
-    <a:masterClrMapping/>
-  </p:clrMapOvr>
-</p:sld>
-</file>
-
-<file path=ppt/slides/slide27.xml><?xml version="1.0" encoding="utf-8"?>
-<p:sld xmlns:a="http://schemas.openxmlformats.org/drawingml/2006/main" xmlns:r="http://schemas.openxmlformats.org/officeDocument/2006/relationships" xmlns:p="http://schemas.openxmlformats.org/presentationml/2006/main">
-  <p:cSld>
-    <p:spTree>
-      <p:nvGrpSpPr>
-        <p:cNvPr id="1" name=""/>
-        <p:cNvGrpSpPr/>
-        <p:nvPr/>
-      </p:nvGrpSpPr>
-      <p:grpSpPr>
-        <a:xfrm>
-          <a:off x="0" y="0"/>
-          <a:ext cx="0" cy="0"/>
-          <a:chOff x="0" y="0"/>
-          <a:chExt cx="0" cy="0"/>
-        </a:xfrm>
-      </p:grpSpPr>
-      <p:sp>
-        <p:nvSpPr>
-          <p:cNvPr id="2" name="Title 1">
-            <a:extLst>
-              <a:ext uri="{FF2B5EF4-FFF2-40B4-BE49-F238E27FC236}">
-                <a16:creationId xmlns:a16="http://schemas.microsoft.com/office/drawing/2014/main" id="{74C9854A-991D-BE1C-55DF-59ED46CF396C}"/>
-              </a:ext>
-            </a:extLst>
-          </p:cNvPr>
-          <p:cNvSpPr>
-            <a:spLocks noGrp="1"/>
-          </p:cNvSpPr>
-          <p:nvPr>
-            <p:ph type="title"/>
-          </p:nvPr>
-        </p:nvSpPr>
-        <p:spPr/>
-        <p:txBody>
-          <a:bodyPr/>
-          <a:lstStyle/>
-          <a:p>
-            <a:r>
-              <a:rPr lang="en-US" dirty="0"/>
-              <a:t>Azure Storage Queue</a:t>
-            </a:r>
-          </a:p>
-        </p:txBody>
-      </p:sp>
-      <p:sp>
-        <p:nvSpPr>
-          <p:cNvPr id="3" name="Text Placeholder 2">
-            <a:extLst>
-              <a:ext uri="{FF2B5EF4-FFF2-40B4-BE49-F238E27FC236}">
-                <a16:creationId xmlns:a16="http://schemas.microsoft.com/office/drawing/2014/main" id="{DC18811A-0EF0-BA29-A195-9468A42C4AF8}"/>
-              </a:ext>
-            </a:extLst>
-          </p:cNvPr>
-          <p:cNvSpPr>
-            <a:spLocks noGrp="1"/>
-          </p:cNvSpPr>
-          <p:nvPr>
-            <p:ph type="body" idx="1"/>
-          </p:nvPr>
-        </p:nvSpPr>
-        <p:spPr/>
-        <p:txBody>
-          <a:bodyPr/>
-          <a:lstStyle/>
-          <a:p>
-            <a:r>
-              <a:rPr lang="en-US" dirty="0"/>
-              <a:t>A messaging solution that is mostly a queue</a:t>
-            </a:r>
-          </a:p>
-        </p:txBody>
-      </p:sp>
-    </p:spTree>
-    <p:extLst>
-      <p:ext uri="{BB962C8B-B14F-4D97-AF65-F5344CB8AC3E}">
-        <p14:creationId xmlns:p14="http://schemas.microsoft.com/office/powerpoint/2010/main" val="936172737"/>
-      </p:ext>
-    </p:extLst>
-  </p:cSld>
-  <p:clrMapOvr>
-    <a:masterClrMapping/>
-  </p:clrMapOvr>
-</p:sld>
-</file>
-
 <file path=ppt/slides/slide28.xml><?xml version="1.0" encoding="utf-8"?>
 <p:sld xmlns:a="http://schemas.openxmlformats.org/drawingml/2006/main" xmlns:r="http://schemas.openxmlformats.org/officeDocument/2006/relationships" xmlns:p="http://schemas.openxmlformats.org/presentationml/2006/main">
   <p:cSld>
@@ -15423,6 +15943,309 @@
       </p:grpSpPr>
       <p:sp>
         <p:nvSpPr>
+          <p:cNvPr id="2" name="Title 1">
+            <a:extLst>
+              <a:ext uri="{FF2B5EF4-FFF2-40B4-BE49-F238E27FC236}">
+                <a16:creationId xmlns:a16="http://schemas.microsoft.com/office/drawing/2014/main" id="{8B10B72A-E8EE-E103-3BAB-B209FBF0E099}"/>
+              </a:ext>
+            </a:extLst>
+          </p:cNvPr>
+          <p:cNvSpPr>
+            <a:spLocks noGrp="1"/>
+          </p:cNvSpPr>
+          <p:nvPr>
+            <p:ph type="title"/>
+          </p:nvPr>
+        </p:nvSpPr>
+        <p:spPr/>
+        <p:txBody>
+          <a:bodyPr/>
+          <a:lstStyle/>
+          <a:p>
+            <a:r>
+              <a:rPr lang="en-US" dirty="0"/>
+              <a:t>Publishing and Subscribing to messages</a:t>
+            </a:r>
+          </a:p>
+        </p:txBody>
+      </p:sp>
+      <p:sp>
+        <p:nvSpPr>
+          <p:cNvPr id="3" name="Text Placeholder 2">
+            <a:extLst>
+              <a:ext uri="{FF2B5EF4-FFF2-40B4-BE49-F238E27FC236}">
+                <a16:creationId xmlns:a16="http://schemas.microsoft.com/office/drawing/2014/main" id="{862566A3-198E-5B8A-39BA-0D758BDFB39F}"/>
+              </a:ext>
+            </a:extLst>
+          </p:cNvPr>
+          <p:cNvSpPr>
+            <a:spLocks noGrp="1"/>
+          </p:cNvSpPr>
+          <p:nvPr>
+            <p:ph type="body" idx="1"/>
+          </p:nvPr>
+        </p:nvSpPr>
+        <p:spPr/>
+        <p:txBody>
+          <a:bodyPr/>
+          <a:lstStyle/>
+          <a:p>
+            <a:r>
+              <a:rPr lang="en-US" dirty="0"/>
+              <a:t>Azure Service Bus messaging</a:t>
+            </a:r>
+          </a:p>
+        </p:txBody>
+      </p:sp>
+    </p:spTree>
+    <p:extLst>
+      <p:ext uri="{BB962C8B-B14F-4D97-AF65-F5344CB8AC3E}">
+        <p14:creationId xmlns:p14="http://schemas.microsoft.com/office/powerpoint/2010/main" val="3085507398"/>
+      </p:ext>
+    </p:extLst>
+  </p:cSld>
+  <p:clrMapOvr>
+    <a:masterClrMapping/>
+  </p:clrMapOvr>
+</p:sld>
+</file>
+
+<file path=ppt/slides/slide29.xml><?xml version="1.0" encoding="utf-8"?>
+<p:sld xmlns:a="http://schemas.openxmlformats.org/drawingml/2006/main" xmlns:r="http://schemas.openxmlformats.org/officeDocument/2006/relationships" xmlns:p="http://schemas.openxmlformats.org/presentationml/2006/main">
+  <p:cSld>
+    <p:spTree>
+      <p:nvGrpSpPr>
+        <p:cNvPr id="1" name=""/>
+        <p:cNvGrpSpPr/>
+        <p:nvPr/>
+      </p:nvGrpSpPr>
+      <p:grpSpPr>
+        <a:xfrm>
+          <a:off x="0" y="0"/>
+          <a:ext cx="0" cy="0"/>
+          <a:chOff x="0" y="0"/>
+          <a:chExt cx="0" cy="0"/>
+        </a:xfrm>
+      </p:grpSpPr>
+      <p:sp>
+        <p:nvSpPr>
+          <p:cNvPr id="2" name="Title 1">
+            <a:extLst>
+              <a:ext uri="{FF2B5EF4-FFF2-40B4-BE49-F238E27FC236}">
+                <a16:creationId xmlns:a16="http://schemas.microsoft.com/office/drawing/2014/main" id="{74C9854A-991D-BE1C-55DF-59ED46CF396C}"/>
+              </a:ext>
+            </a:extLst>
+          </p:cNvPr>
+          <p:cNvSpPr>
+            <a:spLocks noGrp="1"/>
+          </p:cNvSpPr>
+          <p:nvPr>
+            <p:ph type="title"/>
+          </p:nvPr>
+        </p:nvSpPr>
+        <p:spPr/>
+        <p:txBody>
+          <a:bodyPr/>
+          <a:lstStyle/>
+          <a:p>
+            <a:r>
+              <a:rPr lang="en-US" dirty="0"/>
+              <a:t>Azure Storage Queue</a:t>
+            </a:r>
+          </a:p>
+        </p:txBody>
+      </p:sp>
+      <p:sp>
+        <p:nvSpPr>
+          <p:cNvPr id="3" name="Text Placeholder 2">
+            <a:extLst>
+              <a:ext uri="{FF2B5EF4-FFF2-40B4-BE49-F238E27FC236}">
+                <a16:creationId xmlns:a16="http://schemas.microsoft.com/office/drawing/2014/main" id="{DC18811A-0EF0-BA29-A195-9468A42C4AF8}"/>
+              </a:ext>
+            </a:extLst>
+          </p:cNvPr>
+          <p:cNvSpPr>
+            <a:spLocks noGrp="1"/>
+          </p:cNvSpPr>
+          <p:nvPr>
+            <p:ph type="body" idx="1"/>
+          </p:nvPr>
+        </p:nvSpPr>
+        <p:spPr/>
+        <p:txBody>
+          <a:bodyPr/>
+          <a:lstStyle/>
+          <a:p>
+            <a:r>
+              <a:rPr lang="en-US" dirty="0"/>
+              <a:t>A messaging solution that is mostly a queue</a:t>
+            </a:r>
+          </a:p>
+        </p:txBody>
+      </p:sp>
+    </p:spTree>
+    <p:extLst>
+      <p:ext uri="{BB962C8B-B14F-4D97-AF65-F5344CB8AC3E}">
+        <p14:creationId xmlns:p14="http://schemas.microsoft.com/office/powerpoint/2010/main" val="936172737"/>
+      </p:ext>
+    </p:extLst>
+  </p:cSld>
+  <p:clrMapOvr>
+    <a:masterClrMapping/>
+  </p:clrMapOvr>
+</p:sld>
+</file>
+
+<file path=ppt/slides/slide3.xml><?xml version="1.0" encoding="utf-8"?>
+<p:sld xmlns:a="http://schemas.openxmlformats.org/drawingml/2006/main" xmlns:r="http://schemas.openxmlformats.org/officeDocument/2006/relationships" xmlns:p="http://schemas.openxmlformats.org/presentationml/2006/main">
+  <p:cSld>
+    <p:spTree>
+      <p:nvGrpSpPr>
+        <p:cNvPr id="1" name=""/>
+        <p:cNvGrpSpPr/>
+        <p:nvPr/>
+      </p:nvGrpSpPr>
+      <p:grpSpPr>
+        <a:xfrm>
+          <a:off x="0" y="0"/>
+          <a:ext cx="0" cy="0"/>
+          <a:chOff x="0" y="0"/>
+          <a:chExt cx="0" cy="0"/>
+        </a:xfrm>
+      </p:grpSpPr>
+      <p:sp>
+        <p:nvSpPr>
+          <p:cNvPr id="2" name="Title 1"/>
+          <p:cNvSpPr>
+            <a:spLocks noGrp="1"/>
+          </p:cNvSpPr>
+          <p:nvPr>
+            <p:ph type="title"/>
+          </p:nvPr>
+        </p:nvSpPr>
+        <p:spPr/>
+        <p:txBody>
+          <a:bodyPr/>
+          <a:lstStyle/>
+          <a:p>
+            <a:r>
+              <a:rPr lang="en-US" dirty="0"/>
+              <a:t>Agenda</a:t>
+            </a:r>
+          </a:p>
+        </p:txBody>
+      </p:sp>
+      <p:sp>
+        <p:nvSpPr>
+          <p:cNvPr id="3" name="Content Placeholder 2"/>
+          <p:cNvSpPr>
+            <a:spLocks noGrp="1"/>
+          </p:cNvSpPr>
+          <p:nvPr>
+            <p:ph idx="1"/>
+          </p:nvPr>
+        </p:nvSpPr>
+        <p:spPr>
+          <a:xfrm>
+            <a:off x="2589212" y="1625599"/>
+            <a:ext cx="8915400" cy="5113867"/>
+          </a:xfrm>
+        </p:spPr>
+        <p:txBody>
+          <a:bodyPr>
+            <a:normAutofit/>
+          </a:bodyPr>
+          <a:lstStyle/>
+          <a:p>
+            <a:r>
+              <a:rPr lang="en-US" dirty="0"/>
+              <a:t>Exploring the messaging options</a:t>
+            </a:r>
+          </a:p>
+          <a:p>
+            <a:pPr lvl="1"/>
+            <a:r>
+              <a:rPr lang="en-US" dirty="0"/>
+              <a:t>Event Hubs</a:t>
+            </a:r>
+          </a:p>
+          <a:p>
+            <a:pPr lvl="1"/>
+            <a:r>
+              <a:rPr lang="en-US" dirty="0"/>
+              <a:t>Event Grid</a:t>
+            </a:r>
+          </a:p>
+          <a:p>
+            <a:pPr lvl="1"/>
+            <a:r>
+              <a:rPr lang="en-US" dirty="0"/>
+              <a:t>Service Bus [Pub/Sub]</a:t>
+            </a:r>
+          </a:p>
+          <a:p>
+            <a:pPr lvl="1"/>
+            <a:r>
+              <a:rPr lang="en-US" dirty="0"/>
+              <a:t>Service Bus [Queue]</a:t>
+            </a:r>
+          </a:p>
+          <a:p>
+            <a:pPr lvl="1"/>
+            <a:r>
+              <a:rPr lang="en-US" dirty="0"/>
+              <a:t>Storage Queue</a:t>
+            </a:r>
+          </a:p>
+          <a:p>
+            <a:endParaRPr lang="en-US" dirty="0"/>
+          </a:p>
+          <a:p>
+            <a:pPr marL="0" indent="0">
+              <a:buNone/>
+            </a:pPr>
+            <a:endParaRPr lang="en-US" dirty="0"/>
+          </a:p>
+          <a:p>
+            <a:endParaRPr lang="en-US" dirty="0"/>
+          </a:p>
+          <a:p>
+            <a:endParaRPr lang="en-US" dirty="0"/>
+          </a:p>
+        </p:txBody>
+      </p:sp>
+    </p:spTree>
+    <p:extLst>
+      <p:ext uri="{BB962C8B-B14F-4D97-AF65-F5344CB8AC3E}">
+        <p14:creationId xmlns:p14="http://schemas.microsoft.com/office/powerpoint/2010/main" val="661577800"/>
+      </p:ext>
+    </p:extLst>
+  </p:cSld>
+  <p:clrMapOvr>
+    <a:masterClrMapping/>
+  </p:clrMapOvr>
+</p:sld>
+</file>
+
+<file path=ppt/slides/slide30.xml><?xml version="1.0" encoding="utf-8"?>
+<p:sld xmlns:a="http://schemas.openxmlformats.org/drawingml/2006/main" xmlns:r="http://schemas.openxmlformats.org/officeDocument/2006/relationships" xmlns:p="http://schemas.openxmlformats.org/presentationml/2006/main">
+  <p:cSld>
+    <p:spTree>
+      <p:nvGrpSpPr>
+        <p:cNvPr id="1" name=""/>
+        <p:cNvGrpSpPr/>
+        <p:nvPr/>
+      </p:nvGrpSpPr>
+      <p:grpSpPr>
+        <a:xfrm>
+          <a:off x="0" y="0"/>
+          <a:ext cx="0" cy="0"/>
+          <a:chOff x="0" y="0"/>
+          <a:chExt cx="0" cy="0"/>
+        </a:xfrm>
+      </p:grpSpPr>
+      <p:sp>
+        <p:nvSpPr>
           <p:cNvPr id="4" name="Title 3">
             <a:extLst>
               <a:ext uri="{FF2B5EF4-FFF2-40B4-BE49-F238E27FC236}">
@@ -15465,12 +16288,52 @@
             <p:ph idx="1"/>
           </p:nvPr>
         </p:nvSpPr>
-        <p:spPr/>
+        <p:spPr>
+          <a:xfrm>
+            <a:off x="2589212" y="1540188"/>
+            <a:ext cx="8915400" cy="4875359"/>
+          </a:xfrm>
+        </p:spPr>
         <p:txBody>
-          <a:bodyPr/>
+          <a:bodyPr>
+            <a:normAutofit/>
+          </a:bodyPr>
           <a:lstStyle/>
           <a:p>
-            <a:endParaRPr lang="en-US"/>
+            <a:r>
+              <a:rPr lang="en-US" sz="2400" dirty="0"/>
+              <a:t>Store Large numbers of messages</a:t>
+            </a:r>
+          </a:p>
+          <a:p>
+            <a:r>
+              <a:rPr lang="en-US" sz="2400" dirty="0"/>
+              <a:t>Up to 64kb in size per messaged</a:t>
+            </a:r>
+          </a:p>
+          <a:p>
+            <a:r>
+              <a:rPr lang="en-US" sz="2400" dirty="0"/>
+              <a:t>Use when you have massive amounts of messages that need to be processed in a decoupled fashion.</a:t>
+            </a:r>
+          </a:p>
+          <a:p>
+            <a:r>
+              <a:rPr lang="en-US" sz="2400" dirty="0"/>
+              <a:t>Access messages via HTTPs</a:t>
+            </a:r>
+          </a:p>
+          <a:p>
+            <a:r>
+              <a:rPr lang="en-US" sz="2400" dirty="0"/>
+              <a:t>Need to store &gt; 80GB of message data</a:t>
+            </a:r>
+          </a:p>
+          <a:p>
+            <a:r>
+              <a:rPr lang="en-US" sz="2400" dirty="0"/>
+              <a:t>Server-side logging of all message interaction</a:t>
+            </a:r>
           </a:p>
         </p:txBody>
       </p:sp>
@@ -15487,7 +16350,7 @@
 </p:sld>
 </file>
 
-<file path=ppt/slides/slide29.xml><?xml version="1.0" encoding="utf-8"?>
+<file path=ppt/slides/slide31.xml><?xml version="1.0" encoding="utf-8"?>
 <p:sld xmlns:a="http://schemas.openxmlformats.org/drawingml/2006/main" xmlns:r="http://schemas.openxmlformats.org/officeDocument/2006/relationships" xmlns:p="http://schemas.openxmlformats.org/presentationml/2006/main">
   <p:cSld>
     <p:spTree>
@@ -15610,7 +16473,7 @@
 </p:sld>
 </file>
 
-<file path=ppt/slides/slide3.xml><?xml version="1.0" encoding="utf-8"?>
+<file path=ppt/slides/slide32.xml><?xml version="1.0" encoding="utf-8"?>
 <p:sld xmlns:a="http://schemas.openxmlformats.org/drawingml/2006/main" xmlns:r="http://schemas.openxmlformats.org/officeDocument/2006/relationships" xmlns:p="http://schemas.openxmlformats.org/presentationml/2006/main">
   <p:cSld>
     <p:spTree>
@@ -15629,7 +16492,13 @@
       </p:grpSpPr>
       <p:sp>
         <p:nvSpPr>
-          <p:cNvPr id="2" name="Title 1"/>
+          <p:cNvPr id="2" name="Title 1">
+            <a:extLst>
+              <a:ext uri="{FF2B5EF4-FFF2-40B4-BE49-F238E27FC236}">
+                <a16:creationId xmlns:a16="http://schemas.microsoft.com/office/drawing/2014/main" id="{6DEFA28E-0D29-4B0D-C566-DFF3CBCE8751}"/>
+              </a:ext>
+            </a:extLst>
+          </p:cNvPr>
           <p:cNvSpPr>
             <a:spLocks noGrp="1"/>
           </p:cNvSpPr>
@@ -15644,94 +16513,43 @@
           <a:p>
             <a:r>
               <a:rPr lang="en-US" dirty="0"/>
-              <a:t>Agenda</a:t>
+              <a:t>Working with Azure Storage Queue</a:t>
             </a:r>
           </a:p>
         </p:txBody>
       </p:sp>
       <p:sp>
         <p:nvSpPr>
-          <p:cNvPr id="3" name="Content Placeholder 2"/>
+          <p:cNvPr id="3" name="Text Placeholder 2">
+            <a:extLst>
+              <a:ext uri="{FF2B5EF4-FFF2-40B4-BE49-F238E27FC236}">
+                <a16:creationId xmlns:a16="http://schemas.microsoft.com/office/drawing/2014/main" id="{FDC3333B-5646-73C0-6042-F6D59445D9EB}"/>
+              </a:ext>
+            </a:extLst>
+          </p:cNvPr>
           <p:cNvSpPr>
             <a:spLocks noGrp="1"/>
           </p:cNvSpPr>
           <p:nvPr>
-            <p:ph idx="1"/>
-          </p:nvPr>
-        </p:nvSpPr>
-        <p:spPr>
-          <a:xfrm>
-            <a:off x="2589212" y="1625599"/>
-            <a:ext cx="8915400" cy="5113867"/>
-          </a:xfrm>
-        </p:spPr>
+            <p:ph type="body" idx="1"/>
+          </p:nvPr>
+        </p:nvSpPr>
+        <p:spPr/>
         <p:txBody>
-          <a:bodyPr>
-            <a:normAutofit/>
-          </a:bodyPr>
+          <a:bodyPr/>
           <a:lstStyle/>
           <a:p>
             <a:r>
               <a:rPr lang="en-US" dirty="0"/>
-              <a:t>Exploring the messaging options</a:t>
-            </a:r>
-          </a:p>
-          <a:p>
-            <a:pPr lvl="1"/>
-            <a:r>
-              <a:rPr lang="en-US" dirty="0"/>
-              <a:t>Event Hubs</a:t>
-            </a:r>
-          </a:p>
-          <a:p>
-            <a:pPr lvl="1"/>
-            <a:r>
-              <a:rPr lang="en-US" dirty="0"/>
-              <a:t>Event Grid</a:t>
-            </a:r>
-          </a:p>
-          <a:p>
-            <a:pPr lvl="1"/>
-            <a:r>
-              <a:rPr lang="en-US" dirty="0"/>
-              <a:t>Service Bus [Pub/Sub]</a:t>
-            </a:r>
-          </a:p>
-          <a:p>
-            <a:pPr lvl="1"/>
-            <a:r>
-              <a:rPr lang="en-US" dirty="0"/>
-              <a:t>Service Bus [Queue]</a:t>
-            </a:r>
-          </a:p>
-          <a:p>
-            <a:pPr lvl="1"/>
-            <a:r>
-              <a:rPr lang="en-US" dirty="0"/>
-              <a:t>Storage Queue</a:t>
-            </a:r>
-          </a:p>
-          <a:p>
-            <a:endParaRPr lang="en-US" dirty="0"/>
-          </a:p>
-          <a:p>
-            <a:pPr marL="0" indent="0">
-              <a:buNone/>
-            </a:pPr>
-            <a:endParaRPr lang="en-US" dirty="0"/>
-          </a:p>
-          <a:p>
-            <a:endParaRPr lang="en-US" dirty="0"/>
-          </a:p>
-          <a:p>
-            <a:endParaRPr lang="en-US" dirty="0"/>
+              <a:t>Utilizing Azure storage for your messaging solution</a:t>
+            </a:r>
           </a:p>
         </p:txBody>
       </p:sp>
     </p:spTree>
     <p:extLst>
       <p:ext uri="{BB962C8B-B14F-4D97-AF65-F5344CB8AC3E}">
-        <p14:creationId xmlns:p14="http://schemas.microsoft.com/office/powerpoint/2010/main" val="661577800"/>
+        <p14:creationId xmlns:p14="http://schemas.microsoft.com/office/powerpoint/2010/main" val="3191085718"/>
       </p:ext>
     </p:extLst>
   </p:cSld>
@@ -15741,7 +16559,7 @@
 </p:sld>
 </file>
 
-<file path=ppt/slides/slide30.xml><?xml version="1.0" encoding="utf-8"?>
+<file path=ppt/slides/slide33.xml><?xml version="1.0" encoding="utf-8"?>
 <p:sld xmlns:a="http://schemas.openxmlformats.org/drawingml/2006/main" xmlns:r="http://schemas.openxmlformats.org/officeDocument/2006/relationships" xmlns:p="http://schemas.openxmlformats.org/presentationml/2006/main">
   <p:cSld>
     <p:spTree>
@@ -15763,92 +16581,6 @@
           <p:cNvPr id="2" name="Title 1">
             <a:extLst>
               <a:ext uri="{FF2B5EF4-FFF2-40B4-BE49-F238E27FC236}">
-                <a16:creationId xmlns:a16="http://schemas.microsoft.com/office/drawing/2014/main" id="{6DEFA28E-0D29-4B0D-C566-DFF3CBCE8751}"/>
-              </a:ext>
-            </a:extLst>
-          </p:cNvPr>
-          <p:cNvSpPr>
-            <a:spLocks noGrp="1"/>
-          </p:cNvSpPr>
-          <p:nvPr>
-            <p:ph type="title"/>
-          </p:nvPr>
-        </p:nvSpPr>
-        <p:spPr/>
-        <p:txBody>
-          <a:bodyPr/>
-          <a:lstStyle/>
-          <a:p>
-            <a:r>
-              <a:rPr lang="en-US" dirty="0"/>
-              <a:t>Working with Azure Storage Queue</a:t>
-            </a:r>
-          </a:p>
-        </p:txBody>
-      </p:sp>
-      <p:sp>
-        <p:nvSpPr>
-          <p:cNvPr id="3" name="Text Placeholder 2">
-            <a:extLst>
-              <a:ext uri="{FF2B5EF4-FFF2-40B4-BE49-F238E27FC236}">
-                <a16:creationId xmlns:a16="http://schemas.microsoft.com/office/drawing/2014/main" id="{FDC3333B-5646-73C0-6042-F6D59445D9EB}"/>
-              </a:ext>
-            </a:extLst>
-          </p:cNvPr>
-          <p:cNvSpPr>
-            <a:spLocks noGrp="1"/>
-          </p:cNvSpPr>
-          <p:nvPr>
-            <p:ph type="body" idx="1"/>
-          </p:nvPr>
-        </p:nvSpPr>
-        <p:spPr/>
-        <p:txBody>
-          <a:bodyPr/>
-          <a:lstStyle/>
-          <a:p>
-            <a:r>
-              <a:rPr lang="en-US" dirty="0"/>
-              <a:t>Utilizing Azure storage for your messaging solution</a:t>
-            </a:r>
-          </a:p>
-        </p:txBody>
-      </p:sp>
-    </p:spTree>
-    <p:extLst>
-      <p:ext uri="{BB962C8B-B14F-4D97-AF65-F5344CB8AC3E}">
-        <p14:creationId xmlns:p14="http://schemas.microsoft.com/office/powerpoint/2010/main" val="3191085718"/>
-      </p:ext>
-    </p:extLst>
-  </p:cSld>
-  <p:clrMapOvr>
-    <a:masterClrMapping/>
-  </p:clrMapOvr>
-</p:sld>
-</file>
-
-<file path=ppt/slides/slide31.xml><?xml version="1.0" encoding="utf-8"?>
-<p:sld xmlns:a="http://schemas.openxmlformats.org/drawingml/2006/main" xmlns:r="http://schemas.openxmlformats.org/officeDocument/2006/relationships" xmlns:p="http://schemas.openxmlformats.org/presentationml/2006/main">
-  <p:cSld>
-    <p:spTree>
-      <p:nvGrpSpPr>
-        <p:cNvPr id="1" name=""/>
-        <p:cNvGrpSpPr/>
-        <p:nvPr/>
-      </p:nvGrpSpPr>
-      <p:grpSpPr>
-        <a:xfrm>
-          <a:off x="0" y="0"/>
-          <a:ext cx="0" cy="0"/>
-          <a:chOff x="0" y="0"/>
-          <a:chExt cx="0" cy="0"/>
-        </a:xfrm>
-      </p:grpSpPr>
-      <p:sp>
-        <p:nvSpPr>
-          <p:cNvPr id="2" name="Title 1">
-            <a:extLst>
-              <a:ext uri="{FF2B5EF4-FFF2-40B4-BE49-F238E27FC236}">
                 <a16:creationId xmlns:a16="http://schemas.microsoft.com/office/drawing/2014/main" id="{AF699263-9B90-4B57-95BC-4E8B2EDC3154}"/>
               </a:ext>
             </a:extLst>
@@ -15937,7 +16669,7 @@
 </p:sld>
 </file>
 
-<file path=ppt/slides/slide32.xml><?xml version="1.0" encoding="utf-8"?>
+<file path=ppt/slides/slide34.xml><?xml version="1.0" encoding="utf-8"?>
 <p:sld xmlns:a="http://schemas.openxmlformats.org/drawingml/2006/main" xmlns:r="http://schemas.openxmlformats.org/officeDocument/2006/relationships" xmlns:p="http://schemas.openxmlformats.org/presentationml/2006/main">
   <p:cSld>
     <p:bg>
@@ -18635,7 +19367,7 @@
 </p:sld>
 </file>
 
-<file path=ppt/slides/slide33.xml><?xml version="1.0" encoding="utf-8"?>
+<file path=ppt/slides/slide35.xml><?xml version="1.0" encoding="utf-8"?>
 <p:sld xmlns:a="http://schemas.openxmlformats.org/drawingml/2006/main" xmlns:r="http://schemas.openxmlformats.org/officeDocument/2006/relationships" xmlns:p="http://schemas.openxmlformats.org/presentationml/2006/main">
   <p:cSld>
     <p:spTree>

</xml_diff>

<commit_message>
updates to slides and to the event hub code to utilize user secrets so no time wasted setting configs
</commit_message>
<xml_diff>
--- a/ServerlessMessagingDemystified.pptx
+++ b/ServerlessMessagingDemystified.pptx
@@ -5,7 +5,7 @@
     <p:sldMasterId id="2147483648" r:id="rId1"/>
   </p:sldMasterIdLst>
   <p:notesMasterIdLst>
-    <p:notesMasterId r:id="rId37"/>
+    <p:notesMasterId r:id="rId39"/>
   </p:notesMasterIdLst>
   <p:sldIdLst>
     <p:sldId id="256" r:id="rId2"/>
@@ -18,31 +18,33 @@
     <p:sldId id="336" r:id="rId9"/>
     <p:sldId id="335" r:id="rId10"/>
     <p:sldId id="337" r:id="rId11"/>
-    <p:sldId id="323" r:id="rId12"/>
-    <p:sldId id="344" r:id="rId13"/>
-    <p:sldId id="347" r:id="rId14"/>
-    <p:sldId id="346" r:id="rId15"/>
-    <p:sldId id="348" r:id="rId16"/>
-    <p:sldId id="350" r:id="rId17"/>
-    <p:sldId id="349" r:id="rId18"/>
-    <p:sldId id="340" r:id="rId19"/>
-    <p:sldId id="351" r:id="rId20"/>
-    <p:sldId id="353" r:id="rId21"/>
-    <p:sldId id="352" r:id="rId22"/>
-    <p:sldId id="341" r:id="rId23"/>
-    <p:sldId id="338" r:id="rId24"/>
-    <p:sldId id="345" r:id="rId25"/>
-    <p:sldId id="357" r:id="rId26"/>
-    <p:sldId id="358" r:id="rId27"/>
-    <p:sldId id="354" r:id="rId28"/>
-    <p:sldId id="339" r:id="rId29"/>
-    <p:sldId id="342" r:id="rId30"/>
-    <p:sldId id="355" r:id="rId31"/>
-    <p:sldId id="356" r:id="rId32"/>
-    <p:sldId id="343" r:id="rId33"/>
-    <p:sldId id="328" r:id="rId34"/>
-    <p:sldId id="330" r:id="rId35"/>
-    <p:sldId id="329" r:id="rId36"/>
+    <p:sldId id="359" r:id="rId12"/>
+    <p:sldId id="360" r:id="rId13"/>
+    <p:sldId id="323" r:id="rId14"/>
+    <p:sldId id="344" r:id="rId15"/>
+    <p:sldId id="347" r:id="rId16"/>
+    <p:sldId id="346" r:id="rId17"/>
+    <p:sldId id="348" r:id="rId18"/>
+    <p:sldId id="350" r:id="rId19"/>
+    <p:sldId id="349" r:id="rId20"/>
+    <p:sldId id="340" r:id="rId21"/>
+    <p:sldId id="351" r:id="rId22"/>
+    <p:sldId id="353" r:id="rId23"/>
+    <p:sldId id="352" r:id="rId24"/>
+    <p:sldId id="341" r:id="rId25"/>
+    <p:sldId id="338" r:id="rId26"/>
+    <p:sldId id="345" r:id="rId27"/>
+    <p:sldId id="357" r:id="rId28"/>
+    <p:sldId id="358" r:id="rId29"/>
+    <p:sldId id="354" r:id="rId30"/>
+    <p:sldId id="339" r:id="rId31"/>
+    <p:sldId id="342" r:id="rId32"/>
+    <p:sldId id="355" r:id="rId33"/>
+    <p:sldId id="356" r:id="rId34"/>
+    <p:sldId id="343" r:id="rId35"/>
+    <p:sldId id="328" r:id="rId36"/>
+    <p:sldId id="330" r:id="rId37"/>
+    <p:sldId id="329" r:id="rId38"/>
   </p:sldIdLst>
   <p:sldSz cx="12192000" cy="6858000"/>
   <p:notesSz cx="6858000" cy="9144000"/>
@@ -160,6 +162,8 @@
             <p14:sldId id="336"/>
             <p14:sldId id="335"/>
             <p14:sldId id="337"/>
+            <p14:sldId id="359"/>
+            <p14:sldId id="360"/>
           </p14:sldIdLst>
         </p14:section>
         <p14:section name="Demo" id="{911148FC-92D6-4E4F-B450-EAAB9AAE3928}">
@@ -318,7 +322,7 @@
           <a:p>
             <a:fld id="{EC6E915F-729B-41B5-9E60-B75A98DB1B95}" type="datetimeFigureOut">
               <a:rPr lang="en-US" smtClean="0"/>
-              <a:t>6/3/2022</a:t>
+              <a:t>7/11/2022</a:t>
             </a:fld>
             <a:endParaRPr lang="en-US"/>
           </a:p>
@@ -785,10 +789,7 @@
           <a:bodyPr/>
           <a:lstStyle/>
           <a:p>
-            <a:r>
-              <a:rPr lang="en-US" dirty="0"/>
-              <a:t>https://docs.microsoft.com/en-us/azure/service-bus-messaging/service-bus-dotnet-how-to-use-topics-subscriptions</a:t>
-            </a:r>
+            <a:endParaRPr lang="en-US" dirty="0"/>
           </a:p>
         </p:txBody>
       </p:sp>
@@ -809,7 +810,7 @@
           <a:p>
             <a:fld id="{8C2E9449-D161-4234-AF44-56BC19BD5257}" type="slidenum">
               <a:rPr lang="en-US" smtClean="0"/>
-              <a:t>28</a:t>
+              <a:t>18</a:t>
             </a:fld>
             <a:endParaRPr lang="en-US"/>
           </a:p>
@@ -818,7 +819,7 @@
     </p:spTree>
     <p:extLst>
       <p:ext uri="{BB962C8B-B14F-4D97-AF65-F5344CB8AC3E}">
-        <p14:creationId xmlns:p14="http://schemas.microsoft.com/office/powerpoint/2010/main" val="3129252641"/>
+        <p14:creationId xmlns:p14="http://schemas.microsoft.com/office/powerpoint/2010/main" val="65335043"/>
       </p:ext>
     </p:extLst>
   </p:cSld>
@@ -874,7 +875,7 @@
           <a:p>
             <a:r>
               <a:rPr lang="en-US" dirty="0"/>
-              <a:t>https://docs.microsoft.com/en-us/azure/service-bus-messaging/service-bus-azure-and-service-bus-queues-compared-contrasted</a:t>
+              <a:t>Just create it with the subscription in the portal then drop a file to show it working</a:t>
             </a:r>
           </a:p>
         </p:txBody>
@@ -896,7 +897,7 @@
           <a:p>
             <a:fld id="{8C2E9449-D161-4234-AF44-56BC19BD5257}" type="slidenum">
               <a:rPr lang="en-US" smtClean="0"/>
-              <a:t>29</a:t>
+              <a:t>19</a:t>
             </a:fld>
             <a:endParaRPr lang="en-US"/>
           </a:p>
@@ -905,7 +906,7 @@
     </p:spTree>
     <p:extLst>
       <p:ext uri="{BB962C8B-B14F-4D97-AF65-F5344CB8AC3E}">
-        <p14:creationId xmlns:p14="http://schemas.microsoft.com/office/powerpoint/2010/main" val="3790585450"/>
+        <p14:creationId xmlns:p14="http://schemas.microsoft.com/office/powerpoint/2010/main" val="649696302"/>
       </p:ext>
     </p:extLst>
   </p:cSld>
@@ -959,7 +960,10 @@
           <a:bodyPr/>
           <a:lstStyle/>
           <a:p>
-            <a:endParaRPr lang="en-US" dirty="0"/>
+            <a:r>
+              <a:rPr lang="en-US" dirty="0"/>
+              <a:t>https://docs.microsoft.com/en-us/azure/service-bus-messaging/service-bus-dotnet-get-started-with-queues</a:t>
+            </a:r>
           </a:p>
         </p:txBody>
       </p:sp>
@@ -980,7 +984,7 @@
           <a:p>
             <a:fld id="{8C2E9449-D161-4234-AF44-56BC19BD5257}" type="slidenum">
               <a:rPr lang="en-US" smtClean="0"/>
-              <a:t>31</a:t>
+              <a:t>24</a:t>
             </a:fld>
             <a:endParaRPr lang="en-US"/>
           </a:p>
@@ -989,7 +993,7 @@
     </p:spTree>
     <p:extLst>
       <p:ext uri="{BB962C8B-B14F-4D97-AF65-F5344CB8AC3E}">
-        <p14:creationId xmlns:p14="http://schemas.microsoft.com/office/powerpoint/2010/main" val="3854404646"/>
+        <p14:creationId xmlns:p14="http://schemas.microsoft.com/office/powerpoint/2010/main" val="613864464"/>
       </p:ext>
     </p:extLst>
   </p:cSld>
@@ -1043,29 +1047,6 @@
           <a:bodyPr/>
           <a:lstStyle/>
           <a:p>
-            <a:pPr marL="0" marR="0" lvl="0" indent="0" algn="l" defTabSz="914400" rtl="0" eaLnBrk="1" fontAlgn="auto" latinLnBrk="0" hangingPunct="1">
-              <a:lnSpc>
-                <a:spcPct val="100000"/>
-              </a:lnSpc>
-              <a:spcBef>
-                <a:spcPts val="0"/>
-              </a:spcBef>
-              <a:spcAft>
-                <a:spcPts val="0"/>
-              </a:spcAft>
-              <a:buClrTx/>
-              <a:buSzTx/>
-              <a:buFontTx/>
-              <a:buNone/>
-              <a:tabLst/>
-              <a:defRPr/>
-            </a:pPr>
-            <a:r>
-              <a:rPr lang="en-US" dirty="0"/>
-              <a:t>https://docs.microsoft.com/en-us/azure/storage/queues/storage-dotnet-how-to-use-queues?tabs=dotnet</a:t>
-            </a:r>
-          </a:p>
-          <a:p>
             <a:endParaRPr lang="en-US" dirty="0"/>
           </a:p>
         </p:txBody>
@@ -1087,7 +1068,7 @@
           <a:p>
             <a:fld id="{8C2E9449-D161-4234-AF44-56BC19BD5257}" type="slidenum">
               <a:rPr lang="en-US" smtClean="0"/>
-              <a:t>32</a:t>
+              <a:t>25</a:t>
             </a:fld>
             <a:endParaRPr lang="en-US"/>
           </a:p>
@@ -1096,7 +1077,7 @@
     </p:spTree>
     <p:extLst>
       <p:ext uri="{BB962C8B-B14F-4D97-AF65-F5344CB8AC3E}">
-        <p14:creationId xmlns:p14="http://schemas.microsoft.com/office/powerpoint/2010/main" val="313362551"/>
+        <p14:creationId xmlns:p14="http://schemas.microsoft.com/office/powerpoint/2010/main" val="927344670"/>
       </p:ext>
     </p:extLst>
   </p:cSld>
@@ -1171,7 +1152,7 @@
           <a:p>
             <a:fld id="{8C2E9449-D161-4234-AF44-56BC19BD5257}" type="slidenum">
               <a:rPr lang="en-US" smtClean="0"/>
-              <a:t>34</a:t>
+              <a:t>27</a:t>
             </a:fld>
             <a:endParaRPr lang="en-US"/>
           </a:p>
@@ -1180,7 +1161,7 @@
     </p:spTree>
     <p:extLst>
       <p:ext uri="{BB962C8B-B14F-4D97-AF65-F5344CB8AC3E}">
-        <p14:creationId xmlns:p14="http://schemas.microsoft.com/office/powerpoint/2010/main" val="1009367226"/>
+        <p14:creationId xmlns:p14="http://schemas.microsoft.com/office/powerpoint/2010/main" val="522867708"/>
       </p:ext>
     </p:extLst>
   </p:cSld>
@@ -1234,41 +1215,7 @@
           <a:bodyPr/>
           <a:lstStyle/>
           <a:p>
-            <a:r>
-              <a:rPr lang="en-US" dirty="0"/>
-              <a:t>Thank you for attending my talk today.  Please reach out and connect. </a:t>
-            </a:r>
-          </a:p>
-          <a:p>
             <a:endParaRPr lang="en-US" dirty="0"/>
-          </a:p>
-          <a:p>
-            <a:r>
-              <a:rPr lang="en-US" dirty="0"/>
-              <a:t>If you liked the talk today, you can support me by listening to one or more of my songs on </a:t>
-            </a:r>
-            <a:r>
-              <a:rPr lang="en-US" dirty="0" err="1"/>
-              <a:t>spotify</a:t>
-            </a:r>
-            <a:r>
-              <a:rPr lang="en-US" dirty="0"/>
-              <a:t> </a:t>
-            </a:r>
-            <a:r>
-              <a:rPr lang="en-US" dirty="0">
-                <a:sym typeface="Wingdings" panose="05000000000000000000" pitchFamily="2" charset="2"/>
-              </a:rPr>
-              <a:t></a:t>
-            </a:r>
-            <a:br>
-              <a:rPr lang="en-US" dirty="0">
-                <a:sym typeface="Wingdings" panose="05000000000000000000" pitchFamily="2" charset="2"/>
-              </a:rPr>
-            </a:br>
-            <a:endParaRPr lang="en-US" dirty="0">
-              <a:sym typeface="Wingdings" panose="05000000000000000000" pitchFamily="2" charset="2"/>
-            </a:endParaRPr>
           </a:p>
         </p:txBody>
       </p:sp>
@@ -1289,7 +1236,7 @@
           <a:p>
             <a:fld id="{8C2E9449-D161-4234-AF44-56BC19BD5257}" type="slidenum">
               <a:rPr lang="en-US" smtClean="0"/>
-              <a:t>35</a:t>
+              <a:t>29</a:t>
             </a:fld>
             <a:endParaRPr lang="en-US"/>
           </a:p>
@@ -1298,7 +1245,372 @@
     </p:spTree>
     <p:extLst>
       <p:ext uri="{BB962C8B-B14F-4D97-AF65-F5344CB8AC3E}">
-        <p14:creationId xmlns:p14="http://schemas.microsoft.com/office/powerpoint/2010/main" val="4169632679"/>
+        <p14:creationId xmlns:p14="http://schemas.microsoft.com/office/powerpoint/2010/main" val="3266879566"/>
+      </p:ext>
+    </p:extLst>
+  </p:cSld>
+  <p:clrMapOvr>
+    <a:masterClrMapping/>
+  </p:clrMapOvr>
+</p:notes>
+</file>
+
+<file path=ppt/notesSlides/notesSlide16.xml><?xml version="1.0" encoding="utf-8"?>
+<p:notes xmlns:a="http://schemas.openxmlformats.org/drawingml/2006/main" xmlns:r="http://schemas.openxmlformats.org/officeDocument/2006/relationships" xmlns:p="http://schemas.openxmlformats.org/presentationml/2006/main">
+  <p:cSld>
+    <p:spTree>
+      <p:nvGrpSpPr>
+        <p:cNvPr id="1" name=""/>
+        <p:cNvGrpSpPr/>
+        <p:nvPr/>
+      </p:nvGrpSpPr>
+      <p:grpSpPr>
+        <a:xfrm>
+          <a:off x="0" y="0"/>
+          <a:ext cx="0" cy="0"/>
+          <a:chOff x="0" y="0"/>
+          <a:chExt cx="0" cy="0"/>
+        </a:xfrm>
+      </p:grpSpPr>
+      <p:sp>
+        <p:nvSpPr>
+          <p:cNvPr id="2" name="Slide Image Placeholder 1"/>
+          <p:cNvSpPr>
+            <a:spLocks noGrp="1" noRot="1" noChangeAspect="1"/>
+          </p:cNvSpPr>
+          <p:nvPr>
+            <p:ph type="sldImg"/>
+          </p:nvPr>
+        </p:nvSpPr>
+        <p:spPr/>
+      </p:sp>
+      <p:sp>
+        <p:nvSpPr>
+          <p:cNvPr id="3" name="Notes Placeholder 2"/>
+          <p:cNvSpPr>
+            <a:spLocks noGrp="1"/>
+          </p:cNvSpPr>
+          <p:nvPr>
+            <p:ph type="body" idx="1"/>
+          </p:nvPr>
+        </p:nvSpPr>
+        <p:spPr/>
+        <p:txBody>
+          <a:bodyPr/>
+          <a:lstStyle/>
+          <a:p>
+            <a:r>
+              <a:rPr lang="en-US" dirty="0"/>
+              <a:t>https://docs.microsoft.com/en-us/azure/service-bus-messaging/service-bus-dotnet-how-to-use-topics-subscriptions</a:t>
+            </a:r>
+          </a:p>
+        </p:txBody>
+      </p:sp>
+      <p:sp>
+        <p:nvSpPr>
+          <p:cNvPr id="4" name="Slide Number Placeholder 3"/>
+          <p:cNvSpPr>
+            <a:spLocks noGrp="1"/>
+          </p:cNvSpPr>
+          <p:nvPr>
+            <p:ph type="sldNum" sz="quarter" idx="5"/>
+          </p:nvPr>
+        </p:nvSpPr>
+        <p:spPr/>
+        <p:txBody>
+          <a:bodyPr/>
+          <a:lstStyle/>
+          <a:p>
+            <a:fld id="{8C2E9449-D161-4234-AF44-56BC19BD5257}" type="slidenum">
+              <a:rPr lang="en-US" smtClean="0"/>
+              <a:t>30</a:t>
+            </a:fld>
+            <a:endParaRPr lang="en-US"/>
+          </a:p>
+        </p:txBody>
+      </p:sp>
+    </p:spTree>
+    <p:extLst>
+      <p:ext uri="{BB962C8B-B14F-4D97-AF65-F5344CB8AC3E}">
+        <p14:creationId xmlns:p14="http://schemas.microsoft.com/office/powerpoint/2010/main" val="3129252641"/>
+      </p:ext>
+    </p:extLst>
+  </p:cSld>
+  <p:clrMapOvr>
+    <a:masterClrMapping/>
+  </p:clrMapOvr>
+</p:notes>
+</file>
+
+<file path=ppt/notesSlides/notesSlide17.xml><?xml version="1.0" encoding="utf-8"?>
+<p:notes xmlns:a="http://schemas.openxmlformats.org/drawingml/2006/main" xmlns:r="http://schemas.openxmlformats.org/officeDocument/2006/relationships" xmlns:p="http://schemas.openxmlformats.org/presentationml/2006/main">
+  <p:cSld>
+    <p:spTree>
+      <p:nvGrpSpPr>
+        <p:cNvPr id="1" name=""/>
+        <p:cNvGrpSpPr/>
+        <p:nvPr/>
+      </p:nvGrpSpPr>
+      <p:grpSpPr>
+        <a:xfrm>
+          <a:off x="0" y="0"/>
+          <a:ext cx="0" cy="0"/>
+          <a:chOff x="0" y="0"/>
+          <a:chExt cx="0" cy="0"/>
+        </a:xfrm>
+      </p:grpSpPr>
+      <p:sp>
+        <p:nvSpPr>
+          <p:cNvPr id="2" name="Slide Image Placeholder 1"/>
+          <p:cNvSpPr>
+            <a:spLocks noGrp="1" noRot="1" noChangeAspect="1"/>
+          </p:cNvSpPr>
+          <p:nvPr>
+            <p:ph type="sldImg"/>
+          </p:nvPr>
+        </p:nvSpPr>
+        <p:spPr/>
+      </p:sp>
+      <p:sp>
+        <p:nvSpPr>
+          <p:cNvPr id="3" name="Notes Placeholder 2"/>
+          <p:cNvSpPr>
+            <a:spLocks noGrp="1"/>
+          </p:cNvSpPr>
+          <p:nvPr>
+            <p:ph type="body" idx="1"/>
+          </p:nvPr>
+        </p:nvSpPr>
+        <p:spPr/>
+        <p:txBody>
+          <a:bodyPr/>
+          <a:lstStyle/>
+          <a:p>
+            <a:r>
+              <a:rPr lang="en-US" dirty="0"/>
+              <a:t>https://docs.microsoft.com/en-us/azure/service-bus-messaging/service-bus-azure-and-service-bus-queues-compared-contrasted</a:t>
+            </a:r>
+          </a:p>
+        </p:txBody>
+      </p:sp>
+      <p:sp>
+        <p:nvSpPr>
+          <p:cNvPr id="4" name="Slide Number Placeholder 3"/>
+          <p:cNvSpPr>
+            <a:spLocks noGrp="1"/>
+          </p:cNvSpPr>
+          <p:nvPr>
+            <p:ph type="sldNum" sz="quarter" idx="5"/>
+          </p:nvPr>
+        </p:nvSpPr>
+        <p:spPr/>
+        <p:txBody>
+          <a:bodyPr/>
+          <a:lstStyle/>
+          <a:p>
+            <a:fld id="{8C2E9449-D161-4234-AF44-56BC19BD5257}" type="slidenum">
+              <a:rPr lang="en-US" smtClean="0"/>
+              <a:t>31</a:t>
+            </a:fld>
+            <a:endParaRPr lang="en-US"/>
+          </a:p>
+        </p:txBody>
+      </p:sp>
+    </p:spTree>
+    <p:extLst>
+      <p:ext uri="{BB962C8B-B14F-4D97-AF65-F5344CB8AC3E}">
+        <p14:creationId xmlns:p14="http://schemas.microsoft.com/office/powerpoint/2010/main" val="3790585450"/>
+      </p:ext>
+    </p:extLst>
+  </p:cSld>
+  <p:clrMapOvr>
+    <a:masterClrMapping/>
+  </p:clrMapOvr>
+</p:notes>
+</file>
+
+<file path=ppt/notesSlides/notesSlide18.xml><?xml version="1.0" encoding="utf-8"?>
+<p:notes xmlns:a="http://schemas.openxmlformats.org/drawingml/2006/main" xmlns:r="http://schemas.openxmlformats.org/officeDocument/2006/relationships" xmlns:p="http://schemas.openxmlformats.org/presentationml/2006/main">
+  <p:cSld>
+    <p:spTree>
+      <p:nvGrpSpPr>
+        <p:cNvPr id="1" name=""/>
+        <p:cNvGrpSpPr/>
+        <p:nvPr/>
+      </p:nvGrpSpPr>
+      <p:grpSpPr>
+        <a:xfrm>
+          <a:off x="0" y="0"/>
+          <a:ext cx="0" cy="0"/>
+          <a:chOff x="0" y="0"/>
+          <a:chExt cx="0" cy="0"/>
+        </a:xfrm>
+      </p:grpSpPr>
+      <p:sp>
+        <p:nvSpPr>
+          <p:cNvPr id="2" name="Slide Image Placeholder 1"/>
+          <p:cNvSpPr>
+            <a:spLocks noGrp="1" noRot="1" noChangeAspect="1"/>
+          </p:cNvSpPr>
+          <p:nvPr>
+            <p:ph type="sldImg"/>
+          </p:nvPr>
+        </p:nvSpPr>
+        <p:spPr/>
+      </p:sp>
+      <p:sp>
+        <p:nvSpPr>
+          <p:cNvPr id="3" name="Notes Placeholder 2"/>
+          <p:cNvSpPr>
+            <a:spLocks noGrp="1"/>
+          </p:cNvSpPr>
+          <p:nvPr>
+            <p:ph type="body" idx="1"/>
+          </p:nvPr>
+        </p:nvSpPr>
+        <p:spPr/>
+        <p:txBody>
+          <a:bodyPr/>
+          <a:lstStyle/>
+          <a:p>
+            <a:endParaRPr lang="en-US" dirty="0"/>
+          </a:p>
+        </p:txBody>
+      </p:sp>
+      <p:sp>
+        <p:nvSpPr>
+          <p:cNvPr id="4" name="Slide Number Placeholder 3"/>
+          <p:cNvSpPr>
+            <a:spLocks noGrp="1"/>
+          </p:cNvSpPr>
+          <p:nvPr>
+            <p:ph type="sldNum" sz="quarter" idx="5"/>
+          </p:nvPr>
+        </p:nvSpPr>
+        <p:spPr/>
+        <p:txBody>
+          <a:bodyPr/>
+          <a:lstStyle/>
+          <a:p>
+            <a:fld id="{8C2E9449-D161-4234-AF44-56BC19BD5257}" type="slidenum">
+              <a:rPr lang="en-US" smtClean="0"/>
+              <a:t>33</a:t>
+            </a:fld>
+            <a:endParaRPr lang="en-US"/>
+          </a:p>
+        </p:txBody>
+      </p:sp>
+    </p:spTree>
+    <p:extLst>
+      <p:ext uri="{BB962C8B-B14F-4D97-AF65-F5344CB8AC3E}">
+        <p14:creationId xmlns:p14="http://schemas.microsoft.com/office/powerpoint/2010/main" val="3854404646"/>
+      </p:ext>
+    </p:extLst>
+  </p:cSld>
+  <p:clrMapOvr>
+    <a:masterClrMapping/>
+  </p:clrMapOvr>
+</p:notes>
+</file>
+
+<file path=ppt/notesSlides/notesSlide19.xml><?xml version="1.0" encoding="utf-8"?>
+<p:notes xmlns:a="http://schemas.openxmlformats.org/drawingml/2006/main" xmlns:r="http://schemas.openxmlformats.org/officeDocument/2006/relationships" xmlns:p="http://schemas.openxmlformats.org/presentationml/2006/main">
+  <p:cSld>
+    <p:spTree>
+      <p:nvGrpSpPr>
+        <p:cNvPr id="1" name=""/>
+        <p:cNvGrpSpPr/>
+        <p:nvPr/>
+      </p:nvGrpSpPr>
+      <p:grpSpPr>
+        <a:xfrm>
+          <a:off x="0" y="0"/>
+          <a:ext cx="0" cy="0"/>
+          <a:chOff x="0" y="0"/>
+          <a:chExt cx="0" cy="0"/>
+        </a:xfrm>
+      </p:grpSpPr>
+      <p:sp>
+        <p:nvSpPr>
+          <p:cNvPr id="2" name="Slide Image Placeholder 1"/>
+          <p:cNvSpPr>
+            <a:spLocks noGrp="1" noRot="1" noChangeAspect="1"/>
+          </p:cNvSpPr>
+          <p:nvPr>
+            <p:ph type="sldImg"/>
+          </p:nvPr>
+        </p:nvSpPr>
+        <p:spPr/>
+      </p:sp>
+      <p:sp>
+        <p:nvSpPr>
+          <p:cNvPr id="3" name="Notes Placeholder 2"/>
+          <p:cNvSpPr>
+            <a:spLocks noGrp="1"/>
+          </p:cNvSpPr>
+          <p:nvPr>
+            <p:ph type="body" idx="1"/>
+          </p:nvPr>
+        </p:nvSpPr>
+        <p:spPr/>
+        <p:txBody>
+          <a:bodyPr/>
+          <a:lstStyle/>
+          <a:p>
+            <a:pPr marL="0" marR="0" lvl="0" indent="0" algn="l" defTabSz="914400" rtl="0" eaLnBrk="1" fontAlgn="auto" latinLnBrk="0" hangingPunct="1">
+              <a:lnSpc>
+                <a:spcPct val="100000"/>
+              </a:lnSpc>
+              <a:spcBef>
+                <a:spcPts val="0"/>
+              </a:spcBef>
+              <a:spcAft>
+                <a:spcPts val="0"/>
+              </a:spcAft>
+              <a:buClrTx/>
+              <a:buSzTx/>
+              <a:buFontTx/>
+              <a:buNone/>
+              <a:tabLst/>
+              <a:defRPr/>
+            </a:pPr>
+            <a:r>
+              <a:rPr lang="en-US" dirty="0"/>
+              <a:t>https://docs.microsoft.com/en-us/azure/storage/queues/storage-dotnet-how-to-use-queues?tabs=dotnet</a:t>
+            </a:r>
+          </a:p>
+          <a:p>
+            <a:endParaRPr lang="en-US" dirty="0"/>
+          </a:p>
+        </p:txBody>
+      </p:sp>
+      <p:sp>
+        <p:nvSpPr>
+          <p:cNvPr id="4" name="Slide Number Placeholder 3"/>
+          <p:cNvSpPr>
+            <a:spLocks noGrp="1"/>
+          </p:cNvSpPr>
+          <p:nvPr>
+            <p:ph type="sldNum" sz="quarter" idx="5"/>
+          </p:nvPr>
+        </p:nvSpPr>
+        <p:spPr/>
+        <p:txBody>
+          <a:bodyPr/>
+          <a:lstStyle/>
+          <a:p>
+            <a:fld id="{8C2E9449-D161-4234-AF44-56BC19BD5257}" type="slidenum">
+              <a:rPr lang="en-US" smtClean="0"/>
+              <a:t>34</a:t>
+            </a:fld>
+            <a:endParaRPr lang="en-US"/>
+          </a:p>
+        </p:txBody>
+      </p:sp>
+    </p:spTree>
+    <p:extLst>
+      <p:ext uri="{BB962C8B-B14F-4D97-AF65-F5344CB8AC3E}">
+        <p14:creationId xmlns:p14="http://schemas.microsoft.com/office/powerpoint/2010/main" val="313362551"/>
       </p:ext>
     </p:extLst>
   </p:cSld>
@@ -1491,6 +1803,208 @@
     <p:extLst>
       <p:ext uri="{BB962C8B-B14F-4D97-AF65-F5344CB8AC3E}">
         <p14:creationId xmlns:p14="http://schemas.microsoft.com/office/powerpoint/2010/main" val="768980581"/>
+      </p:ext>
+    </p:extLst>
+  </p:cSld>
+  <p:clrMapOvr>
+    <a:masterClrMapping/>
+  </p:clrMapOvr>
+</p:notes>
+</file>
+
+<file path=ppt/notesSlides/notesSlide20.xml><?xml version="1.0" encoding="utf-8"?>
+<p:notes xmlns:a="http://schemas.openxmlformats.org/drawingml/2006/main" xmlns:r="http://schemas.openxmlformats.org/officeDocument/2006/relationships" xmlns:p="http://schemas.openxmlformats.org/presentationml/2006/main">
+  <p:cSld>
+    <p:spTree>
+      <p:nvGrpSpPr>
+        <p:cNvPr id="1" name=""/>
+        <p:cNvGrpSpPr/>
+        <p:nvPr/>
+      </p:nvGrpSpPr>
+      <p:grpSpPr>
+        <a:xfrm>
+          <a:off x="0" y="0"/>
+          <a:ext cx="0" cy="0"/>
+          <a:chOff x="0" y="0"/>
+          <a:chExt cx="0" cy="0"/>
+        </a:xfrm>
+      </p:grpSpPr>
+      <p:sp>
+        <p:nvSpPr>
+          <p:cNvPr id="2" name="Slide Image Placeholder 1"/>
+          <p:cNvSpPr>
+            <a:spLocks noGrp="1" noRot="1" noChangeAspect="1"/>
+          </p:cNvSpPr>
+          <p:nvPr>
+            <p:ph type="sldImg"/>
+          </p:nvPr>
+        </p:nvSpPr>
+        <p:spPr/>
+      </p:sp>
+      <p:sp>
+        <p:nvSpPr>
+          <p:cNvPr id="3" name="Notes Placeholder 2"/>
+          <p:cNvSpPr>
+            <a:spLocks noGrp="1"/>
+          </p:cNvSpPr>
+          <p:nvPr>
+            <p:ph type="body" idx="1"/>
+          </p:nvPr>
+        </p:nvSpPr>
+        <p:spPr/>
+        <p:txBody>
+          <a:bodyPr/>
+          <a:lstStyle/>
+          <a:p>
+            <a:endParaRPr lang="en-US" dirty="0"/>
+          </a:p>
+        </p:txBody>
+      </p:sp>
+      <p:sp>
+        <p:nvSpPr>
+          <p:cNvPr id="4" name="Slide Number Placeholder 3"/>
+          <p:cNvSpPr>
+            <a:spLocks noGrp="1"/>
+          </p:cNvSpPr>
+          <p:nvPr>
+            <p:ph type="sldNum" sz="quarter" idx="5"/>
+          </p:nvPr>
+        </p:nvSpPr>
+        <p:spPr/>
+        <p:txBody>
+          <a:bodyPr/>
+          <a:lstStyle/>
+          <a:p>
+            <a:fld id="{8C2E9449-D161-4234-AF44-56BC19BD5257}" type="slidenum">
+              <a:rPr lang="en-US" smtClean="0"/>
+              <a:t>36</a:t>
+            </a:fld>
+            <a:endParaRPr lang="en-US"/>
+          </a:p>
+        </p:txBody>
+      </p:sp>
+    </p:spTree>
+    <p:extLst>
+      <p:ext uri="{BB962C8B-B14F-4D97-AF65-F5344CB8AC3E}">
+        <p14:creationId xmlns:p14="http://schemas.microsoft.com/office/powerpoint/2010/main" val="1009367226"/>
+      </p:ext>
+    </p:extLst>
+  </p:cSld>
+  <p:clrMapOvr>
+    <a:masterClrMapping/>
+  </p:clrMapOvr>
+</p:notes>
+</file>
+
+<file path=ppt/notesSlides/notesSlide21.xml><?xml version="1.0" encoding="utf-8"?>
+<p:notes xmlns:a="http://schemas.openxmlformats.org/drawingml/2006/main" xmlns:r="http://schemas.openxmlformats.org/officeDocument/2006/relationships" xmlns:p="http://schemas.openxmlformats.org/presentationml/2006/main">
+  <p:cSld>
+    <p:spTree>
+      <p:nvGrpSpPr>
+        <p:cNvPr id="1" name=""/>
+        <p:cNvGrpSpPr/>
+        <p:nvPr/>
+      </p:nvGrpSpPr>
+      <p:grpSpPr>
+        <a:xfrm>
+          <a:off x="0" y="0"/>
+          <a:ext cx="0" cy="0"/>
+          <a:chOff x="0" y="0"/>
+          <a:chExt cx="0" cy="0"/>
+        </a:xfrm>
+      </p:grpSpPr>
+      <p:sp>
+        <p:nvSpPr>
+          <p:cNvPr id="2" name="Slide Image Placeholder 1"/>
+          <p:cNvSpPr>
+            <a:spLocks noGrp="1" noRot="1" noChangeAspect="1"/>
+          </p:cNvSpPr>
+          <p:nvPr>
+            <p:ph type="sldImg"/>
+          </p:nvPr>
+        </p:nvSpPr>
+        <p:spPr/>
+      </p:sp>
+      <p:sp>
+        <p:nvSpPr>
+          <p:cNvPr id="3" name="Notes Placeholder 2"/>
+          <p:cNvSpPr>
+            <a:spLocks noGrp="1"/>
+          </p:cNvSpPr>
+          <p:nvPr>
+            <p:ph type="body" idx="1"/>
+          </p:nvPr>
+        </p:nvSpPr>
+        <p:spPr/>
+        <p:txBody>
+          <a:bodyPr/>
+          <a:lstStyle/>
+          <a:p>
+            <a:r>
+              <a:rPr lang="en-US" dirty="0"/>
+              <a:t>Thank you for attending my talk today.  Please reach out and connect. </a:t>
+            </a:r>
+          </a:p>
+          <a:p>
+            <a:endParaRPr lang="en-US" dirty="0"/>
+          </a:p>
+          <a:p>
+            <a:r>
+              <a:rPr lang="en-US" dirty="0"/>
+              <a:t>If you liked the talk today, you can support me by listening to one or more of my songs on </a:t>
+            </a:r>
+            <a:r>
+              <a:rPr lang="en-US" dirty="0" err="1"/>
+              <a:t>spotify</a:t>
+            </a:r>
+            <a:r>
+              <a:rPr lang="en-US" dirty="0"/>
+              <a:t> </a:t>
+            </a:r>
+            <a:r>
+              <a:rPr lang="en-US" dirty="0">
+                <a:sym typeface="Wingdings" panose="05000000000000000000" pitchFamily="2" charset="2"/>
+              </a:rPr>
+              <a:t></a:t>
+            </a:r>
+            <a:br>
+              <a:rPr lang="en-US" dirty="0">
+                <a:sym typeface="Wingdings" panose="05000000000000000000" pitchFamily="2" charset="2"/>
+              </a:rPr>
+            </a:br>
+            <a:endParaRPr lang="en-US" dirty="0">
+              <a:sym typeface="Wingdings" panose="05000000000000000000" pitchFamily="2" charset="2"/>
+            </a:endParaRPr>
+          </a:p>
+        </p:txBody>
+      </p:sp>
+      <p:sp>
+        <p:nvSpPr>
+          <p:cNvPr id="4" name="Slide Number Placeholder 3"/>
+          <p:cNvSpPr>
+            <a:spLocks noGrp="1"/>
+          </p:cNvSpPr>
+          <p:nvPr>
+            <p:ph type="sldNum" sz="quarter" idx="5"/>
+          </p:nvPr>
+        </p:nvSpPr>
+        <p:spPr/>
+        <p:txBody>
+          <a:bodyPr/>
+          <a:lstStyle/>
+          <a:p>
+            <a:fld id="{8C2E9449-D161-4234-AF44-56BC19BD5257}" type="slidenum">
+              <a:rPr lang="en-US" smtClean="0"/>
+              <a:t>37</a:t>
+            </a:fld>
+            <a:endParaRPr lang="en-US"/>
+          </a:p>
+        </p:txBody>
+      </p:sp>
+    </p:spTree>
+    <p:extLst>
+      <p:ext uri="{BB962C8B-B14F-4D97-AF65-F5344CB8AC3E}">
+        <p14:creationId xmlns:p14="http://schemas.microsoft.com/office/powerpoint/2010/main" val="4169632679"/>
       </p:ext>
     </p:extLst>
   </p:cSld>
@@ -1649,7 +2163,7 @@
           <a:p>
             <a:fld id="{8C2E9449-D161-4234-AF44-56BC19BD5257}" type="slidenum">
               <a:rPr lang="en-US" smtClean="0"/>
-              <a:t>16</a:t>
+              <a:t>8</a:t>
             </a:fld>
             <a:endParaRPr lang="en-US"/>
           </a:p>
@@ -1658,7 +2172,7 @@
     </p:spTree>
     <p:extLst>
       <p:ext uri="{BB962C8B-B14F-4D97-AF65-F5344CB8AC3E}">
-        <p14:creationId xmlns:p14="http://schemas.microsoft.com/office/powerpoint/2010/main" val="65335043"/>
+        <p14:creationId xmlns:p14="http://schemas.microsoft.com/office/powerpoint/2010/main" val="263551293"/>
       </p:ext>
     </p:extLst>
   </p:cSld>
@@ -1714,7 +2228,21 @@
           <a:p>
             <a:r>
               <a:rPr lang="en-US" dirty="0"/>
-              <a:t>Just create it with the subscription in the portal then drop a file to show it working</a:t>
+              <a:t>Call out the partition count and data retention days</a:t>
+            </a:r>
+          </a:p>
+          <a:p>
+            <a:r>
+              <a:rPr lang="en-US" dirty="0"/>
+              <a:t>Call out the storage account is pre-created with a container &amp; </a:t>
+            </a:r>
+            <a:r>
+              <a:rPr lang="en-US" dirty="0" err="1"/>
+              <a:t>datalake</a:t>
+            </a:r>
+            <a:r>
+              <a:rPr lang="en-US" dirty="0"/>
+              <a:t> ability, set to cool archive (call out that you will say more about the “cool path” in a bit, but that cool tier != cool path in lambda! (can be a big source of confusion))</a:t>
             </a:r>
           </a:p>
         </p:txBody>
@@ -1736,7 +2264,7 @@
           <a:p>
             <a:fld id="{8C2E9449-D161-4234-AF44-56BC19BD5257}" type="slidenum">
               <a:rPr lang="en-US" smtClean="0"/>
-              <a:t>17</a:t>
+              <a:t>10</a:t>
             </a:fld>
             <a:endParaRPr lang="en-US"/>
           </a:p>
@@ -1745,7 +2273,7 @@
     </p:spTree>
     <p:extLst>
       <p:ext uri="{BB962C8B-B14F-4D97-AF65-F5344CB8AC3E}">
-        <p14:creationId xmlns:p14="http://schemas.microsoft.com/office/powerpoint/2010/main" val="649696302"/>
+        <p14:creationId xmlns:p14="http://schemas.microsoft.com/office/powerpoint/2010/main" val="1759188052"/>
       </p:ext>
     </p:extLst>
   </p:cSld>
@@ -1801,8 +2329,17 @@
           <a:p>
             <a:r>
               <a:rPr lang="en-US" dirty="0"/>
-              <a:t>https://docs.microsoft.com/en-us/azure/service-bus-messaging/service-bus-dotnet-get-started-with-queues</a:t>
-            </a:r>
+              <a:t>Shared access key on the namespace is God mode</a:t>
+            </a:r>
+          </a:p>
+          <a:p>
+            <a:r>
+              <a:rPr lang="en-US" dirty="0"/>
+              <a:t>It’s better to do a specific key for read/write for security and for your sanity</a:t>
+            </a:r>
+          </a:p>
+          <a:p>
+            <a:endParaRPr lang="en-US" dirty="0"/>
           </a:p>
         </p:txBody>
       </p:sp>
@@ -1823,7 +2360,7 @@
           <a:p>
             <a:fld id="{8C2E9449-D161-4234-AF44-56BC19BD5257}" type="slidenum">
               <a:rPr lang="en-US" smtClean="0"/>
-              <a:t>22</a:t>
+              <a:t>11</a:t>
             </a:fld>
             <a:endParaRPr lang="en-US"/>
           </a:p>
@@ -1832,7 +2369,7 @@
     </p:spTree>
     <p:extLst>
       <p:ext uri="{BB962C8B-B14F-4D97-AF65-F5344CB8AC3E}">
-        <p14:creationId xmlns:p14="http://schemas.microsoft.com/office/powerpoint/2010/main" val="613864464"/>
+        <p14:creationId xmlns:p14="http://schemas.microsoft.com/office/powerpoint/2010/main" val="1057444777"/>
       </p:ext>
     </p:extLst>
   </p:cSld>
@@ -1886,6 +2423,20 @@
           <a:bodyPr/>
           <a:lstStyle/>
           <a:p>
+            <a:r>
+              <a:rPr lang="en-US" dirty="0"/>
+              <a:t>Call out both syntaxes.  Mention syntax 2 could be useful from other </a:t>
+            </a:r>
+            <a:r>
+              <a:rPr lang="en-US"/>
+              <a:t>azure services configs </a:t>
+            </a:r>
+            <a:r>
+              <a:rPr lang="en-US">
+                <a:sym typeface="Wingdings" panose="05000000000000000000" pitchFamily="2" charset="2"/>
+              </a:rPr>
+              <a:t></a:t>
+            </a:r>
             <a:endParaRPr lang="en-US" dirty="0"/>
           </a:p>
         </p:txBody>
@@ -1907,7 +2458,7 @@
           <a:p>
             <a:fld id="{8C2E9449-D161-4234-AF44-56BC19BD5257}" type="slidenum">
               <a:rPr lang="en-US" smtClean="0"/>
-              <a:t>23</a:t>
+              <a:t>12</a:t>
             </a:fld>
             <a:endParaRPr lang="en-US"/>
           </a:p>
@@ -1916,7 +2467,7 @@
     </p:spTree>
     <p:extLst>
       <p:ext uri="{BB962C8B-B14F-4D97-AF65-F5344CB8AC3E}">
-        <p14:creationId xmlns:p14="http://schemas.microsoft.com/office/powerpoint/2010/main" val="927344670"/>
+        <p14:creationId xmlns:p14="http://schemas.microsoft.com/office/powerpoint/2010/main" val="3231789439"/>
       </p:ext>
     </p:extLst>
   </p:cSld>
@@ -1970,7 +2521,52 @@
           <a:bodyPr/>
           <a:lstStyle/>
           <a:p>
+            <a:r>
+              <a:rPr lang="en-US" dirty="0"/>
+              <a:t>Scenario –</a:t>
+            </a:r>
+          </a:p>
+          <a:p>
+            <a:br>
+              <a:rPr lang="en-US" dirty="0"/>
+            </a:br>
+            <a:r>
+              <a:rPr lang="en-US" dirty="0"/>
+              <a:t>Client is logging verbose logs to log analytics workspace and it’s costing them a fortune  (even with reservations).  </a:t>
+            </a:r>
+            <a:br>
+              <a:rPr lang="en-US" dirty="0"/>
+            </a:br>
+            <a:r>
+              <a:rPr lang="en-US" dirty="0"/>
+              <a:t>In an effort to skew costs, they are trying to offload some of the logging that is not critical directly to storage so that they have the logs but don’t have to pay for the throughput/storage on a log-analytics workspace.  This also means they will have to come up with another solution to </a:t>
+            </a:r>
+            <a:r>
+              <a:rPr lang="en-US" dirty="0" err="1"/>
+              <a:t>splunk</a:t>
+            </a:r>
+            <a:r>
+              <a:rPr lang="en-US" dirty="0"/>
+              <a:t> the logs or push to another big-data solution via ELT.</a:t>
+            </a:r>
+          </a:p>
+          <a:p>
             <a:endParaRPr lang="en-US" dirty="0"/>
+          </a:p>
+          <a:p>
+            <a:r>
+              <a:rPr lang="en-US" dirty="0"/>
+              <a:t>However, they will only be pushing critical logs into the workspace going forward, saving money on that utilization.</a:t>
+            </a:r>
+          </a:p>
+          <a:p>
+            <a:endParaRPr lang="en-US" dirty="0"/>
+          </a:p>
+          <a:p>
+            <a:r>
+              <a:rPr lang="en-US" dirty="0"/>
+              <a:t>Show the logging from the application:</a:t>
+            </a:r>
           </a:p>
         </p:txBody>
       </p:sp>
@@ -1991,7 +2587,7 @@
           <a:p>
             <a:fld id="{8C2E9449-D161-4234-AF44-56BC19BD5257}" type="slidenum">
               <a:rPr lang="en-US" smtClean="0"/>
-              <a:t>25</a:t>
+              <a:t>13</a:t>
             </a:fld>
             <a:endParaRPr lang="en-US"/>
           </a:p>
@@ -2000,7 +2596,7 @@
     </p:spTree>
     <p:extLst>
       <p:ext uri="{BB962C8B-B14F-4D97-AF65-F5344CB8AC3E}">
-        <p14:creationId xmlns:p14="http://schemas.microsoft.com/office/powerpoint/2010/main" val="522867708"/>
+        <p14:creationId xmlns:p14="http://schemas.microsoft.com/office/powerpoint/2010/main" val="456621197"/>
       </p:ext>
     </p:extLst>
   </p:cSld>
@@ -2075,7 +2671,7 @@
           <a:p>
             <a:fld id="{8C2E9449-D161-4234-AF44-56BC19BD5257}" type="slidenum">
               <a:rPr lang="en-US" smtClean="0"/>
-              <a:t>27</a:t>
+              <a:t>14</a:t>
             </a:fld>
             <a:endParaRPr lang="en-US"/>
           </a:p>
@@ -2084,7 +2680,7 @@
     </p:spTree>
     <p:extLst>
       <p:ext uri="{BB962C8B-B14F-4D97-AF65-F5344CB8AC3E}">
-        <p14:creationId xmlns:p14="http://schemas.microsoft.com/office/powerpoint/2010/main" val="3266879566"/>
+        <p14:creationId xmlns:p14="http://schemas.microsoft.com/office/powerpoint/2010/main" val="72671278"/>
       </p:ext>
     </p:extLst>
   </p:cSld>
@@ -2283,7 +2879,7 @@
             <a:fld id="{B61BEF0D-F0BB-DE4B-95CE-6DB70DBA9567}" type="datetimeFigureOut">
               <a:rPr lang="en-US" dirty="0"/>
               <a:pPr/>
-              <a:t>6/3/2022</a:t>
+              <a:t>7/11/2022</a:t>
             </a:fld>
             <a:endParaRPr lang="en-US" dirty="0"/>
           </a:p>
@@ -2618,7 +3214,7 @@
             <a:fld id="{B61BEF0D-F0BB-DE4B-95CE-6DB70DBA9567}" type="datetimeFigureOut">
               <a:rPr lang="en-US" dirty="0"/>
               <a:pPr/>
-              <a:t>6/3/2022</a:t>
+              <a:t>7/11/2022</a:t>
             </a:fld>
             <a:endParaRPr lang="en-US" dirty="0"/>
           </a:p>
@@ -3016,7 +3612,7 @@
             <a:fld id="{B61BEF0D-F0BB-DE4B-95CE-6DB70DBA9567}" type="datetimeFigureOut">
               <a:rPr lang="en-US" dirty="0"/>
               <a:pPr/>
-              <a:t>6/3/2022</a:t>
+              <a:t>7/11/2022</a:t>
             </a:fld>
             <a:endParaRPr lang="en-US" dirty="0"/>
           </a:p>
@@ -3349,7 +3945,7 @@
             <a:fld id="{B61BEF0D-F0BB-DE4B-95CE-6DB70DBA9567}" type="datetimeFigureOut">
               <a:rPr lang="en-US" dirty="0"/>
               <a:pPr/>
-              <a:t>6/3/2022</a:t>
+              <a:t>7/11/2022</a:t>
             </a:fld>
             <a:endParaRPr lang="en-US" dirty="0"/>
           </a:p>
@@ -3666,7 +4262,7 @@
             <a:fld id="{B61BEF0D-F0BB-DE4B-95CE-6DB70DBA9567}" type="datetimeFigureOut">
               <a:rPr lang="en-US" dirty="0"/>
               <a:pPr/>
-              <a:t>6/3/2022</a:t>
+              <a:t>7/11/2022</a:t>
             </a:fld>
             <a:endParaRPr lang="en-US" dirty="0"/>
           </a:p>
@@ -4059,7 +4655,7 @@
             <a:fld id="{B61BEF0D-F0BB-DE4B-95CE-6DB70DBA9567}" type="datetimeFigureOut">
               <a:rPr lang="en-US" dirty="0"/>
               <a:pPr/>
-              <a:t>6/3/2022</a:t>
+              <a:t>7/11/2022</a:t>
             </a:fld>
             <a:endParaRPr lang="en-US" dirty="0"/>
           </a:p>
@@ -4313,7 +4909,7 @@
             <a:fld id="{B61BEF0D-F0BB-DE4B-95CE-6DB70DBA9567}" type="datetimeFigureOut">
               <a:rPr lang="en-US" dirty="0"/>
               <a:pPr/>
-              <a:t>6/3/2022</a:t>
+              <a:t>7/11/2022</a:t>
             </a:fld>
             <a:endParaRPr lang="en-US" dirty="0"/>
           </a:p>
@@ -4572,7 +5168,7 @@
             <a:fld id="{B61BEF0D-F0BB-DE4B-95CE-6DB70DBA9567}" type="datetimeFigureOut">
               <a:rPr lang="en-US" dirty="0"/>
               <a:pPr/>
-              <a:t>6/3/2022</a:t>
+              <a:t>7/11/2022</a:t>
             </a:fld>
             <a:endParaRPr lang="en-US" dirty="0"/>
           </a:p>
@@ -4831,7 +5427,7 @@
             <a:fld id="{B61BEF0D-F0BB-DE4B-95CE-6DB70DBA9567}" type="datetimeFigureOut">
               <a:rPr lang="en-US" dirty="0"/>
               <a:pPr/>
-              <a:t>6/3/2022</a:t>
+              <a:t>7/11/2022</a:t>
             </a:fld>
             <a:endParaRPr lang="en-US" dirty="0"/>
           </a:p>
@@ -5157,7 +5753,7 @@
             <a:fld id="{B61BEF0D-F0BB-DE4B-95CE-6DB70DBA9567}" type="datetimeFigureOut">
               <a:rPr lang="en-US" dirty="0"/>
               <a:pPr/>
-              <a:t>6/3/2022</a:t>
+              <a:t>7/11/2022</a:t>
             </a:fld>
             <a:endParaRPr lang="en-US" dirty="0"/>
           </a:p>
@@ -5477,7 +6073,7 @@
             <a:fld id="{B61BEF0D-F0BB-DE4B-95CE-6DB70DBA9567}" type="datetimeFigureOut">
               <a:rPr lang="en-US" dirty="0"/>
               <a:pPr/>
-              <a:t>6/3/2022</a:t>
+              <a:t>7/11/2022</a:t>
             </a:fld>
             <a:endParaRPr lang="en-US" dirty="0"/>
           </a:p>
@@ -5931,7 +6527,7 @@
             <a:fld id="{B61BEF0D-F0BB-DE4B-95CE-6DB70DBA9567}" type="datetimeFigureOut">
               <a:rPr lang="en-US" dirty="0"/>
               <a:pPr/>
-              <a:t>6/3/2022</a:t>
+              <a:t>7/11/2022</a:t>
             </a:fld>
             <a:endParaRPr lang="en-US" dirty="0"/>
           </a:p>
@@ -6133,7 +6729,7 @@
             <a:fld id="{B61BEF0D-F0BB-DE4B-95CE-6DB70DBA9567}" type="datetimeFigureOut">
               <a:rPr lang="en-US" dirty="0"/>
               <a:pPr/>
-              <a:t>6/3/2022</a:t>
+              <a:t>7/11/2022</a:t>
             </a:fld>
             <a:endParaRPr lang="en-US" dirty="0"/>
           </a:p>
@@ -6307,7 +6903,7 @@
             <a:fld id="{B61BEF0D-F0BB-DE4B-95CE-6DB70DBA9567}" type="datetimeFigureOut">
               <a:rPr lang="en-US" dirty="0"/>
               <a:pPr/>
-              <a:t>6/3/2022</a:t>
+              <a:t>7/11/2022</a:t>
             </a:fld>
             <a:endParaRPr lang="en-US" dirty="0"/>
           </a:p>
@@ -6637,7 +7233,7 @@
             <a:fld id="{B61BEF0D-F0BB-DE4B-95CE-6DB70DBA9567}" type="datetimeFigureOut">
               <a:rPr lang="en-US" dirty="0"/>
               <a:pPr/>
-              <a:t>6/3/2022</a:t>
+              <a:t>7/11/2022</a:t>
             </a:fld>
             <a:endParaRPr lang="en-US" dirty="0"/>
           </a:p>
@@ -6979,7 +7575,7 @@
             <a:fld id="{B61BEF0D-F0BB-DE4B-95CE-6DB70DBA9567}" type="datetimeFigureOut">
               <a:rPr lang="en-US" dirty="0"/>
               <a:pPr/>
-              <a:t>6/3/2022</a:t>
+              <a:t>7/11/2022</a:t>
             </a:fld>
             <a:endParaRPr lang="en-US" dirty="0"/>
           </a:p>
@@ -9093,7 +9689,7 @@
             <a:fld id="{B61BEF0D-F0BB-DE4B-95CE-6DB70DBA9567}" type="datetimeFigureOut">
               <a:rPr lang="en-US" dirty="0"/>
               <a:pPr/>
-              <a:t>6/3/2022</a:t>
+              <a:t>7/11/2022</a:t>
             </a:fld>
             <a:endParaRPr lang="en-US" dirty="0"/>
           </a:p>
@@ -9732,7 +10328,7 @@
           </p:nvPr>
         </p:nvPicPr>
         <p:blipFill>
-          <a:blip r:embed="rId2"/>
+          <a:blip r:embed="rId3"/>
           <a:stretch>
             <a:fillRect/>
           </a:stretch>
@@ -9761,7 +10357,7 @@
           </p:nvPr>
         </p:nvPicPr>
         <p:blipFill>
-          <a:blip r:embed="rId3"/>
+          <a:blip r:embed="rId4"/>
           <a:stretch>
             <a:fillRect/>
           </a:stretch>
@@ -9805,10 +10401,10 @@
       </p:grpSpPr>
       <p:sp>
         <p:nvSpPr>
-          <p:cNvPr id="4" name="Title 3">
+          <p:cNvPr id="2" name="Title 1">
             <a:extLst>
               <a:ext uri="{FF2B5EF4-FFF2-40B4-BE49-F238E27FC236}">
-                <a16:creationId xmlns:a16="http://schemas.microsoft.com/office/drawing/2014/main" id="{BFF5CDDA-2AF8-4160-934C-2EA35407E912}"/>
+                <a16:creationId xmlns:a16="http://schemas.microsoft.com/office/drawing/2014/main" id="{98C56ABF-4C5A-9A45-830A-702660CFAD71}"/>
               </a:ext>
             </a:extLst>
           </p:cNvPr>
@@ -9821,48 +10417,111 @@
         </p:nvSpPr>
         <p:spPr/>
         <p:txBody>
-          <a:bodyPr/>
+          <a:bodyPr>
+            <a:normAutofit fontScale="90000"/>
+          </a:bodyPr>
           <a:lstStyle/>
           <a:p>
             <a:r>
               <a:rPr lang="en-US" dirty="0"/>
-              <a:t>Application Logging Stream</a:t>
+              <a:t>Use the Shared Access Key from the namespace, or specific read/write from the hub</a:t>
             </a:r>
           </a:p>
         </p:txBody>
       </p:sp>
-      <p:sp>
-        <p:nvSpPr>
-          <p:cNvPr id="5" name="Text Placeholder 4">
+      <p:pic>
+        <p:nvPicPr>
+          <p:cNvPr id="6" name="Content Placeholder 5">
             <a:extLst>
               <a:ext uri="{FF2B5EF4-FFF2-40B4-BE49-F238E27FC236}">
-                <a16:creationId xmlns:a16="http://schemas.microsoft.com/office/drawing/2014/main" id="{5F9278D0-3C27-4EF2-84DD-F4E8A78A9543}"/>
+                <a16:creationId xmlns:a16="http://schemas.microsoft.com/office/drawing/2014/main" id="{BE2F7CDE-B5F9-950B-1A73-7865AB2BE215}"/>
               </a:ext>
             </a:extLst>
           </p:cNvPr>
-          <p:cNvSpPr>
-            <a:spLocks noGrp="1"/>
-          </p:cNvSpPr>
-          <p:nvPr>
-            <p:ph type="body" idx="1"/>
-          </p:nvPr>
-        </p:nvSpPr>
-        <p:spPr/>
-        <p:txBody>
-          <a:bodyPr/>
-          <a:lstStyle/>
-          <a:p>
-            <a:r>
-              <a:rPr lang="en-US" dirty="0"/>
-              <a:t>Creating logs from your application to an Event Hub Stream</a:t>
-            </a:r>
-          </a:p>
-        </p:txBody>
-      </p:sp>
+          <p:cNvPicPr>
+            <a:picLocks noGrp="1" noChangeAspect="1"/>
+          </p:cNvPicPr>
+          <p:nvPr>
+            <p:ph sz="half" idx="1"/>
+          </p:nvPr>
+        </p:nvPicPr>
+        <p:blipFill>
+          <a:blip r:embed="rId3"/>
+          <a:stretch>
+            <a:fillRect/>
+          </a:stretch>
+        </p:blipFill>
+        <p:spPr>
+          <a:xfrm>
+            <a:off x="1635531" y="2344430"/>
+            <a:ext cx="3359414" cy="3778250"/>
+          </a:xfrm>
+        </p:spPr>
+      </p:pic>
+      <p:pic>
+        <p:nvPicPr>
+          <p:cNvPr id="12" name="Picture 11">
+            <a:extLst>
+              <a:ext uri="{FF2B5EF4-FFF2-40B4-BE49-F238E27FC236}">
+                <a16:creationId xmlns:a16="http://schemas.microsoft.com/office/drawing/2014/main" id="{1F1DA9B9-07FF-AA8B-014F-0A7E3B695AC5}"/>
+              </a:ext>
+            </a:extLst>
+          </p:cNvPr>
+          <p:cNvPicPr>
+            <a:picLocks noChangeAspect="1"/>
+          </p:cNvPicPr>
+          <p:nvPr/>
+        </p:nvPicPr>
+        <p:blipFill>
+          <a:blip r:embed="rId4"/>
+          <a:stretch>
+            <a:fillRect/>
+          </a:stretch>
+        </p:blipFill>
+        <p:spPr>
+          <a:xfrm>
+            <a:off x="5641110" y="2090698"/>
+            <a:ext cx="2580952" cy="4285714"/>
+          </a:xfrm>
+          <a:prstGeom prst="rect">
+            <a:avLst/>
+          </a:prstGeom>
+        </p:spPr>
+      </p:pic>
+      <p:pic>
+        <p:nvPicPr>
+          <p:cNvPr id="18" name="Picture 17">
+            <a:extLst>
+              <a:ext uri="{FF2B5EF4-FFF2-40B4-BE49-F238E27FC236}">
+                <a16:creationId xmlns:a16="http://schemas.microsoft.com/office/drawing/2014/main" id="{79C0ADFC-EADC-D556-A5C6-47C940D59DFD}"/>
+              </a:ext>
+            </a:extLst>
+          </p:cNvPr>
+          <p:cNvPicPr>
+            <a:picLocks noChangeAspect="1"/>
+          </p:cNvPicPr>
+          <p:nvPr/>
+        </p:nvPicPr>
+        <p:blipFill>
+          <a:blip r:embed="rId5"/>
+          <a:stretch>
+            <a:fillRect/>
+          </a:stretch>
+        </p:blipFill>
+        <p:spPr>
+          <a:xfrm>
+            <a:off x="8847468" y="2128166"/>
+            <a:ext cx="2657143" cy="4152381"/>
+          </a:xfrm>
+          <a:prstGeom prst="rect">
+            <a:avLst/>
+          </a:prstGeom>
+        </p:spPr>
+      </p:pic>
     </p:spTree>
     <p:extLst>
       <p:ext uri="{BB962C8B-B14F-4D97-AF65-F5344CB8AC3E}">
-        <p14:creationId xmlns:p14="http://schemas.microsoft.com/office/powerpoint/2010/main" val="3958988082"/>
+        <p14:creationId xmlns:p14="http://schemas.microsoft.com/office/powerpoint/2010/main" val="2578315307"/>
       </p:ext>
     </p:extLst>
   </p:cSld>
@@ -9891,10 +10550,10 @@
       </p:grpSpPr>
       <p:sp>
         <p:nvSpPr>
-          <p:cNvPr id="4" name="Title 3">
+          <p:cNvPr id="7" name="Title 1">
             <a:extLst>
               <a:ext uri="{FF2B5EF4-FFF2-40B4-BE49-F238E27FC236}">
-                <a16:creationId xmlns:a16="http://schemas.microsoft.com/office/drawing/2014/main" id="{93D9368E-078D-CDD3-08DC-79155EA1F40D}"/>
+                <a16:creationId xmlns:a16="http://schemas.microsoft.com/office/drawing/2014/main" id="{9715AA4F-ED3C-19C5-CC0A-6478951EEB0F}"/>
               </a:ext>
             </a:extLst>
           </p:cNvPr>
@@ -9907,94 +10566,121 @@
         </p:nvSpPr>
         <p:spPr>
           <a:xfrm>
-            <a:off x="2592925" y="624110"/>
-            <a:ext cx="8911687" cy="796128"/>
+            <a:off x="2445440" y="275887"/>
+            <a:ext cx="8911687" cy="1280890"/>
           </a:xfrm>
         </p:spPr>
         <p:txBody>
-          <a:bodyPr/>
+          <a:bodyPr>
+            <a:normAutofit/>
+          </a:bodyPr>
           <a:lstStyle/>
           <a:p>
             <a:r>
               <a:rPr lang="en-US" dirty="0"/>
-              <a:t>IoT Hub</a:t>
+              <a:t>Add the secrets to your user-secrets files</a:t>
             </a:r>
           </a:p>
         </p:txBody>
       </p:sp>
-      <p:sp>
-        <p:nvSpPr>
-          <p:cNvPr id="5" name="Content Placeholder 4">
+      <p:pic>
+        <p:nvPicPr>
+          <p:cNvPr id="2050" name="Picture 2">
             <a:extLst>
               <a:ext uri="{FF2B5EF4-FFF2-40B4-BE49-F238E27FC236}">
-                <a16:creationId xmlns:a16="http://schemas.microsoft.com/office/drawing/2014/main" id="{5127C277-009F-4CE8-C7C6-0B892526DA9B}"/>
+                <a16:creationId xmlns:a16="http://schemas.microsoft.com/office/drawing/2014/main" id="{14A37630-2CBF-EC9C-3F5E-393FA4778951}"/>
               </a:ext>
             </a:extLst>
           </p:cNvPr>
-          <p:cNvSpPr>
-            <a:spLocks noGrp="1"/>
-          </p:cNvSpPr>
-          <p:nvPr>
-            <p:ph idx="1"/>
-          </p:nvPr>
-        </p:nvSpPr>
-        <p:spPr>
+          <p:cNvPicPr>
+            <a:picLocks noChangeAspect="1" noChangeArrowheads="1"/>
+          </p:cNvPicPr>
+          <p:nvPr/>
+        </p:nvPicPr>
+        <p:blipFill>
+          <a:blip r:embed="rId3">
+            <a:extLst>
+              <a:ext uri="{28A0092B-C50C-407E-A947-70E740481C1C}">
+                <a14:useLocalDpi xmlns:a14="http://schemas.microsoft.com/office/drawing/2010/main" val="0"/>
+              </a:ext>
+            </a:extLst>
+          </a:blip>
+          <a:srcRect/>
+          <a:stretch>
+            <a:fillRect/>
+          </a:stretch>
+        </p:blipFill>
+        <p:spPr bwMode="auto">
           <a:xfrm>
-            <a:off x="2589212" y="1420238"/>
-            <a:ext cx="8915400" cy="4490984"/>
+            <a:off x="575187" y="1556777"/>
+            <a:ext cx="11039322" cy="2410539"/>
           </a:xfrm>
+          <a:prstGeom prst="rect">
+            <a:avLst/>
+          </a:prstGeom>
+          <a:noFill/>
+          <a:extLst>
+            <a:ext uri="{909E8E84-426E-40DD-AFC4-6F175D3DCCD1}">
+              <a14:hiddenFill xmlns:a14="http://schemas.microsoft.com/office/drawing/2010/main">
+                <a:solidFill>
+                  <a:srgbClr val="FFFFFF"/>
+                </a:solidFill>
+              </a14:hiddenFill>
+            </a:ext>
+          </a:extLst>
         </p:spPr>
-        <p:txBody>
-          <a:bodyPr/>
-          <a:lstStyle/>
-          <a:p>
-            <a:r>
-              <a:rPr lang="en-US" dirty="0"/>
-              <a:t>Subset of Event Hub</a:t>
-            </a:r>
-          </a:p>
-          <a:p>
-            <a:r>
-              <a:rPr lang="en-US" dirty="0"/>
-              <a:t>Most solutions need only 4 partitions</a:t>
-            </a:r>
-          </a:p>
-          <a:p>
-            <a:r>
-              <a:rPr lang="en-US" dirty="0"/>
-              <a:t>Stream millions of telemetry events per minute to your hub</a:t>
-            </a:r>
-          </a:p>
-          <a:p>
-            <a:r>
-              <a:rPr lang="en-US" dirty="0"/>
-              <a:t>Ingress your telemetry to Azure</a:t>
-            </a:r>
-          </a:p>
-          <a:p>
-            <a:r>
-              <a:rPr lang="en-US" dirty="0"/>
-              <a:t>Leverage the Edge to prefilter </a:t>
-            </a:r>
-          </a:p>
-          <a:p>
-            <a:r>
-              <a:rPr lang="en-US" dirty="0"/>
-              <a:t>Package and deploy edge modules</a:t>
-            </a:r>
-          </a:p>
-          <a:p>
-            <a:r>
-              <a:rPr lang="en-US" dirty="0"/>
-              <a:t>Register devices</a:t>
-            </a:r>
-          </a:p>
-        </p:txBody>
-      </p:sp>
+      </p:pic>
+      <p:pic>
+        <p:nvPicPr>
+          <p:cNvPr id="2054" name="Picture 6">
+            <a:extLst>
+              <a:ext uri="{FF2B5EF4-FFF2-40B4-BE49-F238E27FC236}">
+                <a16:creationId xmlns:a16="http://schemas.microsoft.com/office/drawing/2014/main" id="{B7AE5FE6-2026-DE8E-DDFE-A050052AD94D}"/>
+              </a:ext>
+            </a:extLst>
+          </p:cNvPr>
+          <p:cNvPicPr>
+            <a:picLocks noChangeAspect="1" noChangeArrowheads="1"/>
+          </p:cNvPicPr>
+          <p:nvPr/>
+        </p:nvPicPr>
+        <p:blipFill>
+          <a:blip r:embed="rId4">
+            <a:extLst>
+              <a:ext uri="{28A0092B-C50C-407E-A947-70E740481C1C}">
+                <a14:useLocalDpi xmlns:a14="http://schemas.microsoft.com/office/drawing/2010/main" val="0"/>
+              </a:ext>
+            </a:extLst>
+          </a:blip>
+          <a:srcRect/>
+          <a:stretch>
+            <a:fillRect/>
+          </a:stretch>
+        </p:blipFill>
+        <p:spPr bwMode="auto">
+          <a:xfrm>
+            <a:off x="715143" y="4502744"/>
+            <a:ext cx="11179278" cy="1960741"/>
+          </a:xfrm>
+          <a:prstGeom prst="rect">
+            <a:avLst/>
+          </a:prstGeom>
+          <a:noFill/>
+          <a:extLst>
+            <a:ext uri="{909E8E84-426E-40DD-AFC4-6F175D3DCCD1}">
+              <a14:hiddenFill xmlns:a14="http://schemas.microsoft.com/office/drawing/2010/main">
+                <a:solidFill>
+                  <a:srgbClr val="FFFFFF"/>
+                </a:solidFill>
+              </a14:hiddenFill>
+            </a:ext>
+          </a:extLst>
+        </p:spPr>
+      </p:pic>
     </p:spTree>
     <p:extLst>
       <p:ext uri="{BB962C8B-B14F-4D97-AF65-F5344CB8AC3E}">
-        <p14:creationId xmlns:p14="http://schemas.microsoft.com/office/powerpoint/2010/main" val="1273671260"/>
+        <p14:creationId xmlns:p14="http://schemas.microsoft.com/office/powerpoint/2010/main" val="935845570"/>
       </p:ext>
     </p:extLst>
   </p:cSld>
@@ -10026,6 +10712,260 @@
           <p:cNvPr id="4" name="Title 3">
             <a:extLst>
               <a:ext uri="{FF2B5EF4-FFF2-40B4-BE49-F238E27FC236}">
+                <a16:creationId xmlns:a16="http://schemas.microsoft.com/office/drawing/2014/main" id="{BFF5CDDA-2AF8-4160-934C-2EA35407E912}"/>
+              </a:ext>
+            </a:extLst>
+          </p:cNvPr>
+          <p:cNvSpPr>
+            <a:spLocks noGrp="1"/>
+          </p:cNvSpPr>
+          <p:nvPr>
+            <p:ph type="title"/>
+          </p:nvPr>
+        </p:nvSpPr>
+        <p:spPr/>
+        <p:txBody>
+          <a:bodyPr/>
+          <a:lstStyle/>
+          <a:p>
+            <a:r>
+              <a:rPr lang="en-US" dirty="0"/>
+              <a:t>Application Logging Stream</a:t>
+            </a:r>
+          </a:p>
+        </p:txBody>
+      </p:sp>
+      <p:sp>
+        <p:nvSpPr>
+          <p:cNvPr id="5" name="Text Placeholder 4">
+            <a:extLst>
+              <a:ext uri="{FF2B5EF4-FFF2-40B4-BE49-F238E27FC236}">
+                <a16:creationId xmlns:a16="http://schemas.microsoft.com/office/drawing/2014/main" id="{5F9278D0-3C27-4EF2-84DD-F4E8A78A9543}"/>
+              </a:ext>
+            </a:extLst>
+          </p:cNvPr>
+          <p:cNvSpPr>
+            <a:spLocks noGrp="1"/>
+          </p:cNvSpPr>
+          <p:nvPr>
+            <p:ph type="body" idx="1"/>
+          </p:nvPr>
+        </p:nvSpPr>
+        <p:spPr/>
+        <p:txBody>
+          <a:bodyPr/>
+          <a:lstStyle/>
+          <a:p>
+            <a:r>
+              <a:rPr lang="en-US" dirty="0"/>
+              <a:t>Creating logs from your application to an Event Hub Stream</a:t>
+            </a:r>
+          </a:p>
+        </p:txBody>
+      </p:sp>
+    </p:spTree>
+    <p:extLst>
+      <p:ext uri="{BB962C8B-B14F-4D97-AF65-F5344CB8AC3E}">
+        <p14:creationId xmlns:p14="http://schemas.microsoft.com/office/powerpoint/2010/main" val="3958988082"/>
+      </p:ext>
+    </p:extLst>
+  </p:cSld>
+  <p:clrMapOvr>
+    <a:masterClrMapping/>
+  </p:clrMapOvr>
+</p:sld>
+</file>
+
+<file path=ppt/slides/slide14.xml><?xml version="1.0" encoding="utf-8"?>
+<p:sld xmlns:a="http://schemas.openxmlformats.org/drawingml/2006/main" xmlns:r="http://schemas.openxmlformats.org/officeDocument/2006/relationships" xmlns:p="http://schemas.openxmlformats.org/presentationml/2006/main">
+  <p:cSld>
+    <p:spTree>
+      <p:nvGrpSpPr>
+        <p:cNvPr id="1" name=""/>
+        <p:cNvGrpSpPr/>
+        <p:nvPr/>
+      </p:nvGrpSpPr>
+      <p:grpSpPr>
+        <a:xfrm>
+          <a:off x="0" y="0"/>
+          <a:ext cx="0" cy="0"/>
+          <a:chOff x="0" y="0"/>
+          <a:chExt cx="0" cy="0"/>
+        </a:xfrm>
+      </p:grpSpPr>
+      <p:sp>
+        <p:nvSpPr>
+          <p:cNvPr id="4" name="Title 3">
+            <a:extLst>
+              <a:ext uri="{FF2B5EF4-FFF2-40B4-BE49-F238E27FC236}">
+                <a16:creationId xmlns:a16="http://schemas.microsoft.com/office/drawing/2014/main" id="{93D9368E-078D-CDD3-08DC-79155EA1F40D}"/>
+              </a:ext>
+            </a:extLst>
+          </p:cNvPr>
+          <p:cNvSpPr>
+            <a:spLocks noGrp="1"/>
+          </p:cNvSpPr>
+          <p:nvPr>
+            <p:ph type="title"/>
+          </p:nvPr>
+        </p:nvSpPr>
+        <p:spPr>
+          <a:xfrm>
+            <a:off x="2592925" y="624110"/>
+            <a:ext cx="8911687" cy="796128"/>
+          </a:xfrm>
+        </p:spPr>
+        <p:txBody>
+          <a:bodyPr/>
+          <a:lstStyle/>
+          <a:p>
+            <a:r>
+              <a:rPr lang="en-US" dirty="0"/>
+              <a:t>IoT Hub</a:t>
+            </a:r>
+          </a:p>
+        </p:txBody>
+      </p:sp>
+      <p:sp>
+        <p:nvSpPr>
+          <p:cNvPr id="5" name="Content Placeholder 4">
+            <a:extLst>
+              <a:ext uri="{FF2B5EF4-FFF2-40B4-BE49-F238E27FC236}">
+                <a16:creationId xmlns:a16="http://schemas.microsoft.com/office/drawing/2014/main" id="{5127C277-009F-4CE8-C7C6-0B892526DA9B}"/>
+              </a:ext>
+            </a:extLst>
+          </p:cNvPr>
+          <p:cNvSpPr>
+            <a:spLocks noGrp="1"/>
+          </p:cNvSpPr>
+          <p:nvPr>
+            <p:ph idx="1"/>
+          </p:nvPr>
+        </p:nvSpPr>
+        <p:spPr>
+          <a:xfrm>
+            <a:off x="2589212" y="1420238"/>
+            <a:ext cx="8915400" cy="4490984"/>
+          </a:xfrm>
+        </p:spPr>
+        <p:txBody>
+          <a:bodyPr/>
+          <a:lstStyle/>
+          <a:p>
+            <a:r>
+              <a:rPr lang="en-US" dirty="0"/>
+              <a:t>Subset of Event Hub</a:t>
+            </a:r>
+          </a:p>
+          <a:p>
+            <a:r>
+              <a:rPr lang="en-US" dirty="0"/>
+              <a:t>Most solutions need only 4 partitions</a:t>
+            </a:r>
+          </a:p>
+          <a:p>
+            <a:r>
+              <a:rPr lang="en-US" dirty="0"/>
+              <a:t>Stream millions of telemetry events per minute to your hub</a:t>
+            </a:r>
+          </a:p>
+          <a:p>
+            <a:r>
+              <a:rPr lang="en-US" dirty="0"/>
+              <a:t>Ingress your telemetry to Azure</a:t>
+            </a:r>
+          </a:p>
+          <a:p>
+            <a:r>
+              <a:rPr lang="en-US" dirty="0"/>
+              <a:t>Leverage the Edge to prefilter </a:t>
+            </a:r>
+          </a:p>
+          <a:p>
+            <a:r>
+              <a:rPr lang="en-US" dirty="0"/>
+              <a:t>Package and deploy edge modules</a:t>
+            </a:r>
+          </a:p>
+          <a:p>
+            <a:r>
+              <a:rPr lang="en-US" dirty="0"/>
+              <a:t>Register devices</a:t>
+            </a:r>
+          </a:p>
+        </p:txBody>
+      </p:sp>
+      <p:pic>
+        <p:nvPicPr>
+          <p:cNvPr id="3" name="Graphic 2">
+            <a:extLst>
+              <a:ext uri="{FF2B5EF4-FFF2-40B4-BE49-F238E27FC236}">
+                <a16:creationId xmlns:a16="http://schemas.microsoft.com/office/drawing/2014/main" id="{EA2A4202-89EE-7CE7-878E-F1889021F4B9}"/>
+              </a:ext>
+            </a:extLst>
+          </p:cNvPr>
+          <p:cNvPicPr>
+            <a:picLocks noChangeAspect="1"/>
+          </p:cNvPicPr>
+          <p:nvPr/>
+        </p:nvPicPr>
+        <p:blipFill>
+          <a:blip r:embed="rId3">
+            <a:extLst>
+              <a:ext uri="{96DAC541-7B7A-43D3-8B79-37D633B846F1}">
+                <asvg:svgBlip xmlns:asvg="http://schemas.microsoft.com/office/drawing/2016/SVG/main" r:embed="rId4"/>
+              </a:ext>
+            </a:extLst>
+          </a:blip>
+          <a:stretch>
+            <a:fillRect/>
+          </a:stretch>
+        </p:blipFill>
+        <p:spPr>
+          <a:xfrm>
+            <a:off x="10080830" y="126363"/>
+            <a:ext cx="1791622" cy="1791622"/>
+          </a:xfrm>
+          <a:prstGeom prst="rect">
+            <a:avLst/>
+          </a:prstGeom>
+        </p:spPr>
+      </p:pic>
+    </p:spTree>
+    <p:extLst>
+      <p:ext uri="{BB962C8B-B14F-4D97-AF65-F5344CB8AC3E}">
+        <p14:creationId xmlns:p14="http://schemas.microsoft.com/office/powerpoint/2010/main" val="1273671260"/>
+      </p:ext>
+    </p:extLst>
+  </p:cSld>
+  <p:clrMapOvr>
+    <a:masterClrMapping/>
+  </p:clrMapOvr>
+</p:sld>
+</file>
+
+<file path=ppt/slides/slide15.xml><?xml version="1.0" encoding="utf-8"?>
+<p:sld xmlns:a="http://schemas.openxmlformats.org/drawingml/2006/main" xmlns:r="http://schemas.openxmlformats.org/officeDocument/2006/relationships" xmlns:p="http://schemas.openxmlformats.org/presentationml/2006/main">
+  <p:cSld>
+    <p:spTree>
+      <p:nvGrpSpPr>
+        <p:cNvPr id="1" name=""/>
+        <p:cNvGrpSpPr/>
+        <p:nvPr/>
+      </p:nvGrpSpPr>
+      <p:grpSpPr>
+        <a:xfrm>
+          <a:off x="0" y="0"/>
+          <a:ext cx="0" cy="0"/>
+          <a:chOff x="0" y="0"/>
+          <a:chExt cx="0" cy="0"/>
+        </a:xfrm>
+      </p:grpSpPr>
+      <p:sp>
+        <p:nvSpPr>
+          <p:cNvPr id="4" name="Title 3">
+            <a:extLst>
+              <a:ext uri="{FF2B5EF4-FFF2-40B4-BE49-F238E27FC236}">
                 <a16:creationId xmlns:a16="http://schemas.microsoft.com/office/drawing/2014/main" id="{531F068E-0CA9-69AA-F8AE-036798872F3D}"/>
               </a:ext>
             </a:extLst>
@@ -10090,7 +11030,7 @@
 </p:sld>
 </file>
 
-<file path=ppt/slides/slide14.xml><?xml version="1.0" encoding="utf-8"?>
+<file path=ppt/slides/slide16.xml><?xml version="1.0" encoding="utf-8"?>
 <p:sld xmlns:a="http://schemas.openxmlformats.org/drawingml/2006/main" xmlns:r="http://schemas.openxmlformats.org/officeDocument/2006/relationships" xmlns:p="http://schemas.openxmlformats.org/presentationml/2006/main">
   <p:cSld>
     <p:spTree>
@@ -10311,336 +11251,6 @@
 </p:sld>
 </file>
 
-<file path=ppt/slides/slide15.xml><?xml version="1.0" encoding="utf-8"?>
-<p:sld xmlns:a="http://schemas.openxmlformats.org/drawingml/2006/main" xmlns:r="http://schemas.openxmlformats.org/officeDocument/2006/relationships" xmlns:p="http://schemas.openxmlformats.org/presentationml/2006/main">
-  <p:cSld>
-    <p:spTree>
-      <p:nvGrpSpPr>
-        <p:cNvPr id="1" name=""/>
-        <p:cNvGrpSpPr/>
-        <p:nvPr/>
-      </p:nvGrpSpPr>
-      <p:grpSpPr>
-        <a:xfrm>
-          <a:off x="0" y="0"/>
-          <a:ext cx="0" cy="0"/>
-          <a:chOff x="0" y="0"/>
-          <a:chExt cx="0" cy="0"/>
-        </a:xfrm>
-      </p:grpSpPr>
-      <p:sp>
-        <p:nvSpPr>
-          <p:cNvPr id="2" name="Title 1">
-            <a:extLst>
-              <a:ext uri="{FF2B5EF4-FFF2-40B4-BE49-F238E27FC236}">
-                <a16:creationId xmlns:a16="http://schemas.microsoft.com/office/drawing/2014/main" id="{3EE78B52-58FC-916F-DA31-8D36F2DE2CC6}"/>
-              </a:ext>
-            </a:extLst>
-          </p:cNvPr>
-          <p:cNvSpPr>
-            <a:spLocks noGrp="1"/>
-          </p:cNvSpPr>
-          <p:nvPr>
-            <p:ph type="title"/>
-          </p:nvPr>
-        </p:nvSpPr>
-        <p:spPr>
-          <a:xfrm>
-            <a:off x="2592925" y="624110"/>
-            <a:ext cx="8911687" cy="708579"/>
-          </a:xfrm>
-        </p:spPr>
-        <p:txBody>
-          <a:bodyPr/>
-          <a:lstStyle/>
-          <a:p>
-            <a:r>
-              <a:rPr lang="en-US" dirty="0"/>
-              <a:t>Event Grid Capabilities</a:t>
-            </a:r>
-          </a:p>
-        </p:txBody>
-      </p:sp>
-      <p:sp>
-        <p:nvSpPr>
-          <p:cNvPr id="3" name="Content Placeholder 2">
-            <a:extLst>
-              <a:ext uri="{FF2B5EF4-FFF2-40B4-BE49-F238E27FC236}">
-                <a16:creationId xmlns:a16="http://schemas.microsoft.com/office/drawing/2014/main" id="{5418F423-7FA6-51C0-0DE9-9BE9116E4747}"/>
-              </a:ext>
-            </a:extLst>
-          </p:cNvPr>
-          <p:cNvSpPr>
-            <a:spLocks noGrp="1"/>
-          </p:cNvSpPr>
-          <p:nvPr>
-            <p:ph idx="1"/>
-          </p:nvPr>
-        </p:nvSpPr>
-        <p:spPr>
-          <a:xfrm>
-            <a:off x="2589212" y="1332689"/>
-            <a:ext cx="8915400" cy="4578533"/>
-          </a:xfrm>
-        </p:spPr>
-        <p:txBody>
-          <a:bodyPr/>
-          <a:lstStyle/>
-          <a:p>
-            <a:r>
-              <a:rPr lang="en-US" dirty="0"/>
-              <a:t>Filtering</a:t>
-            </a:r>
-          </a:p>
-          <a:p>
-            <a:pPr lvl="1"/>
-            <a:r>
-              <a:rPr lang="en-US" dirty="0"/>
-              <a:t>Event Type and/or Publish Path</a:t>
-            </a:r>
-          </a:p>
-          <a:p>
-            <a:r>
-              <a:rPr lang="en-US" dirty="0"/>
-              <a:t>Pub/Sub </a:t>
-            </a:r>
-          </a:p>
-          <a:p>
-            <a:pPr lvl="1"/>
-            <a:r>
-              <a:rPr lang="en-US" dirty="0"/>
-              <a:t>Subscribe with as many endpoints as needed for each event</a:t>
-            </a:r>
-          </a:p>
-          <a:p>
-            <a:r>
-              <a:rPr lang="en-US" dirty="0"/>
-              <a:t>Consumption based</a:t>
-            </a:r>
-          </a:p>
-          <a:p>
-            <a:pPr lvl="1"/>
-            <a:r>
-              <a:rPr lang="en-US" dirty="0"/>
-              <a:t>Pay for what you use</a:t>
-            </a:r>
-          </a:p>
-          <a:p>
-            <a:r>
-              <a:rPr lang="en-US" dirty="0"/>
-              <a:t>Custom Events</a:t>
-            </a:r>
-          </a:p>
-          <a:p>
-            <a:pPr lvl="1"/>
-            <a:r>
-              <a:rPr lang="en-US" dirty="0"/>
-              <a:t>You can create and publish your own events</a:t>
-            </a:r>
-          </a:p>
-          <a:p>
-            <a:r>
-              <a:rPr lang="en-US" dirty="0" err="1"/>
-              <a:t>PreFab</a:t>
-            </a:r>
-            <a:r>
-              <a:rPr lang="en-US" dirty="0"/>
-              <a:t> Events</a:t>
-            </a:r>
-          </a:p>
-          <a:p>
-            <a:pPr lvl="1"/>
-            <a:r>
-              <a:rPr lang="en-US" dirty="0"/>
-              <a:t>Respond to built-in events by resource</a:t>
-            </a:r>
-          </a:p>
-        </p:txBody>
-      </p:sp>
-    </p:spTree>
-    <p:extLst>
-      <p:ext uri="{BB962C8B-B14F-4D97-AF65-F5344CB8AC3E}">
-        <p14:creationId xmlns:p14="http://schemas.microsoft.com/office/powerpoint/2010/main" val="3254041414"/>
-      </p:ext>
-    </p:extLst>
-  </p:cSld>
-  <p:clrMapOvr>
-    <a:masterClrMapping/>
-  </p:clrMapOvr>
-</p:sld>
-</file>
-
-<file path=ppt/slides/slide16.xml><?xml version="1.0" encoding="utf-8"?>
-<p:sld xmlns:a="http://schemas.openxmlformats.org/drawingml/2006/main" xmlns:r="http://schemas.openxmlformats.org/officeDocument/2006/relationships" xmlns:p="http://schemas.openxmlformats.org/presentationml/2006/main">
-  <p:cSld>
-    <p:spTree>
-      <p:nvGrpSpPr>
-        <p:cNvPr id="1" name=""/>
-        <p:cNvGrpSpPr/>
-        <p:nvPr/>
-      </p:nvGrpSpPr>
-      <p:grpSpPr>
-        <a:xfrm>
-          <a:off x="0" y="0"/>
-          <a:ext cx="0" cy="0"/>
-          <a:chOff x="0" y="0"/>
-          <a:chExt cx="0" cy="0"/>
-        </a:xfrm>
-      </p:grpSpPr>
-      <p:sp>
-        <p:nvSpPr>
-          <p:cNvPr id="2" name="Title 1">
-            <a:extLst>
-              <a:ext uri="{FF2B5EF4-FFF2-40B4-BE49-F238E27FC236}">
-                <a16:creationId xmlns:a16="http://schemas.microsoft.com/office/drawing/2014/main" id="{62D3AE40-8B38-B792-64B1-55D7883A0D71}"/>
-              </a:ext>
-            </a:extLst>
-          </p:cNvPr>
-          <p:cNvSpPr>
-            <a:spLocks noGrp="1"/>
-          </p:cNvSpPr>
-          <p:nvPr>
-            <p:ph type="title"/>
-          </p:nvPr>
-        </p:nvSpPr>
-        <p:spPr>
-          <a:xfrm>
-            <a:off x="2592925" y="624110"/>
-            <a:ext cx="8911687" cy="747490"/>
-          </a:xfrm>
-        </p:spPr>
-        <p:txBody>
-          <a:bodyPr/>
-          <a:lstStyle/>
-          <a:p>
-            <a:r>
-              <a:rPr lang="en-US" dirty="0"/>
-              <a:t>Event Grid Concepts</a:t>
-            </a:r>
-          </a:p>
-        </p:txBody>
-      </p:sp>
-      <p:sp>
-        <p:nvSpPr>
-          <p:cNvPr id="3" name="Content Placeholder 2">
-            <a:extLst>
-              <a:ext uri="{FF2B5EF4-FFF2-40B4-BE49-F238E27FC236}">
-                <a16:creationId xmlns:a16="http://schemas.microsoft.com/office/drawing/2014/main" id="{9A5BDC5D-462D-AFCF-C118-C3E70578A950}"/>
-              </a:ext>
-            </a:extLst>
-          </p:cNvPr>
-          <p:cNvSpPr>
-            <a:spLocks noGrp="1"/>
-          </p:cNvSpPr>
-          <p:nvPr>
-            <p:ph idx="1"/>
-          </p:nvPr>
-        </p:nvSpPr>
-        <p:spPr>
-          <a:xfrm>
-            <a:off x="2589212" y="1371600"/>
-            <a:ext cx="8915400" cy="4539622"/>
-          </a:xfrm>
-        </p:spPr>
-        <p:txBody>
-          <a:bodyPr/>
-          <a:lstStyle/>
-          <a:p>
-            <a:r>
-              <a:rPr lang="en-US" dirty="0"/>
-              <a:t>Retry </a:t>
-            </a:r>
-          </a:p>
-          <a:p>
-            <a:pPr lvl="1"/>
-            <a:r>
-              <a:rPr lang="en-US" dirty="0"/>
-              <a:t>Exponential Retry</a:t>
-            </a:r>
-          </a:p>
-          <a:p>
-            <a:pPr lvl="1"/>
-            <a:r>
-              <a:rPr lang="en-US" dirty="0"/>
-              <a:t>Set maximum number of attempts</a:t>
-            </a:r>
-          </a:p>
-          <a:p>
-            <a:pPr lvl="1"/>
-            <a:r>
-              <a:rPr lang="en-US" dirty="0"/>
-              <a:t>Event TTL can determine how long to retry (max 24 hours)</a:t>
-            </a:r>
-          </a:p>
-          <a:p>
-            <a:r>
-              <a:rPr lang="en-US" dirty="0"/>
-              <a:t>Dead-Lettering</a:t>
-            </a:r>
-          </a:p>
-          <a:p>
-            <a:pPr lvl="1"/>
-            <a:r>
-              <a:rPr lang="en-US" dirty="0"/>
-              <a:t>Send the event info to storage after retry failure</a:t>
-            </a:r>
-          </a:p>
-          <a:p>
-            <a:r>
-              <a:rPr lang="en-US" dirty="0"/>
-              <a:t>What won’t be retried?</a:t>
-            </a:r>
-          </a:p>
-          <a:p>
-            <a:pPr lvl="1"/>
-            <a:r>
-              <a:rPr lang="en-US" dirty="0"/>
-              <a:t>400 Bad Request </a:t>
-            </a:r>
-          </a:p>
-          <a:p>
-            <a:pPr lvl="1"/>
-            <a:r>
-              <a:rPr lang="en-US" dirty="0"/>
-              <a:t>401 Unauthorized</a:t>
-            </a:r>
-          </a:p>
-          <a:p>
-            <a:pPr lvl="1"/>
-            <a:r>
-              <a:rPr lang="en-US" dirty="0"/>
-              <a:t>403 Forbidden </a:t>
-            </a:r>
-          </a:p>
-          <a:p>
-            <a:pPr lvl="1"/>
-            <a:r>
-              <a:rPr lang="en-US" dirty="0"/>
-              <a:t>404 Not Found </a:t>
-            </a:r>
-          </a:p>
-          <a:p>
-            <a:pPr lvl="1"/>
-            <a:r>
-              <a:rPr lang="en-US" dirty="0"/>
-              <a:t>413 Request Too Large</a:t>
-            </a:r>
-          </a:p>
-        </p:txBody>
-      </p:sp>
-    </p:spTree>
-    <p:extLst>
-      <p:ext uri="{BB962C8B-B14F-4D97-AF65-F5344CB8AC3E}">
-        <p14:creationId xmlns:p14="http://schemas.microsoft.com/office/powerpoint/2010/main" val="1587101224"/>
-      </p:ext>
-    </p:extLst>
-  </p:cSld>
-  <p:clrMapOvr>
-    <a:masterClrMapping/>
-  </p:clrMapOvr>
-</p:sld>
-</file>
-
 <file path=ppt/slides/slide17.xml><?xml version="1.0" encoding="utf-8"?>
 <p:sld xmlns:a="http://schemas.openxmlformats.org/drawingml/2006/main" xmlns:r="http://schemas.openxmlformats.org/officeDocument/2006/relationships" xmlns:p="http://schemas.openxmlformats.org/presentationml/2006/main">
   <p:cSld>
@@ -10660,10 +11270,10 @@
       </p:grpSpPr>
       <p:sp>
         <p:nvSpPr>
-          <p:cNvPr id="4" name="Title 3">
+          <p:cNvPr id="2" name="Title 1">
             <a:extLst>
               <a:ext uri="{FF2B5EF4-FFF2-40B4-BE49-F238E27FC236}">
-                <a16:creationId xmlns:a16="http://schemas.microsoft.com/office/drawing/2014/main" id="{D7EDAF85-63F4-6C6B-4FD7-9B46F545A9C2}"/>
+                <a16:creationId xmlns:a16="http://schemas.microsoft.com/office/drawing/2014/main" id="{3EE78B52-58FC-916F-DA31-8D36F2DE2CC6}"/>
               </a:ext>
             </a:extLst>
           </p:cNvPr>
@@ -10674,24 +11284,29 @@
             <p:ph type="title"/>
           </p:nvPr>
         </p:nvSpPr>
-        <p:spPr/>
+        <p:spPr>
+          <a:xfrm>
+            <a:off x="2592925" y="624110"/>
+            <a:ext cx="8911687" cy="708579"/>
+          </a:xfrm>
+        </p:spPr>
         <p:txBody>
           <a:bodyPr/>
           <a:lstStyle/>
           <a:p>
             <a:r>
               <a:rPr lang="en-US" dirty="0"/>
-              <a:t>Trigger Logic App on Blob Storage Created</a:t>
+              <a:t>Event Grid Capabilities</a:t>
             </a:r>
           </a:p>
         </p:txBody>
       </p:sp>
       <p:sp>
         <p:nvSpPr>
-          <p:cNvPr id="5" name="Text Placeholder 4">
+          <p:cNvPr id="3" name="Content Placeholder 2">
             <a:extLst>
               <a:ext uri="{FF2B5EF4-FFF2-40B4-BE49-F238E27FC236}">
-                <a16:creationId xmlns:a16="http://schemas.microsoft.com/office/drawing/2014/main" id="{666482BF-D438-BE9A-8975-A0E86DA99CA4}"/>
+                <a16:creationId xmlns:a16="http://schemas.microsoft.com/office/drawing/2014/main" id="{5418F423-7FA6-51C0-0DE9-9BE9116E4747}"/>
               </a:ext>
             </a:extLst>
           </p:cNvPr>
@@ -10699,17 +11314,85 @@
             <a:spLocks noGrp="1"/>
           </p:cNvSpPr>
           <p:nvPr>
-            <p:ph type="body" idx="1"/>
-          </p:nvPr>
-        </p:nvSpPr>
-        <p:spPr/>
+            <p:ph idx="1"/>
+          </p:nvPr>
+        </p:nvSpPr>
+        <p:spPr>
+          <a:xfrm>
+            <a:off x="2589212" y="1332689"/>
+            <a:ext cx="8915400" cy="4578533"/>
+          </a:xfrm>
+        </p:spPr>
         <p:txBody>
           <a:bodyPr/>
           <a:lstStyle/>
           <a:p>
             <a:r>
               <a:rPr lang="en-US" dirty="0"/>
-              <a:t>Easily wire up events when blobs are created</a:t>
+              <a:t>Filtering</a:t>
+            </a:r>
+          </a:p>
+          <a:p>
+            <a:pPr lvl="1"/>
+            <a:r>
+              <a:rPr lang="en-US" dirty="0"/>
+              <a:t>Event Type and/or Publish Path</a:t>
+            </a:r>
+          </a:p>
+          <a:p>
+            <a:r>
+              <a:rPr lang="en-US" dirty="0"/>
+              <a:t>Pub/Sub </a:t>
+            </a:r>
+          </a:p>
+          <a:p>
+            <a:pPr lvl="1"/>
+            <a:r>
+              <a:rPr lang="en-US" dirty="0"/>
+              <a:t>Subscribe with as many endpoints as needed for each event</a:t>
+            </a:r>
+          </a:p>
+          <a:p>
+            <a:r>
+              <a:rPr lang="en-US" dirty="0"/>
+              <a:t>Consumption based</a:t>
+            </a:r>
+          </a:p>
+          <a:p>
+            <a:pPr lvl="1"/>
+            <a:r>
+              <a:rPr lang="en-US" dirty="0"/>
+              <a:t>Pay for what you use</a:t>
+            </a:r>
+          </a:p>
+          <a:p>
+            <a:r>
+              <a:rPr lang="en-US" dirty="0"/>
+              <a:t>Custom Events</a:t>
+            </a:r>
+          </a:p>
+          <a:p>
+            <a:pPr lvl="1"/>
+            <a:r>
+              <a:rPr lang="en-US" dirty="0"/>
+              <a:t>You can create and publish your own events</a:t>
+            </a:r>
+          </a:p>
+          <a:p>
+            <a:r>
+              <a:rPr lang="en-US" dirty="0" err="1"/>
+              <a:t>PreFab</a:t>
+            </a:r>
+            <a:r>
+              <a:rPr lang="en-US" dirty="0"/>
+              <a:t> Events</a:t>
+            </a:r>
+          </a:p>
+          <a:p>
+            <a:pPr lvl="1"/>
+            <a:r>
+              <a:rPr lang="en-US" dirty="0"/>
+              <a:t>Respond to built-in events by resource</a:t>
             </a:r>
           </a:p>
         </p:txBody>
@@ -10717,7 +11400,7 @@
     </p:spTree>
     <p:extLst>
       <p:ext uri="{BB962C8B-B14F-4D97-AF65-F5344CB8AC3E}">
-        <p14:creationId xmlns:p14="http://schemas.microsoft.com/office/powerpoint/2010/main" val="415610152"/>
+        <p14:creationId xmlns:p14="http://schemas.microsoft.com/office/powerpoint/2010/main" val="3254041414"/>
       </p:ext>
     </p:extLst>
   </p:cSld>
@@ -10749,7 +11432,7 @@
           <p:cNvPr id="2" name="Title 1">
             <a:extLst>
               <a:ext uri="{FF2B5EF4-FFF2-40B4-BE49-F238E27FC236}">
-                <a16:creationId xmlns:a16="http://schemas.microsoft.com/office/drawing/2014/main" id="{0EF55DF5-E8AB-BFE6-3598-98775700154F}"/>
+                <a16:creationId xmlns:a16="http://schemas.microsoft.com/office/drawing/2014/main" id="{62D3AE40-8B38-B792-64B1-55D7883A0D71}"/>
               </a:ext>
             </a:extLst>
           </p:cNvPr>
@@ -10760,24 +11443,29 @@
             <p:ph type="title"/>
           </p:nvPr>
         </p:nvSpPr>
-        <p:spPr/>
+        <p:spPr>
+          <a:xfrm>
+            <a:off x="2592925" y="624110"/>
+            <a:ext cx="8911687" cy="747490"/>
+          </a:xfrm>
+        </p:spPr>
         <p:txBody>
           <a:bodyPr/>
           <a:lstStyle/>
           <a:p>
             <a:r>
               <a:rPr lang="en-US" dirty="0"/>
-              <a:t>Service Bus Queue</a:t>
+              <a:t>Event Grid Concepts</a:t>
             </a:r>
           </a:p>
         </p:txBody>
       </p:sp>
       <p:sp>
         <p:nvSpPr>
-          <p:cNvPr id="3" name="Text Placeholder 2">
+          <p:cNvPr id="3" name="Content Placeholder 2">
             <a:extLst>
               <a:ext uri="{FF2B5EF4-FFF2-40B4-BE49-F238E27FC236}">
-                <a16:creationId xmlns:a16="http://schemas.microsoft.com/office/drawing/2014/main" id="{C5D78BE3-3D5D-820E-D86B-9B8B2E20FDFE}"/>
+                <a16:creationId xmlns:a16="http://schemas.microsoft.com/office/drawing/2014/main" id="{9A5BDC5D-462D-AFCF-C118-C3E70578A950}"/>
               </a:ext>
             </a:extLst>
           </p:cNvPr>
@@ -10785,17 +11473,97 @@
             <a:spLocks noGrp="1"/>
           </p:cNvSpPr>
           <p:nvPr>
-            <p:ph type="body" idx="1"/>
-          </p:nvPr>
-        </p:nvSpPr>
-        <p:spPr/>
+            <p:ph idx="1"/>
+          </p:nvPr>
+        </p:nvSpPr>
+        <p:spPr>
+          <a:xfrm>
+            <a:off x="2589212" y="1371600"/>
+            <a:ext cx="8915400" cy="4539622"/>
+          </a:xfrm>
+        </p:spPr>
         <p:txBody>
           <a:bodyPr/>
           <a:lstStyle/>
           <a:p>
             <a:r>
               <a:rPr lang="en-US" dirty="0"/>
-              <a:t>Ordered messaging for processing</a:t>
+              <a:t>Retry </a:t>
+            </a:r>
+          </a:p>
+          <a:p>
+            <a:pPr lvl="1"/>
+            <a:r>
+              <a:rPr lang="en-US" dirty="0"/>
+              <a:t>Exponential Retry</a:t>
+            </a:r>
+          </a:p>
+          <a:p>
+            <a:pPr lvl="1"/>
+            <a:r>
+              <a:rPr lang="en-US" dirty="0"/>
+              <a:t>Set maximum number of attempts</a:t>
+            </a:r>
+          </a:p>
+          <a:p>
+            <a:pPr lvl="1"/>
+            <a:r>
+              <a:rPr lang="en-US" dirty="0"/>
+              <a:t>Event TTL can determine how long to retry (max 24 hours)</a:t>
+            </a:r>
+          </a:p>
+          <a:p>
+            <a:r>
+              <a:rPr lang="en-US" dirty="0"/>
+              <a:t>Dead-Lettering</a:t>
+            </a:r>
+          </a:p>
+          <a:p>
+            <a:pPr lvl="1"/>
+            <a:r>
+              <a:rPr lang="en-US" dirty="0"/>
+              <a:t>Send the event info to storage after retry failure</a:t>
+            </a:r>
+          </a:p>
+          <a:p>
+            <a:r>
+              <a:rPr lang="en-US" dirty="0"/>
+              <a:t>What won’t be retried?</a:t>
+            </a:r>
+          </a:p>
+          <a:p>
+            <a:pPr lvl="1"/>
+            <a:r>
+              <a:rPr lang="en-US" dirty="0"/>
+              <a:t>400 Bad Request </a:t>
+            </a:r>
+          </a:p>
+          <a:p>
+            <a:pPr lvl="1"/>
+            <a:r>
+              <a:rPr lang="en-US" dirty="0"/>
+              <a:t>401 Unauthorized</a:t>
+            </a:r>
+          </a:p>
+          <a:p>
+            <a:pPr lvl="1"/>
+            <a:r>
+              <a:rPr lang="en-US" dirty="0"/>
+              <a:t>403 Forbidden </a:t>
+            </a:r>
+          </a:p>
+          <a:p>
+            <a:pPr lvl="1"/>
+            <a:r>
+              <a:rPr lang="en-US" dirty="0"/>
+              <a:t>404 Not Found </a:t>
+            </a:r>
+          </a:p>
+          <a:p>
+            <a:pPr lvl="1"/>
+            <a:r>
+              <a:rPr lang="en-US" dirty="0"/>
+              <a:t>413 Request Too Large</a:t>
             </a:r>
           </a:p>
         </p:txBody>
@@ -10803,7 +11571,7 @@
     </p:spTree>
     <p:extLst>
       <p:ext uri="{BB962C8B-B14F-4D97-AF65-F5344CB8AC3E}">
-        <p14:creationId xmlns:p14="http://schemas.microsoft.com/office/powerpoint/2010/main" val="3993264018"/>
+        <p14:creationId xmlns:p14="http://schemas.microsoft.com/office/powerpoint/2010/main" val="1587101224"/>
       </p:ext>
     </p:extLst>
   </p:cSld>
@@ -10835,7 +11603,7 @@
           <p:cNvPr id="4" name="Title 3">
             <a:extLst>
               <a:ext uri="{FF2B5EF4-FFF2-40B4-BE49-F238E27FC236}">
-                <a16:creationId xmlns:a16="http://schemas.microsoft.com/office/drawing/2014/main" id="{AAB5FD34-3870-CF94-5E6C-A8FEED6DF7B3}"/>
+                <a16:creationId xmlns:a16="http://schemas.microsoft.com/office/drawing/2014/main" id="{D7EDAF85-63F4-6C6B-4FD7-9B46F545A9C2}"/>
               </a:ext>
             </a:extLst>
           </p:cNvPr>
@@ -10853,17 +11621,17 @@
           <a:p>
             <a:r>
               <a:rPr lang="en-US" dirty="0"/>
-              <a:t>Service Bus Queue</a:t>
+              <a:t>Trigger Logic App on Blob Storage Created</a:t>
             </a:r>
           </a:p>
         </p:txBody>
       </p:sp>
       <p:sp>
         <p:nvSpPr>
-          <p:cNvPr id="5" name="Content Placeholder 4">
+          <p:cNvPr id="5" name="Text Placeholder 4">
             <a:extLst>
               <a:ext uri="{FF2B5EF4-FFF2-40B4-BE49-F238E27FC236}">
-                <a16:creationId xmlns:a16="http://schemas.microsoft.com/office/drawing/2014/main" id="{C33B33CF-0C69-EB0D-8B2E-DAC931943E59}"/>
+                <a16:creationId xmlns:a16="http://schemas.microsoft.com/office/drawing/2014/main" id="{666482BF-D438-BE9A-8975-A0E86DA99CA4}"/>
               </a:ext>
             </a:extLst>
           </p:cNvPr>
@@ -10871,113 +11639,25 @@
             <a:spLocks noGrp="1"/>
           </p:cNvSpPr>
           <p:nvPr>
-            <p:ph idx="1"/>
-          </p:nvPr>
-        </p:nvSpPr>
-        <p:spPr>
-          <a:xfrm>
-            <a:off x="2589212" y="1352811"/>
-            <a:ext cx="8915400" cy="4881079"/>
-          </a:xfrm>
-        </p:spPr>
+            <p:ph type="body" idx="1"/>
+          </p:nvPr>
+        </p:nvSpPr>
+        <p:spPr/>
         <p:txBody>
-          <a:bodyPr>
-            <a:normAutofit fontScale="85000" lnSpcReduction="20000"/>
-          </a:bodyPr>
+          <a:bodyPr/>
           <a:lstStyle/>
           <a:p>
             <a:r>
-              <a:rPr lang="en-US" sz="2600" dirty="0"/>
-              <a:t>Capable of true FIFO (ordered) processing to one or more competing consumers</a:t>
-            </a:r>
-          </a:p>
-          <a:p>
-            <a:r>
-              <a:rPr lang="en-US" sz="2600" dirty="0"/>
-              <a:t>256 kb max message size</a:t>
-            </a:r>
-          </a:p>
-          <a:p>
-            <a:r>
-              <a:rPr lang="en-US" sz="2600" dirty="0"/>
-              <a:t>Duplicate Detection</a:t>
-            </a:r>
-          </a:p>
-          <a:p>
-            <a:r>
-              <a:rPr lang="en-US" sz="2600" dirty="0"/>
-              <a:t>Provides decoupling of application components, thereby helping with load-levelling/load-balancing</a:t>
-            </a:r>
-          </a:p>
-          <a:p>
-            <a:r>
-              <a:rPr lang="en-US" sz="2600" dirty="0"/>
-              <a:t>Modes</a:t>
-            </a:r>
-          </a:p>
-          <a:p>
-            <a:pPr lvl="1"/>
-            <a:r>
-              <a:rPr lang="en-US" sz="2200" b="1" dirty="0"/>
-              <a:t>Receive and Delete </a:t>
-            </a:r>
-            <a:r>
-              <a:rPr lang="en-US" sz="2200" dirty="0"/>
-              <a:t>[use when app can tolerate not processing messages]</a:t>
-            </a:r>
-          </a:p>
-          <a:p>
-            <a:pPr lvl="1"/>
-            <a:r>
-              <a:rPr lang="en-US" sz="2200" b="1" dirty="0"/>
-              <a:t>Peek Lock </a:t>
-            </a:r>
-            <a:r>
-              <a:rPr lang="en-US" sz="2200" dirty="0"/>
-              <a:t>[apps cannot tolerate not processing.  Locks, then marks completed]</a:t>
-            </a:r>
-          </a:p>
-          <a:p>
-            <a:pPr lvl="2"/>
-            <a:r>
-              <a:rPr lang="en-US" sz="1900" dirty="0"/>
-              <a:t>Message is abandoned and returned or occurs after timeout expires</a:t>
-            </a:r>
-          </a:p>
-          <a:p>
-            <a:pPr lvl="2"/>
-            <a:r>
-              <a:rPr lang="en-US" sz="1900" dirty="0"/>
-              <a:t>At-least once processing</a:t>
-            </a:r>
-          </a:p>
-          <a:p>
-            <a:pPr lvl="2"/>
-            <a:r>
-              <a:rPr lang="en-US" sz="1900" dirty="0"/>
-              <a:t>At-most once processing</a:t>
-            </a:r>
-          </a:p>
-          <a:p>
-            <a:pPr lvl="1"/>
-            <a:endParaRPr lang="en-US" dirty="0"/>
-          </a:p>
-          <a:p>
-            <a:pPr lvl="1"/>
-            <a:endParaRPr lang="en-US" dirty="0"/>
-          </a:p>
-          <a:p>
-            <a:endParaRPr lang="en-US" dirty="0"/>
-          </a:p>
-          <a:p>
-            <a:endParaRPr lang="en-US" dirty="0"/>
+              <a:rPr lang="en-US" dirty="0"/>
+              <a:t>Easily wire up events when blobs are created</a:t>
+            </a:r>
           </a:p>
         </p:txBody>
       </p:sp>
     </p:spTree>
     <p:extLst>
       <p:ext uri="{BB962C8B-B14F-4D97-AF65-F5344CB8AC3E}">
-        <p14:creationId xmlns:p14="http://schemas.microsoft.com/office/powerpoint/2010/main" val="3991001877"/>
+        <p14:creationId xmlns:p14="http://schemas.microsoft.com/office/powerpoint/2010/main" val="415610152"/>
       </p:ext>
     </p:extLst>
   </p:cSld>
@@ -14064,7 +14744,7 @@
                 <a:ea typeface="Verdana" panose="020B0604030504040204" pitchFamily="34" charset="0"/>
                 <a:cs typeface="Utsaah" panose="020B0502040204020203" pitchFamily="34" charset="0"/>
               </a:rPr>
-              <a:t>MCT (x3)</a:t>
+              <a:t>MCT (x4) / MVP (x2)</a:t>
             </a:r>
             <a:br>
               <a:rPr lang="en-US" sz="1600" dirty="0">
@@ -14148,7 +14828,7 @@
                 <a:ea typeface="Verdana" panose="020B0604030504040204" pitchFamily="34" charset="0"/>
                 <a:cs typeface="Utsaah" panose="020B0502040204020203" pitchFamily="34" charset="0"/>
               </a:rPr>
-              <a:t>	Azure Administrator Associate</a:t>
+              <a:t>	Azure SCI Fundamentals</a:t>
             </a:r>
             <a:br>
               <a:rPr lang="en-US" sz="1600" dirty="0">
@@ -14169,7 +14849,7 @@
                 <a:ea typeface="Verdana" panose="020B0604030504040204" pitchFamily="34" charset="0"/>
                 <a:cs typeface="Utsaah" panose="020B0502040204020203" pitchFamily="34" charset="0"/>
               </a:rPr>
-              <a:t>	Azure Security Associate</a:t>
+              <a:t>	Azure Administrator Associate</a:t>
             </a:r>
             <a:br>
               <a:rPr lang="en-US" sz="1600" dirty="0">
@@ -14190,7 +14870,7 @@
                 <a:ea typeface="Verdana" panose="020B0604030504040204" pitchFamily="34" charset="0"/>
                 <a:cs typeface="Utsaah" panose="020B0502040204020203" pitchFamily="34" charset="0"/>
               </a:rPr>
-              <a:t>	Azure Developer Associate </a:t>
+              <a:t>	Azure Security Associate</a:t>
             </a:r>
             <a:br>
               <a:rPr lang="en-US" sz="1600" dirty="0">
@@ -14211,7 +14891,7 @@
                 <a:ea typeface="Verdana" panose="020B0604030504040204" pitchFamily="34" charset="0"/>
                 <a:cs typeface="Utsaah" panose="020B0502040204020203" pitchFamily="34" charset="0"/>
               </a:rPr>
-              <a:t>	Azure IOT Developer Specialization</a:t>
+              <a:t>	Azure Developer Associate </a:t>
             </a:r>
             <a:br>
               <a:rPr lang="en-US" sz="1600" dirty="0">
@@ -14232,7 +14912,7 @@
                 <a:ea typeface="Verdana" panose="020B0604030504040204" pitchFamily="34" charset="0"/>
                 <a:cs typeface="Utsaah" panose="020B0502040204020203" pitchFamily="34" charset="0"/>
               </a:rPr>
-              <a:t>	Azure Database Administrator Associate</a:t>
+              <a:t>	Azure IOT Developer Specialization</a:t>
             </a:r>
             <a:br>
               <a:rPr lang="en-US" sz="1600" dirty="0">
@@ -14253,7 +14933,7 @@
                 <a:ea typeface="Verdana" panose="020B0604030504040204" pitchFamily="34" charset="0"/>
                 <a:cs typeface="Utsaah" panose="020B0502040204020203" pitchFamily="34" charset="0"/>
               </a:rPr>
-              <a:t>	Azure Solutions Architect Expert</a:t>
+              <a:t>	Azure Database Administrator Associate</a:t>
             </a:r>
             <a:br>
               <a:rPr lang="en-US" sz="1600" dirty="0">
@@ -14274,6 +14954,27 @@
                 <a:ea typeface="Verdana" panose="020B0604030504040204" pitchFamily="34" charset="0"/>
                 <a:cs typeface="Utsaah" panose="020B0502040204020203" pitchFamily="34" charset="0"/>
               </a:rPr>
+              <a:t>	Azure Solutions Architect Expert</a:t>
+            </a:r>
+            <a:br>
+              <a:rPr lang="en-US" sz="1600" dirty="0">
+                <a:solidFill>
+                  <a:schemeClr val="bg1"/>
+                </a:solidFill>
+                <a:latin typeface="Utsaah" panose="020B0502040204020203" pitchFamily="34" charset="0"/>
+                <a:ea typeface="Verdana" panose="020B0604030504040204" pitchFamily="34" charset="0"/>
+                <a:cs typeface="Utsaah" panose="020B0502040204020203" pitchFamily="34" charset="0"/>
+              </a:rPr>
+            </a:br>
+            <a:r>
+              <a:rPr lang="en-US" sz="1600" dirty="0">
+                <a:solidFill>
+                  <a:schemeClr val="bg1"/>
+                </a:solidFill>
+                <a:latin typeface="Utsaah" panose="020B0502040204020203" pitchFamily="34" charset="0"/>
+                <a:ea typeface="Verdana" panose="020B0604030504040204" pitchFamily="34" charset="0"/>
+                <a:cs typeface="Utsaah" panose="020B0502040204020203" pitchFamily="34" charset="0"/>
+              </a:rPr>
               <a:t>	Azure DevOps Engineer Expert</a:t>
             </a:r>
           </a:p>
@@ -14322,7 +15023,51 @@
                 <a:ea typeface="Verdana" panose="020B0604030504040204" pitchFamily="34" charset="0"/>
                 <a:cs typeface="Utsaah" panose="020B0502040204020203" pitchFamily="34" charset="0"/>
               </a:rPr>
-              <a:t>Brian has also created many online video courses, available on various platforms.  Recently, Brian published his first book: Practical Entity Framework with </a:t>
+              <a:t>Brian has also created many online video courses, available on various platforms.  Recently, Brian published </a:t>
+            </a:r>
+            <a:r>
+              <a:rPr lang="en-US" dirty="0">
+                <a:solidFill>
+                  <a:schemeClr val="bg1"/>
+                </a:solidFill>
+                <a:latin typeface="Utsaah" panose="020B0502040204020203" pitchFamily="34" charset="0"/>
+                <a:ea typeface="Verdana" panose="020B0604030504040204" pitchFamily="34" charset="0"/>
+                <a:cs typeface="Utsaah" panose="020B0502040204020203" pitchFamily="34" charset="0"/>
+              </a:rPr>
+              <a:t>the second edition of his</a:t>
+            </a:r>
+            <a:r>
+              <a:rPr lang="en-US" sz="1400" dirty="0">
+                <a:solidFill>
+                  <a:schemeClr val="bg1"/>
+                </a:solidFill>
+                <a:latin typeface="Utsaah" panose="020B0502040204020203" pitchFamily="34" charset="0"/>
+                <a:ea typeface="Verdana" panose="020B0604030504040204" pitchFamily="34" charset="0"/>
+                <a:cs typeface="Utsaah" panose="020B0502040204020203" pitchFamily="34" charset="0"/>
+              </a:rPr>
+              <a:t> first book: Practical Entity Framework </a:t>
+            </a:r>
+            <a:r>
+              <a:rPr lang="en-US" dirty="0">
+                <a:solidFill>
+                  <a:schemeClr val="bg1"/>
+                </a:solidFill>
+                <a:latin typeface="Utsaah" panose="020B0502040204020203" pitchFamily="34" charset="0"/>
+                <a:ea typeface="Verdana" panose="020B0604030504040204" pitchFamily="34" charset="0"/>
+                <a:cs typeface="Utsaah" panose="020B0502040204020203" pitchFamily="34" charset="0"/>
+              </a:rPr>
+              <a:t>Core 6 </a:t>
+            </a:r>
+            <a:r>
+              <a:rPr lang="en-US" sz="1400" dirty="0">
+                <a:solidFill>
+                  <a:schemeClr val="bg1"/>
+                </a:solidFill>
+                <a:latin typeface="Utsaah" panose="020B0502040204020203" pitchFamily="34" charset="0"/>
+                <a:ea typeface="Verdana" panose="020B0604030504040204" pitchFamily="34" charset="0"/>
+                <a:cs typeface="Utsaah" panose="020B0502040204020203" pitchFamily="34" charset="0"/>
+              </a:rPr>
+              <a:t>with </a:t>
             </a:r>
             <a:r>
               <a:rPr lang="en-US" sz="1400" dirty="0" err="1">
@@ -14639,35 +15384,6 @@
       </p:pic>
       <p:pic>
         <p:nvPicPr>
-          <p:cNvPr id="12" name="Content Placeholder 11">
-            <a:extLst>
-              <a:ext uri="{FF2B5EF4-FFF2-40B4-BE49-F238E27FC236}">
-                <a16:creationId xmlns:a16="http://schemas.microsoft.com/office/drawing/2014/main" id="{D371E78E-2009-4B50-8220-E19857EFD0C7}"/>
-              </a:ext>
-            </a:extLst>
-          </p:cNvPr>
-          <p:cNvPicPr>
-            <a:picLocks noGrp="1" noChangeAspect="1"/>
-          </p:cNvPicPr>
-          <p:nvPr>
-            <p:ph idx="1"/>
-          </p:nvPr>
-        </p:nvPicPr>
-        <p:blipFill>
-          <a:blip r:embed="rId10"/>
-          <a:stretch>
-            <a:fillRect/>
-          </a:stretch>
-        </p:blipFill>
-        <p:spPr>
-          <a:xfrm>
-            <a:off x="9714887" y="33494"/>
-            <a:ext cx="2323809" cy="4876190"/>
-          </a:xfrm>
-        </p:spPr>
-      </p:pic>
-      <p:pic>
-        <p:nvPicPr>
           <p:cNvPr id="3" name="Picture 2" descr="A picture containing text, sign, blue&#10;&#10;Description automatically generated">
             <a:extLst>
               <a:ext uri="{FF2B5EF4-FFF2-40B4-BE49-F238E27FC236}">
@@ -14681,7 +15397,7 @@
           <p:nvPr/>
         </p:nvPicPr>
         <p:blipFill>
-          <a:blip r:embed="rId11"/>
+          <a:blip r:embed="rId10"/>
           <a:stretch>
             <a:fillRect/>
           </a:stretch>
@@ -14711,7 +15427,7 @@
           <p:nvPr/>
         </p:nvPicPr>
         <p:blipFill>
-          <a:blip r:embed="rId12"/>
+          <a:blip r:embed="rId11"/>
           <a:stretch>
             <a:fillRect/>
           </a:stretch>
@@ -14741,7 +15457,7 @@
           <p:nvPr/>
         </p:nvPicPr>
         <p:blipFill>
-          <a:blip r:embed="rId13"/>
+          <a:blip r:embed="rId12"/>
           <a:stretch>
             <a:fillRect/>
           </a:stretch>
@@ -14771,7 +15487,7 @@
           <p:nvPr/>
         </p:nvPicPr>
         <p:blipFill>
-          <a:blip r:embed="rId14"/>
+          <a:blip r:embed="rId13"/>
           <a:stretch>
             <a:fillRect/>
           </a:stretch>
@@ -14801,7 +15517,7 @@
           <p:nvPr/>
         </p:nvPicPr>
         <p:blipFill>
-          <a:blip r:embed="rId15"/>
+          <a:blip r:embed="rId14"/>
           <a:stretch>
             <a:fillRect/>
           </a:stretch>
@@ -14810,6 +15526,65 @@
           <a:xfrm>
             <a:off x="10434100" y="5003088"/>
             <a:ext cx="1143245" cy="1629940"/>
+          </a:xfrm>
+          <a:prstGeom prst="rect">
+            <a:avLst/>
+          </a:prstGeom>
+        </p:spPr>
+      </p:pic>
+      <p:pic>
+        <p:nvPicPr>
+          <p:cNvPr id="11" name="Content Placeholder 10" descr="A picture containing text, sign, outdoor&#10;&#10;Description automatically generated">
+            <a:extLst>
+              <a:ext uri="{FF2B5EF4-FFF2-40B4-BE49-F238E27FC236}">
+                <a16:creationId xmlns:a16="http://schemas.microsoft.com/office/drawing/2014/main" id="{8A28ABBD-73EB-17A1-F4EC-E9E0EA390555}"/>
+              </a:ext>
+            </a:extLst>
+          </p:cNvPr>
+          <p:cNvPicPr>
+            <a:picLocks noGrp="1" noChangeAspect="1"/>
+          </p:cNvPicPr>
+          <p:nvPr>
+            <p:ph idx="1"/>
+          </p:nvPr>
+        </p:nvPicPr>
+        <p:blipFill>
+          <a:blip r:embed="rId15"/>
+          <a:stretch>
+            <a:fillRect/>
+          </a:stretch>
+        </p:blipFill>
+        <p:spPr>
+          <a:xfrm>
+            <a:off x="3558780" y="2906567"/>
+            <a:ext cx="1324601" cy="1324601"/>
+          </a:xfrm>
+        </p:spPr>
+      </p:pic>
+      <p:pic>
+        <p:nvPicPr>
+          <p:cNvPr id="9" name="Picture 8">
+            <a:extLst>
+              <a:ext uri="{FF2B5EF4-FFF2-40B4-BE49-F238E27FC236}">
+                <a16:creationId xmlns:a16="http://schemas.microsoft.com/office/drawing/2014/main" id="{4742F78E-7CEE-CB5B-89D7-1C144D40B45D}"/>
+              </a:ext>
+            </a:extLst>
+          </p:cNvPr>
+          <p:cNvPicPr>
+            <a:picLocks noChangeAspect="1"/>
+          </p:cNvPicPr>
+          <p:nvPr/>
+        </p:nvPicPr>
+        <p:blipFill>
+          <a:blip r:embed="rId16"/>
+          <a:stretch>
+            <a:fillRect/>
+          </a:stretch>
+        </p:blipFill>
+        <p:spPr>
+          <a:xfrm>
+            <a:off x="9914423" y="0"/>
+            <a:ext cx="2247619" cy="4838095"/>
           </a:xfrm>
           <a:prstGeom prst="rect">
             <a:avLst/>
@@ -14830,6 +15605,266 @@
 </file>
 
 <file path=ppt/slides/slide20.xml><?xml version="1.0" encoding="utf-8"?>
+<p:sld xmlns:a="http://schemas.openxmlformats.org/drawingml/2006/main" xmlns:r="http://schemas.openxmlformats.org/officeDocument/2006/relationships" xmlns:p="http://schemas.openxmlformats.org/presentationml/2006/main">
+  <p:cSld>
+    <p:spTree>
+      <p:nvGrpSpPr>
+        <p:cNvPr id="1" name=""/>
+        <p:cNvGrpSpPr/>
+        <p:nvPr/>
+      </p:nvGrpSpPr>
+      <p:grpSpPr>
+        <a:xfrm>
+          <a:off x="0" y="0"/>
+          <a:ext cx="0" cy="0"/>
+          <a:chOff x="0" y="0"/>
+          <a:chExt cx="0" cy="0"/>
+        </a:xfrm>
+      </p:grpSpPr>
+      <p:sp>
+        <p:nvSpPr>
+          <p:cNvPr id="2" name="Title 1">
+            <a:extLst>
+              <a:ext uri="{FF2B5EF4-FFF2-40B4-BE49-F238E27FC236}">
+                <a16:creationId xmlns:a16="http://schemas.microsoft.com/office/drawing/2014/main" id="{0EF55DF5-E8AB-BFE6-3598-98775700154F}"/>
+              </a:ext>
+            </a:extLst>
+          </p:cNvPr>
+          <p:cNvSpPr>
+            <a:spLocks noGrp="1"/>
+          </p:cNvSpPr>
+          <p:nvPr>
+            <p:ph type="title"/>
+          </p:nvPr>
+        </p:nvSpPr>
+        <p:spPr/>
+        <p:txBody>
+          <a:bodyPr/>
+          <a:lstStyle/>
+          <a:p>
+            <a:r>
+              <a:rPr lang="en-US" dirty="0"/>
+              <a:t>Service Bus Queue</a:t>
+            </a:r>
+          </a:p>
+        </p:txBody>
+      </p:sp>
+      <p:sp>
+        <p:nvSpPr>
+          <p:cNvPr id="3" name="Text Placeholder 2">
+            <a:extLst>
+              <a:ext uri="{FF2B5EF4-FFF2-40B4-BE49-F238E27FC236}">
+                <a16:creationId xmlns:a16="http://schemas.microsoft.com/office/drawing/2014/main" id="{C5D78BE3-3D5D-820E-D86B-9B8B2E20FDFE}"/>
+              </a:ext>
+            </a:extLst>
+          </p:cNvPr>
+          <p:cNvSpPr>
+            <a:spLocks noGrp="1"/>
+          </p:cNvSpPr>
+          <p:nvPr>
+            <p:ph type="body" idx="1"/>
+          </p:nvPr>
+        </p:nvSpPr>
+        <p:spPr/>
+        <p:txBody>
+          <a:bodyPr/>
+          <a:lstStyle/>
+          <a:p>
+            <a:r>
+              <a:rPr lang="en-US" dirty="0"/>
+              <a:t>Ordered messaging for processing</a:t>
+            </a:r>
+          </a:p>
+        </p:txBody>
+      </p:sp>
+    </p:spTree>
+    <p:extLst>
+      <p:ext uri="{BB962C8B-B14F-4D97-AF65-F5344CB8AC3E}">
+        <p14:creationId xmlns:p14="http://schemas.microsoft.com/office/powerpoint/2010/main" val="3993264018"/>
+      </p:ext>
+    </p:extLst>
+  </p:cSld>
+  <p:clrMapOvr>
+    <a:masterClrMapping/>
+  </p:clrMapOvr>
+</p:sld>
+</file>
+
+<file path=ppt/slides/slide21.xml><?xml version="1.0" encoding="utf-8"?>
+<p:sld xmlns:a="http://schemas.openxmlformats.org/drawingml/2006/main" xmlns:r="http://schemas.openxmlformats.org/officeDocument/2006/relationships" xmlns:p="http://schemas.openxmlformats.org/presentationml/2006/main">
+  <p:cSld>
+    <p:spTree>
+      <p:nvGrpSpPr>
+        <p:cNvPr id="1" name=""/>
+        <p:cNvGrpSpPr/>
+        <p:nvPr/>
+      </p:nvGrpSpPr>
+      <p:grpSpPr>
+        <a:xfrm>
+          <a:off x="0" y="0"/>
+          <a:ext cx="0" cy="0"/>
+          <a:chOff x="0" y="0"/>
+          <a:chExt cx="0" cy="0"/>
+        </a:xfrm>
+      </p:grpSpPr>
+      <p:sp>
+        <p:nvSpPr>
+          <p:cNvPr id="4" name="Title 3">
+            <a:extLst>
+              <a:ext uri="{FF2B5EF4-FFF2-40B4-BE49-F238E27FC236}">
+                <a16:creationId xmlns:a16="http://schemas.microsoft.com/office/drawing/2014/main" id="{AAB5FD34-3870-CF94-5E6C-A8FEED6DF7B3}"/>
+              </a:ext>
+            </a:extLst>
+          </p:cNvPr>
+          <p:cNvSpPr>
+            <a:spLocks noGrp="1"/>
+          </p:cNvSpPr>
+          <p:nvPr>
+            <p:ph type="title"/>
+          </p:nvPr>
+        </p:nvSpPr>
+        <p:spPr/>
+        <p:txBody>
+          <a:bodyPr/>
+          <a:lstStyle/>
+          <a:p>
+            <a:r>
+              <a:rPr lang="en-US" dirty="0"/>
+              <a:t>Service Bus Queue</a:t>
+            </a:r>
+          </a:p>
+        </p:txBody>
+      </p:sp>
+      <p:sp>
+        <p:nvSpPr>
+          <p:cNvPr id="5" name="Content Placeholder 4">
+            <a:extLst>
+              <a:ext uri="{FF2B5EF4-FFF2-40B4-BE49-F238E27FC236}">
+                <a16:creationId xmlns:a16="http://schemas.microsoft.com/office/drawing/2014/main" id="{C33B33CF-0C69-EB0D-8B2E-DAC931943E59}"/>
+              </a:ext>
+            </a:extLst>
+          </p:cNvPr>
+          <p:cNvSpPr>
+            <a:spLocks noGrp="1"/>
+          </p:cNvSpPr>
+          <p:nvPr>
+            <p:ph idx="1"/>
+          </p:nvPr>
+        </p:nvSpPr>
+        <p:spPr>
+          <a:xfrm>
+            <a:off x="2589212" y="1352811"/>
+            <a:ext cx="8915400" cy="4881079"/>
+          </a:xfrm>
+        </p:spPr>
+        <p:txBody>
+          <a:bodyPr>
+            <a:normAutofit fontScale="85000" lnSpcReduction="20000"/>
+          </a:bodyPr>
+          <a:lstStyle/>
+          <a:p>
+            <a:r>
+              <a:rPr lang="en-US" sz="2600" dirty="0"/>
+              <a:t>Capable of true FIFO (ordered) processing to one or more competing consumers</a:t>
+            </a:r>
+          </a:p>
+          <a:p>
+            <a:r>
+              <a:rPr lang="en-US" sz="2600" dirty="0"/>
+              <a:t>256 kb max message size</a:t>
+            </a:r>
+          </a:p>
+          <a:p>
+            <a:r>
+              <a:rPr lang="en-US" sz="2600" dirty="0"/>
+              <a:t>Duplicate Detection</a:t>
+            </a:r>
+          </a:p>
+          <a:p>
+            <a:r>
+              <a:rPr lang="en-US" sz="2600" dirty="0"/>
+              <a:t>Provides decoupling of application components, thereby helping with load-levelling/load-balancing</a:t>
+            </a:r>
+          </a:p>
+          <a:p>
+            <a:r>
+              <a:rPr lang="en-US" sz="2600" dirty="0"/>
+              <a:t>Modes</a:t>
+            </a:r>
+          </a:p>
+          <a:p>
+            <a:pPr lvl="1"/>
+            <a:r>
+              <a:rPr lang="en-US" sz="2200" b="1" dirty="0"/>
+              <a:t>Receive and Delete </a:t>
+            </a:r>
+            <a:r>
+              <a:rPr lang="en-US" sz="2200" dirty="0"/>
+              <a:t>[use when app can tolerate not processing messages]</a:t>
+            </a:r>
+          </a:p>
+          <a:p>
+            <a:pPr lvl="1"/>
+            <a:r>
+              <a:rPr lang="en-US" sz="2200" b="1" dirty="0"/>
+              <a:t>Peek Lock </a:t>
+            </a:r>
+            <a:r>
+              <a:rPr lang="en-US" sz="2200" dirty="0"/>
+              <a:t>[apps cannot tolerate not processing.  Locks, then marks completed]</a:t>
+            </a:r>
+          </a:p>
+          <a:p>
+            <a:pPr lvl="2"/>
+            <a:r>
+              <a:rPr lang="en-US" sz="1900" dirty="0"/>
+              <a:t>Message is abandoned and returned or occurs after timeout expires</a:t>
+            </a:r>
+          </a:p>
+          <a:p>
+            <a:pPr lvl="2"/>
+            <a:r>
+              <a:rPr lang="en-US" sz="1900" dirty="0"/>
+              <a:t>At-least once processing</a:t>
+            </a:r>
+          </a:p>
+          <a:p>
+            <a:pPr lvl="2"/>
+            <a:r>
+              <a:rPr lang="en-US" sz="1900" dirty="0"/>
+              <a:t>At-most once processing</a:t>
+            </a:r>
+          </a:p>
+          <a:p>
+            <a:pPr lvl="1"/>
+            <a:endParaRPr lang="en-US" dirty="0"/>
+          </a:p>
+          <a:p>
+            <a:pPr lvl="1"/>
+            <a:endParaRPr lang="en-US" dirty="0"/>
+          </a:p>
+          <a:p>
+            <a:endParaRPr lang="en-US" dirty="0"/>
+          </a:p>
+          <a:p>
+            <a:endParaRPr lang="en-US" dirty="0"/>
+          </a:p>
+        </p:txBody>
+      </p:sp>
+    </p:spTree>
+    <p:extLst>
+      <p:ext uri="{BB962C8B-B14F-4D97-AF65-F5344CB8AC3E}">
+        <p14:creationId xmlns:p14="http://schemas.microsoft.com/office/powerpoint/2010/main" val="3991001877"/>
+      </p:ext>
+    </p:extLst>
+  </p:cSld>
+  <p:clrMapOvr>
+    <a:masterClrMapping/>
+  </p:clrMapOvr>
+</p:sld>
+</file>
+
+<file path=ppt/slides/slide22.xml><?xml version="1.0" encoding="utf-8"?>
 <p:sld xmlns:a="http://schemas.openxmlformats.org/drawingml/2006/main" xmlns:r="http://schemas.openxmlformats.org/officeDocument/2006/relationships" xmlns:p="http://schemas.openxmlformats.org/presentationml/2006/main">
   <p:cSld>
     <p:spTree>
@@ -14959,7 +15994,7 @@
 </p:sld>
 </file>
 
-<file path=ppt/slides/slide21.xml><?xml version="1.0" encoding="utf-8"?>
+<file path=ppt/slides/slide23.xml><?xml version="1.0" encoding="utf-8"?>
 <p:sld xmlns:a="http://schemas.openxmlformats.org/drawingml/2006/main" xmlns:r="http://schemas.openxmlformats.org/officeDocument/2006/relationships" xmlns:p="http://schemas.openxmlformats.org/presentationml/2006/main">
   <p:cSld>
     <p:spTree>
@@ -15117,178 +16152,6 @@
 </p:sld>
 </file>
 
-<file path=ppt/slides/slide22.xml><?xml version="1.0" encoding="utf-8"?>
-<p:sld xmlns:a="http://schemas.openxmlformats.org/drawingml/2006/main" xmlns:r="http://schemas.openxmlformats.org/officeDocument/2006/relationships" xmlns:p="http://schemas.openxmlformats.org/presentationml/2006/main">
-  <p:cSld>
-    <p:spTree>
-      <p:nvGrpSpPr>
-        <p:cNvPr id="1" name=""/>
-        <p:cNvGrpSpPr/>
-        <p:nvPr/>
-      </p:nvGrpSpPr>
-      <p:grpSpPr>
-        <a:xfrm>
-          <a:off x="0" y="0"/>
-          <a:ext cx="0" cy="0"/>
-          <a:chOff x="0" y="0"/>
-          <a:chExt cx="0" cy="0"/>
-        </a:xfrm>
-      </p:grpSpPr>
-      <p:sp>
-        <p:nvSpPr>
-          <p:cNvPr id="2" name="Title 1">
-            <a:extLst>
-              <a:ext uri="{FF2B5EF4-FFF2-40B4-BE49-F238E27FC236}">
-                <a16:creationId xmlns:a16="http://schemas.microsoft.com/office/drawing/2014/main" id="{4953E4A6-B2EF-EC50-9CA0-24917F87068C}"/>
-              </a:ext>
-            </a:extLst>
-          </p:cNvPr>
-          <p:cNvSpPr>
-            <a:spLocks noGrp="1"/>
-          </p:cNvSpPr>
-          <p:nvPr>
-            <p:ph type="title"/>
-          </p:nvPr>
-        </p:nvSpPr>
-        <p:spPr/>
-        <p:txBody>
-          <a:bodyPr/>
-          <a:lstStyle/>
-          <a:p>
-            <a:r>
-              <a:rPr lang="en-US" dirty="0"/>
-              <a:t>Service Bus Queue</a:t>
-            </a:r>
-          </a:p>
-        </p:txBody>
-      </p:sp>
-      <p:sp>
-        <p:nvSpPr>
-          <p:cNvPr id="3" name="Text Placeholder 2">
-            <a:extLst>
-              <a:ext uri="{FF2B5EF4-FFF2-40B4-BE49-F238E27FC236}">
-                <a16:creationId xmlns:a16="http://schemas.microsoft.com/office/drawing/2014/main" id="{ADA36454-57CD-D416-EB21-2979E34F1482}"/>
-              </a:ext>
-            </a:extLst>
-          </p:cNvPr>
-          <p:cNvSpPr>
-            <a:spLocks noGrp="1"/>
-          </p:cNvSpPr>
-          <p:nvPr>
-            <p:ph type="body" idx="1"/>
-          </p:nvPr>
-        </p:nvSpPr>
-        <p:spPr/>
-        <p:txBody>
-          <a:bodyPr/>
-          <a:lstStyle/>
-          <a:p>
-            <a:r>
-              <a:rPr lang="en-US" dirty="0"/>
-              <a:t>How to work with the Service Bus as a Queue</a:t>
-            </a:r>
-          </a:p>
-        </p:txBody>
-      </p:sp>
-    </p:spTree>
-    <p:extLst>
-      <p:ext uri="{BB962C8B-B14F-4D97-AF65-F5344CB8AC3E}">
-        <p14:creationId xmlns:p14="http://schemas.microsoft.com/office/powerpoint/2010/main" val="2731207567"/>
-      </p:ext>
-    </p:extLst>
-  </p:cSld>
-  <p:clrMapOvr>
-    <a:masterClrMapping/>
-  </p:clrMapOvr>
-</p:sld>
-</file>
-
-<file path=ppt/slides/slide23.xml><?xml version="1.0" encoding="utf-8"?>
-<p:sld xmlns:a="http://schemas.openxmlformats.org/drawingml/2006/main" xmlns:r="http://schemas.openxmlformats.org/officeDocument/2006/relationships" xmlns:p="http://schemas.openxmlformats.org/presentationml/2006/main">
-  <p:cSld>
-    <p:spTree>
-      <p:nvGrpSpPr>
-        <p:cNvPr id="1" name=""/>
-        <p:cNvGrpSpPr/>
-        <p:nvPr/>
-      </p:nvGrpSpPr>
-      <p:grpSpPr>
-        <a:xfrm>
-          <a:off x="0" y="0"/>
-          <a:ext cx="0" cy="0"/>
-          <a:chOff x="0" y="0"/>
-          <a:chExt cx="0" cy="0"/>
-        </a:xfrm>
-      </p:grpSpPr>
-      <p:sp>
-        <p:nvSpPr>
-          <p:cNvPr id="6" name="Title 5">
-            <a:extLst>
-              <a:ext uri="{FF2B5EF4-FFF2-40B4-BE49-F238E27FC236}">
-                <a16:creationId xmlns:a16="http://schemas.microsoft.com/office/drawing/2014/main" id="{372C71B0-60D8-A4F2-98DA-79DD371FEB82}"/>
-              </a:ext>
-            </a:extLst>
-          </p:cNvPr>
-          <p:cNvSpPr>
-            <a:spLocks noGrp="1"/>
-          </p:cNvSpPr>
-          <p:nvPr>
-            <p:ph type="title"/>
-          </p:nvPr>
-        </p:nvSpPr>
-        <p:spPr/>
-        <p:txBody>
-          <a:bodyPr/>
-          <a:lstStyle/>
-          <a:p>
-            <a:r>
-              <a:rPr lang="en-US" dirty="0"/>
-              <a:t>Service Bus Messaging	</a:t>
-            </a:r>
-          </a:p>
-        </p:txBody>
-      </p:sp>
-      <p:sp>
-        <p:nvSpPr>
-          <p:cNvPr id="7" name="Text Placeholder 6">
-            <a:extLst>
-              <a:ext uri="{FF2B5EF4-FFF2-40B4-BE49-F238E27FC236}">
-                <a16:creationId xmlns:a16="http://schemas.microsoft.com/office/drawing/2014/main" id="{867DE9C3-1833-1DC6-DDD1-78AA06A355A9}"/>
-              </a:ext>
-            </a:extLst>
-          </p:cNvPr>
-          <p:cNvSpPr>
-            <a:spLocks noGrp="1"/>
-          </p:cNvSpPr>
-          <p:nvPr>
-            <p:ph type="body" idx="1"/>
-          </p:nvPr>
-        </p:nvSpPr>
-        <p:spPr/>
-        <p:txBody>
-          <a:bodyPr/>
-          <a:lstStyle/>
-          <a:p>
-            <a:r>
-              <a:rPr lang="en-US" dirty="0"/>
-              <a:t>When you need to pub/sub with filtering capabilities</a:t>
-            </a:r>
-          </a:p>
-        </p:txBody>
-      </p:sp>
-    </p:spTree>
-    <p:extLst>
-      <p:ext uri="{BB962C8B-B14F-4D97-AF65-F5344CB8AC3E}">
-        <p14:creationId xmlns:p14="http://schemas.microsoft.com/office/powerpoint/2010/main" val="1649611049"/>
-      </p:ext>
-    </p:extLst>
-  </p:cSld>
-  <p:clrMapOvr>
-    <a:masterClrMapping/>
-  </p:clrMapOvr>
-</p:sld>
-</file>
-
 <file path=ppt/slides/slide24.xml><?xml version="1.0" encoding="utf-8"?>
 <p:sld xmlns:a="http://schemas.openxmlformats.org/drawingml/2006/main" xmlns:r="http://schemas.openxmlformats.org/officeDocument/2006/relationships" xmlns:p="http://schemas.openxmlformats.org/presentationml/2006/main">
   <p:cSld>
@@ -15308,10 +16171,10 @@
       </p:grpSpPr>
       <p:sp>
         <p:nvSpPr>
-          <p:cNvPr id="4" name="Title 3">
+          <p:cNvPr id="2" name="Title 1">
             <a:extLst>
               <a:ext uri="{FF2B5EF4-FFF2-40B4-BE49-F238E27FC236}">
-                <a16:creationId xmlns:a16="http://schemas.microsoft.com/office/drawing/2014/main" id="{E571A7E1-0D87-C4EC-030B-EDD7E7BE5AF1}"/>
+                <a16:creationId xmlns:a16="http://schemas.microsoft.com/office/drawing/2014/main" id="{4953E4A6-B2EF-EC50-9CA0-24917F87068C}"/>
               </a:ext>
             </a:extLst>
           </p:cNvPr>
@@ -15329,17 +16192,17 @@
           <a:p>
             <a:r>
               <a:rPr lang="en-US" dirty="0"/>
-              <a:t>Service Bus Pub/Sub</a:t>
+              <a:t>Service Bus Queue</a:t>
             </a:r>
           </a:p>
         </p:txBody>
       </p:sp>
       <p:sp>
         <p:nvSpPr>
-          <p:cNvPr id="5" name="Content Placeholder 4">
+          <p:cNvPr id="3" name="Text Placeholder 2">
             <a:extLst>
               <a:ext uri="{FF2B5EF4-FFF2-40B4-BE49-F238E27FC236}">
-                <a16:creationId xmlns:a16="http://schemas.microsoft.com/office/drawing/2014/main" id="{2FC0DE1A-89D5-C450-F6D0-94030FDC9BD2}"/>
+                <a16:creationId xmlns:a16="http://schemas.microsoft.com/office/drawing/2014/main" id="{ADA36454-57CD-D416-EB21-2979E34F1482}"/>
               </a:ext>
             </a:extLst>
           </p:cNvPr>
@@ -15347,66 +16210,25 @@
             <a:spLocks noGrp="1"/>
           </p:cNvSpPr>
           <p:nvPr>
-            <p:ph idx="1"/>
-          </p:nvPr>
-        </p:nvSpPr>
-        <p:spPr>
-          <a:xfrm>
-            <a:off x="2589212" y="1615858"/>
-            <a:ext cx="8915400" cy="4295364"/>
-          </a:xfrm>
-        </p:spPr>
+            <p:ph type="body" idx="1"/>
+          </p:nvPr>
+        </p:nvSpPr>
+        <p:spPr/>
         <p:txBody>
           <a:bodyPr/>
           <a:lstStyle/>
           <a:p>
             <a:r>
-              <a:rPr lang="en-US" sz="2400" dirty="0"/>
-              <a:t>Create topics with one or more subscriptions for Pub/Sub pattern</a:t>
-            </a:r>
-          </a:p>
-          <a:p>
-            <a:r>
-              <a:rPr lang="en-US" sz="2400" dirty="0"/>
-              <a:t>Can handle dead-letter messaging</a:t>
-            </a:r>
-          </a:p>
-          <a:p>
-            <a:r>
-              <a:rPr lang="en-US" sz="2400" dirty="0"/>
-              <a:t>Filter at the subscription level to only receive messages important to the subscriber</a:t>
-            </a:r>
-          </a:p>
-          <a:p>
-            <a:r>
-              <a:rPr lang="en-US" sz="2400" dirty="0"/>
-              <a:t>Subscriptions act as a virtual queue with copies of the messages</a:t>
-            </a:r>
-          </a:p>
-          <a:p>
-            <a:r>
-              <a:rPr lang="en-US" sz="2400" dirty="0"/>
-              <a:t>All the same benefits of a queue but can be leveraged through multiple filtered subscriptions</a:t>
-            </a:r>
-          </a:p>
-          <a:p>
-            <a:pPr marL="0" indent="0">
-              <a:buNone/>
-            </a:pPr>
-            <a:endParaRPr lang="en-US" dirty="0"/>
-          </a:p>
-          <a:p>
-            <a:endParaRPr lang="en-US" dirty="0"/>
-          </a:p>
-          <a:p>
-            <a:endParaRPr lang="en-US" dirty="0"/>
+              <a:rPr lang="en-US" dirty="0"/>
+              <a:t>How to work with the Service Bus as a Queue</a:t>
+            </a:r>
           </a:p>
         </p:txBody>
       </p:sp>
     </p:spTree>
     <p:extLst>
       <p:ext uri="{BB962C8B-B14F-4D97-AF65-F5344CB8AC3E}">
-        <p14:creationId xmlns:p14="http://schemas.microsoft.com/office/powerpoint/2010/main" val="3662393117"/>
+        <p14:creationId xmlns:p14="http://schemas.microsoft.com/office/powerpoint/2010/main" val="2731207567"/>
       </p:ext>
     </p:extLst>
   </p:cSld>
@@ -15435,10 +16257,10 @@
       </p:grpSpPr>
       <p:sp>
         <p:nvSpPr>
-          <p:cNvPr id="2" name="Title 1">
+          <p:cNvPr id="6" name="Title 5">
             <a:extLst>
               <a:ext uri="{FF2B5EF4-FFF2-40B4-BE49-F238E27FC236}">
-                <a16:creationId xmlns:a16="http://schemas.microsoft.com/office/drawing/2014/main" id="{42820365-0C4B-7C8C-79A1-1538537E5F91}"/>
+                <a16:creationId xmlns:a16="http://schemas.microsoft.com/office/drawing/2014/main" id="{372C71B0-60D8-A4F2-98DA-79DD371FEB82}"/>
               </a:ext>
             </a:extLst>
           </p:cNvPr>
@@ -15456,17 +16278,17 @@
           <a:p>
             <a:r>
               <a:rPr lang="en-US" dirty="0"/>
-              <a:t>Service Bus Pub/Sub cont.</a:t>
+              <a:t>Service Bus Messaging	</a:t>
             </a:r>
           </a:p>
         </p:txBody>
       </p:sp>
       <p:sp>
         <p:nvSpPr>
-          <p:cNvPr id="3" name="Content Placeholder 2">
+          <p:cNvPr id="7" name="Text Placeholder 6">
             <a:extLst>
               <a:ext uri="{FF2B5EF4-FFF2-40B4-BE49-F238E27FC236}">
-                <a16:creationId xmlns:a16="http://schemas.microsoft.com/office/drawing/2014/main" id="{CF5138A8-E086-11BE-895C-926370A74C4A}"/>
+                <a16:creationId xmlns:a16="http://schemas.microsoft.com/office/drawing/2014/main" id="{867DE9C3-1833-1DC6-DDD1-78AA06A355A9}"/>
               </a:ext>
             </a:extLst>
           </p:cNvPr>
@@ -15474,135 +16296,17 @@
             <a:spLocks noGrp="1"/>
           </p:cNvSpPr>
           <p:nvPr>
-            <p:ph idx="1"/>
-          </p:nvPr>
-        </p:nvSpPr>
-        <p:spPr>
-          <a:xfrm>
-            <a:off x="2589212" y="1441100"/>
-            <a:ext cx="8915400" cy="5107184"/>
-          </a:xfrm>
-        </p:spPr>
+            <p:ph type="body" idx="1"/>
+          </p:nvPr>
+        </p:nvSpPr>
+        <p:spPr/>
         <p:txBody>
-          <a:bodyPr>
-            <a:normAutofit fontScale="92500" lnSpcReduction="20000"/>
-          </a:bodyPr>
+          <a:bodyPr/>
           <a:lstStyle/>
           <a:p>
             <a:r>
-              <a:rPr lang="en-US" sz="2400" dirty="0"/>
-              <a:t>Leverage both system properties and custom user-defined fields</a:t>
-            </a:r>
-          </a:p>
-          <a:p>
-            <a:r>
-              <a:rPr lang="en-US" sz="2400" dirty="0"/>
-              <a:t>Filter actions with filter expressions</a:t>
-            </a:r>
-          </a:p>
-          <a:p>
-            <a:pPr lvl="1"/>
-            <a:r>
-              <a:rPr lang="en-US" sz="2000" dirty="0"/>
-              <a:t>SQL Filter (exists, IS NULL, AND/OR/NOT)</a:t>
-            </a:r>
-          </a:p>
-          <a:p>
-            <a:pPr lvl="1"/>
-            <a:r>
-              <a:rPr lang="en-US" sz="2000" dirty="0"/>
-              <a:t>Boolean Filter (</a:t>
-            </a:r>
-            <a:r>
-              <a:rPr lang="en-US" sz="2000" dirty="0" err="1"/>
-              <a:t>TrueFilter</a:t>
-            </a:r>
-            <a:r>
-              <a:rPr lang="en-US" sz="2000" dirty="0"/>
-              <a:t> or </a:t>
-            </a:r>
-            <a:r>
-              <a:rPr lang="en-US" sz="2000" dirty="0" err="1"/>
-              <a:t>FalseFilter</a:t>
-            </a:r>
-            <a:r>
-              <a:rPr lang="en-US" sz="2000" dirty="0"/>
-              <a:t>)</a:t>
-            </a:r>
-          </a:p>
-          <a:p>
-            <a:pPr lvl="1"/>
-            <a:r>
-              <a:rPr lang="en-US" sz="2000" dirty="0"/>
-              <a:t>Correlation filter </a:t>
-            </a:r>
-          </a:p>
-          <a:p>
-            <a:pPr lvl="2"/>
-            <a:r>
-              <a:rPr lang="en-US" sz="1800" dirty="0"/>
-              <a:t>Correlation Id</a:t>
-            </a:r>
-          </a:p>
-          <a:p>
-            <a:pPr lvl="2"/>
-            <a:r>
-              <a:rPr lang="en-US" sz="1800" dirty="0" err="1"/>
-              <a:t>ContentType</a:t>
-            </a:r>
-            <a:endParaRPr lang="en-US" sz="1800" dirty="0"/>
-          </a:p>
-          <a:p>
-            <a:pPr lvl="2"/>
-            <a:r>
-              <a:rPr lang="en-US" sz="1800" dirty="0"/>
-              <a:t>Label</a:t>
-            </a:r>
-          </a:p>
-          <a:p>
-            <a:pPr lvl="2"/>
-            <a:r>
-              <a:rPr lang="en-US" sz="1800" dirty="0" err="1"/>
-              <a:t>MessageId</a:t>
-            </a:r>
-            <a:endParaRPr lang="en-US" sz="1800" dirty="0"/>
-          </a:p>
-          <a:p>
-            <a:pPr lvl="2"/>
-            <a:r>
-              <a:rPr lang="en-US" sz="1800" dirty="0" err="1"/>
-              <a:t>ReplyTo</a:t>
-            </a:r>
-            <a:r>
-              <a:rPr lang="en-US" sz="1800" dirty="0"/>
-              <a:t>/</a:t>
-            </a:r>
-            <a:r>
-              <a:rPr lang="en-US" sz="1800" dirty="0" err="1"/>
-              <a:t>ReplyToSessionId</a:t>
-            </a:r>
-            <a:endParaRPr lang="en-US" sz="1800" dirty="0"/>
-          </a:p>
-          <a:p>
-            <a:pPr lvl="2"/>
-            <a:r>
-              <a:rPr lang="en-US" sz="1800" dirty="0" err="1"/>
-              <a:t>SessionId</a:t>
-            </a:r>
-            <a:endParaRPr lang="en-US" sz="1800" dirty="0"/>
-          </a:p>
-          <a:p>
-            <a:pPr lvl="2"/>
-            <a:r>
-              <a:rPr lang="en-US" sz="1800" dirty="0"/>
-              <a:t>To</a:t>
-            </a:r>
-          </a:p>
-          <a:p>
-            <a:pPr lvl="2"/>
-            <a:r>
-              <a:rPr lang="en-US" sz="1800" dirty="0"/>
-              <a:t>Any user-defined properties</a:t>
+              <a:rPr lang="en-US" dirty="0"/>
+              <a:t>When you need to pub/sub with filtering capabilities</a:t>
             </a:r>
           </a:p>
         </p:txBody>
@@ -15610,7 +16314,7 @@
     </p:spTree>
     <p:extLst>
       <p:ext uri="{BB962C8B-B14F-4D97-AF65-F5344CB8AC3E}">
-        <p14:creationId xmlns:p14="http://schemas.microsoft.com/office/powerpoint/2010/main" val="2000262289"/>
+        <p14:creationId xmlns:p14="http://schemas.microsoft.com/office/powerpoint/2010/main" val="1649611049"/>
       </p:ext>
     </p:extLst>
   </p:cSld>
@@ -15639,6 +16343,337 @@
       </p:grpSpPr>
       <p:sp>
         <p:nvSpPr>
+          <p:cNvPr id="4" name="Title 3">
+            <a:extLst>
+              <a:ext uri="{FF2B5EF4-FFF2-40B4-BE49-F238E27FC236}">
+                <a16:creationId xmlns:a16="http://schemas.microsoft.com/office/drawing/2014/main" id="{E571A7E1-0D87-C4EC-030B-EDD7E7BE5AF1}"/>
+              </a:ext>
+            </a:extLst>
+          </p:cNvPr>
+          <p:cNvSpPr>
+            <a:spLocks noGrp="1"/>
+          </p:cNvSpPr>
+          <p:nvPr>
+            <p:ph type="title"/>
+          </p:nvPr>
+        </p:nvSpPr>
+        <p:spPr/>
+        <p:txBody>
+          <a:bodyPr/>
+          <a:lstStyle/>
+          <a:p>
+            <a:r>
+              <a:rPr lang="en-US" dirty="0"/>
+              <a:t>Service Bus Pub/Sub</a:t>
+            </a:r>
+          </a:p>
+        </p:txBody>
+      </p:sp>
+      <p:sp>
+        <p:nvSpPr>
+          <p:cNvPr id="5" name="Content Placeholder 4">
+            <a:extLst>
+              <a:ext uri="{FF2B5EF4-FFF2-40B4-BE49-F238E27FC236}">
+                <a16:creationId xmlns:a16="http://schemas.microsoft.com/office/drawing/2014/main" id="{2FC0DE1A-89D5-C450-F6D0-94030FDC9BD2}"/>
+              </a:ext>
+            </a:extLst>
+          </p:cNvPr>
+          <p:cNvSpPr>
+            <a:spLocks noGrp="1"/>
+          </p:cNvSpPr>
+          <p:nvPr>
+            <p:ph idx="1"/>
+          </p:nvPr>
+        </p:nvSpPr>
+        <p:spPr>
+          <a:xfrm>
+            <a:off x="2589212" y="1615858"/>
+            <a:ext cx="8915400" cy="4295364"/>
+          </a:xfrm>
+        </p:spPr>
+        <p:txBody>
+          <a:bodyPr/>
+          <a:lstStyle/>
+          <a:p>
+            <a:r>
+              <a:rPr lang="en-US" sz="2400" dirty="0"/>
+              <a:t>Create topics with one or more subscriptions for Pub/Sub pattern</a:t>
+            </a:r>
+          </a:p>
+          <a:p>
+            <a:r>
+              <a:rPr lang="en-US" sz="2400" dirty="0"/>
+              <a:t>Can handle dead-letter messaging</a:t>
+            </a:r>
+          </a:p>
+          <a:p>
+            <a:r>
+              <a:rPr lang="en-US" sz="2400" dirty="0"/>
+              <a:t>Filter at the subscription level to only receive messages important to the subscriber</a:t>
+            </a:r>
+          </a:p>
+          <a:p>
+            <a:r>
+              <a:rPr lang="en-US" sz="2400" dirty="0"/>
+              <a:t>Subscriptions act as a virtual queue with copies of the messages</a:t>
+            </a:r>
+          </a:p>
+          <a:p>
+            <a:r>
+              <a:rPr lang="en-US" sz="2400" dirty="0"/>
+              <a:t>All the same benefits of a queue but can be leveraged through multiple filtered subscriptions</a:t>
+            </a:r>
+          </a:p>
+          <a:p>
+            <a:pPr marL="0" indent="0">
+              <a:buNone/>
+            </a:pPr>
+            <a:endParaRPr lang="en-US" dirty="0"/>
+          </a:p>
+          <a:p>
+            <a:endParaRPr lang="en-US" dirty="0"/>
+          </a:p>
+          <a:p>
+            <a:endParaRPr lang="en-US" dirty="0"/>
+          </a:p>
+        </p:txBody>
+      </p:sp>
+    </p:spTree>
+    <p:extLst>
+      <p:ext uri="{BB962C8B-B14F-4D97-AF65-F5344CB8AC3E}">
+        <p14:creationId xmlns:p14="http://schemas.microsoft.com/office/powerpoint/2010/main" val="3662393117"/>
+      </p:ext>
+    </p:extLst>
+  </p:cSld>
+  <p:clrMapOvr>
+    <a:masterClrMapping/>
+  </p:clrMapOvr>
+</p:sld>
+</file>
+
+<file path=ppt/slides/slide27.xml><?xml version="1.0" encoding="utf-8"?>
+<p:sld xmlns:a="http://schemas.openxmlformats.org/drawingml/2006/main" xmlns:r="http://schemas.openxmlformats.org/officeDocument/2006/relationships" xmlns:p="http://schemas.openxmlformats.org/presentationml/2006/main">
+  <p:cSld>
+    <p:spTree>
+      <p:nvGrpSpPr>
+        <p:cNvPr id="1" name=""/>
+        <p:cNvGrpSpPr/>
+        <p:nvPr/>
+      </p:nvGrpSpPr>
+      <p:grpSpPr>
+        <a:xfrm>
+          <a:off x="0" y="0"/>
+          <a:ext cx="0" cy="0"/>
+          <a:chOff x="0" y="0"/>
+          <a:chExt cx="0" cy="0"/>
+        </a:xfrm>
+      </p:grpSpPr>
+      <p:sp>
+        <p:nvSpPr>
+          <p:cNvPr id="2" name="Title 1">
+            <a:extLst>
+              <a:ext uri="{FF2B5EF4-FFF2-40B4-BE49-F238E27FC236}">
+                <a16:creationId xmlns:a16="http://schemas.microsoft.com/office/drawing/2014/main" id="{42820365-0C4B-7C8C-79A1-1538537E5F91}"/>
+              </a:ext>
+            </a:extLst>
+          </p:cNvPr>
+          <p:cNvSpPr>
+            <a:spLocks noGrp="1"/>
+          </p:cNvSpPr>
+          <p:nvPr>
+            <p:ph type="title"/>
+          </p:nvPr>
+        </p:nvSpPr>
+        <p:spPr/>
+        <p:txBody>
+          <a:bodyPr/>
+          <a:lstStyle/>
+          <a:p>
+            <a:r>
+              <a:rPr lang="en-US" dirty="0"/>
+              <a:t>Service Bus Pub/Sub cont.</a:t>
+            </a:r>
+          </a:p>
+        </p:txBody>
+      </p:sp>
+      <p:sp>
+        <p:nvSpPr>
+          <p:cNvPr id="3" name="Content Placeholder 2">
+            <a:extLst>
+              <a:ext uri="{FF2B5EF4-FFF2-40B4-BE49-F238E27FC236}">
+                <a16:creationId xmlns:a16="http://schemas.microsoft.com/office/drawing/2014/main" id="{CF5138A8-E086-11BE-895C-926370A74C4A}"/>
+              </a:ext>
+            </a:extLst>
+          </p:cNvPr>
+          <p:cNvSpPr>
+            <a:spLocks noGrp="1"/>
+          </p:cNvSpPr>
+          <p:nvPr>
+            <p:ph idx="1"/>
+          </p:nvPr>
+        </p:nvSpPr>
+        <p:spPr>
+          <a:xfrm>
+            <a:off x="2589212" y="1441100"/>
+            <a:ext cx="8915400" cy="5107184"/>
+          </a:xfrm>
+        </p:spPr>
+        <p:txBody>
+          <a:bodyPr>
+            <a:normAutofit fontScale="92500" lnSpcReduction="20000"/>
+          </a:bodyPr>
+          <a:lstStyle/>
+          <a:p>
+            <a:r>
+              <a:rPr lang="en-US" sz="2400" dirty="0"/>
+              <a:t>Leverage both system properties and custom user-defined fields</a:t>
+            </a:r>
+          </a:p>
+          <a:p>
+            <a:r>
+              <a:rPr lang="en-US" sz="2400" dirty="0"/>
+              <a:t>Filter actions with filter expressions</a:t>
+            </a:r>
+          </a:p>
+          <a:p>
+            <a:pPr lvl="1"/>
+            <a:r>
+              <a:rPr lang="en-US" sz="2000" dirty="0"/>
+              <a:t>SQL Filter (exists, IS NULL, AND/OR/NOT)</a:t>
+            </a:r>
+          </a:p>
+          <a:p>
+            <a:pPr lvl="1"/>
+            <a:r>
+              <a:rPr lang="en-US" sz="2000" dirty="0"/>
+              <a:t>Boolean Filter (</a:t>
+            </a:r>
+            <a:r>
+              <a:rPr lang="en-US" sz="2000" dirty="0" err="1"/>
+              <a:t>TrueFilter</a:t>
+            </a:r>
+            <a:r>
+              <a:rPr lang="en-US" sz="2000" dirty="0"/>
+              <a:t> or </a:t>
+            </a:r>
+            <a:r>
+              <a:rPr lang="en-US" sz="2000" dirty="0" err="1"/>
+              <a:t>FalseFilter</a:t>
+            </a:r>
+            <a:r>
+              <a:rPr lang="en-US" sz="2000" dirty="0"/>
+              <a:t>)</a:t>
+            </a:r>
+          </a:p>
+          <a:p>
+            <a:pPr lvl="1"/>
+            <a:r>
+              <a:rPr lang="en-US" sz="2000" dirty="0"/>
+              <a:t>Correlation filter </a:t>
+            </a:r>
+          </a:p>
+          <a:p>
+            <a:pPr lvl="2"/>
+            <a:r>
+              <a:rPr lang="en-US" sz="1800" dirty="0"/>
+              <a:t>Correlation Id</a:t>
+            </a:r>
+          </a:p>
+          <a:p>
+            <a:pPr lvl="2"/>
+            <a:r>
+              <a:rPr lang="en-US" sz="1800" dirty="0" err="1"/>
+              <a:t>ContentType</a:t>
+            </a:r>
+            <a:endParaRPr lang="en-US" sz="1800" dirty="0"/>
+          </a:p>
+          <a:p>
+            <a:pPr lvl="2"/>
+            <a:r>
+              <a:rPr lang="en-US" sz="1800" dirty="0"/>
+              <a:t>Label</a:t>
+            </a:r>
+          </a:p>
+          <a:p>
+            <a:pPr lvl="2"/>
+            <a:r>
+              <a:rPr lang="en-US" sz="1800" dirty="0" err="1"/>
+              <a:t>MessageId</a:t>
+            </a:r>
+            <a:endParaRPr lang="en-US" sz="1800" dirty="0"/>
+          </a:p>
+          <a:p>
+            <a:pPr lvl="2"/>
+            <a:r>
+              <a:rPr lang="en-US" sz="1800" dirty="0" err="1"/>
+              <a:t>ReplyTo</a:t>
+            </a:r>
+            <a:r>
+              <a:rPr lang="en-US" sz="1800" dirty="0"/>
+              <a:t>/</a:t>
+            </a:r>
+            <a:r>
+              <a:rPr lang="en-US" sz="1800" dirty="0" err="1"/>
+              <a:t>ReplyToSessionId</a:t>
+            </a:r>
+            <a:endParaRPr lang="en-US" sz="1800" dirty="0"/>
+          </a:p>
+          <a:p>
+            <a:pPr lvl="2"/>
+            <a:r>
+              <a:rPr lang="en-US" sz="1800" dirty="0" err="1"/>
+              <a:t>SessionId</a:t>
+            </a:r>
+            <a:endParaRPr lang="en-US" sz="1800" dirty="0"/>
+          </a:p>
+          <a:p>
+            <a:pPr lvl="2"/>
+            <a:r>
+              <a:rPr lang="en-US" sz="1800" dirty="0"/>
+              <a:t>To</a:t>
+            </a:r>
+          </a:p>
+          <a:p>
+            <a:pPr lvl="2"/>
+            <a:r>
+              <a:rPr lang="en-US" sz="1800" dirty="0"/>
+              <a:t>Any user-defined properties</a:t>
+            </a:r>
+          </a:p>
+        </p:txBody>
+      </p:sp>
+    </p:spTree>
+    <p:extLst>
+      <p:ext uri="{BB962C8B-B14F-4D97-AF65-F5344CB8AC3E}">
+        <p14:creationId xmlns:p14="http://schemas.microsoft.com/office/powerpoint/2010/main" val="2000262289"/>
+      </p:ext>
+    </p:extLst>
+  </p:cSld>
+  <p:clrMapOvr>
+    <a:masterClrMapping/>
+  </p:clrMapOvr>
+</p:sld>
+</file>
+
+<file path=ppt/slides/slide28.xml><?xml version="1.0" encoding="utf-8"?>
+<p:sld xmlns:a="http://schemas.openxmlformats.org/drawingml/2006/main" xmlns:r="http://schemas.openxmlformats.org/officeDocument/2006/relationships" xmlns:p="http://schemas.openxmlformats.org/presentationml/2006/main">
+  <p:cSld>
+    <p:spTree>
+      <p:nvGrpSpPr>
+        <p:cNvPr id="1" name=""/>
+        <p:cNvGrpSpPr/>
+        <p:nvPr/>
+      </p:nvGrpSpPr>
+      <p:grpSpPr>
+        <a:xfrm>
+          <a:off x="0" y="0"/>
+          <a:ext cx="0" cy="0"/>
+          <a:chOff x="0" y="0"/>
+          <a:chExt cx="0" cy="0"/>
+        </a:xfrm>
+      </p:grpSpPr>
+      <p:sp>
+        <p:nvSpPr>
           <p:cNvPr id="2" name="Title 1">
             <a:extLst>
               <a:ext uri="{FF2B5EF4-FFF2-40B4-BE49-F238E27FC236}">
@@ -15801,7 +16836,7 @@
 </p:sld>
 </file>
 
-<file path=ppt/slides/slide27.xml><?xml version="1.0" encoding="utf-8"?>
+<file path=ppt/slides/slide29.xml><?xml version="1.0" encoding="utf-8"?>
 <p:sld xmlns:a="http://schemas.openxmlformats.org/drawingml/2006/main" xmlns:r="http://schemas.openxmlformats.org/officeDocument/2006/relationships" xmlns:p="http://schemas.openxmlformats.org/presentationml/2006/main">
   <p:cSld>
     <p:spTree>
@@ -15924,178 +16959,6 @@
 </p:sld>
 </file>
 
-<file path=ppt/slides/slide28.xml><?xml version="1.0" encoding="utf-8"?>
-<p:sld xmlns:a="http://schemas.openxmlformats.org/drawingml/2006/main" xmlns:r="http://schemas.openxmlformats.org/officeDocument/2006/relationships" xmlns:p="http://schemas.openxmlformats.org/presentationml/2006/main">
-  <p:cSld>
-    <p:spTree>
-      <p:nvGrpSpPr>
-        <p:cNvPr id="1" name=""/>
-        <p:cNvGrpSpPr/>
-        <p:nvPr/>
-      </p:nvGrpSpPr>
-      <p:grpSpPr>
-        <a:xfrm>
-          <a:off x="0" y="0"/>
-          <a:ext cx="0" cy="0"/>
-          <a:chOff x="0" y="0"/>
-          <a:chExt cx="0" cy="0"/>
-        </a:xfrm>
-      </p:grpSpPr>
-      <p:sp>
-        <p:nvSpPr>
-          <p:cNvPr id="2" name="Title 1">
-            <a:extLst>
-              <a:ext uri="{FF2B5EF4-FFF2-40B4-BE49-F238E27FC236}">
-                <a16:creationId xmlns:a16="http://schemas.microsoft.com/office/drawing/2014/main" id="{8B10B72A-E8EE-E103-3BAB-B209FBF0E099}"/>
-              </a:ext>
-            </a:extLst>
-          </p:cNvPr>
-          <p:cNvSpPr>
-            <a:spLocks noGrp="1"/>
-          </p:cNvSpPr>
-          <p:nvPr>
-            <p:ph type="title"/>
-          </p:nvPr>
-        </p:nvSpPr>
-        <p:spPr/>
-        <p:txBody>
-          <a:bodyPr/>
-          <a:lstStyle/>
-          <a:p>
-            <a:r>
-              <a:rPr lang="en-US" dirty="0"/>
-              <a:t>Publishing and Subscribing to messages</a:t>
-            </a:r>
-          </a:p>
-        </p:txBody>
-      </p:sp>
-      <p:sp>
-        <p:nvSpPr>
-          <p:cNvPr id="3" name="Text Placeholder 2">
-            <a:extLst>
-              <a:ext uri="{FF2B5EF4-FFF2-40B4-BE49-F238E27FC236}">
-                <a16:creationId xmlns:a16="http://schemas.microsoft.com/office/drawing/2014/main" id="{862566A3-198E-5B8A-39BA-0D758BDFB39F}"/>
-              </a:ext>
-            </a:extLst>
-          </p:cNvPr>
-          <p:cNvSpPr>
-            <a:spLocks noGrp="1"/>
-          </p:cNvSpPr>
-          <p:nvPr>
-            <p:ph type="body" idx="1"/>
-          </p:nvPr>
-        </p:nvSpPr>
-        <p:spPr/>
-        <p:txBody>
-          <a:bodyPr/>
-          <a:lstStyle/>
-          <a:p>
-            <a:r>
-              <a:rPr lang="en-US" dirty="0"/>
-              <a:t>Azure Service Bus messaging</a:t>
-            </a:r>
-          </a:p>
-        </p:txBody>
-      </p:sp>
-    </p:spTree>
-    <p:extLst>
-      <p:ext uri="{BB962C8B-B14F-4D97-AF65-F5344CB8AC3E}">
-        <p14:creationId xmlns:p14="http://schemas.microsoft.com/office/powerpoint/2010/main" val="3085507398"/>
-      </p:ext>
-    </p:extLst>
-  </p:cSld>
-  <p:clrMapOvr>
-    <a:masterClrMapping/>
-  </p:clrMapOvr>
-</p:sld>
-</file>
-
-<file path=ppt/slides/slide29.xml><?xml version="1.0" encoding="utf-8"?>
-<p:sld xmlns:a="http://schemas.openxmlformats.org/drawingml/2006/main" xmlns:r="http://schemas.openxmlformats.org/officeDocument/2006/relationships" xmlns:p="http://schemas.openxmlformats.org/presentationml/2006/main">
-  <p:cSld>
-    <p:spTree>
-      <p:nvGrpSpPr>
-        <p:cNvPr id="1" name=""/>
-        <p:cNvGrpSpPr/>
-        <p:nvPr/>
-      </p:nvGrpSpPr>
-      <p:grpSpPr>
-        <a:xfrm>
-          <a:off x="0" y="0"/>
-          <a:ext cx="0" cy="0"/>
-          <a:chOff x="0" y="0"/>
-          <a:chExt cx="0" cy="0"/>
-        </a:xfrm>
-      </p:grpSpPr>
-      <p:sp>
-        <p:nvSpPr>
-          <p:cNvPr id="2" name="Title 1">
-            <a:extLst>
-              <a:ext uri="{FF2B5EF4-FFF2-40B4-BE49-F238E27FC236}">
-                <a16:creationId xmlns:a16="http://schemas.microsoft.com/office/drawing/2014/main" id="{74C9854A-991D-BE1C-55DF-59ED46CF396C}"/>
-              </a:ext>
-            </a:extLst>
-          </p:cNvPr>
-          <p:cNvSpPr>
-            <a:spLocks noGrp="1"/>
-          </p:cNvSpPr>
-          <p:nvPr>
-            <p:ph type="title"/>
-          </p:nvPr>
-        </p:nvSpPr>
-        <p:spPr/>
-        <p:txBody>
-          <a:bodyPr/>
-          <a:lstStyle/>
-          <a:p>
-            <a:r>
-              <a:rPr lang="en-US" dirty="0"/>
-              <a:t>Azure Storage Queue</a:t>
-            </a:r>
-          </a:p>
-        </p:txBody>
-      </p:sp>
-      <p:sp>
-        <p:nvSpPr>
-          <p:cNvPr id="3" name="Text Placeholder 2">
-            <a:extLst>
-              <a:ext uri="{FF2B5EF4-FFF2-40B4-BE49-F238E27FC236}">
-                <a16:creationId xmlns:a16="http://schemas.microsoft.com/office/drawing/2014/main" id="{DC18811A-0EF0-BA29-A195-9468A42C4AF8}"/>
-              </a:ext>
-            </a:extLst>
-          </p:cNvPr>
-          <p:cNvSpPr>
-            <a:spLocks noGrp="1"/>
-          </p:cNvSpPr>
-          <p:nvPr>
-            <p:ph type="body" idx="1"/>
-          </p:nvPr>
-        </p:nvSpPr>
-        <p:spPr/>
-        <p:txBody>
-          <a:bodyPr/>
-          <a:lstStyle/>
-          <a:p>
-            <a:r>
-              <a:rPr lang="en-US" dirty="0"/>
-              <a:t>A messaging solution that is mostly a queue</a:t>
-            </a:r>
-          </a:p>
-        </p:txBody>
-      </p:sp>
-    </p:spTree>
-    <p:extLst>
-      <p:ext uri="{BB962C8B-B14F-4D97-AF65-F5344CB8AC3E}">
-        <p14:creationId xmlns:p14="http://schemas.microsoft.com/office/powerpoint/2010/main" val="936172737"/>
-      </p:ext>
-    </p:extLst>
-  </p:cSld>
-  <p:clrMapOvr>
-    <a:masterClrMapping/>
-  </p:clrMapOvr>
-</p:sld>
-</file>
-
 <file path=ppt/slides/slide3.xml><?xml version="1.0" encoding="utf-8"?>
 <p:sld xmlns:a="http://schemas.openxmlformats.org/drawingml/2006/main" xmlns:r="http://schemas.openxmlformats.org/officeDocument/2006/relationships" xmlns:p="http://schemas.openxmlformats.org/presentationml/2006/main">
   <p:cSld>
@@ -16166,14 +17029,14 @@
             <a:pPr lvl="1"/>
             <a:r>
               <a:rPr lang="en-US" dirty="0"/>
-              <a:t>Event Hubs</a:t>
+              <a:t>Event Hubs [&amp; namespaces]</a:t>
             </a:r>
           </a:p>
           <a:p>
             <a:pPr lvl="1"/>
             <a:r>
               <a:rPr lang="en-US" dirty="0"/>
-              <a:t>Event Grid</a:t>
+              <a:t>Event Grid [Topics/Subscriptions]</a:t>
             </a:r>
           </a:p>
           <a:p>
@@ -16214,6 +17077,186 @@
           </a:p>
         </p:txBody>
       </p:sp>
+      <p:pic>
+        <p:nvPicPr>
+          <p:cNvPr id="5" name="Graphic 4">
+            <a:extLst>
+              <a:ext uri="{FF2B5EF4-FFF2-40B4-BE49-F238E27FC236}">
+                <a16:creationId xmlns:a16="http://schemas.microsoft.com/office/drawing/2014/main" id="{A179578F-A05A-0CAD-CE89-5262BF79C5A2}"/>
+              </a:ext>
+            </a:extLst>
+          </p:cNvPr>
+          <p:cNvPicPr>
+            <a:picLocks noChangeAspect="1"/>
+          </p:cNvPicPr>
+          <p:nvPr/>
+        </p:nvPicPr>
+        <p:blipFill>
+          <a:blip r:embed="rId3">
+            <a:extLst>
+              <a:ext uri="{96DAC541-7B7A-43D3-8B79-37D633B846F1}">
+                <asvg:svgBlip xmlns:asvg="http://schemas.microsoft.com/office/drawing/2016/SVG/main" r:embed="rId4"/>
+              </a:ext>
+            </a:extLst>
+          </a:blip>
+          <a:stretch>
+            <a:fillRect/>
+          </a:stretch>
+        </p:blipFill>
+        <p:spPr>
+          <a:xfrm>
+            <a:off x="7115014" y="3475330"/>
+            <a:ext cx="1477671" cy="1477671"/>
+          </a:xfrm>
+          <a:prstGeom prst="rect">
+            <a:avLst/>
+          </a:prstGeom>
+        </p:spPr>
+      </p:pic>
+      <p:pic>
+        <p:nvPicPr>
+          <p:cNvPr id="7" name="Graphic 6">
+            <a:extLst>
+              <a:ext uri="{FF2B5EF4-FFF2-40B4-BE49-F238E27FC236}">
+                <a16:creationId xmlns:a16="http://schemas.microsoft.com/office/drawing/2014/main" id="{5E220884-27BB-E46C-935B-50F710C74CE6}"/>
+              </a:ext>
+            </a:extLst>
+          </p:cNvPr>
+          <p:cNvPicPr>
+            <a:picLocks noChangeAspect="1"/>
+          </p:cNvPicPr>
+          <p:nvPr/>
+        </p:nvPicPr>
+        <p:blipFill>
+          <a:blip r:embed="rId5">
+            <a:extLst>
+              <a:ext uri="{96DAC541-7B7A-43D3-8B79-37D633B846F1}">
+                <asvg:svgBlip xmlns:asvg="http://schemas.microsoft.com/office/drawing/2016/SVG/main" r:embed="rId6"/>
+              </a:ext>
+            </a:extLst>
+          </a:blip>
+          <a:stretch>
+            <a:fillRect/>
+          </a:stretch>
+        </p:blipFill>
+        <p:spPr>
+          <a:xfrm>
+            <a:off x="8863952" y="1951329"/>
+            <a:ext cx="1477671" cy="1477671"/>
+          </a:xfrm>
+          <a:prstGeom prst="rect">
+            <a:avLst/>
+          </a:prstGeom>
+        </p:spPr>
+      </p:pic>
+      <p:pic>
+        <p:nvPicPr>
+          <p:cNvPr id="9" name="Graphic 8">
+            <a:extLst>
+              <a:ext uri="{FF2B5EF4-FFF2-40B4-BE49-F238E27FC236}">
+                <a16:creationId xmlns:a16="http://schemas.microsoft.com/office/drawing/2014/main" id="{721D6C0A-095F-049D-3095-E9F8D65A4F94}"/>
+              </a:ext>
+            </a:extLst>
+          </p:cNvPr>
+          <p:cNvPicPr>
+            <a:picLocks noChangeAspect="1"/>
+          </p:cNvPicPr>
+          <p:nvPr/>
+        </p:nvPicPr>
+        <p:blipFill>
+          <a:blip r:embed="rId7">
+            <a:extLst>
+              <a:ext uri="{96DAC541-7B7A-43D3-8B79-37D633B846F1}">
+                <asvg:svgBlip xmlns:asvg="http://schemas.microsoft.com/office/drawing/2016/SVG/main" r:embed="rId8"/>
+              </a:ext>
+            </a:extLst>
+          </a:blip>
+          <a:stretch>
+            <a:fillRect/>
+          </a:stretch>
+        </p:blipFill>
+        <p:spPr>
+          <a:xfrm>
+            <a:off x="7115014" y="1935538"/>
+            <a:ext cx="1477671" cy="1477671"/>
+          </a:xfrm>
+          <a:prstGeom prst="rect">
+            <a:avLst/>
+          </a:prstGeom>
+        </p:spPr>
+      </p:pic>
+      <p:pic>
+        <p:nvPicPr>
+          <p:cNvPr id="13" name="Graphic 12">
+            <a:extLst>
+              <a:ext uri="{FF2B5EF4-FFF2-40B4-BE49-F238E27FC236}">
+                <a16:creationId xmlns:a16="http://schemas.microsoft.com/office/drawing/2014/main" id="{35849424-961D-F788-031F-41F6D9B964B7}"/>
+              </a:ext>
+            </a:extLst>
+          </p:cNvPr>
+          <p:cNvPicPr>
+            <a:picLocks noChangeAspect="1"/>
+          </p:cNvPicPr>
+          <p:nvPr/>
+        </p:nvPicPr>
+        <p:blipFill>
+          <a:blip r:embed="rId9">
+            <a:extLst>
+              <a:ext uri="{96DAC541-7B7A-43D3-8B79-37D633B846F1}">
+                <asvg:svgBlip xmlns:asvg="http://schemas.microsoft.com/office/drawing/2016/SVG/main" r:embed="rId10"/>
+              </a:ext>
+            </a:extLst>
+          </a:blip>
+          <a:stretch>
+            <a:fillRect/>
+          </a:stretch>
+        </p:blipFill>
+        <p:spPr>
+          <a:xfrm>
+            <a:off x="7115015" y="386019"/>
+            <a:ext cx="1477671" cy="1477671"/>
+          </a:xfrm>
+          <a:prstGeom prst="rect">
+            <a:avLst/>
+          </a:prstGeom>
+        </p:spPr>
+      </p:pic>
+      <p:pic>
+        <p:nvPicPr>
+          <p:cNvPr id="21" name="Graphic 20">
+            <a:extLst>
+              <a:ext uri="{FF2B5EF4-FFF2-40B4-BE49-F238E27FC236}">
+                <a16:creationId xmlns:a16="http://schemas.microsoft.com/office/drawing/2014/main" id="{8082B162-5861-BA0D-4DFC-99A7698AC067}"/>
+              </a:ext>
+            </a:extLst>
+          </p:cNvPr>
+          <p:cNvPicPr>
+            <a:picLocks noChangeAspect="1"/>
+          </p:cNvPicPr>
+          <p:nvPr/>
+        </p:nvPicPr>
+        <p:blipFill>
+          <a:blip r:embed="rId11">
+            <a:extLst>
+              <a:ext uri="{96DAC541-7B7A-43D3-8B79-37D633B846F1}">
+                <asvg:svgBlip xmlns:asvg="http://schemas.microsoft.com/office/drawing/2016/SVG/main" r:embed="rId12"/>
+              </a:ext>
+            </a:extLst>
+          </a:blip>
+          <a:stretch>
+            <a:fillRect/>
+          </a:stretch>
+        </p:blipFill>
+        <p:spPr>
+          <a:xfrm>
+            <a:off x="7046912" y="4953001"/>
+            <a:ext cx="1477671" cy="1477671"/>
+          </a:xfrm>
+          <a:prstGeom prst="rect">
+            <a:avLst/>
+          </a:prstGeom>
+        </p:spPr>
+      </p:pic>
     </p:spTree>
     <p:extLst>
       <p:ext uri="{BB962C8B-B14F-4D97-AF65-F5344CB8AC3E}">
@@ -16246,6 +17289,178 @@
       </p:grpSpPr>
       <p:sp>
         <p:nvSpPr>
+          <p:cNvPr id="2" name="Title 1">
+            <a:extLst>
+              <a:ext uri="{FF2B5EF4-FFF2-40B4-BE49-F238E27FC236}">
+                <a16:creationId xmlns:a16="http://schemas.microsoft.com/office/drawing/2014/main" id="{8B10B72A-E8EE-E103-3BAB-B209FBF0E099}"/>
+              </a:ext>
+            </a:extLst>
+          </p:cNvPr>
+          <p:cNvSpPr>
+            <a:spLocks noGrp="1"/>
+          </p:cNvSpPr>
+          <p:nvPr>
+            <p:ph type="title"/>
+          </p:nvPr>
+        </p:nvSpPr>
+        <p:spPr/>
+        <p:txBody>
+          <a:bodyPr/>
+          <a:lstStyle/>
+          <a:p>
+            <a:r>
+              <a:rPr lang="en-US" dirty="0"/>
+              <a:t>Publishing and Subscribing to messages</a:t>
+            </a:r>
+          </a:p>
+        </p:txBody>
+      </p:sp>
+      <p:sp>
+        <p:nvSpPr>
+          <p:cNvPr id="3" name="Text Placeholder 2">
+            <a:extLst>
+              <a:ext uri="{FF2B5EF4-FFF2-40B4-BE49-F238E27FC236}">
+                <a16:creationId xmlns:a16="http://schemas.microsoft.com/office/drawing/2014/main" id="{862566A3-198E-5B8A-39BA-0D758BDFB39F}"/>
+              </a:ext>
+            </a:extLst>
+          </p:cNvPr>
+          <p:cNvSpPr>
+            <a:spLocks noGrp="1"/>
+          </p:cNvSpPr>
+          <p:nvPr>
+            <p:ph type="body" idx="1"/>
+          </p:nvPr>
+        </p:nvSpPr>
+        <p:spPr/>
+        <p:txBody>
+          <a:bodyPr/>
+          <a:lstStyle/>
+          <a:p>
+            <a:r>
+              <a:rPr lang="en-US" dirty="0"/>
+              <a:t>Azure Service Bus messaging</a:t>
+            </a:r>
+          </a:p>
+        </p:txBody>
+      </p:sp>
+    </p:spTree>
+    <p:extLst>
+      <p:ext uri="{BB962C8B-B14F-4D97-AF65-F5344CB8AC3E}">
+        <p14:creationId xmlns:p14="http://schemas.microsoft.com/office/powerpoint/2010/main" val="3085507398"/>
+      </p:ext>
+    </p:extLst>
+  </p:cSld>
+  <p:clrMapOvr>
+    <a:masterClrMapping/>
+  </p:clrMapOvr>
+</p:sld>
+</file>
+
+<file path=ppt/slides/slide31.xml><?xml version="1.0" encoding="utf-8"?>
+<p:sld xmlns:a="http://schemas.openxmlformats.org/drawingml/2006/main" xmlns:r="http://schemas.openxmlformats.org/officeDocument/2006/relationships" xmlns:p="http://schemas.openxmlformats.org/presentationml/2006/main">
+  <p:cSld>
+    <p:spTree>
+      <p:nvGrpSpPr>
+        <p:cNvPr id="1" name=""/>
+        <p:cNvGrpSpPr/>
+        <p:nvPr/>
+      </p:nvGrpSpPr>
+      <p:grpSpPr>
+        <a:xfrm>
+          <a:off x="0" y="0"/>
+          <a:ext cx="0" cy="0"/>
+          <a:chOff x="0" y="0"/>
+          <a:chExt cx="0" cy="0"/>
+        </a:xfrm>
+      </p:grpSpPr>
+      <p:sp>
+        <p:nvSpPr>
+          <p:cNvPr id="2" name="Title 1">
+            <a:extLst>
+              <a:ext uri="{FF2B5EF4-FFF2-40B4-BE49-F238E27FC236}">
+                <a16:creationId xmlns:a16="http://schemas.microsoft.com/office/drawing/2014/main" id="{74C9854A-991D-BE1C-55DF-59ED46CF396C}"/>
+              </a:ext>
+            </a:extLst>
+          </p:cNvPr>
+          <p:cNvSpPr>
+            <a:spLocks noGrp="1"/>
+          </p:cNvSpPr>
+          <p:nvPr>
+            <p:ph type="title"/>
+          </p:nvPr>
+        </p:nvSpPr>
+        <p:spPr/>
+        <p:txBody>
+          <a:bodyPr/>
+          <a:lstStyle/>
+          <a:p>
+            <a:r>
+              <a:rPr lang="en-US" dirty="0"/>
+              <a:t>Azure Storage Queue</a:t>
+            </a:r>
+          </a:p>
+        </p:txBody>
+      </p:sp>
+      <p:sp>
+        <p:nvSpPr>
+          <p:cNvPr id="3" name="Text Placeholder 2">
+            <a:extLst>
+              <a:ext uri="{FF2B5EF4-FFF2-40B4-BE49-F238E27FC236}">
+                <a16:creationId xmlns:a16="http://schemas.microsoft.com/office/drawing/2014/main" id="{DC18811A-0EF0-BA29-A195-9468A42C4AF8}"/>
+              </a:ext>
+            </a:extLst>
+          </p:cNvPr>
+          <p:cNvSpPr>
+            <a:spLocks noGrp="1"/>
+          </p:cNvSpPr>
+          <p:nvPr>
+            <p:ph type="body" idx="1"/>
+          </p:nvPr>
+        </p:nvSpPr>
+        <p:spPr/>
+        <p:txBody>
+          <a:bodyPr/>
+          <a:lstStyle/>
+          <a:p>
+            <a:r>
+              <a:rPr lang="en-US" dirty="0"/>
+              <a:t>A messaging solution that is mostly a queue</a:t>
+            </a:r>
+          </a:p>
+        </p:txBody>
+      </p:sp>
+    </p:spTree>
+    <p:extLst>
+      <p:ext uri="{BB962C8B-B14F-4D97-AF65-F5344CB8AC3E}">
+        <p14:creationId xmlns:p14="http://schemas.microsoft.com/office/powerpoint/2010/main" val="936172737"/>
+      </p:ext>
+    </p:extLst>
+  </p:cSld>
+  <p:clrMapOvr>
+    <a:masterClrMapping/>
+  </p:clrMapOvr>
+</p:sld>
+</file>
+
+<file path=ppt/slides/slide32.xml><?xml version="1.0" encoding="utf-8"?>
+<p:sld xmlns:a="http://schemas.openxmlformats.org/drawingml/2006/main" xmlns:r="http://schemas.openxmlformats.org/officeDocument/2006/relationships" xmlns:p="http://schemas.openxmlformats.org/presentationml/2006/main">
+  <p:cSld>
+    <p:spTree>
+      <p:nvGrpSpPr>
+        <p:cNvPr id="1" name=""/>
+        <p:cNvGrpSpPr/>
+        <p:nvPr/>
+      </p:nvGrpSpPr>
+      <p:grpSpPr>
+        <a:xfrm>
+          <a:off x="0" y="0"/>
+          <a:ext cx="0" cy="0"/>
+          <a:chOff x="0" y="0"/>
+          <a:chExt cx="0" cy="0"/>
+        </a:xfrm>
+      </p:grpSpPr>
+      <p:sp>
+        <p:nvSpPr>
           <p:cNvPr id="4" name="Title 3">
             <a:extLst>
               <a:ext uri="{FF2B5EF4-FFF2-40B4-BE49-F238E27FC236}">
@@ -16350,7 +17565,7 @@
 </p:sld>
 </file>
 
-<file path=ppt/slides/slide31.xml><?xml version="1.0" encoding="utf-8"?>
+<file path=ppt/slides/slide33.xml><?xml version="1.0" encoding="utf-8"?>
 <p:sld xmlns:a="http://schemas.openxmlformats.org/drawingml/2006/main" xmlns:r="http://schemas.openxmlformats.org/officeDocument/2006/relationships" xmlns:p="http://schemas.openxmlformats.org/presentationml/2006/main">
   <p:cSld>
     <p:spTree>
@@ -16473,7 +17688,7 @@
 </p:sld>
 </file>
 
-<file path=ppt/slides/slide32.xml><?xml version="1.0" encoding="utf-8"?>
+<file path=ppt/slides/slide34.xml><?xml version="1.0" encoding="utf-8"?>
 <p:sld xmlns:a="http://schemas.openxmlformats.org/drawingml/2006/main" xmlns:r="http://schemas.openxmlformats.org/officeDocument/2006/relationships" xmlns:p="http://schemas.openxmlformats.org/presentationml/2006/main">
   <p:cSld>
     <p:spTree>
@@ -16559,7 +17774,7 @@
 </p:sld>
 </file>
 
-<file path=ppt/slides/slide33.xml><?xml version="1.0" encoding="utf-8"?>
+<file path=ppt/slides/slide35.xml><?xml version="1.0" encoding="utf-8"?>
 <p:sld xmlns:a="http://schemas.openxmlformats.org/drawingml/2006/main" xmlns:r="http://schemas.openxmlformats.org/officeDocument/2006/relationships" xmlns:p="http://schemas.openxmlformats.org/presentationml/2006/main">
   <p:cSld>
     <p:spTree>
@@ -16669,7 +17884,7 @@
 </p:sld>
 </file>
 
-<file path=ppt/slides/slide34.xml><?xml version="1.0" encoding="utf-8"?>
+<file path=ppt/slides/slide36.xml><?xml version="1.0" encoding="utf-8"?>
 <p:sld xmlns:a="http://schemas.openxmlformats.org/drawingml/2006/main" xmlns:r="http://schemas.openxmlformats.org/officeDocument/2006/relationships" xmlns:p="http://schemas.openxmlformats.org/presentationml/2006/main">
   <p:cSld>
     <p:bg>
@@ -19367,7 +20582,7 @@
 </p:sld>
 </file>
 
-<file path=ppt/slides/slide35.xml><?xml version="1.0" encoding="utf-8"?>
+<file path=ppt/slides/slide37.xml><?xml version="1.0" encoding="utf-8"?>
 <p:sld xmlns:a="http://schemas.openxmlformats.org/drawingml/2006/main" xmlns:r="http://schemas.openxmlformats.org/officeDocument/2006/relationships" xmlns:p="http://schemas.openxmlformats.org/presentationml/2006/main">
   <p:cSld>
     <p:spTree>
@@ -19693,6 +20908,42 @@
           </a:p>
         </p:txBody>
       </p:sp>
+      <p:pic>
+        <p:nvPicPr>
+          <p:cNvPr id="6" name="Graphic 5">
+            <a:extLst>
+              <a:ext uri="{FF2B5EF4-FFF2-40B4-BE49-F238E27FC236}">
+                <a16:creationId xmlns:a16="http://schemas.microsoft.com/office/drawing/2014/main" id="{BD733E8E-FA35-14A3-4D9A-564B9E53240C}"/>
+              </a:ext>
+            </a:extLst>
+          </p:cNvPr>
+          <p:cNvPicPr>
+            <a:picLocks noChangeAspect="1"/>
+          </p:cNvPicPr>
+          <p:nvPr/>
+        </p:nvPicPr>
+        <p:blipFill>
+          <a:blip r:embed="rId2">
+            <a:extLst>
+              <a:ext uri="{96DAC541-7B7A-43D3-8B79-37D633B846F1}">
+                <asvg:svgBlip xmlns:asvg="http://schemas.microsoft.com/office/drawing/2016/SVG/main" r:embed="rId3"/>
+              </a:ext>
+            </a:extLst>
+          </a:blip>
+          <a:stretch>
+            <a:fillRect/>
+          </a:stretch>
+        </p:blipFill>
+        <p:spPr>
+          <a:xfrm>
+            <a:off x="8457118" y="0"/>
+            <a:ext cx="3419065" cy="3419065"/>
+          </a:xfrm>
+          <a:prstGeom prst="rect">
+            <a:avLst/>
+          </a:prstGeom>
+        </p:spPr>
+      </p:pic>
     </p:spTree>
     <p:extLst>
       <p:ext uri="{BB962C8B-B14F-4D97-AF65-F5344CB8AC3E}">
@@ -19854,6 +21105,42 @@
           </a:p>
         </p:txBody>
       </p:sp>
+      <p:pic>
+        <p:nvPicPr>
+          <p:cNvPr id="4" name="Graphic 3">
+            <a:extLst>
+              <a:ext uri="{FF2B5EF4-FFF2-40B4-BE49-F238E27FC236}">
+                <a16:creationId xmlns:a16="http://schemas.microsoft.com/office/drawing/2014/main" id="{9E00E6CD-2A7D-32F5-3736-C81D9F22A2F7}"/>
+              </a:ext>
+            </a:extLst>
+          </p:cNvPr>
+          <p:cNvPicPr>
+            <a:picLocks noChangeAspect="1"/>
+          </p:cNvPicPr>
+          <p:nvPr/>
+        </p:nvPicPr>
+        <p:blipFill>
+          <a:blip r:embed="rId2">
+            <a:extLst>
+              <a:ext uri="{96DAC541-7B7A-43D3-8B79-37D633B846F1}">
+                <asvg:svgBlip xmlns:asvg="http://schemas.microsoft.com/office/drawing/2016/SVG/main" r:embed="rId3"/>
+              </a:ext>
+            </a:extLst>
+          </a:blip>
+          <a:stretch>
+            <a:fillRect/>
+          </a:stretch>
+        </p:blipFill>
+        <p:spPr>
+          <a:xfrm>
+            <a:off x="10580886" y="0"/>
+            <a:ext cx="1477671" cy="1477671"/>
+          </a:xfrm>
+          <a:prstGeom prst="rect">
+            <a:avLst/>
+          </a:prstGeom>
+        </p:spPr>
+      </p:pic>
     </p:spTree>
     <p:extLst>
       <p:ext uri="{BB962C8B-B14F-4D97-AF65-F5344CB8AC3E}">
@@ -19902,7 +21189,7 @@
         </p:nvSpPr>
         <p:spPr>
           <a:xfrm>
-            <a:off x="2589212" y="5404625"/>
+            <a:off x="2338490" y="5463494"/>
             <a:ext cx="8915400" cy="566738"/>
           </a:xfrm>
         </p:spPr>
@@ -19942,7 +21229,7 @@
         </p:blipFill>
         <p:spPr>
           <a:xfrm>
-            <a:off x="2589212" y="500889"/>
+            <a:off x="2338490" y="323659"/>
             <a:ext cx="8212900" cy="4850993"/>
           </a:xfrm>
         </p:spPr>
@@ -19965,7 +21252,7 @@
         </p:nvSpPr>
         <p:spPr>
           <a:xfrm>
-            <a:off x="2589212" y="6043461"/>
+            <a:off x="2338490" y="6040629"/>
             <a:ext cx="8915400" cy="493712"/>
           </a:xfrm>
         </p:spPr>
@@ -19982,6 +21269,42 @@
           </a:p>
         </p:txBody>
       </p:sp>
+      <p:pic>
+        <p:nvPicPr>
+          <p:cNvPr id="5" name="Graphic 4">
+            <a:extLst>
+              <a:ext uri="{FF2B5EF4-FFF2-40B4-BE49-F238E27FC236}">
+                <a16:creationId xmlns:a16="http://schemas.microsoft.com/office/drawing/2014/main" id="{13C5E95C-4394-F660-58E7-B8BF56B455D1}"/>
+              </a:ext>
+            </a:extLst>
+          </p:cNvPr>
+          <p:cNvPicPr>
+            <a:picLocks noChangeAspect="1"/>
+          </p:cNvPicPr>
+          <p:nvPr/>
+        </p:nvPicPr>
+        <p:blipFill>
+          <a:blip r:embed="rId3">
+            <a:extLst>
+              <a:ext uri="{96DAC541-7B7A-43D3-8B79-37D633B846F1}">
+                <asvg:svgBlip xmlns:asvg="http://schemas.microsoft.com/office/drawing/2016/SVG/main" r:embed="rId4"/>
+              </a:ext>
+            </a:extLst>
+          </a:blip>
+          <a:stretch>
+            <a:fillRect/>
+          </a:stretch>
+        </p:blipFill>
+        <p:spPr>
+          <a:xfrm>
+            <a:off x="10714329" y="0"/>
+            <a:ext cx="1477671" cy="1477671"/>
+          </a:xfrm>
+          <a:prstGeom prst="rect">
+            <a:avLst/>
+          </a:prstGeom>
+        </p:spPr>
+      </p:pic>
     </p:spTree>
     <p:extLst>
       <p:ext uri="{BB962C8B-B14F-4D97-AF65-F5344CB8AC3E}">
@@ -20157,6 +21480,42 @@
           </a:p>
         </p:txBody>
       </p:sp>
+      <p:pic>
+        <p:nvPicPr>
+          <p:cNvPr id="4" name="Graphic 3">
+            <a:extLst>
+              <a:ext uri="{FF2B5EF4-FFF2-40B4-BE49-F238E27FC236}">
+                <a16:creationId xmlns:a16="http://schemas.microsoft.com/office/drawing/2014/main" id="{893BB07F-701A-CEBC-2AEF-D1180A3DA1C3}"/>
+              </a:ext>
+            </a:extLst>
+          </p:cNvPr>
+          <p:cNvPicPr>
+            <a:picLocks noChangeAspect="1"/>
+          </p:cNvPicPr>
+          <p:nvPr/>
+        </p:nvPicPr>
+        <p:blipFill>
+          <a:blip r:embed="rId2">
+            <a:extLst>
+              <a:ext uri="{96DAC541-7B7A-43D3-8B79-37D633B846F1}">
+                <asvg:svgBlip xmlns:asvg="http://schemas.microsoft.com/office/drawing/2016/SVG/main" r:embed="rId3"/>
+              </a:ext>
+            </a:extLst>
+          </a:blip>
+          <a:stretch>
+            <a:fillRect/>
+          </a:stretch>
+        </p:blipFill>
+        <p:spPr>
+          <a:xfrm>
+            <a:off x="10566137" y="0"/>
+            <a:ext cx="1477671" cy="1477671"/>
+          </a:xfrm>
+          <a:prstGeom prst="rect">
+            <a:avLst/>
+          </a:prstGeom>
+        </p:spPr>
+      </p:pic>
     </p:spTree>
     <p:extLst>
       <p:ext uri="{BB962C8B-B14F-4D97-AF65-F5344CB8AC3E}">
@@ -20296,6 +21655,42 @@
           </a:p>
         </p:txBody>
       </p:sp>
+      <p:pic>
+        <p:nvPicPr>
+          <p:cNvPr id="4" name="Graphic 3">
+            <a:extLst>
+              <a:ext uri="{FF2B5EF4-FFF2-40B4-BE49-F238E27FC236}">
+                <a16:creationId xmlns:a16="http://schemas.microsoft.com/office/drawing/2014/main" id="{035D2F74-0CDF-D1E8-18C7-AF4601383F00}"/>
+              </a:ext>
+            </a:extLst>
+          </p:cNvPr>
+          <p:cNvPicPr>
+            <a:picLocks noChangeAspect="1"/>
+          </p:cNvPicPr>
+          <p:nvPr/>
+        </p:nvPicPr>
+        <p:blipFill>
+          <a:blip r:embed="rId3">
+            <a:extLst>
+              <a:ext uri="{96DAC541-7B7A-43D3-8B79-37D633B846F1}">
+                <asvg:svgBlip xmlns:asvg="http://schemas.microsoft.com/office/drawing/2016/SVG/main" r:embed="rId4"/>
+              </a:ext>
+            </a:extLst>
+          </a:blip>
+          <a:stretch>
+            <a:fillRect/>
+          </a:stretch>
+        </p:blipFill>
+        <p:spPr>
+          <a:xfrm>
+            <a:off x="10551389" y="0"/>
+            <a:ext cx="1477671" cy="1477671"/>
+          </a:xfrm>
+          <a:prstGeom prst="rect">
+            <a:avLst/>
+          </a:prstGeom>
+        </p:spPr>
+      </p:pic>
     </p:spTree>
     <p:extLst>
       <p:ext uri="{BB962C8B-B14F-4D97-AF65-F5344CB8AC3E}">

</xml_diff>

<commit_message>
updated code to utilize user secrets and slides to have more info
</commit_message>
<xml_diff>
--- a/ServerlessMessagingDemystified.pptx
+++ b/ServerlessMessagingDemystified.pptx
@@ -5,7 +5,7 @@
     <p:sldMasterId id="2147483648" r:id="rId1"/>
   </p:sldMasterIdLst>
   <p:notesMasterIdLst>
-    <p:notesMasterId r:id="rId50"/>
+    <p:notesMasterId r:id="rId53"/>
   </p:notesMasterIdLst>
   <p:sldIdLst>
     <p:sldId id="256" r:id="rId2"/>
@@ -48,14 +48,17 @@
     <p:sldId id="357" r:id="rId39"/>
     <p:sldId id="358" r:id="rId40"/>
     <p:sldId id="354" r:id="rId41"/>
-    <p:sldId id="339" r:id="rId42"/>
-    <p:sldId id="342" r:id="rId43"/>
-    <p:sldId id="355" r:id="rId44"/>
-    <p:sldId id="356" r:id="rId45"/>
-    <p:sldId id="343" r:id="rId46"/>
-    <p:sldId id="328" r:id="rId47"/>
-    <p:sldId id="330" r:id="rId48"/>
-    <p:sldId id="329" r:id="rId49"/>
+    <p:sldId id="372" r:id="rId42"/>
+    <p:sldId id="374" r:id="rId43"/>
+    <p:sldId id="373" r:id="rId44"/>
+    <p:sldId id="339" r:id="rId45"/>
+    <p:sldId id="342" r:id="rId46"/>
+    <p:sldId id="355" r:id="rId47"/>
+    <p:sldId id="356" r:id="rId48"/>
+    <p:sldId id="343" r:id="rId49"/>
+    <p:sldId id="328" r:id="rId50"/>
+    <p:sldId id="330" r:id="rId51"/>
+    <p:sldId id="329" r:id="rId52"/>
   </p:sldIdLst>
   <p:sldSz cx="12192000" cy="6858000"/>
   <p:notesSz cx="6858000" cy="9144000"/>
@@ -227,6 +230,9 @@
             <p14:sldId id="357"/>
             <p14:sldId id="358"/>
             <p14:sldId id="354"/>
+            <p14:sldId id="372"/>
+            <p14:sldId id="374"/>
+            <p14:sldId id="373"/>
           </p14:sldIdLst>
         </p14:section>
         <p14:section name="Demo" id="{4338EE7D-0438-4F9C-BD5A-03E23CFC5BEA}">
@@ -2537,7 +2543,7 @@
           <a:p>
             <a:fld id="{8C2E9449-D161-4234-AF44-56BC19BD5257}" type="slidenum">
               <a:rPr lang="en-US" smtClean="0"/>
-              <a:t>38</a:t>
+              <a:t>37</a:t>
             </a:fld>
             <a:endParaRPr lang="en-US"/>
           </a:p>
@@ -2546,7 +2552,7 @@
     </p:spTree>
     <p:extLst>
       <p:ext uri="{BB962C8B-B14F-4D97-AF65-F5344CB8AC3E}">
-        <p14:creationId xmlns:p14="http://schemas.microsoft.com/office/powerpoint/2010/main" val="522867708"/>
+        <p14:creationId xmlns:p14="http://schemas.microsoft.com/office/powerpoint/2010/main" val="1340397035"/>
       </p:ext>
     </p:extLst>
   </p:cSld>
@@ -2621,7 +2627,7 @@
           <a:p>
             <a:fld id="{8C2E9449-D161-4234-AF44-56BC19BD5257}" type="slidenum">
               <a:rPr lang="en-US" smtClean="0"/>
-              <a:t>40</a:t>
+              <a:t>38</a:t>
             </a:fld>
             <a:endParaRPr lang="en-US"/>
           </a:p>
@@ -2630,7 +2636,7 @@
     </p:spTree>
     <p:extLst>
       <p:ext uri="{BB962C8B-B14F-4D97-AF65-F5344CB8AC3E}">
-        <p14:creationId xmlns:p14="http://schemas.microsoft.com/office/powerpoint/2010/main" val="3266879566"/>
+        <p14:creationId xmlns:p14="http://schemas.microsoft.com/office/powerpoint/2010/main" val="522867708"/>
       </p:ext>
     </p:extLst>
   </p:cSld>
@@ -2684,10 +2690,7 @@
           <a:bodyPr/>
           <a:lstStyle/>
           <a:p>
-            <a:r>
-              <a:rPr lang="en-US" dirty="0"/>
-              <a:t>https://docs.microsoft.com/en-us/azure/service-bus-messaging/service-bus-dotnet-how-to-use-topics-subscriptions</a:t>
-            </a:r>
+            <a:endParaRPr lang="en-US" dirty="0"/>
           </a:p>
         </p:txBody>
       </p:sp>
@@ -2708,7 +2711,7 @@
           <a:p>
             <a:fld id="{8C2E9449-D161-4234-AF44-56BC19BD5257}" type="slidenum">
               <a:rPr lang="en-US" smtClean="0"/>
-              <a:t>41</a:t>
+              <a:t>40</a:t>
             </a:fld>
             <a:endParaRPr lang="en-US"/>
           </a:p>
@@ -2717,7 +2720,7 @@
     </p:spTree>
     <p:extLst>
       <p:ext uri="{BB962C8B-B14F-4D97-AF65-F5344CB8AC3E}">
-        <p14:creationId xmlns:p14="http://schemas.microsoft.com/office/powerpoint/2010/main" val="3129252641"/>
+        <p14:creationId xmlns:p14="http://schemas.microsoft.com/office/powerpoint/2010/main" val="3266879566"/>
       </p:ext>
     </p:extLst>
   </p:cSld>
@@ -2857,7 +2860,7 @@
           <a:p>
             <a:r>
               <a:rPr lang="en-US" dirty="0"/>
-              <a:t>https://docs.microsoft.com/en-us/azure/service-bus-messaging/service-bus-azure-and-service-bus-queues-compared-contrasted</a:t>
+              <a:t>These can be manually created but the  administrator program will run idempotently to create them all or ensure they exist.</a:t>
             </a:r>
           </a:p>
         </p:txBody>
@@ -2879,7 +2882,7 @@
           <a:p>
             <a:fld id="{8C2E9449-D161-4234-AF44-56BC19BD5257}" type="slidenum">
               <a:rPr lang="en-US" smtClean="0"/>
-              <a:t>42</a:t>
+              <a:t>41</a:t>
             </a:fld>
             <a:endParaRPr lang="en-US"/>
           </a:p>
@@ -2888,7 +2891,7 @@
     </p:spTree>
     <p:extLst>
       <p:ext uri="{BB962C8B-B14F-4D97-AF65-F5344CB8AC3E}">
-        <p14:creationId xmlns:p14="http://schemas.microsoft.com/office/powerpoint/2010/main" val="3790585450"/>
+        <p14:creationId xmlns:p14="http://schemas.microsoft.com/office/powerpoint/2010/main" val="2271767487"/>
       </p:ext>
     </p:extLst>
   </p:cSld>
@@ -2942,6 +2945,559 @@
           <a:bodyPr/>
           <a:lstStyle/>
           <a:p>
+            <a:pPr algn="l"/>
+            <a:r>
+              <a:rPr lang="en-US" b="0" i="0" dirty="0">
+                <a:solidFill>
+                  <a:srgbClr val="171717"/>
+                </a:solidFill>
+                <a:effectLst/>
+                <a:latin typeface="Segoe UI" panose="020B0502040204020203" pitchFamily="34" charset="0"/>
+              </a:rPr>
+              <a:t>Service Bus supports three filter conditions:</a:t>
+            </a:r>
+          </a:p>
+          <a:p>
+            <a:pPr algn="l"/>
+            <a:endParaRPr lang="en-US" b="0" i="0" dirty="0">
+              <a:solidFill>
+                <a:srgbClr val="171717"/>
+              </a:solidFill>
+              <a:effectLst/>
+              <a:latin typeface="Segoe UI" panose="020B0502040204020203" pitchFamily="34" charset="0"/>
+            </a:endParaRPr>
+          </a:p>
+          <a:p>
+            <a:pPr algn="l">
+              <a:buFont typeface="Arial" panose="020B0604020202020204" pitchFamily="34" charset="0"/>
+              <a:buChar char="•"/>
+            </a:pPr>
+            <a:r>
+              <a:rPr lang="en-US" b="0" i="1" dirty="0">
+                <a:solidFill>
+                  <a:srgbClr val="171717"/>
+                </a:solidFill>
+                <a:effectLst/>
+                <a:latin typeface="Segoe UI" panose="020B0502040204020203" pitchFamily="34" charset="0"/>
+              </a:rPr>
+              <a:t>SQL Filters</a:t>
+            </a:r>
+            <a:r>
+              <a:rPr lang="en-US" b="0" i="0" dirty="0">
+                <a:solidFill>
+                  <a:srgbClr val="171717"/>
+                </a:solidFill>
+                <a:effectLst/>
+                <a:latin typeface="Segoe UI" panose="020B0502040204020203" pitchFamily="34" charset="0"/>
+              </a:rPr>
+              <a:t> - A </a:t>
+            </a:r>
+            <a:r>
+              <a:rPr lang="en-US" b="1" i="0" dirty="0" err="1">
+                <a:solidFill>
+                  <a:srgbClr val="171717"/>
+                </a:solidFill>
+                <a:effectLst/>
+                <a:latin typeface="Segoe UI" panose="020B0502040204020203" pitchFamily="34" charset="0"/>
+              </a:rPr>
+              <a:t>SqlFilter</a:t>
+            </a:r>
+            <a:r>
+              <a:rPr lang="en-US" b="0" i="0" dirty="0">
+                <a:solidFill>
+                  <a:srgbClr val="171717"/>
+                </a:solidFill>
+                <a:effectLst/>
+                <a:latin typeface="Segoe UI" panose="020B0502040204020203" pitchFamily="34" charset="0"/>
+              </a:rPr>
+              <a:t> holds a SQL-like conditional expression that is evaluated in the broker against the arriving messages' user-defined properties and system properties. All system properties must be prefixed with sys. in the conditional expression. The </a:t>
+            </a:r>
+            <a:r>
+              <a:rPr lang="en-US" b="0" i="0" u="none" strike="noStrike" dirty="0">
+                <a:solidFill>
+                  <a:srgbClr val="171717"/>
+                </a:solidFill>
+                <a:effectLst/>
+                <a:latin typeface="Segoe UI" panose="020B0502040204020203" pitchFamily="34" charset="0"/>
+                <a:hlinkClick r:id="rId3"/>
+              </a:rPr>
+              <a:t>SQL-language subset for filter conditions</a:t>
+            </a:r>
+            <a:r>
+              <a:rPr lang="en-US" b="0" i="0" dirty="0">
+                <a:solidFill>
+                  <a:srgbClr val="171717"/>
+                </a:solidFill>
+                <a:effectLst/>
+                <a:latin typeface="Segoe UI" panose="020B0502040204020203" pitchFamily="34" charset="0"/>
+              </a:rPr>
+              <a:t> tests for the existence of properties (EXISTS), null-values (IS NULL), logical NOT/AND/OR, relational operators, simple numeric arithmetic, and simple text pattern matching with LIKE.</a:t>
+            </a:r>
+          </a:p>
+          <a:p>
+            <a:pPr algn="l">
+              <a:buFont typeface="Arial" panose="020B0604020202020204" pitchFamily="34" charset="0"/>
+              <a:buChar char="•"/>
+            </a:pPr>
+            <a:endParaRPr lang="en-US" b="0" i="0" dirty="0">
+              <a:solidFill>
+                <a:srgbClr val="171717"/>
+              </a:solidFill>
+              <a:effectLst/>
+              <a:latin typeface="Segoe UI" panose="020B0502040204020203" pitchFamily="34" charset="0"/>
+            </a:endParaRPr>
+          </a:p>
+          <a:p>
+            <a:pPr algn="l">
+              <a:buFont typeface="Arial" panose="020B0604020202020204" pitchFamily="34" charset="0"/>
+              <a:buChar char="•"/>
+            </a:pPr>
+            <a:r>
+              <a:rPr lang="en-US" b="0" i="1" dirty="0">
+                <a:solidFill>
+                  <a:srgbClr val="171717"/>
+                </a:solidFill>
+                <a:effectLst/>
+                <a:latin typeface="Segoe UI" panose="020B0502040204020203" pitchFamily="34" charset="0"/>
+              </a:rPr>
+              <a:t>Boolean filters</a:t>
+            </a:r>
+            <a:r>
+              <a:rPr lang="en-US" b="0" i="0" dirty="0">
+                <a:solidFill>
+                  <a:srgbClr val="171717"/>
+                </a:solidFill>
+                <a:effectLst/>
+                <a:latin typeface="Segoe UI" panose="020B0502040204020203" pitchFamily="34" charset="0"/>
+              </a:rPr>
+              <a:t> - The </a:t>
+            </a:r>
+            <a:r>
+              <a:rPr lang="en-US" b="1" i="0" dirty="0" err="1">
+                <a:solidFill>
+                  <a:srgbClr val="171717"/>
+                </a:solidFill>
+                <a:effectLst/>
+                <a:latin typeface="Segoe UI" panose="020B0502040204020203" pitchFamily="34" charset="0"/>
+              </a:rPr>
+              <a:t>TrueFilter</a:t>
+            </a:r>
+            <a:r>
+              <a:rPr lang="en-US" b="0" i="0" dirty="0">
+                <a:solidFill>
+                  <a:srgbClr val="171717"/>
+                </a:solidFill>
+                <a:effectLst/>
+                <a:latin typeface="Segoe UI" panose="020B0502040204020203" pitchFamily="34" charset="0"/>
+              </a:rPr>
+              <a:t> and </a:t>
+            </a:r>
+            <a:r>
+              <a:rPr lang="en-US" b="1" i="0" dirty="0" err="1">
+                <a:solidFill>
+                  <a:srgbClr val="171717"/>
+                </a:solidFill>
+                <a:effectLst/>
+                <a:latin typeface="Segoe UI" panose="020B0502040204020203" pitchFamily="34" charset="0"/>
+              </a:rPr>
+              <a:t>FalseFilter</a:t>
+            </a:r>
+            <a:r>
+              <a:rPr lang="en-US" b="0" i="0" dirty="0">
+                <a:solidFill>
+                  <a:srgbClr val="171717"/>
+                </a:solidFill>
+                <a:effectLst/>
+                <a:latin typeface="Segoe UI" panose="020B0502040204020203" pitchFamily="34" charset="0"/>
+              </a:rPr>
+              <a:t> either cause all arriving messages (</a:t>
+            </a:r>
+            <a:r>
+              <a:rPr lang="en-US" b="1" i="0" dirty="0">
+                <a:solidFill>
+                  <a:srgbClr val="171717"/>
+                </a:solidFill>
+                <a:effectLst/>
+                <a:latin typeface="Segoe UI" panose="020B0502040204020203" pitchFamily="34" charset="0"/>
+              </a:rPr>
+              <a:t>true</a:t>
+            </a:r>
+            <a:r>
+              <a:rPr lang="en-US" b="0" i="0" dirty="0">
+                <a:solidFill>
+                  <a:srgbClr val="171717"/>
+                </a:solidFill>
+                <a:effectLst/>
+                <a:latin typeface="Segoe UI" panose="020B0502040204020203" pitchFamily="34" charset="0"/>
+              </a:rPr>
+              <a:t>) or none of the arriving messages (</a:t>
+            </a:r>
+            <a:r>
+              <a:rPr lang="en-US" b="1" i="0" dirty="0">
+                <a:solidFill>
+                  <a:srgbClr val="171717"/>
+                </a:solidFill>
+                <a:effectLst/>
+                <a:latin typeface="Segoe UI" panose="020B0502040204020203" pitchFamily="34" charset="0"/>
+              </a:rPr>
+              <a:t>false</a:t>
+            </a:r>
+            <a:r>
+              <a:rPr lang="en-US" b="0" i="0" dirty="0">
+                <a:solidFill>
+                  <a:srgbClr val="171717"/>
+                </a:solidFill>
+                <a:effectLst/>
+                <a:latin typeface="Segoe UI" panose="020B0502040204020203" pitchFamily="34" charset="0"/>
+              </a:rPr>
+              <a:t>) to be selected for the subscription. These two filters derive from the SQL filter.</a:t>
+            </a:r>
+          </a:p>
+          <a:p>
+            <a:pPr algn="l">
+              <a:buFont typeface="Arial" panose="020B0604020202020204" pitchFamily="34" charset="0"/>
+              <a:buChar char="•"/>
+            </a:pPr>
+            <a:endParaRPr lang="en-US" b="0" i="0" dirty="0">
+              <a:solidFill>
+                <a:srgbClr val="171717"/>
+              </a:solidFill>
+              <a:effectLst/>
+              <a:latin typeface="Segoe UI" panose="020B0502040204020203" pitchFamily="34" charset="0"/>
+            </a:endParaRPr>
+          </a:p>
+          <a:p>
+            <a:pPr algn="l">
+              <a:buFont typeface="Arial" panose="020B0604020202020204" pitchFamily="34" charset="0"/>
+              <a:buChar char="•"/>
+            </a:pPr>
+            <a:r>
+              <a:rPr lang="en-US" b="0" i="1" dirty="0">
+                <a:solidFill>
+                  <a:srgbClr val="171717"/>
+                </a:solidFill>
+                <a:effectLst/>
+                <a:latin typeface="Segoe UI" panose="020B0502040204020203" pitchFamily="34" charset="0"/>
+              </a:rPr>
+              <a:t>Correlation Filters</a:t>
+            </a:r>
+            <a:r>
+              <a:rPr lang="en-US" b="0" i="0" dirty="0">
+                <a:solidFill>
+                  <a:srgbClr val="171717"/>
+                </a:solidFill>
+                <a:effectLst/>
+                <a:latin typeface="Segoe UI" panose="020B0502040204020203" pitchFamily="34" charset="0"/>
+              </a:rPr>
+              <a:t> - A </a:t>
+            </a:r>
+            <a:r>
+              <a:rPr lang="en-US" b="1" i="0" dirty="0" err="1">
+                <a:solidFill>
+                  <a:srgbClr val="171717"/>
+                </a:solidFill>
+                <a:effectLst/>
+                <a:latin typeface="Segoe UI" panose="020B0502040204020203" pitchFamily="34" charset="0"/>
+              </a:rPr>
+              <a:t>CorrelationFilter</a:t>
+            </a:r>
+            <a:r>
+              <a:rPr lang="en-US" b="0" i="0" dirty="0">
+                <a:solidFill>
+                  <a:srgbClr val="171717"/>
+                </a:solidFill>
+                <a:effectLst/>
+                <a:latin typeface="Segoe UI" panose="020B0502040204020203" pitchFamily="34" charset="0"/>
+              </a:rPr>
+              <a:t> holds a set of conditions that are matched against one or more of an arriving message's user and system properties. A common use is to match against the </a:t>
+            </a:r>
+            <a:r>
+              <a:rPr lang="en-US" b="1" i="0" dirty="0" err="1">
+                <a:solidFill>
+                  <a:srgbClr val="171717"/>
+                </a:solidFill>
+                <a:effectLst/>
+                <a:latin typeface="Segoe UI" panose="020B0502040204020203" pitchFamily="34" charset="0"/>
+              </a:rPr>
+              <a:t>CorrelationId</a:t>
+            </a:r>
+            <a:r>
+              <a:rPr lang="en-US" b="0" i="0" dirty="0">
+                <a:solidFill>
+                  <a:srgbClr val="171717"/>
+                </a:solidFill>
+                <a:effectLst/>
+                <a:latin typeface="Segoe UI" panose="020B0502040204020203" pitchFamily="34" charset="0"/>
+              </a:rPr>
+              <a:t> property, but the application can also choose to match against the following properties:</a:t>
+            </a:r>
+          </a:p>
+          <a:p>
+            <a:pPr marL="742950" lvl="1" indent="-285750" algn="l">
+              <a:buFont typeface="Arial" panose="020B0604020202020204" pitchFamily="34" charset="0"/>
+              <a:buChar char="•"/>
+            </a:pPr>
+            <a:r>
+              <a:rPr lang="en-US" b="1" i="0" dirty="0" err="1">
+                <a:solidFill>
+                  <a:srgbClr val="171717"/>
+                </a:solidFill>
+                <a:effectLst/>
+                <a:latin typeface="Segoe UI" panose="020B0502040204020203" pitchFamily="34" charset="0"/>
+              </a:rPr>
+              <a:t>ContentType</a:t>
+            </a:r>
+            <a:endParaRPr lang="en-US" b="0" i="0" dirty="0">
+              <a:solidFill>
+                <a:srgbClr val="171717"/>
+              </a:solidFill>
+              <a:effectLst/>
+              <a:latin typeface="Segoe UI" panose="020B0502040204020203" pitchFamily="34" charset="0"/>
+            </a:endParaRPr>
+          </a:p>
+          <a:p>
+            <a:pPr marL="742950" lvl="1" indent="-285750" algn="l">
+              <a:buFont typeface="Arial" panose="020B0604020202020204" pitchFamily="34" charset="0"/>
+              <a:buChar char="•"/>
+            </a:pPr>
+            <a:r>
+              <a:rPr lang="en-US" b="1" i="0" dirty="0">
+                <a:solidFill>
+                  <a:srgbClr val="171717"/>
+                </a:solidFill>
+                <a:effectLst/>
+                <a:latin typeface="Segoe UI" panose="020B0502040204020203" pitchFamily="34" charset="0"/>
+              </a:rPr>
+              <a:t>Label</a:t>
+            </a:r>
+            <a:endParaRPr lang="en-US" b="0" i="0" dirty="0">
+              <a:solidFill>
+                <a:srgbClr val="171717"/>
+              </a:solidFill>
+              <a:effectLst/>
+              <a:latin typeface="Segoe UI" panose="020B0502040204020203" pitchFamily="34" charset="0"/>
+            </a:endParaRPr>
+          </a:p>
+          <a:p>
+            <a:pPr marL="742950" lvl="1" indent="-285750" algn="l">
+              <a:buFont typeface="Arial" panose="020B0604020202020204" pitchFamily="34" charset="0"/>
+              <a:buChar char="•"/>
+            </a:pPr>
+            <a:r>
+              <a:rPr lang="en-US" b="1" i="0" dirty="0" err="1">
+                <a:solidFill>
+                  <a:srgbClr val="171717"/>
+                </a:solidFill>
+                <a:effectLst/>
+                <a:latin typeface="Segoe UI" panose="020B0502040204020203" pitchFamily="34" charset="0"/>
+              </a:rPr>
+              <a:t>MessageId</a:t>
+            </a:r>
+            <a:endParaRPr lang="en-US" b="0" i="0" dirty="0">
+              <a:solidFill>
+                <a:srgbClr val="171717"/>
+              </a:solidFill>
+              <a:effectLst/>
+              <a:latin typeface="Segoe UI" panose="020B0502040204020203" pitchFamily="34" charset="0"/>
+            </a:endParaRPr>
+          </a:p>
+          <a:p>
+            <a:pPr marL="742950" lvl="1" indent="-285750" algn="l">
+              <a:buFont typeface="Arial" panose="020B0604020202020204" pitchFamily="34" charset="0"/>
+              <a:buChar char="•"/>
+            </a:pPr>
+            <a:r>
+              <a:rPr lang="en-US" b="1" i="0" dirty="0" err="1">
+                <a:solidFill>
+                  <a:srgbClr val="171717"/>
+                </a:solidFill>
+                <a:effectLst/>
+                <a:latin typeface="Segoe UI" panose="020B0502040204020203" pitchFamily="34" charset="0"/>
+              </a:rPr>
+              <a:t>ReplyTo</a:t>
+            </a:r>
+            <a:endParaRPr lang="en-US" b="0" i="0" dirty="0">
+              <a:solidFill>
+                <a:srgbClr val="171717"/>
+              </a:solidFill>
+              <a:effectLst/>
+              <a:latin typeface="Segoe UI" panose="020B0502040204020203" pitchFamily="34" charset="0"/>
+            </a:endParaRPr>
+          </a:p>
+          <a:p>
+            <a:pPr marL="742950" lvl="1" indent="-285750" algn="l">
+              <a:buFont typeface="Arial" panose="020B0604020202020204" pitchFamily="34" charset="0"/>
+              <a:buChar char="•"/>
+            </a:pPr>
+            <a:r>
+              <a:rPr lang="en-US" b="1" i="0" dirty="0" err="1">
+                <a:solidFill>
+                  <a:srgbClr val="171717"/>
+                </a:solidFill>
+                <a:effectLst/>
+                <a:latin typeface="Segoe UI" panose="020B0502040204020203" pitchFamily="34" charset="0"/>
+              </a:rPr>
+              <a:t>ReplyToSessionId</a:t>
+            </a:r>
+            <a:endParaRPr lang="en-US" b="0" i="0" dirty="0">
+              <a:solidFill>
+                <a:srgbClr val="171717"/>
+              </a:solidFill>
+              <a:effectLst/>
+              <a:latin typeface="Segoe UI" panose="020B0502040204020203" pitchFamily="34" charset="0"/>
+            </a:endParaRPr>
+          </a:p>
+          <a:p>
+            <a:pPr marL="742950" lvl="1" indent="-285750" algn="l">
+              <a:buFont typeface="Arial" panose="020B0604020202020204" pitchFamily="34" charset="0"/>
+              <a:buChar char="•"/>
+            </a:pPr>
+            <a:r>
+              <a:rPr lang="en-US" b="1" i="0" dirty="0" err="1">
+                <a:solidFill>
+                  <a:srgbClr val="171717"/>
+                </a:solidFill>
+                <a:effectLst/>
+                <a:latin typeface="Segoe UI" panose="020B0502040204020203" pitchFamily="34" charset="0"/>
+              </a:rPr>
+              <a:t>SessionId</a:t>
+            </a:r>
+            <a:endParaRPr lang="en-US" b="0" i="0" dirty="0">
+              <a:solidFill>
+                <a:srgbClr val="171717"/>
+              </a:solidFill>
+              <a:effectLst/>
+              <a:latin typeface="Segoe UI" panose="020B0502040204020203" pitchFamily="34" charset="0"/>
+            </a:endParaRPr>
+          </a:p>
+          <a:p>
+            <a:pPr marL="742950" lvl="1" indent="-285750" algn="l">
+              <a:buFont typeface="Arial" panose="020B0604020202020204" pitchFamily="34" charset="0"/>
+              <a:buChar char="•"/>
+            </a:pPr>
+            <a:r>
+              <a:rPr lang="en-US" b="1" i="0" dirty="0">
+                <a:solidFill>
+                  <a:srgbClr val="171717"/>
+                </a:solidFill>
+                <a:effectLst/>
+                <a:latin typeface="Segoe UI" panose="020B0502040204020203" pitchFamily="34" charset="0"/>
+              </a:rPr>
+              <a:t>To</a:t>
+            </a:r>
+            <a:endParaRPr lang="en-US" b="0" i="0" dirty="0">
+              <a:solidFill>
+                <a:srgbClr val="171717"/>
+              </a:solidFill>
+              <a:effectLst/>
+              <a:latin typeface="Segoe UI" panose="020B0502040204020203" pitchFamily="34" charset="0"/>
+            </a:endParaRPr>
+          </a:p>
+          <a:p>
+            <a:pPr marL="742950" lvl="1" indent="-285750" algn="l">
+              <a:buFont typeface="Arial" panose="020B0604020202020204" pitchFamily="34" charset="0"/>
+              <a:buChar char="•"/>
+            </a:pPr>
+            <a:r>
+              <a:rPr lang="en-US" b="0" i="0" dirty="0">
+                <a:solidFill>
+                  <a:srgbClr val="171717"/>
+                </a:solidFill>
+                <a:effectLst/>
+                <a:latin typeface="Segoe UI" panose="020B0502040204020203" pitchFamily="34" charset="0"/>
+              </a:rPr>
+              <a:t>any user-defined properties.</a:t>
+            </a:r>
+          </a:p>
+          <a:p>
+            <a:pPr marL="457200" lvl="1" indent="0" algn="l">
+              <a:buFont typeface="Arial" panose="020B0604020202020204" pitchFamily="34" charset="0"/>
+              <a:buNone/>
+            </a:pPr>
+            <a:endParaRPr lang="en-US" b="0" i="0" dirty="0">
+              <a:solidFill>
+                <a:srgbClr val="171717"/>
+              </a:solidFill>
+              <a:effectLst/>
+              <a:latin typeface="Segoe UI" panose="020B0502040204020203" pitchFamily="34" charset="0"/>
+            </a:endParaRPr>
+          </a:p>
+          <a:p>
+            <a:pPr algn="l">
+              <a:buFont typeface="Arial" panose="020B0604020202020204" pitchFamily="34" charset="0"/>
+              <a:buChar char="•"/>
+            </a:pPr>
+            <a:r>
+              <a:rPr lang="en-US" b="0" i="0" dirty="0">
+                <a:solidFill>
+                  <a:srgbClr val="171717"/>
+                </a:solidFill>
+                <a:effectLst/>
+                <a:latin typeface="Segoe UI" panose="020B0502040204020203" pitchFamily="34" charset="0"/>
+              </a:rPr>
+              <a:t>A match exists when an arriving message's value for a property is equal to the value specified in the correlation filter. For string expressions, the comparison is case-sensitive. When specifying multiple match properties, the filter combines them as a logical AND condition, meaning for the filter to match, all conditions must match.</a:t>
+            </a:r>
+          </a:p>
+          <a:p>
+            <a:pPr algn="l"/>
+            <a:r>
+              <a:rPr lang="en-US" b="0" i="0" dirty="0">
+                <a:solidFill>
+                  <a:srgbClr val="171717"/>
+                </a:solidFill>
+                <a:effectLst/>
+                <a:latin typeface="Segoe UI" panose="020B0502040204020203" pitchFamily="34" charset="0"/>
+              </a:rPr>
+              <a:t>All filters evaluate message properties. </a:t>
+            </a:r>
+          </a:p>
+          <a:p>
+            <a:pPr algn="l"/>
+            <a:endParaRPr lang="en-US" b="1" i="0" dirty="0">
+              <a:solidFill>
+                <a:srgbClr val="171717"/>
+              </a:solidFill>
+              <a:effectLst/>
+              <a:latin typeface="Segoe UI" panose="020B0502040204020203" pitchFamily="34" charset="0"/>
+            </a:endParaRPr>
+          </a:p>
+          <a:p>
+            <a:pPr algn="l"/>
+            <a:r>
+              <a:rPr lang="en-US" b="1" i="0" dirty="0">
+                <a:solidFill>
+                  <a:srgbClr val="171717"/>
+                </a:solidFill>
+                <a:effectLst/>
+                <a:latin typeface="Segoe UI" panose="020B0502040204020203" pitchFamily="34" charset="0"/>
+              </a:rPr>
+              <a:t>Filters can't evaluate the message body.</a:t>
+            </a:r>
+          </a:p>
+          <a:p>
+            <a:pPr algn="l"/>
+            <a:endParaRPr lang="en-US" b="1" i="0" dirty="0">
+              <a:solidFill>
+                <a:srgbClr val="171717"/>
+              </a:solidFill>
+              <a:effectLst/>
+              <a:latin typeface="Segoe UI" panose="020B0502040204020203" pitchFamily="34" charset="0"/>
+            </a:endParaRPr>
+          </a:p>
+          <a:p>
+            <a:pPr algn="l"/>
+            <a:r>
+              <a:rPr lang="en-US" b="1" i="0" dirty="0">
+                <a:solidFill>
+                  <a:srgbClr val="171717"/>
+                </a:solidFill>
+                <a:effectLst/>
+                <a:latin typeface="Segoe UI" panose="020B0502040204020203" pitchFamily="34" charset="0"/>
+              </a:rPr>
+              <a:t>https://docs.microsoft.com/en-us/azure/service-bus-messaging/topic-filters</a:t>
+            </a:r>
+          </a:p>
+          <a:p>
             <a:endParaRPr lang="en-US" dirty="0"/>
           </a:p>
         </p:txBody>
@@ -2963,7 +3519,7 @@
           <a:p>
             <a:fld id="{8C2E9449-D161-4234-AF44-56BC19BD5257}" type="slidenum">
               <a:rPr lang="en-US" smtClean="0"/>
-              <a:t>44</a:t>
+              <a:t>42</a:t>
             </a:fld>
             <a:endParaRPr lang="en-US"/>
           </a:p>
@@ -2972,7 +3528,7 @@
     </p:spTree>
     <p:extLst>
       <p:ext uri="{BB962C8B-B14F-4D97-AF65-F5344CB8AC3E}">
-        <p14:creationId xmlns:p14="http://schemas.microsoft.com/office/powerpoint/2010/main" val="3854404646"/>
+        <p14:creationId xmlns:p14="http://schemas.microsoft.com/office/powerpoint/2010/main" val="3041727952"/>
       </p:ext>
     </p:extLst>
   </p:cSld>
@@ -3026,29 +3582,6 @@
           <a:bodyPr/>
           <a:lstStyle/>
           <a:p>
-            <a:pPr marL="0" marR="0" lvl="0" indent="0" algn="l" defTabSz="914400" rtl="0" eaLnBrk="1" fontAlgn="auto" latinLnBrk="0" hangingPunct="1">
-              <a:lnSpc>
-                <a:spcPct val="100000"/>
-              </a:lnSpc>
-              <a:spcBef>
-                <a:spcPts val="0"/>
-              </a:spcBef>
-              <a:spcAft>
-                <a:spcPts val="0"/>
-              </a:spcAft>
-              <a:buClrTx/>
-              <a:buSzTx/>
-              <a:buFontTx/>
-              <a:buNone/>
-              <a:tabLst/>
-              <a:defRPr/>
-            </a:pPr>
-            <a:r>
-              <a:rPr lang="en-US" dirty="0"/>
-              <a:t>https://docs.microsoft.com/en-us/azure/storage/queues/storage-dotnet-how-to-use-queues?tabs=dotnet</a:t>
-            </a:r>
-          </a:p>
-          <a:p>
             <a:endParaRPr lang="en-US" dirty="0"/>
           </a:p>
         </p:txBody>
@@ -3070,7 +3603,7 @@
           <a:p>
             <a:fld id="{8C2E9449-D161-4234-AF44-56BC19BD5257}" type="slidenum">
               <a:rPr lang="en-US" smtClean="0"/>
-              <a:t>45</a:t>
+              <a:t>43</a:t>
             </a:fld>
             <a:endParaRPr lang="en-US"/>
           </a:p>
@@ -3079,7 +3612,7 @@
     </p:spTree>
     <p:extLst>
       <p:ext uri="{BB962C8B-B14F-4D97-AF65-F5344CB8AC3E}">
-        <p14:creationId xmlns:p14="http://schemas.microsoft.com/office/powerpoint/2010/main" val="313362551"/>
+        <p14:creationId xmlns:p14="http://schemas.microsoft.com/office/powerpoint/2010/main" val="3388967443"/>
       </p:ext>
     </p:extLst>
   </p:cSld>
@@ -3133,7 +3666,10 @@
           <a:bodyPr/>
           <a:lstStyle/>
           <a:p>
-            <a:endParaRPr lang="en-US" dirty="0"/>
+            <a:r>
+              <a:rPr lang="en-US" dirty="0"/>
+              <a:t>https://docs.microsoft.com/en-us/azure/service-bus-messaging/service-bus-dotnet-how-to-use-topics-subscriptions</a:t>
+            </a:r>
           </a:p>
         </p:txBody>
       </p:sp>
@@ -3154,7 +3690,7 @@
           <a:p>
             <a:fld id="{8C2E9449-D161-4234-AF44-56BC19BD5257}" type="slidenum">
               <a:rPr lang="en-US" smtClean="0"/>
-              <a:t>47</a:t>
+              <a:t>44</a:t>
             </a:fld>
             <a:endParaRPr lang="en-US"/>
           </a:p>
@@ -3163,7 +3699,7 @@
     </p:spTree>
     <p:extLst>
       <p:ext uri="{BB962C8B-B14F-4D97-AF65-F5344CB8AC3E}">
-        <p14:creationId xmlns:p14="http://schemas.microsoft.com/office/powerpoint/2010/main" val="1009367226"/>
+        <p14:creationId xmlns:p14="http://schemas.microsoft.com/office/powerpoint/2010/main" val="3129252641"/>
       </p:ext>
     </p:extLst>
   </p:cSld>
@@ -3219,6 +3755,452 @@
           <a:p>
             <a:r>
               <a:rPr lang="en-US" dirty="0"/>
+              <a:t>https://docs.microsoft.com/en-us/azure/service-bus-messaging/service-bus-azure-and-service-bus-queues-compared-contrasted</a:t>
+            </a:r>
+          </a:p>
+        </p:txBody>
+      </p:sp>
+      <p:sp>
+        <p:nvSpPr>
+          <p:cNvPr id="4" name="Slide Number Placeholder 3"/>
+          <p:cNvSpPr>
+            <a:spLocks noGrp="1"/>
+          </p:cNvSpPr>
+          <p:nvPr>
+            <p:ph type="sldNum" sz="quarter" idx="5"/>
+          </p:nvPr>
+        </p:nvSpPr>
+        <p:spPr/>
+        <p:txBody>
+          <a:bodyPr/>
+          <a:lstStyle/>
+          <a:p>
+            <a:fld id="{8C2E9449-D161-4234-AF44-56BC19BD5257}" type="slidenum">
+              <a:rPr lang="en-US" smtClean="0"/>
+              <a:t>45</a:t>
+            </a:fld>
+            <a:endParaRPr lang="en-US"/>
+          </a:p>
+        </p:txBody>
+      </p:sp>
+    </p:spTree>
+    <p:extLst>
+      <p:ext uri="{BB962C8B-B14F-4D97-AF65-F5344CB8AC3E}">
+        <p14:creationId xmlns:p14="http://schemas.microsoft.com/office/powerpoint/2010/main" val="3790585450"/>
+      </p:ext>
+    </p:extLst>
+  </p:cSld>
+  <p:clrMapOvr>
+    <a:masterClrMapping/>
+  </p:clrMapOvr>
+</p:notes>
+</file>
+
+<file path=ppt/notesSlides/notesSlide35.xml><?xml version="1.0" encoding="utf-8"?>
+<p:notes xmlns:a="http://schemas.openxmlformats.org/drawingml/2006/main" xmlns:r="http://schemas.openxmlformats.org/officeDocument/2006/relationships" xmlns:p="http://schemas.openxmlformats.org/presentationml/2006/main">
+  <p:cSld>
+    <p:spTree>
+      <p:nvGrpSpPr>
+        <p:cNvPr id="1" name=""/>
+        <p:cNvGrpSpPr/>
+        <p:nvPr/>
+      </p:nvGrpSpPr>
+      <p:grpSpPr>
+        <a:xfrm>
+          <a:off x="0" y="0"/>
+          <a:ext cx="0" cy="0"/>
+          <a:chOff x="0" y="0"/>
+          <a:chExt cx="0" cy="0"/>
+        </a:xfrm>
+      </p:grpSpPr>
+      <p:sp>
+        <p:nvSpPr>
+          <p:cNvPr id="2" name="Slide Image Placeholder 1"/>
+          <p:cNvSpPr>
+            <a:spLocks noGrp="1" noRot="1" noChangeAspect="1"/>
+          </p:cNvSpPr>
+          <p:nvPr>
+            <p:ph type="sldImg"/>
+          </p:nvPr>
+        </p:nvSpPr>
+        <p:spPr/>
+      </p:sp>
+      <p:sp>
+        <p:nvSpPr>
+          <p:cNvPr id="3" name="Notes Placeholder 2"/>
+          <p:cNvSpPr>
+            <a:spLocks noGrp="1"/>
+          </p:cNvSpPr>
+          <p:nvPr>
+            <p:ph type="body" idx="1"/>
+          </p:nvPr>
+        </p:nvSpPr>
+        <p:spPr/>
+        <p:txBody>
+          <a:bodyPr/>
+          <a:lstStyle/>
+          <a:p>
+            <a:endParaRPr lang="en-US" dirty="0"/>
+          </a:p>
+        </p:txBody>
+      </p:sp>
+      <p:sp>
+        <p:nvSpPr>
+          <p:cNvPr id="4" name="Slide Number Placeholder 3"/>
+          <p:cNvSpPr>
+            <a:spLocks noGrp="1"/>
+          </p:cNvSpPr>
+          <p:nvPr>
+            <p:ph type="sldNum" sz="quarter" idx="5"/>
+          </p:nvPr>
+        </p:nvSpPr>
+        <p:spPr/>
+        <p:txBody>
+          <a:bodyPr/>
+          <a:lstStyle/>
+          <a:p>
+            <a:fld id="{8C2E9449-D161-4234-AF44-56BC19BD5257}" type="slidenum">
+              <a:rPr lang="en-US" smtClean="0"/>
+              <a:t>46</a:t>
+            </a:fld>
+            <a:endParaRPr lang="en-US"/>
+          </a:p>
+        </p:txBody>
+      </p:sp>
+    </p:spTree>
+    <p:extLst>
+      <p:ext uri="{BB962C8B-B14F-4D97-AF65-F5344CB8AC3E}">
+        <p14:creationId xmlns:p14="http://schemas.microsoft.com/office/powerpoint/2010/main" val="1040723851"/>
+      </p:ext>
+    </p:extLst>
+  </p:cSld>
+  <p:clrMapOvr>
+    <a:masterClrMapping/>
+  </p:clrMapOvr>
+</p:notes>
+</file>
+
+<file path=ppt/notesSlides/notesSlide36.xml><?xml version="1.0" encoding="utf-8"?>
+<p:notes xmlns:a="http://schemas.openxmlformats.org/drawingml/2006/main" xmlns:r="http://schemas.openxmlformats.org/officeDocument/2006/relationships" xmlns:p="http://schemas.openxmlformats.org/presentationml/2006/main">
+  <p:cSld>
+    <p:spTree>
+      <p:nvGrpSpPr>
+        <p:cNvPr id="1" name=""/>
+        <p:cNvGrpSpPr/>
+        <p:nvPr/>
+      </p:nvGrpSpPr>
+      <p:grpSpPr>
+        <a:xfrm>
+          <a:off x="0" y="0"/>
+          <a:ext cx="0" cy="0"/>
+          <a:chOff x="0" y="0"/>
+          <a:chExt cx="0" cy="0"/>
+        </a:xfrm>
+      </p:grpSpPr>
+      <p:sp>
+        <p:nvSpPr>
+          <p:cNvPr id="2" name="Slide Image Placeholder 1"/>
+          <p:cNvSpPr>
+            <a:spLocks noGrp="1" noRot="1" noChangeAspect="1"/>
+          </p:cNvSpPr>
+          <p:nvPr>
+            <p:ph type="sldImg"/>
+          </p:nvPr>
+        </p:nvSpPr>
+        <p:spPr/>
+      </p:sp>
+      <p:sp>
+        <p:nvSpPr>
+          <p:cNvPr id="3" name="Notes Placeholder 2"/>
+          <p:cNvSpPr>
+            <a:spLocks noGrp="1"/>
+          </p:cNvSpPr>
+          <p:nvPr>
+            <p:ph type="body" idx="1"/>
+          </p:nvPr>
+        </p:nvSpPr>
+        <p:spPr/>
+        <p:txBody>
+          <a:bodyPr/>
+          <a:lstStyle/>
+          <a:p>
+            <a:endParaRPr lang="en-US" dirty="0"/>
+          </a:p>
+        </p:txBody>
+      </p:sp>
+      <p:sp>
+        <p:nvSpPr>
+          <p:cNvPr id="4" name="Slide Number Placeholder 3"/>
+          <p:cNvSpPr>
+            <a:spLocks noGrp="1"/>
+          </p:cNvSpPr>
+          <p:nvPr>
+            <p:ph type="sldNum" sz="quarter" idx="5"/>
+          </p:nvPr>
+        </p:nvSpPr>
+        <p:spPr/>
+        <p:txBody>
+          <a:bodyPr/>
+          <a:lstStyle/>
+          <a:p>
+            <a:fld id="{8C2E9449-D161-4234-AF44-56BC19BD5257}" type="slidenum">
+              <a:rPr lang="en-US" smtClean="0"/>
+              <a:t>47</a:t>
+            </a:fld>
+            <a:endParaRPr lang="en-US"/>
+          </a:p>
+        </p:txBody>
+      </p:sp>
+    </p:spTree>
+    <p:extLst>
+      <p:ext uri="{BB962C8B-B14F-4D97-AF65-F5344CB8AC3E}">
+        <p14:creationId xmlns:p14="http://schemas.microsoft.com/office/powerpoint/2010/main" val="3854404646"/>
+      </p:ext>
+    </p:extLst>
+  </p:cSld>
+  <p:clrMapOvr>
+    <a:masterClrMapping/>
+  </p:clrMapOvr>
+</p:notes>
+</file>
+
+<file path=ppt/notesSlides/notesSlide37.xml><?xml version="1.0" encoding="utf-8"?>
+<p:notes xmlns:a="http://schemas.openxmlformats.org/drawingml/2006/main" xmlns:r="http://schemas.openxmlformats.org/officeDocument/2006/relationships" xmlns:p="http://schemas.openxmlformats.org/presentationml/2006/main">
+  <p:cSld>
+    <p:spTree>
+      <p:nvGrpSpPr>
+        <p:cNvPr id="1" name=""/>
+        <p:cNvGrpSpPr/>
+        <p:nvPr/>
+      </p:nvGrpSpPr>
+      <p:grpSpPr>
+        <a:xfrm>
+          <a:off x="0" y="0"/>
+          <a:ext cx="0" cy="0"/>
+          <a:chOff x="0" y="0"/>
+          <a:chExt cx="0" cy="0"/>
+        </a:xfrm>
+      </p:grpSpPr>
+      <p:sp>
+        <p:nvSpPr>
+          <p:cNvPr id="2" name="Slide Image Placeholder 1"/>
+          <p:cNvSpPr>
+            <a:spLocks noGrp="1" noRot="1" noChangeAspect="1"/>
+          </p:cNvSpPr>
+          <p:nvPr>
+            <p:ph type="sldImg"/>
+          </p:nvPr>
+        </p:nvSpPr>
+        <p:spPr/>
+      </p:sp>
+      <p:sp>
+        <p:nvSpPr>
+          <p:cNvPr id="3" name="Notes Placeholder 2"/>
+          <p:cNvSpPr>
+            <a:spLocks noGrp="1"/>
+          </p:cNvSpPr>
+          <p:nvPr>
+            <p:ph type="body" idx="1"/>
+          </p:nvPr>
+        </p:nvSpPr>
+        <p:spPr/>
+        <p:txBody>
+          <a:bodyPr/>
+          <a:lstStyle/>
+          <a:p>
+            <a:pPr marL="0" marR="0" lvl="0" indent="0" algn="l" defTabSz="914400" rtl="0" eaLnBrk="1" fontAlgn="auto" latinLnBrk="0" hangingPunct="1">
+              <a:lnSpc>
+                <a:spcPct val="100000"/>
+              </a:lnSpc>
+              <a:spcBef>
+                <a:spcPts val="0"/>
+              </a:spcBef>
+              <a:spcAft>
+                <a:spcPts val="0"/>
+              </a:spcAft>
+              <a:buClrTx/>
+              <a:buSzTx/>
+              <a:buFontTx/>
+              <a:buNone/>
+              <a:tabLst/>
+              <a:defRPr/>
+            </a:pPr>
+            <a:r>
+              <a:rPr lang="en-US" dirty="0"/>
+              <a:t>https://docs.microsoft.com/en-us/azure/storage/queues/storage-dotnet-how-to-use-queues?tabs=dotnet</a:t>
+            </a:r>
+          </a:p>
+          <a:p>
+            <a:endParaRPr lang="en-US" dirty="0"/>
+          </a:p>
+        </p:txBody>
+      </p:sp>
+      <p:sp>
+        <p:nvSpPr>
+          <p:cNvPr id="4" name="Slide Number Placeholder 3"/>
+          <p:cNvSpPr>
+            <a:spLocks noGrp="1"/>
+          </p:cNvSpPr>
+          <p:nvPr>
+            <p:ph type="sldNum" sz="quarter" idx="5"/>
+          </p:nvPr>
+        </p:nvSpPr>
+        <p:spPr/>
+        <p:txBody>
+          <a:bodyPr/>
+          <a:lstStyle/>
+          <a:p>
+            <a:fld id="{8C2E9449-D161-4234-AF44-56BC19BD5257}" type="slidenum">
+              <a:rPr lang="en-US" smtClean="0"/>
+              <a:t>48</a:t>
+            </a:fld>
+            <a:endParaRPr lang="en-US"/>
+          </a:p>
+        </p:txBody>
+      </p:sp>
+    </p:spTree>
+    <p:extLst>
+      <p:ext uri="{BB962C8B-B14F-4D97-AF65-F5344CB8AC3E}">
+        <p14:creationId xmlns:p14="http://schemas.microsoft.com/office/powerpoint/2010/main" val="313362551"/>
+      </p:ext>
+    </p:extLst>
+  </p:cSld>
+  <p:clrMapOvr>
+    <a:masterClrMapping/>
+  </p:clrMapOvr>
+</p:notes>
+</file>
+
+<file path=ppt/notesSlides/notesSlide38.xml><?xml version="1.0" encoding="utf-8"?>
+<p:notes xmlns:a="http://schemas.openxmlformats.org/drawingml/2006/main" xmlns:r="http://schemas.openxmlformats.org/officeDocument/2006/relationships" xmlns:p="http://schemas.openxmlformats.org/presentationml/2006/main">
+  <p:cSld>
+    <p:spTree>
+      <p:nvGrpSpPr>
+        <p:cNvPr id="1" name=""/>
+        <p:cNvGrpSpPr/>
+        <p:nvPr/>
+      </p:nvGrpSpPr>
+      <p:grpSpPr>
+        <a:xfrm>
+          <a:off x="0" y="0"/>
+          <a:ext cx="0" cy="0"/>
+          <a:chOff x="0" y="0"/>
+          <a:chExt cx="0" cy="0"/>
+        </a:xfrm>
+      </p:grpSpPr>
+      <p:sp>
+        <p:nvSpPr>
+          <p:cNvPr id="2" name="Slide Image Placeholder 1"/>
+          <p:cNvSpPr>
+            <a:spLocks noGrp="1" noRot="1" noChangeAspect="1"/>
+          </p:cNvSpPr>
+          <p:nvPr>
+            <p:ph type="sldImg"/>
+          </p:nvPr>
+        </p:nvSpPr>
+        <p:spPr/>
+      </p:sp>
+      <p:sp>
+        <p:nvSpPr>
+          <p:cNvPr id="3" name="Notes Placeholder 2"/>
+          <p:cNvSpPr>
+            <a:spLocks noGrp="1"/>
+          </p:cNvSpPr>
+          <p:nvPr>
+            <p:ph type="body" idx="1"/>
+          </p:nvPr>
+        </p:nvSpPr>
+        <p:spPr/>
+        <p:txBody>
+          <a:bodyPr/>
+          <a:lstStyle/>
+          <a:p>
+            <a:endParaRPr lang="en-US" dirty="0"/>
+          </a:p>
+        </p:txBody>
+      </p:sp>
+      <p:sp>
+        <p:nvSpPr>
+          <p:cNvPr id="4" name="Slide Number Placeholder 3"/>
+          <p:cNvSpPr>
+            <a:spLocks noGrp="1"/>
+          </p:cNvSpPr>
+          <p:nvPr>
+            <p:ph type="sldNum" sz="quarter" idx="5"/>
+          </p:nvPr>
+        </p:nvSpPr>
+        <p:spPr/>
+        <p:txBody>
+          <a:bodyPr/>
+          <a:lstStyle/>
+          <a:p>
+            <a:fld id="{8C2E9449-D161-4234-AF44-56BC19BD5257}" type="slidenum">
+              <a:rPr lang="en-US" smtClean="0"/>
+              <a:t>50</a:t>
+            </a:fld>
+            <a:endParaRPr lang="en-US"/>
+          </a:p>
+        </p:txBody>
+      </p:sp>
+    </p:spTree>
+    <p:extLst>
+      <p:ext uri="{BB962C8B-B14F-4D97-AF65-F5344CB8AC3E}">
+        <p14:creationId xmlns:p14="http://schemas.microsoft.com/office/powerpoint/2010/main" val="1009367226"/>
+      </p:ext>
+    </p:extLst>
+  </p:cSld>
+  <p:clrMapOvr>
+    <a:masterClrMapping/>
+  </p:clrMapOvr>
+</p:notes>
+</file>
+
+<file path=ppt/notesSlides/notesSlide39.xml><?xml version="1.0" encoding="utf-8"?>
+<p:notes xmlns:a="http://schemas.openxmlformats.org/drawingml/2006/main" xmlns:r="http://schemas.openxmlformats.org/officeDocument/2006/relationships" xmlns:p="http://schemas.openxmlformats.org/presentationml/2006/main">
+  <p:cSld>
+    <p:spTree>
+      <p:nvGrpSpPr>
+        <p:cNvPr id="1" name=""/>
+        <p:cNvGrpSpPr/>
+        <p:nvPr/>
+      </p:nvGrpSpPr>
+      <p:grpSpPr>
+        <a:xfrm>
+          <a:off x="0" y="0"/>
+          <a:ext cx="0" cy="0"/>
+          <a:chOff x="0" y="0"/>
+          <a:chExt cx="0" cy="0"/>
+        </a:xfrm>
+      </p:grpSpPr>
+      <p:sp>
+        <p:nvSpPr>
+          <p:cNvPr id="2" name="Slide Image Placeholder 1"/>
+          <p:cNvSpPr>
+            <a:spLocks noGrp="1" noRot="1" noChangeAspect="1"/>
+          </p:cNvSpPr>
+          <p:nvPr>
+            <p:ph type="sldImg"/>
+          </p:nvPr>
+        </p:nvSpPr>
+        <p:spPr/>
+      </p:sp>
+      <p:sp>
+        <p:nvSpPr>
+          <p:cNvPr id="3" name="Notes Placeholder 2"/>
+          <p:cNvSpPr>
+            <a:spLocks noGrp="1"/>
+          </p:cNvSpPr>
+          <p:nvPr>
+            <p:ph type="body" idx="1"/>
+          </p:nvPr>
+        </p:nvSpPr>
+        <p:spPr/>
+        <p:txBody>
+          <a:bodyPr/>
+          <a:lstStyle/>
+          <a:p>
+            <a:r>
+              <a:rPr lang="en-US" dirty="0"/>
               <a:t>Thank you for attending my talk today.  Please reach out and connect. </a:t>
             </a:r>
           </a:p>
@@ -3272,7 +4254,7 @@
           <a:p>
             <a:fld id="{8C2E9449-D161-4234-AF44-56BC19BD5257}" type="slidenum">
               <a:rPr lang="en-US" smtClean="0"/>
-              <a:t>48</a:t>
+              <a:t>51</a:t>
             </a:fld>
             <a:endParaRPr lang="en-US"/>
           </a:p>
@@ -18377,6 +19359,42 @@
           </a:p>
         </p:txBody>
       </p:sp>
+      <p:pic>
+        <p:nvPicPr>
+          <p:cNvPr id="4" name="Graphic 3">
+            <a:extLst>
+              <a:ext uri="{FF2B5EF4-FFF2-40B4-BE49-F238E27FC236}">
+                <a16:creationId xmlns:a16="http://schemas.microsoft.com/office/drawing/2014/main" id="{F6DD4244-8FF3-6211-7FA0-801B63C4E612}"/>
+              </a:ext>
+            </a:extLst>
+          </p:cNvPr>
+          <p:cNvPicPr>
+            <a:picLocks noChangeAspect="1"/>
+          </p:cNvPicPr>
+          <p:nvPr/>
+        </p:nvPicPr>
+        <p:blipFill>
+          <a:blip r:embed="rId2">
+            <a:extLst>
+              <a:ext uri="{96DAC541-7B7A-43D3-8B79-37D633B846F1}">
+                <asvg:svgBlip xmlns:asvg="http://schemas.microsoft.com/office/drawing/2016/SVG/main" r:embed="rId3"/>
+              </a:ext>
+            </a:extLst>
+          </a:blip>
+          <a:stretch>
+            <a:fillRect/>
+          </a:stretch>
+        </p:blipFill>
+        <p:spPr>
+          <a:xfrm>
+            <a:off x="8619350" y="149134"/>
+            <a:ext cx="3012212" cy="3012212"/>
+          </a:xfrm>
+          <a:prstGeom prst="rect">
+            <a:avLst/>
+          </a:prstGeom>
+        </p:spPr>
+      </p:pic>
     </p:spTree>
     <p:extLst>
       <p:ext uri="{BB962C8B-B14F-4D97-AF65-F5344CB8AC3E}">
@@ -18688,6 +19706,36 @@
           </a:prstGeom>
         </p:spPr>
       </p:pic>
+      <p:pic>
+        <p:nvPicPr>
+          <p:cNvPr id="25" name="Picture 24">
+            <a:extLst>
+              <a:ext uri="{FF2B5EF4-FFF2-40B4-BE49-F238E27FC236}">
+                <a16:creationId xmlns:a16="http://schemas.microsoft.com/office/drawing/2014/main" id="{2CB1ACEE-B773-7767-D6AD-5D9E9A03659B}"/>
+              </a:ext>
+            </a:extLst>
+          </p:cNvPr>
+          <p:cNvPicPr>
+            <a:picLocks noChangeAspect="1"/>
+          </p:cNvPicPr>
+          <p:nvPr/>
+        </p:nvPicPr>
+        <p:blipFill>
+          <a:blip r:embed="rId13"/>
+          <a:stretch>
+            <a:fillRect/>
+          </a:stretch>
+        </p:blipFill>
+        <p:spPr>
+          <a:xfrm>
+            <a:off x="8863952" y="3587850"/>
+            <a:ext cx="1365151" cy="1365151"/>
+          </a:xfrm>
+          <a:prstGeom prst="rect">
+            <a:avLst/>
+          </a:prstGeom>
+        </p:spPr>
+      </p:pic>
     </p:spTree>
     <p:extLst>
       <p:ext uri="{BB962C8B-B14F-4D97-AF65-F5344CB8AC3E}">
@@ -18775,14 +19823,22 @@
           <a:lstStyle/>
           <a:p>
             <a:r>
+              <a:rPr lang="en-US" sz="2600" b="1" dirty="0"/>
+              <a:t>Capable of true FIFO (ordered) processing </a:t>
+            </a:r>
+            <a:r>
               <a:rPr lang="en-US" sz="2600" dirty="0"/>
-              <a:t>Capable of true FIFO (ordered) processing to one or more competing consumers</a:t>
-            </a:r>
-          </a:p>
-          <a:p>
+              <a:t>to one or more competing consumers</a:t>
+            </a:r>
+          </a:p>
+          <a:p>
+            <a:r>
+              <a:rPr lang="en-US" sz="2600" b="1" dirty="0"/>
+              <a:t>256 kb</a:t>
+            </a:r>
             <a:r>
               <a:rPr lang="en-US" sz="2600" dirty="0"/>
-              <a:t>256 kb max message size</a:t>
+              <a:t> max message size</a:t>
             </a:r>
           </a:p>
           <a:p>
@@ -19727,6 +20783,36 @@
           </a:p>
         </p:txBody>
       </p:sp>
+      <p:pic>
+        <p:nvPicPr>
+          <p:cNvPr id="4" name="Picture 3">
+            <a:extLst>
+              <a:ext uri="{FF2B5EF4-FFF2-40B4-BE49-F238E27FC236}">
+                <a16:creationId xmlns:a16="http://schemas.microsoft.com/office/drawing/2014/main" id="{EDE36745-4389-DEC1-CDE3-A16347130F24}"/>
+              </a:ext>
+            </a:extLst>
+          </p:cNvPr>
+          <p:cNvPicPr>
+            <a:picLocks noChangeAspect="1"/>
+          </p:cNvPicPr>
+          <p:nvPr/>
+        </p:nvPicPr>
+        <p:blipFill>
+          <a:blip r:embed="rId3"/>
+          <a:stretch>
+            <a:fillRect/>
+          </a:stretch>
+        </p:blipFill>
+        <p:spPr>
+          <a:xfrm>
+            <a:off x="8908197" y="138148"/>
+            <a:ext cx="2993751" cy="2993751"/>
+          </a:xfrm>
+          <a:prstGeom prst="rect">
+            <a:avLst/>
+          </a:prstGeom>
+        </p:spPr>
+      </p:pic>
     </p:spTree>
     <p:extLst>
       <p:ext uri="{BB962C8B-B14F-4D97-AF65-F5344CB8AC3E}">
@@ -19854,6 +20940,36 @@
           </a:p>
         </p:txBody>
       </p:sp>
+      <p:pic>
+        <p:nvPicPr>
+          <p:cNvPr id="6" name="Picture 5">
+            <a:extLst>
+              <a:ext uri="{FF2B5EF4-FFF2-40B4-BE49-F238E27FC236}">
+                <a16:creationId xmlns:a16="http://schemas.microsoft.com/office/drawing/2014/main" id="{5E77DCBE-0E09-AE5D-AA71-F4602014623C}"/>
+              </a:ext>
+            </a:extLst>
+          </p:cNvPr>
+          <p:cNvPicPr>
+            <a:picLocks noChangeAspect="1"/>
+          </p:cNvPicPr>
+          <p:nvPr/>
+        </p:nvPicPr>
+        <p:blipFill>
+          <a:blip r:embed="rId3"/>
+          <a:stretch>
+            <a:fillRect/>
+          </a:stretch>
+        </p:blipFill>
+        <p:spPr>
+          <a:xfrm>
+            <a:off x="10663255" y="107230"/>
+            <a:ext cx="1365151" cy="1365151"/>
+          </a:xfrm>
+          <a:prstGeom prst="rect">
+            <a:avLst/>
+          </a:prstGeom>
+        </p:spPr>
+      </p:pic>
     </p:spTree>
     <p:extLst>
       <p:ext uri="{BB962C8B-B14F-4D97-AF65-F5344CB8AC3E}">
@@ -19930,7 +21046,7 @@
         </p:nvSpPr>
         <p:spPr>
           <a:xfrm>
-            <a:off x="2589212" y="1441100"/>
+            <a:off x="2589212" y="1466355"/>
             <a:ext cx="8915400" cy="5107184"/>
           </a:xfrm>
         </p:spPr>
@@ -20058,6 +21174,36 @@
           </a:p>
         </p:txBody>
       </p:sp>
+      <p:pic>
+        <p:nvPicPr>
+          <p:cNvPr id="4" name="Picture 3">
+            <a:extLst>
+              <a:ext uri="{FF2B5EF4-FFF2-40B4-BE49-F238E27FC236}">
+                <a16:creationId xmlns:a16="http://schemas.microsoft.com/office/drawing/2014/main" id="{91F8DA19-2D33-504B-9870-6F9793CEAA81}"/>
+              </a:ext>
+            </a:extLst>
+          </p:cNvPr>
+          <p:cNvPicPr>
+            <a:picLocks noChangeAspect="1"/>
+          </p:cNvPicPr>
+          <p:nvPr/>
+        </p:nvPicPr>
+        <p:blipFill>
+          <a:blip r:embed="rId3"/>
+          <a:stretch>
+            <a:fillRect/>
+          </a:stretch>
+        </p:blipFill>
+        <p:spPr>
+          <a:xfrm>
+            <a:off x="10692752" y="75949"/>
+            <a:ext cx="1365151" cy="1365151"/>
+          </a:xfrm>
+          <a:prstGeom prst="rect">
+            <a:avLst/>
+          </a:prstGeom>
+        </p:spPr>
+      </p:pic>
     </p:spTree>
     <p:extLst>
       <p:ext uri="{BB962C8B-B14F-4D97-AF65-F5344CB8AC3E}">
@@ -20239,6 +21385,36 @@
           </a:p>
         </p:txBody>
       </p:sp>
+      <p:pic>
+        <p:nvPicPr>
+          <p:cNvPr id="4" name="Picture 3">
+            <a:extLst>
+              <a:ext uri="{FF2B5EF4-FFF2-40B4-BE49-F238E27FC236}">
+                <a16:creationId xmlns:a16="http://schemas.microsoft.com/office/drawing/2014/main" id="{639870CA-E16E-E6E0-6CBC-0990C0335539}"/>
+              </a:ext>
+            </a:extLst>
+          </p:cNvPr>
+          <p:cNvPicPr>
+            <a:picLocks noChangeAspect="1"/>
+          </p:cNvPicPr>
+          <p:nvPr/>
+        </p:nvPicPr>
+        <p:blipFill>
+          <a:blip r:embed="rId2"/>
+          <a:stretch>
+            <a:fillRect/>
+          </a:stretch>
+        </p:blipFill>
+        <p:spPr>
+          <a:xfrm>
+            <a:off x="10678004" y="198178"/>
+            <a:ext cx="1365151" cy="1365151"/>
+          </a:xfrm>
+          <a:prstGeom prst="rect">
+            <a:avLst/>
+          </a:prstGeom>
+        </p:spPr>
+      </p:pic>
     </p:spTree>
     <p:extLst>
       <p:ext uri="{BB962C8B-B14F-4D97-AF65-F5344CB8AC3E}">
@@ -20484,6 +21660,36 @@
           </a:prstGeom>
         </p:spPr>
       </p:pic>
+      <p:pic>
+        <p:nvPicPr>
+          <p:cNvPr id="5" name="Picture 4">
+            <a:extLst>
+              <a:ext uri="{FF2B5EF4-FFF2-40B4-BE49-F238E27FC236}">
+                <a16:creationId xmlns:a16="http://schemas.microsoft.com/office/drawing/2014/main" id="{E54175B4-916A-C18E-49BF-4E64BE7E255D}"/>
+              </a:ext>
+            </a:extLst>
+          </p:cNvPr>
+          <p:cNvPicPr>
+            <a:picLocks noChangeAspect="1"/>
+          </p:cNvPicPr>
+          <p:nvPr/>
+        </p:nvPicPr>
+        <p:blipFill>
+          <a:blip r:embed="rId4"/>
+          <a:stretch>
+            <a:fillRect/>
+          </a:stretch>
+        </p:blipFill>
+        <p:spPr>
+          <a:xfrm>
+            <a:off x="10648507" y="239458"/>
+            <a:ext cx="1365151" cy="1365151"/>
+          </a:xfrm>
+          <a:prstGeom prst="rect">
+            <a:avLst/>
+          </a:prstGeom>
+        </p:spPr>
+      </p:pic>
     </p:spTree>
     <p:extLst>
       <p:ext uri="{BB962C8B-B14F-4D97-AF65-F5344CB8AC3E}">
@@ -20516,10 +21722,10 @@
       </p:grpSpPr>
       <p:sp>
         <p:nvSpPr>
-          <p:cNvPr id="2" name="Title 1">
+          <p:cNvPr id="5" name="Title 4">
             <a:extLst>
               <a:ext uri="{FF2B5EF4-FFF2-40B4-BE49-F238E27FC236}">
-                <a16:creationId xmlns:a16="http://schemas.microsoft.com/office/drawing/2014/main" id="{8B10B72A-E8EE-E103-3BAB-B209FBF0E099}"/>
+                <a16:creationId xmlns:a16="http://schemas.microsoft.com/office/drawing/2014/main" id="{E637A8E1-8841-26AE-0598-1D2415206565}"/>
               </a:ext>
             </a:extLst>
           </p:cNvPr>
@@ -20530,50 +21736,117 @@
             <p:ph type="title"/>
           </p:nvPr>
         </p:nvSpPr>
-        <p:spPr/>
+        <p:spPr>
+          <a:xfrm>
+            <a:off x="2589212" y="0"/>
+            <a:ext cx="8911687" cy="1280890"/>
+          </a:xfrm>
+        </p:spPr>
         <p:txBody>
           <a:bodyPr/>
           <a:lstStyle/>
           <a:p>
             <a:r>
               <a:rPr lang="en-US" dirty="0"/>
-              <a:t>Publishing and Subscribing to messages</a:t>
+              <a:t>Use the Administrator to create the topic and three subscriptions</a:t>
             </a:r>
           </a:p>
         </p:txBody>
       </p:sp>
-      <p:sp>
-        <p:nvSpPr>
-          <p:cNvPr id="3" name="Text Placeholder 2">
+      <p:pic>
+        <p:nvPicPr>
+          <p:cNvPr id="8" name="Picture 7">
             <a:extLst>
               <a:ext uri="{FF2B5EF4-FFF2-40B4-BE49-F238E27FC236}">
-                <a16:creationId xmlns:a16="http://schemas.microsoft.com/office/drawing/2014/main" id="{862566A3-198E-5B8A-39BA-0D758BDFB39F}"/>
+                <a16:creationId xmlns:a16="http://schemas.microsoft.com/office/drawing/2014/main" id="{5065507B-5FA8-FC83-746D-7D1686377DF4}"/>
               </a:ext>
             </a:extLst>
           </p:cNvPr>
-          <p:cNvSpPr>
-            <a:spLocks noGrp="1"/>
-          </p:cNvSpPr>
-          <p:nvPr>
-            <p:ph type="body" idx="1"/>
-          </p:nvPr>
-        </p:nvSpPr>
-        <p:spPr/>
-        <p:txBody>
-          <a:bodyPr/>
-          <a:lstStyle/>
-          <a:p>
-            <a:r>
-              <a:rPr lang="en-US" dirty="0"/>
-              <a:t>Azure Service Bus messaging</a:t>
-            </a:r>
-          </a:p>
-        </p:txBody>
-      </p:sp>
+          <p:cNvPicPr>
+            <a:picLocks noChangeAspect="1"/>
+          </p:cNvPicPr>
+          <p:nvPr/>
+        </p:nvPicPr>
+        <p:blipFill>
+          <a:blip r:embed="rId3"/>
+          <a:stretch>
+            <a:fillRect/>
+          </a:stretch>
+        </p:blipFill>
+        <p:spPr>
+          <a:xfrm>
+            <a:off x="444930" y="1413295"/>
+            <a:ext cx="5272409" cy="3866433"/>
+          </a:xfrm>
+          <a:prstGeom prst="rect">
+            <a:avLst/>
+          </a:prstGeom>
+        </p:spPr>
+      </p:pic>
+      <p:pic>
+        <p:nvPicPr>
+          <p:cNvPr id="10" name="Picture 9">
+            <a:extLst>
+              <a:ext uri="{FF2B5EF4-FFF2-40B4-BE49-F238E27FC236}">
+                <a16:creationId xmlns:a16="http://schemas.microsoft.com/office/drawing/2014/main" id="{6999B6D1-7D52-784F-3410-C280C27AE2FD}"/>
+              </a:ext>
+            </a:extLst>
+          </p:cNvPr>
+          <p:cNvPicPr>
+            <a:picLocks noChangeAspect="1"/>
+          </p:cNvPicPr>
+          <p:nvPr/>
+        </p:nvPicPr>
+        <p:blipFill>
+          <a:blip r:embed="rId4"/>
+          <a:stretch>
+            <a:fillRect/>
+          </a:stretch>
+        </p:blipFill>
+        <p:spPr>
+          <a:xfrm>
+            <a:off x="6096000" y="3564063"/>
+            <a:ext cx="5958468" cy="3175949"/>
+          </a:xfrm>
+          <a:prstGeom prst="rect">
+            <a:avLst/>
+          </a:prstGeom>
+        </p:spPr>
+      </p:pic>
+      <p:pic>
+        <p:nvPicPr>
+          <p:cNvPr id="11" name="Picture 10">
+            <a:extLst>
+              <a:ext uri="{FF2B5EF4-FFF2-40B4-BE49-F238E27FC236}">
+                <a16:creationId xmlns:a16="http://schemas.microsoft.com/office/drawing/2014/main" id="{40777A5A-C049-2AC5-2CB9-003411E8F294}"/>
+              </a:ext>
+            </a:extLst>
+          </p:cNvPr>
+          <p:cNvPicPr>
+            <a:picLocks noChangeAspect="1"/>
+          </p:cNvPicPr>
+          <p:nvPr/>
+        </p:nvPicPr>
+        <p:blipFill>
+          <a:blip r:embed="rId5"/>
+          <a:stretch>
+            <a:fillRect/>
+          </a:stretch>
+        </p:blipFill>
+        <p:spPr>
+          <a:xfrm>
+            <a:off x="10648507" y="239458"/>
+            <a:ext cx="1365151" cy="1365151"/>
+          </a:xfrm>
+          <a:prstGeom prst="rect">
+            <a:avLst/>
+          </a:prstGeom>
+        </p:spPr>
+      </p:pic>
     </p:spTree>
     <p:extLst>
       <p:ext uri="{BB962C8B-B14F-4D97-AF65-F5344CB8AC3E}">
-        <p14:creationId xmlns:p14="http://schemas.microsoft.com/office/powerpoint/2010/main" val="3085507398"/>
+        <p14:creationId xmlns:p14="http://schemas.microsoft.com/office/powerpoint/2010/main" val="1383607449"/>
       </p:ext>
     </p:extLst>
   </p:cSld>
@@ -20605,7 +21878,7 @@
           <p:cNvPr id="2" name="Title 1">
             <a:extLst>
               <a:ext uri="{FF2B5EF4-FFF2-40B4-BE49-F238E27FC236}">
-                <a16:creationId xmlns:a16="http://schemas.microsoft.com/office/drawing/2014/main" id="{74C9854A-991D-BE1C-55DF-59ED46CF396C}"/>
+                <a16:creationId xmlns:a16="http://schemas.microsoft.com/office/drawing/2014/main" id="{2A241C21-7C67-0CA9-CA3F-F84EF4244CB2}"/>
               </a:ext>
             </a:extLst>
           </p:cNvPr>
@@ -20616,50 +21889,87 @@
             <p:ph type="title"/>
           </p:nvPr>
         </p:nvSpPr>
-        <p:spPr/>
+        <p:spPr>
+          <a:xfrm>
+            <a:off x="2589212" y="0"/>
+            <a:ext cx="8911687" cy="1280890"/>
+          </a:xfrm>
+        </p:spPr>
         <p:txBody>
           <a:bodyPr/>
           <a:lstStyle/>
           <a:p>
             <a:r>
               <a:rPr lang="en-US" dirty="0"/>
-              <a:t>Azure Storage Queue</a:t>
+              <a:t>Subscriptions will have filters</a:t>
             </a:r>
           </a:p>
         </p:txBody>
       </p:sp>
-      <p:sp>
-        <p:nvSpPr>
-          <p:cNvPr id="3" name="Text Placeholder 2">
+      <p:pic>
+        <p:nvPicPr>
+          <p:cNvPr id="5" name="Picture 4">
             <a:extLst>
               <a:ext uri="{FF2B5EF4-FFF2-40B4-BE49-F238E27FC236}">
-                <a16:creationId xmlns:a16="http://schemas.microsoft.com/office/drawing/2014/main" id="{DC18811A-0EF0-BA29-A195-9468A42C4AF8}"/>
+                <a16:creationId xmlns:a16="http://schemas.microsoft.com/office/drawing/2014/main" id="{48BF96EC-3902-A2E6-359A-D712104B50DE}"/>
               </a:ext>
             </a:extLst>
           </p:cNvPr>
-          <p:cNvSpPr>
-            <a:spLocks noGrp="1"/>
-          </p:cNvSpPr>
-          <p:nvPr>
-            <p:ph type="body" idx="1"/>
-          </p:nvPr>
-        </p:nvSpPr>
-        <p:spPr/>
-        <p:txBody>
-          <a:bodyPr/>
-          <a:lstStyle/>
-          <a:p>
-            <a:r>
-              <a:rPr lang="en-US" dirty="0"/>
-              <a:t>A messaging solution that is mostly a queue</a:t>
-            </a:r>
-          </a:p>
-        </p:txBody>
-      </p:sp>
+          <p:cNvPicPr>
+            <a:picLocks noChangeAspect="1"/>
+          </p:cNvPicPr>
+          <p:nvPr/>
+        </p:nvPicPr>
+        <p:blipFill>
+          <a:blip r:embed="rId3"/>
+          <a:stretch>
+            <a:fillRect/>
+          </a:stretch>
+        </p:blipFill>
+        <p:spPr>
+          <a:xfrm>
+            <a:off x="1748554" y="2115237"/>
+            <a:ext cx="9602788" cy="3961010"/>
+          </a:xfrm>
+          <a:prstGeom prst="rect">
+            <a:avLst/>
+          </a:prstGeom>
+        </p:spPr>
+      </p:pic>
+      <p:pic>
+        <p:nvPicPr>
+          <p:cNvPr id="6" name="Picture 5">
+            <a:extLst>
+              <a:ext uri="{FF2B5EF4-FFF2-40B4-BE49-F238E27FC236}">
+                <a16:creationId xmlns:a16="http://schemas.microsoft.com/office/drawing/2014/main" id="{0484CAFA-B307-7159-6BCC-3F674A99EB6B}"/>
+              </a:ext>
+            </a:extLst>
+          </p:cNvPr>
+          <p:cNvPicPr>
+            <a:picLocks noChangeAspect="1"/>
+          </p:cNvPicPr>
+          <p:nvPr/>
+        </p:nvPicPr>
+        <p:blipFill>
+          <a:blip r:embed="rId4"/>
+          <a:stretch>
+            <a:fillRect/>
+          </a:stretch>
+        </p:blipFill>
+        <p:spPr>
+          <a:xfrm>
+            <a:off x="10648507" y="239458"/>
+            <a:ext cx="1365151" cy="1365151"/>
+          </a:xfrm>
+          <a:prstGeom prst="rect">
+            <a:avLst/>
+          </a:prstGeom>
+        </p:spPr>
+      </p:pic>
     </p:spTree>
     <p:extLst>
       <p:ext uri="{BB962C8B-B14F-4D97-AF65-F5344CB8AC3E}">
-        <p14:creationId xmlns:p14="http://schemas.microsoft.com/office/powerpoint/2010/main" val="936172737"/>
+        <p14:creationId xmlns:p14="http://schemas.microsoft.com/office/powerpoint/2010/main" val="2203396960"/>
       </p:ext>
     </p:extLst>
   </p:cSld>
@@ -20688,10 +21998,10 @@
       </p:grpSpPr>
       <p:sp>
         <p:nvSpPr>
-          <p:cNvPr id="4" name="Title 3">
+          <p:cNvPr id="2" name="Title 1">
             <a:extLst>
               <a:ext uri="{FF2B5EF4-FFF2-40B4-BE49-F238E27FC236}">
-                <a16:creationId xmlns:a16="http://schemas.microsoft.com/office/drawing/2014/main" id="{952A30AC-F54B-7FC2-C9BF-51FC741EEF49}"/>
+                <a16:creationId xmlns:a16="http://schemas.microsoft.com/office/drawing/2014/main" id="{EFD92866-C17E-073F-66F5-3BEA6790DDDF}"/>
               </a:ext>
             </a:extLst>
           </p:cNvPr>
@@ -20702,87 +22012,87 @@
             <p:ph type="title"/>
           </p:nvPr>
         </p:nvSpPr>
-        <p:spPr/>
+        <p:spPr>
+          <a:xfrm>
+            <a:off x="2592925" y="122665"/>
+            <a:ext cx="8911687" cy="1280890"/>
+          </a:xfrm>
+        </p:spPr>
         <p:txBody>
           <a:bodyPr/>
           <a:lstStyle/>
           <a:p>
             <a:r>
               <a:rPr lang="en-US" dirty="0"/>
-              <a:t>Azure Storage Queue</a:t>
+              <a:t>Add SAS tokens for producer and consumer rights</a:t>
             </a:r>
           </a:p>
         </p:txBody>
       </p:sp>
-      <p:sp>
-        <p:nvSpPr>
-          <p:cNvPr id="5" name="Content Placeholder 4">
+      <p:pic>
+        <p:nvPicPr>
+          <p:cNvPr id="5" name="Picture 4">
             <a:extLst>
               <a:ext uri="{FF2B5EF4-FFF2-40B4-BE49-F238E27FC236}">
-                <a16:creationId xmlns:a16="http://schemas.microsoft.com/office/drawing/2014/main" id="{AB8EE982-875D-CE3A-E589-49503DE4F5FF}"/>
+                <a16:creationId xmlns:a16="http://schemas.microsoft.com/office/drawing/2014/main" id="{B3AFC424-50AB-4C84-D4A3-B025695F3D44}"/>
               </a:ext>
             </a:extLst>
           </p:cNvPr>
-          <p:cNvSpPr>
-            <a:spLocks noGrp="1"/>
-          </p:cNvSpPr>
-          <p:nvPr>
-            <p:ph idx="1"/>
-          </p:nvPr>
-        </p:nvSpPr>
+          <p:cNvPicPr>
+            <a:picLocks noChangeAspect="1"/>
+          </p:cNvPicPr>
+          <p:nvPr/>
+        </p:nvPicPr>
+        <p:blipFill>
+          <a:blip r:embed="rId3"/>
+          <a:stretch>
+            <a:fillRect/>
+          </a:stretch>
+        </p:blipFill>
         <p:spPr>
           <a:xfrm>
-            <a:off x="2589212" y="1540188"/>
-            <a:ext cx="8915400" cy="4875359"/>
+            <a:off x="1430289" y="1858297"/>
+            <a:ext cx="10546066" cy="4132800"/>
           </a:xfrm>
+          <a:prstGeom prst="rect">
+            <a:avLst/>
+          </a:prstGeom>
         </p:spPr>
-        <p:txBody>
-          <a:bodyPr>
-            <a:normAutofit/>
-          </a:bodyPr>
-          <a:lstStyle/>
-          <a:p>
-            <a:r>
-              <a:rPr lang="en-US" sz="2400" dirty="0"/>
-              <a:t>Store Large numbers of messages</a:t>
-            </a:r>
-          </a:p>
-          <a:p>
-            <a:r>
-              <a:rPr lang="en-US" sz="2400" dirty="0"/>
-              <a:t>Up to 64kb in size per messaged</a:t>
-            </a:r>
-          </a:p>
-          <a:p>
-            <a:r>
-              <a:rPr lang="en-US" sz="2400" dirty="0"/>
-              <a:t>Use when you have massive amounts of messages that need to be processed in a decoupled fashion.</a:t>
-            </a:r>
-          </a:p>
-          <a:p>
-            <a:r>
-              <a:rPr lang="en-US" sz="2400" dirty="0"/>
-              <a:t>Access messages via HTTPs</a:t>
-            </a:r>
-          </a:p>
-          <a:p>
-            <a:r>
-              <a:rPr lang="en-US" sz="2400" dirty="0"/>
-              <a:t>Need to store &gt; 80GB of message data</a:t>
-            </a:r>
-          </a:p>
-          <a:p>
-            <a:r>
-              <a:rPr lang="en-US" sz="2400" dirty="0"/>
-              <a:t>Server-side logging of all message interaction</a:t>
-            </a:r>
-          </a:p>
-        </p:txBody>
-      </p:sp>
+      </p:pic>
+      <p:pic>
+        <p:nvPicPr>
+          <p:cNvPr id="6" name="Picture 5">
+            <a:extLst>
+              <a:ext uri="{FF2B5EF4-FFF2-40B4-BE49-F238E27FC236}">
+                <a16:creationId xmlns:a16="http://schemas.microsoft.com/office/drawing/2014/main" id="{1E4FBB5D-4CEF-E635-8D20-A45AB88DE9A7}"/>
+              </a:ext>
+            </a:extLst>
+          </p:cNvPr>
+          <p:cNvPicPr>
+            <a:picLocks noChangeAspect="1"/>
+          </p:cNvPicPr>
+          <p:nvPr/>
+        </p:nvPicPr>
+        <p:blipFill>
+          <a:blip r:embed="rId4"/>
+          <a:stretch>
+            <a:fillRect/>
+          </a:stretch>
+        </p:blipFill>
+        <p:spPr>
+          <a:xfrm>
+            <a:off x="10648507" y="239458"/>
+            <a:ext cx="1365151" cy="1365151"/>
+          </a:xfrm>
+          <a:prstGeom prst="rect">
+            <a:avLst/>
+          </a:prstGeom>
+        </p:spPr>
+      </p:pic>
     </p:spTree>
     <p:extLst>
       <p:ext uri="{BB962C8B-B14F-4D97-AF65-F5344CB8AC3E}">
-        <p14:creationId xmlns:p14="http://schemas.microsoft.com/office/powerpoint/2010/main" val="377170125"/>
+        <p14:creationId xmlns:p14="http://schemas.microsoft.com/office/powerpoint/2010/main" val="458480918"/>
       </p:ext>
     </p:extLst>
   </p:cSld>
@@ -20811,10 +22121,10 @@
       </p:grpSpPr>
       <p:sp>
         <p:nvSpPr>
-          <p:cNvPr id="4" name="Title 3">
+          <p:cNvPr id="2" name="Title 1">
             <a:extLst>
               <a:ext uri="{FF2B5EF4-FFF2-40B4-BE49-F238E27FC236}">
-                <a16:creationId xmlns:a16="http://schemas.microsoft.com/office/drawing/2014/main" id="{77A46606-5A61-3284-CB1C-3178ABA7C585}"/>
+                <a16:creationId xmlns:a16="http://schemas.microsoft.com/office/drawing/2014/main" id="{8B10B72A-E8EE-E103-3BAB-B209FBF0E099}"/>
               </a:ext>
             </a:extLst>
           </p:cNvPr>
@@ -20825,29 +22135,24 @@
             <p:ph type="title"/>
           </p:nvPr>
         </p:nvSpPr>
-        <p:spPr>
-          <a:xfrm>
-            <a:off x="2589213" y="5588869"/>
-            <a:ext cx="8915400" cy="566738"/>
-          </a:xfrm>
-        </p:spPr>
+        <p:spPr/>
         <p:txBody>
           <a:bodyPr/>
           <a:lstStyle/>
           <a:p>
             <a:r>
               <a:rPr lang="en-US" dirty="0"/>
-              <a:t>Creating an Azure Storage Queue</a:t>
+              <a:t>Publishing and Subscribing to messages</a:t>
             </a:r>
           </a:p>
         </p:txBody>
       </p:sp>
       <p:sp>
         <p:nvSpPr>
-          <p:cNvPr id="6" name="Text Placeholder 5">
+          <p:cNvPr id="3" name="Text Placeholder 2">
             <a:extLst>
               <a:ext uri="{FF2B5EF4-FFF2-40B4-BE49-F238E27FC236}">
-                <a16:creationId xmlns:a16="http://schemas.microsoft.com/office/drawing/2014/main" id="{D44A5037-043B-B3D3-7DFC-DC227A086EBC}"/>
+                <a16:creationId xmlns:a16="http://schemas.microsoft.com/office/drawing/2014/main" id="{862566A3-198E-5B8A-39BA-0D758BDFB39F}"/>
               </a:ext>
             </a:extLst>
           </p:cNvPr>
@@ -20855,57 +22160,25 @@
             <a:spLocks noGrp="1"/>
           </p:cNvSpPr>
           <p:nvPr>
-            <p:ph type="body" sz="half" idx="2"/>
-          </p:nvPr>
-        </p:nvSpPr>
-        <p:spPr>
-          <a:xfrm>
-            <a:off x="2589213" y="6235508"/>
-            <a:ext cx="8915400" cy="493712"/>
-          </a:xfrm>
-        </p:spPr>
+            <p:ph type="body" idx="1"/>
+          </p:nvPr>
+        </p:nvSpPr>
+        <p:spPr/>
         <p:txBody>
           <a:bodyPr/>
           <a:lstStyle/>
           <a:p>
-            <a:endParaRPr lang="en-US" dirty="0"/>
+            <a:r>
+              <a:rPr lang="en-US" dirty="0"/>
+              <a:t>Azure Service Bus messaging</a:t>
+            </a:r>
           </a:p>
         </p:txBody>
       </p:sp>
-      <p:pic>
-        <p:nvPicPr>
-          <p:cNvPr id="8" name="Picture 7">
-            <a:extLst>
-              <a:ext uri="{FF2B5EF4-FFF2-40B4-BE49-F238E27FC236}">
-                <a16:creationId xmlns:a16="http://schemas.microsoft.com/office/drawing/2014/main" id="{F1455356-C298-06AE-A98B-53C4E463A71B}"/>
-              </a:ext>
-            </a:extLst>
-          </p:cNvPr>
-          <p:cNvPicPr>
-            <a:picLocks noChangeAspect="1"/>
-          </p:cNvPicPr>
-          <p:nvPr/>
-        </p:nvPicPr>
-        <p:blipFill>
-          <a:blip r:embed="rId3"/>
-          <a:stretch>
-            <a:fillRect/>
-          </a:stretch>
-        </p:blipFill>
-        <p:spPr>
-          <a:xfrm>
-            <a:off x="3782233" y="375636"/>
-            <a:ext cx="5571429" cy="5133333"/>
-          </a:xfrm>
-          <a:prstGeom prst="rect">
-            <a:avLst/>
-          </a:prstGeom>
-        </p:spPr>
-      </p:pic>
     </p:spTree>
     <p:extLst>
       <p:ext uri="{BB962C8B-B14F-4D97-AF65-F5344CB8AC3E}">
-        <p14:creationId xmlns:p14="http://schemas.microsoft.com/office/powerpoint/2010/main" val="3965157898"/>
+        <p14:creationId xmlns:p14="http://schemas.microsoft.com/office/powerpoint/2010/main" val="3085507398"/>
       </p:ext>
     </p:extLst>
   </p:cSld>
@@ -20937,7 +22210,7 @@
           <p:cNvPr id="2" name="Title 1">
             <a:extLst>
               <a:ext uri="{FF2B5EF4-FFF2-40B4-BE49-F238E27FC236}">
-                <a16:creationId xmlns:a16="http://schemas.microsoft.com/office/drawing/2014/main" id="{6DEFA28E-0D29-4B0D-C566-DFF3CBCE8751}"/>
+                <a16:creationId xmlns:a16="http://schemas.microsoft.com/office/drawing/2014/main" id="{74C9854A-991D-BE1C-55DF-59ED46CF396C}"/>
               </a:ext>
             </a:extLst>
           </p:cNvPr>
@@ -20955,7 +22228,7 @@
           <a:p>
             <a:r>
               <a:rPr lang="en-US" dirty="0"/>
-              <a:t>Working with Azure Storage Queue</a:t>
+              <a:t>Azure Storage Queue</a:t>
             </a:r>
           </a:p>
         </p:txBody>
@@ -20965,7 +22238,7 @@
           <p:cNvPr id="3" name="Text Placeholder 2">
             <a:extLst>
               <a:ext uri="{FF2B5EF4-FFF2-40B4-BE49-F238E27FC236}">
-                <a16:creationId xmlns:a16="http://schemas.microsoft.com/office/drawing/2014/main" id="{FDC3333B-5646-73C0-6042-F6D59445D9EB}"/>
+                <a16:creationId xmlns:a16="http://schemas.microsoft.com/office/drawing/2014/main" id="{DC18811A-0EF0-BA29-A195-9468A42C4AF8}"/>
               </a:ext>
             </a:extLst>
           </p:cNvPr>
@@ -20983,15 +22256,51 @@
           <a:p>
             <a:r>
               <a:rPr lang="en-US" dirty="0"/>
-              <a:t>Utilizing Azure storage for your messaging solution</a:t>
+              <a:t>A messaging solution that is mostly a queue</a:t>
             </a:r>
           </a:p>
         </p:txBody>
       </p:sp>
+      <p:pic>
+        <p:nvPicPr>
+          <p:cNvPr id="4" name="Graphic 3">
+            <a:extLst>
+              <a:ext uri="{FF2B5EF4-FFF2-40B4-BE49-F238E27FC236}">
+                <a16:creationId xmlns:a16="http://schemas.microsoft.com/office/drawing/2014/main" id="{6A2CA1CC-F722-D76D-1B18-D70AB6FF9FE0}"/>
+              </a:ext>
+            </a:extLst>
+          </p:cNvPr>
+          <p:cNvPicPr>
+            <a:picLocks noChangeAspect="1"/>
+          </p:cNvPicPr>
+          <p:nvPr/>
+        </p:nvPicPr>
+        <p:blipFill>
+          <a:blip r:embed="rId3">
+            <a:extLst>
+              <a:ext uri="{96DAC541-7B7A-43D3-8B79-37D633B846F1}">
+                <asvg:svgBlip xmlns:asvg="http://schemas.microsoft.com/office/drawing/2016/SVG/main" r:embed="rId4"/>
+              </a:ext>
+            </a:extLst>
+          </a:blip>
+          <a:stretch>
+            <a:fillRect/>
+          </a:stretch>
+        </p:blipFill>
+        <p:spPr>
+          <a:xfrm>
+            <a:off x="8890461" y="0"/>
+            <a:ext cx="3099978" cy="3099978"/>
+          </a:xfrm>
+          <a:prstGeom prst="rect">
+            <a:avLst/>
+          </a:prstGeom>
+        </p:spPr>
+      </p:pic>
     </p:spTree>
     <p:extLst>
       <p:ext uri="{BB962C8B-B14F-4D97-AF65-F5344CB8AC3E}">
-        <p14:creationId xmlns:p14="http://schemas.microsoft.com/office/powerpoint/2010/main" val="3191085718"/>
+        <p14:creationId xmlns:p14="http://schemas.microsoft.com/office/powerpoint/2010/main" val="936172737"/>
       </p:ext>
     </p:extLst>
   </p:cSld>
@@ -21020,6 +22329,426 @@
       </p:grpSpPr>
       <p:sp>
         <p:nvSpPr>
+          <p:cNvPr id="4" name="Title 3">
+            <a:extLst>
+              <a:ext uri="{FF2B5EF4-FFF2-40B4-BE49-F238E27FC236}">
+                <a16:creationId xmlns:a16="http://schemas.microsoft.com/office/drawing/2014/main" id="{952A30AC-F54B-7FC2-C9BF-51FC741EEF49}"/>
+              </a:ext>
+            </a:extLst>
+          </p:cNvPr>
+          <p:cNvSpPr>
+            <a:spLocks noGrp="1"/>
+          </p:cNvSpPr>
+          <p:nvPr>
+            <p:ph type="title"/>
+          </p:nvPr>
+        </p:nvSpPr>
+        <p:spPr/>
+        <p:txBody>
+          <a:bodyPr/>
+          <a:lstStyle/>
+          <a:p>
+            <a:r>
+              <a:rPr lang="en-US" dirty="0"/>
+              <a:t>Azure Storage Queue</a:t>
+            </a:r>
+          </a:p>
+        </p:txBody>
+      </p:sp>
+      <p:sp>
+        <p:nvSpPr>
+          <p:cNvPr id="5" name="Content Placeholder 4">
+            <a:extLst>
+              <a:ext uri="{FF2B5EF4-FFF2-40B4-BE49-F238E27FC236}">
+                <a16:creationId xmlns:a16="http://schemas.microsoft.com/office/drawing/2014/main" id="{AB8EE982-875D-CE3A-E589-49503DE4F5FF}"/>
+              </a:ext>
+            </a:extLst>
+          </p:cNvPr>
+          <p:cNvSpPr>
+            <a:spLocks noGrp="1"/>
+          </p:cNvSpPr>
+          <p:nvPr>
+            <p:ph idx="1"/>
+          </p:nvPr>
+        </p:nvSpPr>
+        <p:spPr>
+          <a:xfrm>
+            <a:off x="2589212" y="1540188"/>
+            <a:ext cx="8915400" cy="4875359"/>
+          </a:xfrm>
+        </p:spPr>
+        <p:txBody>
+          <a:bodyPr>
+            <a:normAutofit/>
+          </a:bodyPr>
+          <a:lstStyle/>
+          <a:p>
+            <a:r>
+              <a:rPr lang="en-US" sz="2400" dirty="0"/>
+              <a:t>Store Large numbers of messages</a:t>
+            </a:r>
+          </a:p>
+          <a:p>
+            <a:r>
+              <a:rPr lang="en-US" sz="2400" dirty="0"/>
+              <a:t>Up to </a:t>
+            </a:r>
+            <a:r>
+              <a:rPr lang="en-US" sz="2400" b="1" dirty="0"/>
+              <a:t>64kb</a:t>
+            </a:r>
+            <a:r>
+              <a:rPr lang="en-US" sz="2400" dirty="0"/>
+              <a:t> in size per messaged</a:t>
+            </a:r>
+          </a:p>
+          <a:p>
+            <a:r>
+              <a:rPr lang="en-US" sz="2400" dirty="0"/>
+              <a:t>Use when you have massive amounts of messages that need to be processed in a decoupled fashion.</a:t>
+            </a:r>
+          </a:p>
+          <a:p>
+            <a:r>
+              <a:rPr lang="en-US" sz="2400" dirty="0"/>
+              <a:t>Access messages via HTTPs</a:t>
+            </a:r>
+          </a:p>
+          <a:p>
+            <a:r>
+              <a:rPr lang="en-US" sz="2400" dirty="0"/>
+              <a:t>Need to store </a:t>
+            </a:r>
+            <a:r>
+              <a:rPr lang="en-US" sz="2400" b="1" dirty="0"/>
+              <a:t>&gt; 80GB </a:t>
+            </a:r>
+            <a:r>
+              <a:rPr lang="en-US" sz="2400" dirty="0"/>
+              <a:t>of message data</a:t>
+            </a:r>
+          </a:p>
+          <a:p>
+            <a:r>
+              <a:rPr lang="en-US" sz="2400" dirty="0"/>
+              <a:t>Server-side logging of all message interaction</a:t>
+            </a:r>
+          </a:p>
+        </p:txBody>
+      </p:sp>
+      <p:pic>
+        <p:nvPicPr>
+          <p:cNvPr id="6" name="Graphic 5">
+            <a:extLst>
+              <a:ext uri="{FF2B5EF4-FFF2-40B4-BE49-F238E27FC236}">
+                <a16:creationId xmlns:a16="http://schemas.microsoft.com/office/drawing/2014/main" id="{6C96E896-5A98-C687-CF7C-6C79B1915F39}"/>
+              </a:ext>
+            </a:extLst>
+          </p:cNvPr>
+          <p:cNvPicPr>
+            <a:picLocks noChangeAspect="1"/>
+          </p:cNvPicPr>
+          <p:nvPr/>
+        </p:nvPicPr>
+        <p:blipFill>
+          <a:blip r:embed="rId3">
+            <a:extLst>
+              <a:ext uri="{96DAC541-7B7A-43D3-8B79-37D633B846F1}">
+                <asvg:svgBlip xmlns:asvg="http://schemas.microsoft.com/office/drawing/2016/SVG/main" r:embed="rId4"/>
+              </a:ext>
+            </a:extLst>
+          </a:blip>
+          <a:stretch>
+            <a:fillRect/>
+          </a:stretch>
+        </p:blipFill>
+        <p:spPr>
+          <a:xfrm>
+            <a:off x="10498034" y="0"/>
+            <a:ext cx="1477671" cy="1477671"/>
+          </a:xfrm>
+          <a:prstGeom prst="rect">
+            <a:avLst/>
+          </a:prstGeom>
+        </p:spPr>
+      </p:pic>
+    </p:spTree>
+    <p:extLst>
+      <p:ext uri="{BB962C8B-B14F-4D97-AF65-F5344CB8AC3E}">
+        <p14:creationId xmlns:p14="http://schemas.microsoft.com/office/powerpoint/2010/main" val="377170125"/>
+      </p:ext>
+    </p:extLst>
+  </p:cSld>
+  <p:clrMapOvr>
+    <a:masterClrMapping/>
+  </p:clrMapOvr>
+</p:sld>
+</file>
+
+<file path=ppt/slides/slide47.xml><?xml version="1.0" encoding="utf-8"?>
+<p:sld xmlns:a="http://schemas.openxmlformats.org/drawingml/2006/main" xmlns:r="http://schemas.openxmlformats.org/officeDocument/2006/relationships" xmlns:p="http://schemas.openxmlformats.org/presentationml/2006/main">
+  <p:cSld>
+    <p:spTree>
+      <p:nvGrpSpPr>
+        <p:cNvPr id="1" name=""/>
+        <p:cNvGrpSpPr/>
+        <p:nvPr/>
+      </p:nvGrpSpPr>
+      <p:grpSpPr>
+        <a:xfrm>
+          <a:off x="0" y="0"/>
+          <a:ext cx="0" cy="0"/>
+          <a:chOff x="0" y="0"/>
+          <a:chExt cx="0" cy="0"/>
+        </a:xfrm>
+      </p:grpSpPr>
+      <p:sp>
+        <p:nvSpPr>
+          <p:cNvPr id="4" name="Title 3">
+            <a:extLst>
+              <a:ext uri="{FF2B5EF4-FFF2-40B4-BE49-F238E27FC236}">
+                <a16:creationId xmlns:a16="http://schemas.microsoft.com/office/drawing/2014/main" id="{77A46606-5A61-3284-CB1C-3178ABA7C585}"/>
+              </a:ext>
+            </a:extLst>
+          </p:cNvPr>
+          <p:cNvSpPr>
+            <a:spLocks noGrp="1"/>
+          </p:cNvSpPr>
+          <p:nvPr>
+            <p:ph type="title"/>
+          </p:nvPr>
+        </p:nvSpPr>
+        <p:spPr>
+          <a:xfrm>
+            <a:off x="2589213" y="5588869"/>
+            <a:ext cx="8915400" cy="566738"/>
+          </a:xfrm>
+        </p:spPr>
+        <p:txBody>
+          <a:bodyPr/>
+          <a:lstStyle/>
+          <a:p>
+            <a:r>
+              <a:rPr lang="en-US" dirty="0"/>
+              <a:t>Creating an Azure Storage Queue</a:t>
+            </a:r>
+          </a:p>
+        </p:txBody>
+      </p:sp>
+      <p:sp>
+        <p:nvSpPr>
+          <p:cNvPr id="6" name="Text Placeholder 5">
+            <a:extLst>
+              <a:ext uri="{FF2B5EF4-FFF2-40B4-BE49-F238E27FC236}">
+                <a16:creationId xmlns:a16="http://schemas.microsoft.com/office/drawing/2014/main" id="{D44A5037-043B-B3D3-7DFC-DC227A086EBC}"/>
+              </a:ext>
+            </a:extLst>
+          </p:cNvPr>
+          <p:cNvSpPr>
+            <a:spLocks noGrp="1"/>
+          </p:cNvSpPr>
+          <p:nvPr>
+            <p:ph type="body" sz="half" idx="2"/>
+          </p:nvPr>
+        </p:nvSpPr>
+        <p:spPr>
+          <a:xfrm>
+            <a:off x="2589213" y="6235508"/>
+            <a:ext cx="8915400" cy="493712"/>
+          </a:xfrm>
+        </p:spPr>
+        <p:txBody>
+          <a:bodyPr/>
+          <a:lstStyle/>
+          <a:p>
+            <a:endParaRPr lang="en-US" dirty="0"/>
+          </a:p>
+        </p:txBody>
+      </p:sp>
+      <p:pic>
+        <p:nvPicPr>
+          <p:cNvPr id="5" name="Graphic 4">
+            <a:extLst>
+              <a:ext uri="{FF2B5EF4-FFF2-40B4-BE49-F238E27FC236}">
+                <a16:creationId xmlns:a16="http://schemas.microsoft.com/office/drawing/2014/main" id="{A2C542C6-13D8-866A-5EC0-BBB2884B2BA1}"/>
+              </a:ext>
+            </a:extLst>
+          </p:cNvPr>
+          <p:cNvPicPr>
+            <a:picLocks noChangeAspect="1"/>
+          </p:cNvPicPr>
+          <p:nvPr/>
+        </p:nvPicPr>
+        <p:blipFill>
+          <a:blip r:embed="rId3">
+            <a:extLst>
+              <a:ext uri="{96DAC541-7B7A-43D3-8B79-37D633B846F1}">
+                <asvg:svgBlip xmlns:asvg="http://schemas.microsoft.com/office/drawing/2016/SVG/main" r:embed="rId4"/>
+              </a:ext>
+            </a:extLst>
+          </a:blip>
+          <a:stretch>
+            <a:fillRect/>
+          </a:stretch>
+        </p:blipFill>
+        <p:spPr>
+          <a:xfrm>
+            <a:off x="10527532" y="-36443"/>
+            <a:ext cx="1477671" cy="1477671"/>
+          </a:xfrm>
+          <a:prstGeom prst="rect">
+            <a:avLst/>
+          </a:prstGeom>
+        </p:spPr>
+      </p:pic>
+      <p:pic>
+        <p:nvPicPr>
+          <p:cNvPr id="3" name="Picture 2">
+            <a:extLst>
+              <a:ext uri="{FF2B5EF4-FFF2-40B4-BE49-F238E27FC236}">
+                <a16:creationId xmlns:a16="http://schemas.microsoft.com/office/drawing/2014/main" id="{64385C85-D73F-49FD-07B3-B84CC0F23F9A}"/>
+              </a:ext>
+            </a:extLst>
+          </p:cNvPr>
+          <p:cNvPicPr>
+            <a:picLocks noChangeAspect="1"/>
+          </p:cNvPicPr>
+          <p:nvPr/>
+        </p:nvPicPr>
+        <p:blipFill>
+          <a:blip r:embed="rId5"/>
+          <a:stretch>
+            <a:fillRect/>
+          </a:stretch>
+        </p:blipFill>
+        <p:spPr>
+          <a:xfrm>
+            <a:off x="2769087" y="1253613"/>
+            <a:ext cx="7189087" cy="3804534"/>
+          </a:xfrm>
+          <a:prstGeom prst="rect">
+            <a:avLst/>
+          </a:prstGeom>
+        </p:spPr>
+      </p:pic>
+    </p:spTree>
+    <p:extLst>
+      <p:ext uri="{BB962C8B-B14F-4D97-AF65-F5344CB8AC3E}">
+        <p14:creationId xmlns:p14="http://schemas.microsoft.com/office/powerpoint/2010/main" val="3965157898"/>
+      </p:ext>
+    </p:extLst>
+  </p:cSld>
+  <p:clrMapOvr>
+    <a:masterClrMapping/>
+  </p:clrMapOvr>
+</p:sld>
+</file>
+
+<file path=ppt/slides/slide48.xml><?xml version="1.0" encoding="utf-8"?>
+<p:sld xmlns:a="http://schemas.openxmlformats.org/drawingml/2006/main" xmlns:r="http://schemas.openxmlformats.org/officeDocument/2006/relationships" xmlns:p="http://schemas.openxmlformats.org/presentationml/2006/main">
+  <p:cSld>
+    <p:spTree>
+      <p:nvGrpSpPr>
+        <p:cNvPr id="1" name=""/>
+        <p:cNvGrpSpPr/>
+        <p:nvPr/>
+      </p:nvGrpSpPr>
+      <p:grpSpPr>
+        <a:xfrm>
+          <a:off x="0" y="0"/>
+          <a:ext cx="0" cy="0"/>
+          <a:chOff x="0" y="0"/>
+          <a:chExt cx="0" cy="0"/>
+        </a:xfrm>
+      </p:grpSpPr>
+      <p:sp>
+        <p:nvSpPr>
+          <p:cNvPr id="2" name="Title 1">
+            <a:extLst>
+              <a:ext uri="{FF2B5EF4-FFF2-40B4-BE49-F238E27FC236}">
+                <a16:creationId xmlns:a16="http://schemas.microsoft.com/office/drawing/2014/main" id="{6DEFA28E-0D29-4B0D-C566-DFF3CBCE8751}"/>
+              </a:ext>
+            </a:extLst>
+          </p:cNvPr>
+          <p:cNvSpPr>
+            <a:spLocks noGrp="1"/>
+          </p:cNvSpPr>
+          <p:nvPr>
+            <p:ph type="title"/>
+          </p:nvPr>
+        </p:nvSpPr>
+        <p:spPr/>
+        <p:txBody>
+          <a:bodyPr/>
+          <a:lstStyle/>
+          <a:p>
+            <a:r>
+              <a:rPr lang="en-US" dirty="0"/>
+              <a:t>Working with Azure Storage Queue</a:t>
+            </a:r>
+          </a:p>
+        </p:txBody>
+      </p:sp>
+      <p:sp>
+        <p:nvSpPr>
+          <p:cNvPr id="3" name="Text Placeholder 2">
+            <a:extLst>
+              <a:ext uri="{FF2B5EF4-FFF2-40B4-BE49-F238E27FC236}">
+                <a16:creationId xmlns:a16="http://schemas.microsoft.com/office/drawing/2014/main" id="{FDC3333B-5646-73C0-6042-F6D59445D9EB}"/>
+              </a:ext>
+            </a:extLst>
+          </p:cNvPr>
+          <p:cNvSpPr>
+            <a:spLocks noGrp="1"/>
+          </p:cNvSpPr>
+          <p:nvPr>
+            <p:ph type="body" idx="1"/>
+          </p:nvPr>
+        </p:nvSpPr>
+        <p:spPr/>
+        <p:txBody>
+          <a:bodyPr/>
+          <a:lstStyle/>
+          <a:p>
+            <a:r>
+              <a:rPr lang="en-US" dirty="0"/>
+              <a:t>Utilizing Azure storage for your messaging solution</a:t>
+            </a:r>
+          </a:p>
+        </p:txBody>
+      </p:sp>
+    </p:spTree>
+    <p:extLst>
+      <p:ext uri="{BB962C8B-B14F-4D97-AF65-F5344CB8AC3E}">
+        <p14:creationId xmlns:p14="http://schemas.microsoft.com/office/powerpoint/2010/main" val="3191085718"/>
+      </p:ext>
+    </p:extLst>
+  </p:cSld>
+  <p:clrMapOvr>
+    <a:masterClrMapping/>
+  </p:clrMapOvr>
+</p:sld>
+</file>
+
+<file path=ppt/slides/slide49.xml><?xml version="1.0" encoding="utf-8"?>
+<p:sld xmlns:a="http://schemas.openxmlformats.org/drawingml/2006/main" xmlns:r="http://schemas.openxmlformats.org/officeDocument/2006/relationships" xmlns:p="http://schemas.openxmlformats.org/presentationml/2006/main">
+  <p:cSld>
+    <p:spTree>
+      <p:nvGrpSpPr>
+        <p:cNvPr id="1" name=""/>
+        <p:cNvGrpSpPr/>
+        <p:nvPr/>
+      </p:nvGrpSpPr>
+      <p:grpSpPr>
+        <a:xfrm>
+          <a:off x="0" y="0"/>
+          <a:ext cx="0" cy="0"/>
+          <a:chOff x="0" y="0"/>
+          <a:chExt cx="0" cy="0"/>
+        </a:xfrm>
+      </p:grpSpPr>
+      <p:sp>
+        <p:nvSpPr>
           <p:cNvPr id="2" name="Title 1">
             <a:extLst>
               <a:ext uri="{FF2B5EF4-FFF2-40B4-BE49-F238E27FC236}">
@@ -21111,7 +22840,204 @@
 </p:sld>
 </file>
 
-<file path=ppt/slides/slide47.xml><?xml version="1.0" encoding="utf-8"?>
+<file path=ppt/slides/slide5.xml><?xml version="1.0" encoding="utf-8"?>
+<p:sld xmlns:a="http://schemas.openxmlformats.org/drawingml/2006/main" xmlns:r="http://schemas.openxmlformats.org/officeDocument/2006/relationships" xmlns:p="http://schemas.openxmlformats.org/presentationml/2006/main">
+  <p:cSld>
+    <p:spTree>
+      <p:nvGrpSpPr>
+        <p:cNvPr id="1" name=""/>
+        <p:cNvGrpSpPr/>
+        <p:nvPr/>
+      </p:nvGrpSpPr>
+      <p:grpSpPr>
+        <a:xfrm>
+          <a:off x="0" y="0"/>
+          <a:ext cx="0" cy="0"/>
+          <a:chOff x="0" y="0"/>
+          <a:chExt cx="0" cy="0"/>
+        </a:xfrm>
+      </p:grpSpPr>
+      <p:sp>
+        <p:nvSpPr>
+          <p:cNvPr id="2" name="Title 1">
+            <a:extLst>
+              <a:ext uri="{FF2B5EF4-FFF2-40B4-BE49-F238E27FC236}">
+                <a16:creationId xmlns:a16="http://schemas.microsoft.com/office/drawing/2014/main" id="{7F04A875-7BA8-6AAC-E64F-5D74DEF2FF0C}"/>
+              </a:ext>
+            </a:extLst>
+          </p:cNvPr>
+          <p:cNvSpPr>
+            <a:spLocks noGrp="1"/>
+          </p:cNvSpPr>
+          <p:nvPr>
+            <p:ph type="title"/>
+          </p:nvPr>
+        </p:nvSpPr>
+        <p:spPr/>
+        <p:txBody>
+          <a:bodyPr/>
+          <a:lstStyle/>
+          <a:p>
+            <a:r>
+              <a:rPr lang="en-US" dirty="0"/>
+              <a:t>Event Hub Namespace</a:t>
+            </a:r>
+          </a:p>
+        </p:txBody>
+      </p:sp>
+      <p:sp>
+        <p:nvSpPr>
+          <p:cNvPr id="3" name="Content Placeholder 2">
+            <a:extLst>
+              <a:ext uri="{FF2B5EF4-FFF2-40B4-BE49-F238E27FC236}">
+                <a16:creationId xmlns:a16="http://schemas.microsoft.com/office/drawing/2014/main" id="{CBF8E94F-9222-C64C-023C-7DF22581ECBF}"/>
+              </a:ext>
+            </a:extLst>
+          </p:cNvPr>
+          <p:cNvSpPr>
+            <a:spLocks noGrp="1"/>
+          </p:cNvSpPr>
+          <p:nvPr>
+            <p:ph idx="1"/>
+          </p:nvPr>
+        </p:nvSpPr>
+        <p:spPr>
+          <a:xfrm>
+            <a:off x="2589212" y="1487424"/>
+            <a:ext cx="8915400" cy="4423798"/>
+          </a:xfrm>
+        </p:spPr>
+        <p:txBody>
+          <a:bodyPr>
+            <a:normAutofit lnSpcReduction="10000"/>
+          </a:bodyPr>
+          <a:lstStyle/>
+          <a:p>
+            <a:r>
+              <a:rPr lang="en-US" sz="2400" dirty="0"/>
+              <a:t>Houses one or more hubs</a:t>
+            </a:r>
+          </a:p>
+          <a:p>
+            <a:r>
+              <a:rPr lang="en-US" sz="2400" dirty="0"/>
+              <a:t>Unique FQDN across Azure</a:t>
+            </a:r>
+          </a:p>
+          <a:p>
+            <a:r>
+              <a:rPr lang="en-US" sz="2400" dirty="0"/>
+              <a:t>Determines the tier/pricing</a:t>
+            </a:r>
+          </a:p>
+          <a:p>
+            <a:pPr lvl="1"/>
+            <a:r>
+              <a:rPr lang="en-US" sz="2000" dirty="0"/>
+              <a:t>Assigns the number of throughput units [1-40]</a:t>
+            </a:r>
+          </a:p>
+          <a:p>
+            <a:pPr lvl="1"/>
+            <a:r>
+              <a:rPr lang="en-US" sz="2000" dirty="0"/>
+              <a:t>Standard or better can “Auto Inflate” to more TUs</a:t>
+            </a:r>
+          </a:p>
+          <a:p>
+            <a:pPr lvl="1"/>
+            <a:r>
+              <a:rPr lang="en-US" sz="2000" dirty="0"/>
+              <a:t>Standard or better for enabling Capture events [push to storage, </a:t>
+            </a:r>
+            <a:r>
+              <a:rPr lang="en-US" sz="2000" dirty="0" err="1"/>
+              <a:t>etc</a:t>
+            </a:r>
+            <a:r>
+              <a:rPr lang="en-US" sz="2000" dirty="0"/>
+              <a:t>]</a:t>
+            </a:r>
+          </a:p>
+          <a:p>
+            <a:pPr lvl="1"/>
+            <a:r>
+              <a:rPr lang="en-US" sz="2000" dirty="0"/>
+              <a:t>TU limits:</a:t>
+            </a:r>
+          </a:p>
+          <a:p>
+            <a:pPr lvl="2"/>
+            <a:r>
+              <a:rPr lang="en-US" sz="1800" dirty="0"/>
+              <a:t>Ingress: Up to 1 MB per second or 1000 events per second (whichever comes first).</a:t>
+            </a:r>
+          </a:p>
+          <a:p>
+            <a:pPr lvl="2"/>
+            <a:r>
+              <a:rPr lang="en-US" sz="1800" dirty="0"/>
+              <a:t>Egress: Up to 2 MB per second or 4096 events per second.</a:t>
+            </a:r>
+          </a:p>
+          <a:p>
+            <a:pPr marL="914400" lvl="2" indent="0">
+              <a:buNone/>
+            </a:pPr>
+            <a:endParaRPr lang="en-US" dirty="0"/>
+          </a:p>
+        </p:txBody>
+      </p:sp>
+      <p:pic>
+        <p:nvPicPr>
+          <p:cNvPr id="4" name="Graphic 3">
+            <a:extLst>
+              <a:ext uri="{FF2B5EF4-FFF2-40B4-BE49-F238E27FC236}">
+                <a16:creationId xmlns:a16="http://schemas.microsoft.com/office/drawing/2014/main" id="{9E00E6CD-2A7D-32F5-3736-C81D9F22A2F7}"/>
+              </a:ext>
+            </a:extLst>
+          </p:cNvPr>
+          <p:cNvPicPr>
+            <a:picLocks noChangeAspect="1"/>
+          </p:cNvPicPr>
+          <p:nvPr/>
+        </p:nvPicPr>
+        <p:blipFill>
+          <a:blip r:embed="rId2">
+            <a:extLst>
+              <a:ext uri="{96DAC541-7B7A-43D3-8B79-37D633B846F1}">
+                <asvg:svgBlip xmlns:asvg="http://schemas.microsoft.com/office/drawing/2016/SVG/main" r:embed="rId3"/>
+              </a:ext>
+            </a:extLst>
+          </a:blip>
+          <a:stretch>
+            <a:fillRect/>
+          </a:stretch>
+        </p:blipFill>
+        <p:spPr>
+          <a:xfrm>
+            <a:off x="10580886" y="0"/>
+            <a:ext cx="1477671" cy="1477671"/>
+          </a:xfrm>
+          <a:prstGeom prst="rect">
+            <a:avLst/>
+          </a:prstGeom>
+        </p:spPr>
+      </p:pic>
+    </p:spTree>
+    <p:extLst>
+      <p:ext uri="{BB962C8B-B14F-4D97-AF65-F5344CB8AC3E}">
+        <p14:creationId xmlns:p14="http://schemas.microsoft.com/office/powerpoint/2010/main" val="3224179745"/>
+      </p:ext>
+    </p:extLst>
+  </p:cSld>
+  <p:clrMapOvr>
+    <a:masterClrMapping/>
+  </p:clrMapOvr>
+</p:sld>
+</file>
+
+<file path=ppt/slides/slide50.xml><?xml version="1.0" encoding="utf-8"?>
 <p:sld xmlns:a="http://schemas.openxmlformats.org/drawingml/2006/main" xmlns:r="http://schemas.openxmlformats.org/officeDocument/2006/relationships" xmlns:p="http://schemas.openxmlformats.org/presentationml/2006/main">
   <p:cSld>
     <p:bg>
@@ -23809,7 +25735,7 @@
 </p:sld>
 </file>
 
-<file path=ppt/slides/slide48.xml><?xml version="1.0" encoding="utf-8"?>
+<file path=ppt/slides/slide51.xml><?xml version="1.0" encoding="utf-8"?>
 <p:sld xmlns:a="http://schemas.openxmlformats.org/drawingml/2006/main" xmlns:r="http://schemas.openxmlformats.org/officeDocument/2006/relationships" xmlns:p="http://schemas.openxmlformats.org/presentationml/2006/main">
   <p:cSld>
     <p:spTree>
@@ -24053,203 +25979,6 @@
     <p:extLst>
       <p:ext uri="{BB962C8B-B14F-4D97-AF65-F5344CB8AC3E}">
         <p14:creationId xmlns:p14="http://schemas.microsoft.com/office/powerpoint/2010/main" val="1503717419"/>
-      </p:ext>
-    </p:extLst>
-  </p:cSld>
-  <p:clrMapOvr>
-    <a:masterClrMapping/>
-  </p:clrMapOvr>
-</p:sld>
-</file>
-
-<file path=ppt/slides/slide5.xml><?xml version="1.0" encoding="utf-8"?>
-<p:sld xmlns:a="http://schemas.openxmlformats.org/drawingml/2006/main" xmlns:r="http://schemas.openxmlformats.org/officeDocument/2006/relationships" xmlns:p="http://schemas.openxmlformats.org/presentationml/2006/main">
-  <p:cSld>
-    <p:spTree>
-      <p:nvGrpSpPr>
-        <p:cNvPr id="1" name=""/>
-        <p:cNvGrpSpPr/>
-        <p:nvPr/>
-      </p:nvGrpSpPr>
-      <p:grpSpPr>
-        <a:xfrm>
-          <a:off x="0" y="0"/>
-          <a:ext cx="0" cy="0"/>
-          <a:chOff x="0" y="0"/>
-          <a:chExt cx="0" cy="0"/>
-        </a:xfrm>
-      </p:grpSpPr>
-      <p:sp>
-        <p:nvSpPr>
-          <p:cNvPr id="2" name="Title 1">
-            <a:extLst>
-              <a:ext uri="{FF2B5EF4-FFF2-40B4-BE49-F238E27FC236}">
-                <a16:creationId xmlns:a16="http://schemas.microsoft.com/office/drawing/2014/main" id="{7F04A875-7BA8-6AAC-E64F-5D74DEF2FF0C}"/>
-              </a:ext>
-            </a:extLst>
-          </p:cNvPr>
-          <p:cNvSpPr>
-            <a:spLocks noGrp="1"/>
-          </p:cNvSpPr>
-          <p:nvPr>
-            <p:ph type="title"/>
-          </p:nvPr>
-        </p:nvSpPr>
-        <p:spPr/>
-        <p:txBody>
-          <a:bodyPr/>
-          <a:lstStyle/>
-          <a:p>
-            <a:r>
-              <a:rPr lang="en-US" dirty="0"/>
-              <a:t>Event Hub Namespace</a:t>
-            </a:r>
-          </a:p>
-        </p:txBody>
-      </p:sp>
-      <p:sp>
-        <p:nvSpPr>
-          <p:cNvPr id="3" name="Content Placeholder 2">
-            <a:extLst>
-              <a:ext uri="{FF2B5EF4-FFF2-40B4-BE49-F238E27FC236}">
-                <a16:creationId xmlns:a16="http://schemas.microsoft.com/office/drawing/2014/main" id="{CBF8E94F-9222-C64C-023C-7DF22581ECBF}"/>
-              </a:ext>
-            </a:extLst>
-          </p:cNvPr>
-          <p:cNvSpPr>
-            <a:spLocks noGrp="1"/>
-          </p:cNvSpPr>
-          <p:nvPr>
-            <p:ph idx="1"/>
-          </p:nvPr>
-        </p:nvSpPr>
-        <p:spPr>
-          <a:xfrm>
-            <a:off x="2589212" y="1487424"/>
-            <a:ext cx="8915400" cy="4423798"/>
-          </a:xfrm>
-        </p:spPr>
-        <p:txBody>
-          <a:bodyPr>
-            <a:normAutofit lnSpcReduction="10000"/>
-          </a:bodyPr>
-          <a:lstStyle/>
-          <a:p>
-            <a:r>
-              <a:rPr lang="en-US" sz="2400" dirty="0"/>
-              <a:t>Houses one or more hubs</a:t>
-            </a:r>
-          </a:p>
-          <a:p>
-            <a:r>
-              <a:rPr lang="en-US" sz="2400" dirty="0"/>
-              <a:t>Unique FQDN across Azure</a:t>
-            </a:r>
-          </a:p>
-          <a:p>
-            <a:r>
-              <a:rPr lang="en-US" sz="2400" dirty="0"/>
-              <a:t>Determines the tier/pricing</a:t>
-            </a:r>
-          </a:p>
-          <a:p>
-            <a:pPr lvl="1"/>
-            <a:r>
-              <a:rPr lang="en-US" sz="2000" dirty="0"/>
-              <a:t>Assigns the number of throughput units [1-40]</a:t>
-            </a:r>
-          </a:p>
-          <a:p>
-            <a:pPr lvl="1"/>
-            <a:r>
-              <a:rPr lang="en-US" sz="2000" dirty="0"/>
-              <a:t>Standard or better can “Auto Inflate” to more TUs</a:t>
-            </a:r>
-          </a:p>
-          <a:p>
-            <a:pPr lvl="1"/>
-            <a:r>
-              <a:rPr lang="en-US" sz="2000" dirty="0"/>
-              <a:t>Standard or better for enabling Capture events [push to storage, </a:t>
-            </a:r>
-            <a:r>
-              <a:rPr lang="en-US" sz="2000" dirty="0" err="1"/>
-              <a:t>etc</a:t>
-            </a:r>
-            <a:r>
-              <a:rPr lang="en-US" sz="2000" dirty="0"/>
-              <a:t>]</a:t>
-            </a:r>
-          </a:p>
-          <a:p>
-            <a:pPr lvl="1"/>
-            <a:r>
-              <a:rPr lang="en-US" sz="2000" dirty="0"/>
-              <a:t>TU limits:</a:t>
-            </a:r>
-          </a:p>
-          <a:p>
-            <a:pPr lvl="2"/>
-            <a:r>
-              <a:rPr lang="en-US" sz="1800" dirty="0"/>
-              <a:t>Ingress: Up to 1 MB per second or 1000 events per second (whichever comes first).</a:t>
-            </a:r>
-          </a:p>
-          <a:p>
-            <a:pPr lvl="2"/>
-            <a:r>
-              <a:rPr lang="en-US" sz="1800" dirty="0"/>
-              <a:t>Egress: Up to 2 MB per second or 4096 events per second.</a:t>
-            </a:r>
-          </a:p>
-          <a:p>
-            <a:pPr marL="914400" lvl="2" indent="0">
-              <a:buNone/>
-            </a:pPr>
-            <a:endParaRPr lang="en-US" dirty="0"/>
-          </a:p>
-        </p:txBody>
-      </p:sp>
-      <p:pic>
-        <p:nvPicPr>
-          <p:cNvPr id="4" name="Graphic 3">
-            <a:extLst>
-              <a:ext uri="{FF2B5EF4-FFF2-40B4-BE49-F238E27FC236}">
-                <a16:creationId xmlns:a16="http://schemas.microsoft.com/office/drawing/2014/main" id="{9E00E6CD-2A7D-32F5-3736-C81D9F22A2F7}"/>
-              </a:ext>
-            </a:extLst>
-          </p:cNvPr>
-          <p:cNvPicPr>
-            <a:picLocks noChangeAspect="1"/>
-          </p:cNvPicPr>
-          <p:nvPr/>
-        </p:nvPicPr>
-        <p:blipFill>
-          <a:blip r:embed="rId2">
-            <a:extLst>
-              <a:ext uri="{96DAC541-7B7A-43D3-8B79-37D633B846F1}">
-                <asvg:svgBlip xmlns:asvg="http://schemas.microsoft.com/office/drawing/2016/SVG/main" r:embed="rId3"/>
-              </a:ext>
-            </a:extLst>
-          </a:blip>
-          <a:stretch>
-            <a:fillRect/>
-          </a:stretch>
-        </p:blipFill>
-        <p:spPr>
-          <a:xfrm>
-            <a:off x="10580886" y="0"/>
-            <a:ext cx="1477671" cy="1477671"/>
-          </a:xfrm>
-          <a:prstGeom prst="rect">
-            <a:avLst/>
-          </a:prstGeom>
-        </p:spPr>
-      </p:pic>
-    </p:spTree>
-    <p:extLst>
-      <p:ext uri="{BB962C8B-B14F-4D97-AF65-F5344CB8AC3E}">
-        <p14:creationId xmlns:p14="http://schemas.microsoft.com/office/powerpoint/2010/main" val="3224179745"/>
       </p:ext>
     </p:extLst>
   </p:cSld>

</xml_diff>

<commit_message>
updates to storage queue and slides
</commit_message>
<xml_diff>
--- a/ServerlessMessagingDemystified.pptx
+++ b/ServerlessMessagingDemystified.pptx
@@ -4227,10 +4227,18 @@
               <a:t></a:t>
             </a:r>
             <a:br>
-              <a:rPr lang="en-US" dirty="0">
+              <a:rPr lang="en-US">
                 <a:sym typeface="Wingdings" panose="05000000000000000000" pitchFamily="2" charset="2"/>
               </a:rPr>
             </a:br>
+            <a:r>
+              <a:rPr lang="en-US">
+                <a:sym typeface="Wingdings" panose="05000000000000000000" pitchFamily="2" charset="2"/>
+              </a:rPr>
+              <a:t>https://open.spotify.com/artist/0rRlrvBVhAhZCHcENoiFJ0</a:t>
+            </a:r>
+          </a:p>
+          <a:p>
             <a:endParaRPr lang="en-US" dirty="0">
               <a:sym typeface="Wingdings" panose="05000000000000000000" pitchFamily="2" charset="2"/>
             </a:endParaRPr>

</xml_diff>